<commit_message>
some more changes... still not done
</commit_message>
<xml_diff>
--- a/dependencies/dependencies.pptx
+++ b/dependencies/dependencies.pptx
@@ -5,7 +5,7 @@
     <p:sldMasterId id="2147483648" r:id="rId1"/>
   </p:sldMasterIdLst>
   <p:notesMasterIdLst>
-    <p:notesMasterId r:id="rId16"/>
+    <p:notesMasterId r:id="rId31"/>
   </p:notesMasterIdLst>
   <p:sldIdLst>
     <p:sldId id="256" r:id="rId2"/>
@@ -22,6 +22,21 @@
     <p:sldId id="267" r:id="rId13"/>
     <p:sldId id="268" r:id="rId14"/>
     <p:sldId id="269" r:id="rId15"/>
+    <p:sldId id="271" r:id="rId16"/>
+    <p:sldId id="273" r:id="rId17"/>
+    <p:sldId id="272" r:id="rId18"/>
+    <p:sldId id="274" r:id="rId19"/>
+    <p:sldId id="275" r:id="rId20"/>
+    <p:sldId id="276" r:id="rId21"/>
+    <p:sldId id="277" r:id="rId22"/>
+    <p:sldId id="279" r:id="rId23"/>
+    <p:sldId id="278" r:id="rId24"/>
+    <p:sldId id="280" r:id="rId25"/>
+    <p:sldId id="281" r:id="rId26"/>
+    <p:sldId id="282" r:id="rId27"/>
+    <p:sldId id="283" r:id="rId28"/>
+    <p:sldId id="284" r:id="rId29"/>
+    <p:sldId id="270" r:id="rId30"/>
   </p:sldIdLst>
   <p:sldSz cx="9144000" cy="6858000" type="screen4x3"/>
   <p:notesSz cx="6858000" cy="9144000"/>
@@ -205,7 +220,8 @@
           <a:p>
             <a:fld id="{25FF3015-ADE1-B94E-A2C3-338B0764DC65}" type="datetimeFigureOut">
               <a:rPr lang="en-US" smtClean="0"/>
-              <a:t>3/13/10</a:t>
+              <a:pPr/>
+              <a:t>3/15/10</a:t>
             </a:fld>
             <a:endParaRPr lang="en-US"/>
           </a:p>
@@ -366,6 +382,7 @@
           <a:p>
             <a:fld id="{F5395209-E063-144C-8968-CAA31F3D1B83}" type="slidenum">
               <a:rPr lang="en-US" smtClean="0"/>
+              <a:pPr/>
               <a:t>‹#›</a:t>
             </a:fld>
             <a:endParaRPr lang="en-US"/>
@@ -545,7 +562,1162 @@
           <a:p>
             <a:fld id="{F5395209-E063-144C-8968-CAA31F3D1B83}" type="slidenum">
               <a:rPr lang="en-US" smtClean="0"/>
+              <a:pPr/>
               <a:t>2</a:t>
+            </a:fld>
+            <a:endParaRPr lang="en-US"/>
+          </a:p>
+        </p:txBody>
+      </p:sp>
+    </p:spTree>
+  </p:cSld>
+  <p:clrMapOvr>
+    <a:masterClrMapping/>
+  </p:clrMapOvr>
+</p:notes>
+</file>
+
+<file path=ppt/notesSlides/notesSlide10.xml><?xml version="1.0" encoding="utf-8"?>
+<p:notes xmlns:a="http://schemas.openxmlformats.org/drawingml/2006/main" xmlns:r="http://schemas.openxmlformats.org/officeDocument/2006/relationships" xmlns:mc="http://schemas.openxmlformats.org/markup-compatibility/2006" xmlns:mv="urn:schemas-microsoft-com:mac:vml" xmlns:p="http://schemas.openxmlformats.org/presentationml/2006/main" mc:Ignorable="mv" mc:PreserveAttributes="mv:*">
+  <p:cSld>
+    <p:spTree>
+      <p:nvGrpSpPr>
+        <p:cNvPr id="1" name=""/>
+        <p:cNvGrpSpPr/>
+        <p:nvPr/>
+      </p:nvGrpSpPr>
+      <p:grpSpPr>
+        <a:xfrm>
+          <a:off x="0" y="0"/>
+          <a:ext cx="0" cy="0"/>
+          <a:chOff x="0" y="0"/>
+          <a:chExt cx="0" cy="0"/>
+        </a:xfrm>
+      </p:grpSpPr>
+      <p:sp>
+        <p:nvSpPr>
+          <p:cNvPr id="2" name="Slide Image Placeholder 1"/>
+          <p:cNvSpPr>
+            <a:spLocks noGrp="1" noRot="1" noChangeAspect="1"/>
+          </p:cNvSpPr>
+          <p:nvPr>
+            <p:ph type="sldImg"/>
+          </p:nvPr>
+        </p:nvSpPr>
+        <p:spPr/>
+      </p:sp>
+      <p:sp>
+        <p:nvSpPr>
+          <p:cNvPr id="3" name="Notes Placeholder 2"/>
+          <p:cNvSpPr>
+            <a:spLocks noGrp="1"/>
+          </p:cNvSpPr>
+          <p:nvPr>
+            <p:ph type="body" idx="1"/>
+          </p:nvPr>
+        </p:nvSpPr>
+        <p:spPr/>
+        <p:txBody>
+          <a:bodyPr>
+            <a:normAutofit/>
+          </a:bodyPr>
+          <a:lstStyle/>
+          <a:p>
+            <a:r>
+              <a:rPr lang="en-US" dirty="0" smtClean="0"/>
+              <a:t>So we’ve broken</a:t>
+            </a:r>
+            <a:r>
+              <a:rPr lang="en-US" baseline="0" dirty="0" smtClean="0"/>
+              <a:t> our concrete dependencies (or at least we know how).</a:t>
+            </a:r>
+            <a:endParaRPr lang="en-US" dirty="0" smtClean="0"/>
+          </a:p>
+          <a:p>
+            <a:r>
+              <a:rPr lang="en-US" dirty="0" smtClean="0"/>
+              <a:t>We</a:t>
+            </a:r>
+            <a:r>
+              <a:rPr lang="en-US" baseline="0" dirty="0" smtClean="0"/>
+              <a:t> need to somehow wire our implementations together.</a:t>
+            </a:r>
+          </a:p>
+          <a:p>
+            <a:r>
+              <a:rPr lang="en-US" dirty="0" smtClean="0"/>
+              <a:t>I think the first natural</a:t>
+            </a:r>
+            <a:r>
+              <a:rPr lang="en-US" baseline="0" dirty="0" smtClean="0"/>
+              <a:t> place to go is service location.</a:t>
+            </a:r>
+          </a:p>
+          <a:p>
+            <a:r>
+              <a:rPr lang="en-US" baseline="0" dirty="0" smtClean="0"/>
+              <a:t>You shove everything behind a global object/static gateway and pull our your dependencies.</a:t>
+            </a:r>
+            <a:endParaRPr lang="en-US" dirty="0"/>
+          </a:p>
+        </p:txBody>
+      </p:sp>
+      <p:sp>
+        <p:nvSpPr>
+          <p:cNvPr id="4" name="Slide Number Placeholder 3"/>
+          <p:cNvSpPr>
+            <a:spLocks noGrp="1"/>
+          </p:cNvSpPr>
+          <p:nvPr>
+            <p:ph type="sldNum" sz="quarter" idx="10"/>
+          </p:nvPr>
+        </p:nvSpPr>
+        <p:spPr/>
+        <p:txBody>
+          <a:bodyPr/>
+          <a:lstStyle/>
+          <a:p>
+            <a:fld id="{F5395209-E063-144C-8968-CAA31F3D1B83}" type="slidenum">
+              <a:rPr lang="en-US" smtClean="0"/>
+              <a:pPr/>
+              <a:t>16</a:t>
+            </a:fld>
+            <a:endParaRPr lang="en-US"/>
+          </a:p>
+        </p:txBody>
+      </p:sp>
+    </p:spTree>
+  </p:cSld>
+  <p:clrMapOvr>
+    <a:masterClrMapping/>
+  </p:clrMapOvr>
+</p:notes>
+</file>
+
+<file path=ppt/notesSlides/notesSlide11.xml><?xml version="1.0" encoding="utf-8"?>
+<p:notes xmlns:a="http://schemas.openxmlformats.org/drawingml/2006/main" xmlns:r="http://schemas.openxmlformats.org/officeDocument/2006/relationships" xmlns:mc="http://schemas.openxmlformats.org/markup-compatibility/2006" xmlns:mv="urn:schemas-microsoft-com:mac:vml" xmlns:p="http://schemas.openxmlformats.org/presentationml/2006/main" mc:Ignorable="mv" mc:PreserveAttributes="mv:*">
+  <p:cSld>
+    <p:spTree>
+      <p:nvGrpSpPr>
+        <p:cNvPr id="1" name=""/>
+        <p:cNvGrpSpPr/>
+        <p:nvPr/>
+      </p:nvGrpSpPr>
+      <p:grpSpPr>
+        <a:xfrm>
+          <a:off x="0" y="0"/>
+          <a:ext cx="0" cy="0"/>
+          <a:chOff x="0" y="0"/>
+          <a:chExt cx="0" cy="0"/>
+        </a:xfrm>
+      </p:grpSpPr>
+      <p:sp>
+        <p:nvSpPr>
+          <p:cNvPr id="2" name="Slide Image Placeholder 1"/>
+          <p:cNvSpPr>
+            <a:spLocks noGrp="1" noRot="1" noChangeAspect="1"/>
+          </p:cNvSpPr>
+          <p:nvPr>
+            <p:ph type="sldImg"/>
+          </p:nvPr>
+        </p:nvSpPr>
+        <p:spPr/>
+      </p:sp>
+      <p:sp>
+        <p:nvSpPr>
+          <p:cNvPr id="3" name="Notes Placeholder 2"/>
+          <p:cNvSpPr>
+            <a:spLocks noGrp="1"/>
+          </p:cNvSpPr>
+          <p:nvPr>
+            <p:ph type="body" idx="1"/>
+          </p:nvPr>
+        </p:nvSpPr>
+        <p:spPr/>
+        <p:txBody>
+          <a:bodyPr>
+            <a:normAutofit/>
+          </a:bodyPr>
+          <a:lstStyle/>
+          <a:p>
+            <a:r>
+              <a:rPr lang="en-US" dirty="0" smtClean="0"/>
+              <a:t>At this point, we’ve</a:t>
+            </a:r>
+            <a:r>
+              <a:rPr lang="en-US" baseline="0" dirty="0" smtClean="0"/>
+              <a:t> basically traded dependencies.  We got rid of </a:t>
+            </a:r>
+            <a:r>
+              <a:rPr lang="en-US" baseline="0" dirty="0" err="1" smtClean="0"/>
+              <a:t>ImdbMovieFinder</a:t>
+            </a:r>
+            <a:r>
+              <a:rPr lang="en-US" baseline="0" dirty="0" smtClean="0"/>
+              <a:t> dependency but picked up the </a:t>
+            </a:r>
+            <a:r>
+              <a:rPr lang="en-US" baseline="0" dirty="0" err="1" smtClean="0"/>
+              <a:t>ServiceLocator</a:t>
+            </a:r>
+            <a:r>
+              <a:rPr lang="en-US" baseline="0" dirty="0" smtClean="0"/>
+              <a:t> one.</a:t>
+            </a:r>
+          </a:p>
+          <a:p>
+            <a:r>
+              <a:rPr lang="en-US" baseline="0" dirty="0" smtClean="0"/>
+              <a:t>That being said, this is probably the lesser of two evils.  It’s slightly more flexible.</a:t>
+            </a:r>
+          </a:p>
+          <a:p>
+            <a:r>
+              <a:rPr lang="en-US" baseline="0" dirty="0" smtClean="0"/>
+              <a:t>We’ve still got a bit of a smell though… the dependencies aren’t explicit.</a:t>
+            </a:r>
+          </a:p>
+          <a:p>
+            <a:r>
+              <a:rPr lang="en-US" baseline="0" dirty="0" smtClean="0"/>
+              <a:t>You can’t tell what this class needs, unless you look inside of it, at the implementation. Imagine using a library, and having to look at the source code to figure out what you need to register in your service locator to make it work?</a:t>
+            </a:r>
+          </a:p>
+          <a:p>
+            <a:r>
+              <a:rPr lang="en-US" baseline="0" dirty="0" smtClean="0"/>
+              <a:t>The idea is to make your implicit dependencies explicit, by declaring them, somehow.</a:t>
+            </a:r>
+          </a:p>
+          <a:p>
+            <a:r>
+              <a:rPr lang="en-US" baseline="0" dirty="0" smtClean="0"/>
+              <a:t>Also, depending on the implementation of your service locator, it may be difficult to reconfigure at deployment or runtime which finder gets used.</a:t>
+            </a:r>
+          </a:p>
+          <a:p>
+            <a:r>
+              <a:rPr lang="en-US" baseline="0" dirty="0" smtClean="0"/>
+              <a:t>That being said, this works pretty well, is easy to understand and is better than hard-coding all your dependencies.</a:t>
+            </a:r>
+          </a:p>
+          <a:p>
+            <a:r>
+              <a:rPr lang="en-US" baseline="0" dirty="0" smtClean="0"/>
+              <a:t>Let’s see a better way…</a:t>
+            </a:r>
+            <a:endParaRPr lang="en-US" dirty="0"/>
+          </a:p>
+        </p:txBody>
+      </p:sp>
+      <p:sp>
+        <p:nvSpPr>
+          <p:cNvPr id="4" name="Slide Number Placeholder 3"/>
+          <p:cNvSpPr>
+            <a:spLocks noGrp="1"/>
+          </p:cNvSpPr>
+          <p:nvPr>
+            <p:ph type="sldNum" sz="quarter" idx="10"/>
+          </p:nvPr>
+        </p:nvSpPr>
+        <p:spPr/>
+        <p:txBody>
+          <a:bodyPr/>
+          <a:lstStyle/>
+          <a:p>
+            <a:fld id="{F5395209-E063-144C-8968-CAA31F3D1B83}" type="slidenum">
+              <a:rPr lang="en-US" smtClean="0"/>
+              <a:pPr/>
+              <a:t>17</a:t>
+            </a:fld>
+            <a:endParaRPr lang="en-US"/>
+          </a:p>
+        </p:txBody>
+      </p:sp>
+    </p:spTree>
+  </p:cSld>
+  <p:clrMapOvr>
+    <a:masterClrMapping/>
+  </p:clrMapOvr>
+</p:notes>
+</file>
+
+<file path=ppt/notesSlides/notesSlide12.xml><?xml version="1.0" encoding="utf-8"?>
+<p:notes xmlns:a="http://schemas.openxmlformats.org/drawingml/2006/main" xmlns:r="http://schemas.openxmlformats.org/officeDocument/2006/relationships" xmlns:mc="http://schemas.openxmlformats.org/markup-compatibility/2006" xmlns:mv="urn:schemas-microsoft-com:mac:vml" xmlns:p="http://schemas.openxmlformats.org/presentationml/2006/main" mc:Ignorable="mv" mc:PreserveAttributes="mv:*">
+  <p:cSld>
+    <p:spTree>
+      <p:nvGrpSpPr>
+        <p:cNvPr id="1" name=""/>
+        <p:cNvGrpSpPr/>
+        <p:nvPr/>
+      </p:nvGrpSpPr>
+      <p:grpSpPr>
+        <a:xfrm>
+          <a:off x="0" y="0"/>
+          <a:ext cx="0" cy="0"/>
+          <a:chOff x="0" y="0"/>
+          <a:chExt cx="0" cy="0"/>
+        </a:xfrm>
+      </p:grpSpPr>
+      <p:sp>
+        <p:nvSpPr>
+          <p:cNvPr id="2" name="Slide Image Placeholder 1"/>
+          <p:cNvSpPr>
+            <a:spLocks noGrp="1" noRot="1" noChangeAspect="1"/>
+          </p:cNvSpPr>
+          <p:nvPr>
+            <p:ph type="sldImg"/>
+          </p:nvPr>
+        </p:nvSpPr>
+        <p:spPr/>
+      </p:sp>
+      <p:sp>
+        <p:nvSpPr>
+          <p:cNvPr id="3" name="Notes Placeholder 2"/>
+          <p:cNvSpPr>
+            <a:spLocks noGrp="1"/>
+          </p:cNvSpPr>
+          <p:nvPr>
+            <p:ph type="body" idx="1"/>
+          </p:nvPr>
+        </p:nvSpPr>
+        <p:spPr/>
+        <p:txBody>
+          <a:bodyPr>
+            <a:normAutofit/>
+          </a:bodyPr>
+          <a:lstStyle/>
+          <a:p>
+            <a:r>
+              <a:rPr lang="en-US" dirty="0" smtClean="0"/>
+              <a:t>Dependency</a:t>
+            </a:r>
+            <a:r>
+              <a:rPr lang="en-US" baseline="0" dirty="0" smtClean="0"/>
+              <a:t> injection is the act of injecting your dependencies (whether they’ve been inverted or not) into the consuming class of the service or dependency.</a:t>
+            </a:r>
+          </a:p>
+          <a:p>
+            <a:r>
+              <a:rPr lang="en-US" baseline="0" dirty="0" smtClean="0"/>
+              <a:t>We saw a minute ago how the consumer was pulling dependencies in.  We’re going to flip that upside down, and pass them into the consumer.</a:t>
+            </a:r>
+            <a:endParaRPr lang="en-US" dirty="0"/>
+          </a:p>
+        </p:txBody>
+      </p:sp>
+      <p:sp>
+        <p:nvSpPr>
+          <p:cNvPr id="4" name="Slide Number Placeholder 3"/>
+          <p:cNvSpPr>
+            <a:spLocks noGrp="1"/>
+          </p:cNvSpPr>
+          <p:nvPr>
+            <p:ph type="sldNum" sz="quarter" idx="10"/>
+          </p:nvPr>
+        </p:nvSpPr>
+        <p:spPr/>
+        <p:txBody>
+          <a:bodyPr/>
+          <a:lstStyle/>
+          <a:p>
+            <a:fld id="{F5395209-E063-144C-8968-CAA31F3D1B83}" type="slidenum">
+              <a:rPr lang="en-US" smtClean="0"/>
+              <a:pPr/>
+              <a:t>18</a:t>
+            </a:fld>
+            <a:endParaRPr lang="en-US"/>
+          </a:p>
+        </p:txBody>
+      </p:sp>
+    </p:spTree>
+  </p:cSld>
+  <p:clrMapOvr>
+    <a:masterClrMapping/>
+  </p:clrMapOvr>
+</p:notes>
+</file>
+
+<file path=ppt/notesSlides/notesSlide13.xml><?xml version="1.0" encoding="utf-8"?>
+<p:notes xmlns:a="http://schemas.openxmlformats.org/drawingml/2006/main" xmlns:r="http://schemas.openxmlformats.org/officeDocument/2006/relationships" xmlns:mc="http://schemas.openxmlformats.org/markup-compatibility/2006" xmlns:mv="urn:schemas-microsoft-com:mac:vml" xmlns:p="http://schemas.openxmlformats.org/presentationml/2006/main" mc:Ignorable="mv" mc:PreserveAttributes="mv:*">
+  <p:cSld>
+    <p:spTree>
+      <p:nvGrpSpPr>
+        <p:cNvPr id="1" name=""/>
+        <p:cNvGrpSpPr/>
+        <p:nvPr/>
+      </p:nvGrpSpPr>
+      <p:grpSpPr>
+        <a:xfrm>
+          <a:off x="0" y="0"/>
+          <a:ext cx="0" cy="0"/>
+          <a:chOff x="0" y="0"/>
+          <a:chExt cx="0" cy="0"/>
+        </a:xfrm>
+      </p:grpSpPr>
+      <p:sp>
+        <p:nvSpPr>
+          <p:cNvPr id="2" name="Slide Image Placeholder 1"/>
+          <p:cNvSpPr>
+            <a:spLocks noGrp="1" noRot="1" noChangeAspect="1"/>
+          </p:cNvSpPr>
+          <p:nvPr>
+            <p:ph type="sldImg"/>
+          </p:nvPr>
+        </p:nvSpPr>
+        <p:spPr/>
+      </p:sp>
+      <p:sp>
+        <p:nvSpPr>
+          <p:cNvPr id="3" name="Notes Placeholder 2"/>
+          <p:cNvSpPr>
+            <a:spLocks noGrp="1"/>
+          </p:cNvSpPr>
+          <p:nvPr>
+            <p:ph type="body" idx="1"/>
+          </p:nvPr>
+        </p:nvSpPr>
+        <p:spPr/>
+        <p:txBody>
+          <a:bodyPr>
+            <a:normAutofit/>
+          </a:bodyPr>
+          <a:lstStyle/>
+          <a:p>
+            <a:r>
+              <a:rPr lang="en-US" dirty="0" smtClean="0"/>
+              <a:t>Java guys like to do it this way</a:t>
+            </a:r>
+            <a:endParaRPr lang="en-US" dirty="0"/>
+          </a:p>
+        </p:txBody>
+      </p:sp>
+      <p:sp>
+        <p:nvSpPr>
+          <p:cNvPr id="4" name="Slide Number Placeholder 3"/>
+          <p:cNvSpPr>
+            <a:spLocks noGrp="1"/>
+          </p:cNvSpPr>
+          <p:nvPr>
+            <p:ph type="sldNum" sz="quarter" idx="10"/>
+          </p:nvPr>
+        </p:nvSpPr>
+        <p:spPr/>
+        <p:txBody>
+          <a:bodyPr/>
+          <a:lstStyle/>
+          <a:p>
+            <a:fld id="{F5395209-E063-144C-8968-CAA31F3D1B83}" type="slidenum">
+              <a:rPr lang="en-US" smtClean="0"/>
+              <a:pPr/>
+              <a:t>20</a:t>
+            </a:fld>
+            <a:endParaRPr lang="en-US"/>
+          </a:p>
+        </p:txBody>
+      </p:sp>
+    </p:spTree>
+  </p:cSld>
+  <p:clrMapOvr>
+    <a:masterClrMapping/>
+  </p:clrMapOvr>
+</p:notes>
+</file>
+
+<file path=ppt/notesSlides/notesSlide14.xml><?xml version="1.0" encoding="utf-8"?>
+<p:notes xmlns:a="http://schemas.openxmlformats.org/drawingml/2006/main" xmlns:r="http://schemas.openxmlformats.org/officeDocument/2006/relationships" xmlns:mc="http://schemas.openxmlformats.org/markup-compatibility/2006" xmlns:mv="urn:schemas-microsoft-com:mac:vml" xmlns:p="http://schemas.openxmlformats.org/presentationml/2006/main" mc:Ignorable="mv" mc:PreserveAttributes="mv:*">
+  <p:cSld>
+    <p:spTree>
+      <p:nvGrpSpPr>
+        <p:cNvPr id="1" name=""/>
+        <p:cNvGrpSpPr/>
+        <p:nvPr/>
+      </p:nvGrpSpPr>
+      <p:grpSpPr>
+        <a:xfrm>
+          <a:off x="0" y="0"/>
+          <a:ext cx="0" cy="0"/>
+          <a:chOff x="0" y="0"/>
+          <a:chExt cx="0" cy="0"/>
+        </a:xfrm>
+      </p:grpSpPr>
+      <p:sp>
+        <p:nvSpPr>
+          <p:cNvPr id="2" name="Slide Image Placeholder 1"/>
+          <p:cNvSpPr>
+            <a:spLocks noGrp="1" noRot="1" noChangeAspect="1"/>
+          </p:cNvSpPr>
+          <p:nvPr>
+            <p:ph type="sldImg"/>
+          </p:nvPr>
+        </p:nvSpPr>
+        <p:spPr/>
+      </p:sp>
+      <p:sp>
+        <p:nvSpPr>
+          <p:cNvPr id="3" name="Notes Placeholder 2"/>
+          <p:cNvSpPr>
+            <a:spLocks noGrp="1"/>
+          </p:cNvSpPr>
+          <p:nvPr>
+            <p:ph type="body" idx="1"/>
+          </p:nvPr>
+        </p:nvSpPr>
+        <p:spPr/>
+        <p:txBody>
+          <a:bodyPr>
+            <a:normAutofit/>
+          </a:bodyPr>
+          <a:lstStyle/>
+          <a:p>
+            <a:r>
+              <a:rPr lang="en-US" dirty="0" smtClean="0"/>
+              <a:t>.NET guys</a:t>
+            </a:r>
+            <a:r>
+              <a:rPr lang="en-US" baseline="0" dirty="0" smtClean="0"/>
+              <a:t> (myself included) like to do it this way.</a:t>
+            </a:r>
+          </a:p>
+          <a:p>
+            <a:r>
+              <a:rPr lang="en-US" baseline="0" dirty="0" smtClean="0"/>
+              <a:t>You can see now, how the dependencies are explicitly stated up front, when the class gets created.</a:t>
+            </a:r>
+            <a:endParaRPr lang="en-US" dirty="0"/>
+          </a:p>
+        </p:txBody>
+      </p:sp>
+      <p:sp>
+        <p:nvSpPr>
+          <p:cNvPr id="4" name="Slide Number Placeholder 3"/>
+          <p:cNvSpPr>
+            <a:spLocks noGrp="1"/>
+          </p:cNvSpPr>
+          <p:nvPr>
+            <p:ph type="sldNum" sz="quarter" idx="10"/>
+          </p:nvPr>
+        </p:nvSpPr>
+        <p:spPr/>
+        <p:txBody>
+          <a:bodyPr/>
+          <a:lstStyle/>
+          <a:p>
+            <a:fld id="{F5395209-E063-144C-8968-CAA31F3D1B83}" type="slidenum">
+              <a:rPr lang="en-US" smtClean="0"/>
+              <a:pPr/>
+              <a:t>21</a:t>
+            </a:fld>
+            <a:endParaRPr lang="en-US"/>
+          </a:p>
+        </p:txBody>
+      </p:sp>
+    </p:spTree>
+  </p:cSld>
+  <p:clrMapOvr>
+    <a:masterClrMapping/>
+  </p:clrMapOvr>
+</p:notes>
+</file>
+
+<file path=ppt/notesSlides/notesSlide15.xml><?xml version="1.0" encoding="utf-8"?>
+<p:notes xmlns:a="http://schemas.openxmlformats.org/drawingml/2006/main" xmlns:r="http://schemas.openxmlformats.org/officeDocument/2006/relationships" xmlns:mc="http://schemas.openxmlformats.org/markup-compatibility/2006" xmlns:mv="urn:schemas-microsoft-com:mac:vml" xmlns:p="http://schemas.openxmlformats.org/presentationml/2006/main" mc:Ignorable="mv" mc:PreserveAttributes="mv:*">
+  <p:cSld>
+    <p:spTree>
+      <p:nvGrpSpPr>
+        <p:cNvPr id="1" name=""/>
+        <p:cNvGrpSpPr/>
+        <p:nvPr/>
+      </p:nvGrpSpPr>
+      <p:grpSpPr>
+        <a:xfrm>
+          <a:off x="0" y="0"/>
+          <a:ext cx="0" cy="0"/>
+          <a:chOff x="0" y="0"/>
+          <a:chExt cx="0" cy="0"/>
+        </a:xfrm>
+      </p:grpSpPr>
+      <p:sp>
+        <p:nvSpPr>
+          <p:cNvPr id="2" name="Slide Image Placeholder 1"/>
+          <p:cNvSpPr>
+            <a:spLocks noGrp="1" noRot="1" noChangeAspect="1"/>
+          </p:cNvSpPr>
+          <p:nvPr>
+            <p:ph type="sldImg"/>
+          </p:nvPr>
+        </p:nvSpPr>
+        <p:spPr/>
+      </p:sp>
+      <p:sp>
+        <p:nvSpPr>
+          <p:cNvPr id="3" name="Notes Placeholder 2"/>
+          <p:cNvSpPr>
+            <a:spLocks noGrp="1"/>
+          </p:cNvSpPr>
+          <p:nvPr>
+            <p:ph type="body" idx="1"/>
+          </p:nvPr>
+        </p:nvSpPr>
+        <p:spPr/>
+        <p:txBody>
+          <a:bodyPr>
+            <a:normAutofit/>
+          </a:bodyPr>
+          <a:lstStyle/>
+          <a:p>
+            <a:r>
+              <a:rPr lang="en-US" dirty="0" smtClean="0"/>
+              <a:t>Poor Man’s DI is:</a:t>
+            </a:r>
+          </a:p>
+          <a:p>
+            <a:r>
+              <a:rPr lang="en-US" dirty="0" smtClean="0"/>
+              <a:t>Easy</a:t>
+            </a:r>
+            <a:r>
+              <a:rPr lang="en-US" baseline="0" dirty="0" smtClean="0"/>
+              <a:t> to understand</a:t>
+            </a:r>
+          </a:p>
+          <a:p>
+            <a:r>
+              <a:rPr lang="en-US" baseline="0" dirty="0" smtClean="0"/>
+              <a:t>Low barrier to entry way to start doing DI.</a:t>
+            </a:r>
+          </a:p>
+        </p:txBody>
+      </p:sp>
+      <p:sp>
+        <p:nvSpPr>
+          <p:cNvPr id="4" name="Slide Number Placeholder 3"/>
+          <p:cNvSpPr>
+            <a:spLocks noGrp="1"/>
+          </p:cNvSpPr>
+          <p:nvPr>
+            <p:ph type="sldNum" sz="quarter" idx="10"/>
+          </p:nvPr>
+        </p:nvSpPr>
+        <p:spPr/>
+        <p:txBody>
+          <a:bodyPr/>
+          <a:lstStyle/>
+          <a:p>
+            <a:fld id="{F5395209-E063-144C-8968-CAA31F3D1B83}" type="slidenum">
+              <a:rPr lang="en-US" smtClean="0"/>
+              <a:pPr/>
+              <a:t>22</a:t>
+            </a:fld>
+            <a:endParaRPr lang="en-US"/>
+          </a:p>
+        </p:txBody>
+      </p:sp>
+    </p:spTree>
+  </p:cSld>
+  <p:clrMapOvr>
+    <a:masterClrMapping/>
+  </p:clrMapOvr>
+</p:notes>
+</file>
+
+<file path=ppt/notesSlides/notesSlide16.xml><?xml version="1.0" encoding="utf-8"?>
+<p:notes xmlns:a="http://schemas.openxmlformats.org/drawingml/2006/main" xmlns:r="http://schemas.openxmlformats.org/officeDocument/2006/relationships" xmlns:mc="http://schemas.openxmlformats.org/markup-compatibility/2006" xmlns:mv="urn:schemas-microsoft-com:mac:vml" xmlns:p="http://schemas.openxmlformats.org/presentationml/2006/main" mc:Ignorable="mv" mc:PreserveAttributes="mv:*">
+  <p:cSld>
+    <p:spTree>
+      <p:nvGrpSpPr>
+        <p:cNvPr id="1" name=""/>
+        <p:cNvGrpSpPr/>
+        <p:nvPr/>
+      </p:nvGrpSpPr>
+      <p:grpSpPr>
+        <a:xfrm>
+          <a:off x="0" y="0"/>
+          <a:ext cx="0" cy="0"/>
+          <a:chOff x="0" y="0"/>
+          <a:chExt cx="0" cy="0"/>
+        </a:xfrm>
+      </p:grpSpPr>
+      <p:sp>
+        <p:nvSpPr>
+          <p:cNvPr id="2" name="Slide Image Placeholder 1"/>
+          <p:cNvSpPr>
+            <a:spLocks noGrp="1" noRot="1" noChangeAspect="1"/>
+          </p:cNvSpPr>
+          <p:nvPr>
+            <p:ph type="sldImg"/>
+          </p:nvPr>
+        </p:nvSpPr>
+        <p:spPr/>
+      </p:sp>
+      <p:sp>
+        <p:nvSpPr>
+          <p:cNvPr id="3" name="Notes Placeholder 2"/>
+          <p:cNvSpPr>
+            <a:spLocks noGrp="1"/>
+          </p:cNvSpPr>
+          <p:nvPr>
+            <p:ph type="body" idx="1"/>
+          </p:nvPr>
+        </p:nvSpPr>
+        <p:spPr/>
+        <p:txBody>
+          <a:bodyPr>
+            <a:normAutofit/>
+          </a:bodyPr>
+          <a:lstStyle/>
+          <a:p>
+            <a:pPr marL="0" marR="0" indent="0" algn="l" defTabSz="457200" rtl="0" eaLnBrk="1" fontAlgn="auto" latinLnBrk="0" hangingPunct="1">
+              <a:lnSpc>
+                <a:spcPct val="100000"/>
+              </a:lnSpc>
+              <a:spcBef>
+                <a:spcPts val="0"/>
+              </a:spcBef>
+              <a:spcAft>
+                <a:spcPts val="0"/>
+              </a:spcAft>
+              <a:buClrTx/>
+              <a:buSzTx/>
+              <a:buFontTx/>
+              <a:buNone/>
+              <a:tabLst/>
+              <a:defRPr/>
+            </a:pPr>
+            <a:r>
+              <a:rPr lang="en-US" baseline="0" dirty="0" smtClean="0"/>
+              <a:t>You can use one version during test (the DI version, so you can mock things) and use another version in production code.</a:t>
+            </a:r>
+            <a:endParaRPr lang="en-US" dirty="0" smtClean="0"/>
+          </a:p>
+          <a:p>
+            <a:r>
+              <a:rPr lang="en-US" dirty="0" smtClean="0"/>
+              <a:t>There may be legitimate</a:t>
+            </a:r>
+            <a:r>
+              <a:rPr lang="en-US" baseline="0" dirty="0" smtClean="0"/>
+              <a:t> reasons for doing this, but I can’t think of any…</a:t>
+            </a:r>
+          </a:p>
+          <a:p>
+            <a:r>
+              <a:rPr lang="en-US" baseline="0" dirty="0" smtClean="0"/>
+              <a:t>In the long run, you’ll be better off to have just went without it, and went with a framework/tool instead.</a:t>
+            </a:r>
+            <a:endParaRPr lang="en-US" dirty="0"/>
+          </a:p>
+        </p:txBody>
+      </p:sp>
+      <p:sp>
+        <p:nvSpPr>
+          <p:cNvPr id="4" name="Slide Number Placeholder 3"/>
+          <p:cNvSpPr>
+            <a:spLocks noGrp="1"/>
+          </p:cNvSpPr>
+          <p:nvPr>
+            <p:ph type="sldNum" sz="quarter" idx="10"/>
+          </p:nvPr>
+        </p:nvSpPr>
+        <p:spPr/>
+        <p:txBody>
+          <a:bodyPr/>
+          <a:lstStyle/>
+          <a:p>
+            <a:fld id="{F5395209-E063-144C-8968-CAA31F3D1B83}" type="slidenum">
+              <a:rPr lang="en-US" smtClean="0"/>
+              <a:pPr/>
+              <a:t>23</a:t>
+            </a:fld>
+            <a:endParaRPr lang="en-US"/>
+          </a:p>
+        </p:txBody>
+      </p:sp>
+    </p:spTree>
+  </p:cSld>
+  <p:clrMapOvr>
+    <a:masterClrMapping/>
+  </p:clrMapOvr>
+</p:notes>
+</file>
+
+<file path=ppt/notesSlides/notesSlide17.xml><?xml version="1.0" encoding="utf-8"?>
+<p:notes xmlns:a="http://schemas.openxmlformats.org/drawingml/2006/main" xmlns:r="http://schemas.openxmlformats.org/officeDocument/2006/relationships" xmlns:mc="http://schemas.openxmlformats.org/markup-compatibility/2006" xmlns:mv="urn:schemas-microsoft-com:mac:vml" xmlns:p="http://schemas.openxmlformats.org/presentationml/2006/main" mc:Ignorable="mv" mc:PreserveAttributes="mv:*">
+  <p:cSld>
+    <p:spTree>
+      <p:nvGrpSpPr>
+        <p:cNvPr id="1" name=""/>
+        <p:cNvGrpSpPr/>
+        <p:nvPr/>
+      </p:nvGrpSpPr>
+      <p:grpSpPr>
+        <a:xfrm>
+          <a:off x="0" y="0"/>
+          <a:ext cx="0" cy="0"/>
+          <a:chOff x="0" y="0"/>
+          <a:chExt cx="0" cy="0"/>
+        </a:xfrm>
+      </p:grpSpPr>
+      <p:sp>
+        <p:nvSpPr>
+          <p:cNvPr id="2" name="Slide Image Placeholder 1"/>
+          <p:cNvSpPr>
+            <a:spLocks noGrp="1" noRot="1" noChangeAspect="1"/>
+          </p:cNvSpPr>
+          <p:nvPr>
+            <p:ph type="sldImg"/>
+          </p:nvPr>
+        </p:nvSpPr>
+        <p:spPr/>
+      </p:sp>
+      <p:sp>
+        <p:nvSpPr>
+          <p:cNvPr id="3" name="Notes Placeholder 2"/>
+          <p:cNvSpPr>
+            <a:spLocks noGrp="1"/>
+          </p:cNvSpPr>
+          <p:nvPr>
+            <p:ph type="body" idx="1"/>
+          </p:nvPr>
+        </p:nvSpPr>
+        <p:spPr/>
+        <p:txBody>
+          <a:bodyPr>
+            <a:normAutofit/>
+          </a:bodyPr>
+          <a:lstStyle/>
+          <a:p>
+            <a:r>
+              <a:rPr lang="en-US" dirty="0" smtClean="0"/>
+              <a:t>so I originally stated this was</a:t>
+            </a:r>
+            <a:r>
+              <a:rPr lang="en-US" baseline="0" dirty="0" smtClean="0"/>
+              <a:t> all in the name of simplicity…</a:t>
+            </a:r>
+          </a:p>
+          <a:p>
+            <a:r>
+              <a:rPr lang="en-US" baseline="0" dirty="0" smtClean="0"/>
+              <a:t>does it feel like we’ve gotten simpler?</a:t>
+            </a:r>
+          </a:p>
+          <a:p>
+            <a:r>
+              <a:rPr lang="en-US" baseline="0" dirty="0" smtClean="0"/>
+              <a:t>doesn’t really to me.</a:t>
+            </a:r>
+          </a:p>
+          <a:p>
+            <a:r>
+              <a:rPr lang="en-US" baseline="0" dirty="0" smtClean="0"/>
+              <a:t>we’ve created some abstractions (which, arguably, make our system more difficult to understand)</a:t>
+            </a:r>
+          </a:p>
+          <a:p>
+            <a:r>
+              <a:rPr lang="en-US" baseline="0" dirty="0" smtClean="0"/>
+              <a:t>and we’re manually wiring some of these things together.</a:t>
+            </a:r>
+          </a:p>
+          <a:p>
+            <a:r>
+              <a:rPr lang="en-US" baseline="0" dirty="0" smtClean="0"/>
+              <a:t>How, if we don’t do PMDI or service location are our dependencies going to find each other?</a:t>
+            </a:r>
+          </a:p>
+          <a:p>
+            <a:r>
+              <a:rPr lang="en-US" baseline="0" dirty="0" smtClean="0"/>
+              <a:t>Seems like we’ve just relegated ourselves to instantiating our dependencies one level higher, and then passing them down.</a:t>
+            </a:r>
+          </a:p>
+          <a:p>
+            <a:r>
+              <a:rPr lang="en-US" baseline="0" dirty="0" smtClean="0"/>
+              <a:t>That does NOT sound like simplicity.  Sounds like the same set of problems, just worse.</a:t>
+            </a:r>
+            <a:endParaRPr lang="en-US" dirty="0"/>
+          </a:p>
+        </p:txBody>
+      </p:sp>
+      <p:sp>
+        <p:nvSpPr>
+          <p:cNvPr id="4" name="Slide Number Placeholder 3"/>
+          <p:cNvSpPr>
+            <a:spLocks noGrp="1"/>
+          </p:cNvSpPr>
+          <p:nvPr>
+            <p:ph type="sldNum" sz="quarter" idx="10"/>
+          </p:nvPr>
+        </p:nvSpPr>
+        <p:spPr/>
+        <p:txBody>
+          <a:bodyPr/>
+          <a:lstStyle/>
+          <a:p>
+            <a:fld id="{F5395209-E063-144C-8968-CAA31F3D1B83}" type="slidenum">
+              <a:rPr lang="en-US" smtClean="0"/>
+              <a:pPr/>
+              <a:t>24</a:t>
+            </a:fld>
+            <a:endParaRPr lang="en-US"/>
+          </a:p>
+        </p:txBody>
+      </p:sp>
+    </p:spTree>
+  </p:cSld>
+  <p:clrMapOvr>
+    <a:masterClrMapping/>
+  </p:clrMapOvr>
+</p:notes>
+</file>
+
+<file path=ppt/notesSlides/notesSlide18.xml><?xml version="1.0" encoding="utf-8"?>
+<p:notes xmlns:a="http://schemas.openxmlformats.org/drawingml/2006/main" xmlns:r="http://schemas.openxmlformats.org/officeDocument/2006/relationships" xmlns:mc="http://schemas.openxmlformats.org/markup-compatibility/2006" xmlns:mv="urn:schemas-microsoft-com:mac:vml" xmlns:p="http://schemas.openxmlformats.org/presentationml/2006/main" mc:Ignorable="mv" mc:PreserveAttributes="mv:*">
+  <p:cSld>
+    <p:spTree>
+      <p:nvGrpSpPr>
+        <p:cNvPr id="1" name=""/>
+        <p:cNvGrpSpPr/>
+        <p:nvPr/>
+      </p:nvGrpSpPr>
+      <p:grpSpPr>
+        <a:xfrm>
+          <a:off x="0" y="0"/>
+          <a:ext cx="0" cy="0"/>
+          <a:chOff x="0" y="0"/>
+          <a:chExt cx="0" cy="0"/>
+        </a:xfrm>
+      </p:grpSpPr>
+      <p:sp>
+        <p:nvSpPr>
+          <p:cNvPr id="2" name="Slide Image Placeholder 1"/>
+          <p:cNvSpPr>
+            <a:spLocks noGrp="1" noRot="1" noChangeAspect="1"/>
+          </p:cNvSpPr>
+          <p:nvPr>
+            <p:ph type="sldImg"/>
+          </p:nvPr>
+        </p:nvSpPr>
+        <p:spPr/>
+      </p:sp>
+      <p:sp>
+        <p:nvSpPr>
+          <p:cNvPr id="3" name="Notes Placeholder 2"/>
+          <p:cNvSpPr>
+            <a:spLocks noGrp="1"/>
+          </p:cNvSpPr>
+          <p:nvPr>
+            <p:ph type="body" idx="1"/>
+          </p:nvPr>
+        </p:nvSpPr>
+        <p:spPr/>
+        <p:txBody>
+          <a:bodyPr>
+            <a:normAutofit/>
+          </a:bodyPr>
+          <a:lstStyle/>
+          <a:p>
+            <a:r>
+              <a:rPr lang="en-US" dirty="0" smtClean="0"/>
+              <a:t>Alright, here’s where this starts to get good.</a:t>
+            </a:r>
+          </a:p>
+          <a:p>
+            <a:r>
+              <a:rPr lang="en-US" dirty="0" smtClean="0"/>
+              <a:t>The idea behind the general</a:t>
+            </a:r>
+            <a:r>
+              <a:rPr lang="en-US" baseline="0" dirty="0" smtClean="0"/>
+              <a:t> term is to give control to someone else.  A framework, person, process, etc.</a:t>
+            </a:r>
+          </a:p>
+          <a:p>
+            <a:r>
+              <a:rPr lang="en-US" baseline="0" dirty="0" smtClean="0"/>
+              <a:t>Things like </a:t>
+            </a:r>
+            <a:r>
+              <a:rPr lang="en-US" baseline="0" dirty="0" err="1" smtClean="0"/>
+              <a:t>RoR</a:t>
+            </a:r>
+            <a:r>
+              <a:rPr lang="en-US" baseline="0" dirty="0" smtClean="0"/>
+              <a:t>, WPF, </a:t>
+            </a:r>
+            <a:r>
+              <a:rPr lang="en-US" baseline="0" dirty="0" err="1" smtClean="0"/>
+              <a:t>Nunit</a:t>
+            </a:r>
+            <a:r>
+              <a:rPr lang="en-US" baseline="0" dirty="0" smtClean="0"/>
+              <a:t> are all instances of where you’ve given up control and let someone/something else do the work for you.</a:t>
+            </a:r>
+          </a:p>
+          <a:p>
+            <a:r>
+              <a:rPr lang="en-US" baseline="0" dirty="0" smtClean="0"/>
+              <a:t>An </a:t>
+            </a:r>
+            <a:r>
+              <a:rPr lang="en-US" baseline="0" dirty="0" err="1" smtClean="0"/>
+              <a:t>IoC</a:t>
+            </a:r>
+            <a:r>
+              <a:rPr lang="en-US" baseline="0" dirty="0" smtClean="0"/>
+              <a:t> container is one other instance of this.</a:t>
+            </a:r>
+            <a:endParaRPr lang="en-US" dirty="0"/>
+          </a:p>
+        </p:txBody>
+      </p:sp>
+      <p:sp>
+        <p:nvSpPr>
+          <p:cNvPr id="4" name="Slide Number Placeholder 3"/>
+          <p:cNvSpPr>
+            <a:spLocks noGrp="1"/>
+          </p:cNvSpPr>
+          <p:nvPr>
+            <p:ph type="sldNum" sz="quarter" idx="10"/>
+          </p:nvPr>
+        </p:nvSpPr>
+        <p:spPr/>
+        <p:txBody>
+          <a:bodyPr/>
+          <a:lstStyle/>
+          <a:p>
+            <a:fld id="{F5395209-E063-144C-8968-CAA31F3D1B83}" type="slidenum">
+              <a:rPr lang="en-US" smtClean="0"/>
+              <a:pPr/>
+              <a:t>25</a:t>
+            </a:fld>
+            <a:endParaRPr lang="en-US"/>
+          </a:p>
+        </p:txBody>
+      </p:sp>
+    </p:spTree>
+  </p:cSld>
+  <p:clrMapOvr>
+    <a:masterClrMapping/>
+  </p:clrMapOvr>
+</p:notes>
+</file>
+
+<file path=ppt/notesSlides/notesSlide19.xml><?xml version="1.0" encoding="utf-8"?>
+<p:notes xmlns:a="http://schemas.openxmlformats.org/drawingml/2006/main" xmlns:r="http://schemas.openxmlformats.org/officeDocument/2006/relationships" xmlns:mc="http://schemas.openxmlformats.org/markup-compatibility/2006" xmlns:mv="urn:schemas-microsoft-com:mac:vml" xmlns:p="http://schemas.openxmlformats.org/presentationml/2006/main" mc:Ignorable="mv" mc:PreserveAttributes="mv:*">
+  <p:cSld>
+    <p:spTree>
+      <p:nvGrpSpPr>
+        <p:cNvPr id="1" name=""/>
+        <p:cNvGrpSpPr/>
+        <p:nvPr/>
+      </p:nvGrpSpPr>
+      <p:grpSpPr>
+        <a:xfrm>
+          <a:off x="0" y="0"/>
+          <a:ext cx="0" cy="0"/>
+          <a:chOff x="0" y="0"/>
+          <a:chExt cx="0" cy="0"/>
+        </a:xfrm>
+      </p:grpSpPr>
+      <p:sp>
+        <p:nvSpPr>
+          <p:cNvPr id="2" name="Slide Image Placeholder 1"/>
+          <p:cNvSpPr>
+            <a:spLocks noGrp="1" noRot="1" noChangeAspect="1"/>
+          </p:cNvSpPr>
+          <p:nvPr>
+            <p:ph type="sldImg"/>
+          </p:nvPr>
+        </p:nvSpPr>
+        <p:spPr/>
+      </p:sp>
+      <p:sp>
+        <p:nvSpPr>
+          <p:cNvPr id="3" name="Notes Placeholder 2"/>
+          <p:cNvSpPr>
+            <a:spLocks noGrp="1"/>
+          </p:cNvSpPr>
+          <p:nvPr>
+            <p:ph type="body" idx="1"/>
+          </p:nvPr>
+        </p:nvSpPr>
+        <p:spPr/>
+        <p:txBody>
+          <a:bodyPr>
+            <a:normAutofit/>
+          </a:bodyPr>
+          <a:lstStyle/>
+          <a:p>
+            <a:r>
+              <a:rPr lang="en-US" dirty="0" smtClean="0"/>
+              <a:t>What this allows</a:t>
+            </a:r>
+            <a:r>
+              <a:rPr lang="en-US" baseline="0" dirty="0" smtClean="0"/>
+              <a:t> us to do is be declarative… specify what, not how.</a:t>
+            </a:r>
+          </a:p>
+          <a:p>
+            <a:r>
+              <a:rPr lang="en-US" baseline="0" dirty="0" smtClean="0"/>
+              <a:t>WPF allows you to declare your UI and how it interacts with its data.</a:t>
+            </a:r>
+          </a:p>
+          <a:p>
+            <a:r>
+              <a:rPr lang="en-US" baseline="0" dirty="0" err="1" smtClean="0"/>
+              <a:t>RoR</a:t>
+            </a:r>
+            <a:r>
+              <a:rPr lang="en-US" baseline="0" dirty="0" smtClean="0"/>
+              <a:t> allows you to declaratively define your routes and URL structure.</a:t>
+            </a:r>
+          </a:p>
+          <a:p>
+            <a:r>
+              <a:rPr lang="en-US" baseline="0" dirty="0" smtClean="0"/>
+              <a:t>This correlates to the </a:t>
+            </a:r>
+            <a:r>
+              <a:rPr lang="en-US" baseline="0" dirty="0" err="1" smtClean="0"/>
+              <a:t>hollywood</a:t>
+            </a:r>
+            <a:r>
+              <a:rPr lang="en-US" baseline="0" dirty="0" smtClean="0"/>
+              <a:t> principle.  Don’t Call Us, We’ll Call you.</a:t>
+            </a:r>
+          </a:p>
+          <a:p>
+            <a:r>
+              <a:rPr lang="en-US" baseline="0" dirty="0" smtClean="0"/>
+              <a:t>You place hooks into the process, and when it’s time, your hooks will be called.</a:t>
+            </a:r>
+            <a:endParaRPr lang="en-US" dirty="0"/>
+          </a:p>
+        </p:txBody>
+      </p:sp>
+      <p:sp>
+        <p:nvSpPr>
+          <p:cNvPr id="4" name="Slide Number Placeholder 3"/>
+          <p:cNvSpPr>
+            <a:spLocks noGrp="1"/>
+          </p:cNvSpPr>
+          <p:nvPr>
+            <p:ph type="sldNum" sz="quarter" idx="10"/>
+          </p:nvPr>
+        </p:nvSpPr>
+        <p:spPr/>
+        <p:txBody>
+          <a:bodyPr/>
+          <a:lstStyle/>
+          <a:p>
+            <a:fld id="{F5395209-E063-144C-8968-CAA31F3D1B83}" type="slidenum">
+              <a:rPr lang="en-US" smtClean="0"/>
+              <a:pPr/>
+              <a:t>26</a:t>
             </a:fld>
             <a:endParaRPr lang="en-US"/>
           </a:p>
@@ -633,7 +1805,90 @@
           <a:p>
             <a:fld id="{F5395209-E063-144C-8968-CAA31F3D1B83}" type="slidenum">
               <a:rPr lang="en-US" smtClean="0"/>
+              <a:pPr/>
               <a:t>8</a:t>
+            </a:fld>
+            <a:endParaRPr lang="en-US"/>
+          </a:p>
+        </p:txBody>
+      </p:sp>
+    </p:spTree>
+  </p:cSld>
+  <p:clrMapOvr>
+    <a:masterClrMapping/>
+  </p:clrMapOvr>
+</p:notes>
+</file>
+
+<file path=ppt/notesSlides/notesSlide20.xml><?xml version="1.0" encoding="utf-8"?>
+<p:notes xmlns:a="http://schemas.openxmlformats.org/drawingml/2006/main" xmlns:r="http://schemas.openxmlformats.org/officeDocument/2006/relationships" xmlns:mc="http://schemas.openxmlformats.org/markup-compatibility/2006" xmlns:mv="urn:schemas-microsoft-com:mac:vml" xmlns:p="http://schemas.openxmlformats.org/presentationml/2006/main" mc:Ignorable="mv" mc:PreserveAttributes="mv:*">
+  <p:cSld>
+    <p:spTree>
+      <p:nvGrpSpPr>
+        <p:cNvPr id="1" name=""/>
+        <p:cNvGrpSpPr/>
+        <p:nvPr/>
+      </p:nvGrpSpPr>
+      <p:grpSpPr>
+        <a:xfrm>
+          <a:off x="0" y="0"/>
+          <a:ext cx="0" cy="0"/>
+          <a:chOff x="0" y="0"/>
+          <a:chExt cx="0" cy="0"/>
+        </a:xfrm>
+      </p:grpSpPr>
+      <p:sp>
+        <p:nvSpPr>
+          <p:cNvPr id="2" name="Slide Image Placeholder 1"/>
+          <p:cNvSpPr>
+            <a:spLocks noGrp="1" noRot="1" noChangeAspect="1"/>
+          </p:cNvSpPr>
+          <p:nvPr>
+            <p:ph type="sldImg"/>
+          </p:nvPr>
+        </p:nvSpPr>
+        <p:spPr/>
+      </p:sp>
+      <p:sp>
+        <p:nvSpPr>
+          <p:cNvPr id="3" name="Notes Placeholder 2"/>
+          <p:cNvSpPr>
+            <a:spLocks noGrp="1"/>
+          </p:cNvSpPr>
+          <p:nvPr>
+            <p:ph type="body" idx="1"/>
+          </p:nvPr>
+        </p:nvSpPr>
+        <p:spPr/>
+        <p:txBody>
+          <a:bodyPr>
+            <a:normAutofit/>
+          </a:bodyPr>
+          <a:lstStyle/>
+          <a:p>
+            <a:endParaRPr lang="en-US" dirty="0"/>
+          </a:p>
+        </p:txBody>
+      </p:sp>
+      <p:sp>
+        <p:nvSpPr>
+          <p:cNvPr id="4" name="Slide Number Placeholder 3"/>
+          <p:cNvSpPr>
+            <a:spLocks noGrp="1"/>
+          </p:cNvSpPr>
+          <p:nvPr>
+            <p:ph type="sldNum" sz="quarter" idx="10"/>
+          </p:nvPr>
+        </p:nvSpPr>
+        <p:spPr/>
+        <p:txBody>
+          <a:bodyPr/>
+          <a:lstStyle/>
+          <a:p>
+            <a:fld id="{F5395209-E063-144C-8968-CAA31F3D1B83}" type="slidenum">
+              <a:rPr lang="en-US" smtClean="0"/>
+              <a:pPr/>
+              <a:t>27</a:t>
             </a:fld>
             <a:endParaRPr lang="en-US"/>
           </a:p>
@@ -717,6 +1972,7 @@
           <a:p>
             <a:fld id="{F5395209-E063-144C-8968-CAA31F3D1B83}" type="slidenum">
               <a:rPr lang="en-US" smtClean="0"/>
+              <a:pPr/>
               <a:t>9</a:t>
             </a:fld>
             <a:endParaRPr lang="en-US"/>
@@ -798,6 +2054,7 @@
           <a:p>
             <a:fld id="{F5395209-E063-144C-8968-CAA31F3D1B83}" type="slidenum">
               <a:rPr lang="en-US" smtClean="0"/>
+              <a:pPr/>
               <a:t>10</a:t>
             </a:fld>
             <a:endParaRPr lang="en-US"/>
@@ -890,6 +2147,7 @@
           <a:p>
             <a:fld id="{F5395209-E063-144C-8968-CAA31F3D1B83}" type="slidenum">
               <a:rPr lang="en-US" smtClean="0"/>
+              <a:pPr/>
               <a:t>11</a:t>
             </a:fld>
             <a:endParaRPr lang="en-US"/>
@@ -982,6 +2240,7 @@
           <a:p>
             <a:fld id="{F5395209-E063-144C-8968-CAA31F3D1B83}" type="slidenum">
               <a:rPr lang="en-US" smtClean="0"/>
+              <a:pPr/>
               <a:t>12</a:t>
             </a:fld>
             <a:endParaRPr lang="en-US"/>
@@ -1087,6 +2346,7 @@
           <a:p>
             <a:fld id="{F5395209-E063-144C-8968-CAA31F3D1B83}" type="slidenum">
               <a:rPr lang="en-US" smtClean="0"/>
+              <a:pPr/>
               <a:t>13</a:t>
             </a:fld>
             <a:endParaRPr lang="en-US"/>
@@ -1211,7 +2471,160 @@
           <a:p>
             <a:fld id="{F5395209-E063-144C-8968-CAA31F3D1B83}" type="slidenum">
               <a:rPr lang="en-US" smtClean="0"/>
+              <a:pPr/>
               <a:t>14</a:t>
+            </a:fld>
+            <a:endParaRPr lang="en-US"/>
+          </a:p>
+        </p:txBody>
+      </p:sp>
+    </p:spTree>
+  </p:cSld>
+  <p:clrMapOvr>
+    <a:masterClrMapping/>
+  </p:clrMapOvr>
+</p:notes>
+</file>
+
+<file path=ppt/notesSlides/notesSlide9.xml><?xml version="1.0" encoding="utf-8"?>
+<p:notes xmlns:a="http://schemas.openxmlformats.org/drawingml/2006/main" xmlns:r="http://schemas.openxmlformats.org/officeDocument/2006/relationships" xmlns:mc="http://schemas.openxmlformats.org/markup-compatibility/2006" xmlns:mv="urn:schemas-microsoft-com:mac:vml" xmlns:p="http://schemas.openxmlformats.org/presentationml/2006/main" mc:Ignorable="mv" mc:PreserveAttributes="mv:*">
+  <p:cSld>
+    <p:spTree>
+      <p:nvGrpSpPr>
+        <p:cNvPr id="1" name=""/>
+        <p:cNvGrpSpPr/>
+        <p:nvPr/>
+      </p:nvGrpSpPr>
+      <p:grpSpPr>
+        <a:xfrm>
+          <a:off x="0" y="0"/>
+          <a:ext cx="0" cy="0"/>
+          <a:chOff x="0" y="0"/>
+          <a:chExt cx="0" cy="0"/>
+        </a:xfrm>
+      </p:grpSpPr>
+      <p:sp>
+        <p:nvSpPr>
+          <p:cNvPr id="2" name="Slide Image Placeholder 1"/>
+          <p:cNvSpPr>
+            <a:spLocks noGrp="1" noRot="1" noChangeAspect="1"/>
+          </p:cNvSpPr>
+          <p:nvPr>
+            <p:ph type="sldImg"/>
+          </p:nvPr>
+        </p:nvSpPr>
+        <p:spPr/>
+      </p:sp>
+      <p:sp>
+        <p:nvSpPr>
+          <p:cNvPr id="3" name="Notes Placeholder 2"/>
+          <p:cNvSpPr>
+            <a:spLocks noGrp="1"/>
+          </p:cNvSpPr>
+          <p:nvPr>
+            <p:ph type="body" idx="1"/>
+          </p:nvPr>
+        </p:nvSpPr>
+        <p:spPr/>
+        <p:txBody>
+          <a:bodyPr>
+            <a:normAutofit/>
+          </a:bodyPr>
+          <a:lstStyle/>
+          <a:p>
+            <a:r>
+              <a:rPr lang="en-US" dirty="0" err="1" smtClean="0"/>
+              <a:t>Orthogonality</a:t>
+            </a:r>
+            <a:r>
+              <a:rPr lang="en-US" dirty="0" smtClean="0"/>
+              <a:t>.</a:t>
+            </a:r>
+          </a:p>
+          <a:p>
+            <a:r>
+              <a:rPr lang="en-US" dirty="0" smtClean="0"/>
+              <a:t>With</a:t>
+            </a:r>
+            <a:r>
+              <a:rPr lang="en-US" baseline="0" dirty="0" smtClean="0"/>
+              <a:t> this inverted dependency in place we get the benefit of </a:t>
+            </a:r>
+            <a:r>
+              <a:rPr lang="en-US" baseline="0" dirty="0" err="1" smtClean="0"/>
+              <a:t>orthogonality</a:t>
+            </a:r>
+            <a:r>
+              <a:rPr lang="en-US" baseline="0" dirty="0" smtClean="0"/>
+              <a:t>.</a:t>
+            </a:r>
+          </a:p>
+          <a:p>
+            <a:r>
+              <a:rPr lang="en-US" baseline="0" dirty="0" smtClean="0"/>
+              <a:t>Now since we only depend on abstractions, rather than concretions we can change these to modules independently.</a:t>
+            </a:r>
+          </a:p>
+          <a:p>
+            <a:r>
+              <a:rPr lang="en-US" baseline="0" dirty="0" smtClean="0"/>
+              <a:t>Concerns of one module don’t project onto the concerns of the other.</a:t>
+            </a:r>
+          </a:p>
+          <a:p>
+            <a:pPr marL="0" marR="0" indent="0" algn="l" defTabSz="457200" rtl="0" eaLnBrk="1" fontAlgn="auto" latinLnBrk="0" hangingPunct="1">
+              <a:lnSpc>
+                <a:spcPct val="100000"/>
+              </a:lnSpc>
+              <a:spcBef>
+                <a:spcPts val="0"/>
+              </a:spcBef>
+              <a:spcAft>
+                <a:spcPts val="0"/>
+              </a:spcAft>
+              <a:buClrTx/>
+              <a:buSzTx/>
+              <a:buFontTx/>
+              <a:buNone/>
+              <a:tabLst/>
+              <a:defRPr/>
+            </a:pPr>
+            <a:r>
+              <a:rPr lang="en-US" baseline="0" dirty="0" smtClean="0"/>
+              <a:t>Changes to one won’t affect another.</a:t>
+            </a:r>
+          </a:p>
+          <a:p>
+            <a:r>
+              <a:rPr lang="en-US" dirty="0" smtClean="0"/>
+              <a:t>However,</a:t>
+            </a:r>
+            <a:r>
+              <a:rPr lang="en-US" baseline="0" dirty="0" smtClean="0"/>
+              <a:t> if the semantics or interface changes, then, obviously, we’ll have some work to do.</a:t>
+            </a:r>
+          </a:p>
+        </p:txBody>
+      </p:sp>
+      <p:sp>
+        <p:nvSpPr>
+          <p:cNvPr id="4" name="Slide Number Placeholder 3"/>
+          <p:cNvSpPr>
+            <a:spLocks noGrp="1"/>
+          </p:cNvSpPr>
+          <p:nvPr>
+            <p:ph type="sldNum" sz="quarter" idx="10"/>
+          </p:nvPr>
+        </p:nvSpPr>
+        <p:spPr/>
+        <p:txBody>
+          <a:bodyPr/>
+          <a:lstStyle/>
+          <a:p>
+            <a:fld id="{F5395209-E063-144C-8968-CAA31F3D1B83}" type="slidenum">
+              <a:rPr lang="en-US" smtClean="0"/>
+              <a:pPr/>
+              <a:t>15</a:t>
             </a:fld>
             <a:endParaRPr lang="en-US"/>
           </a:p>
@@ -1406,7 +2819,8 @@
           <a:p>
             <a:fld id="{AEDC4D7B-6231-8E46-9EA9-2210599D057D}" type="datetimeFigureOut">
               <a:rPr lang="en-US" smtClean="0"/>
-              <a:t>3/13/10</a:t>
+              <a:pPr/>
+              <a:t>3/15/10</a:t>
             </a:fld>
             <a:endParaRPr lang="en-US"/>
           </a:p>
@@ -1448,6 +2862,7 @@
           <a:p>
             <a:fld id="{B258BA6B-FF80-FC49-B83B-E65015C8E3C3}" type="slidenum">
               <a:rPr lang="en-US" smtClean="0"/>
+              <a:pPr/>
               <a:t>‹#›</a:t>
             </a:fld>
             <a:endParaRPr lang="en-US"/>
@@ -1571,7 +2986,8 @@
           <a:p>
             <a:fld id="{AEDC4D7B-6231-8E46-9EA9-2210599D057D}" type="datetimeFigureOut">
               <a:rPr lang="en-US" smtClean="0"/>
-              <a:t>3/13/10</a:t>
+              <a:pPr/>
+              <a:t>3/15/10</a:t>
             </a:fld>
             <a:endParaRPr lang="en-US"/>
           </a:p>
@@ -1613,6 +3029,7 @@
           <a:p>
             <a:fld id="{B258BA6B-FF80-FC49-B83B-E65015C8E3C3}" type="slidenum">
               <a:rPr lang="en-US" smtClean="0"/>
+              <a:pPr/>
               <a:t>‹#›</a:t>
             </a:fld>
             <a:endParaRPr lang="en-US"/>
@@ -1746,7 +3163,8 @@
           <a:p>
             <a:fld id="{AEDC4D7B-6231-8E46-9EA9-2210599D057D}" type="datetimeFigureOut">
               <a:rPr lang="en-US" smtClean="0"/>
-              <a:t>3/13/10</a:t>
+              <a:pPr/>
+              <a:t>3/15/10</a:t>
             </a:fld>
             <a:endParaRPr lang="en-US"/>
           </a:p>
@@ -1788,6 +3206,7 @@
           <a:p>
             <a:fld id="{B258BA6B-FF80-FC49-B83B-E65015C8E3C3}" type="slidenum">
               <a:rPr lang="en-US" smtClean="0"/>
+              <a:pPr/>
               <a:t>‹#›</a:t>
             </a:fld>
             <a:endParaRPr lang="en-US"/>
@@ -1911,7 +3330,8 @@
           <a:p>
             <a:fld id="{AEDC4D7B-6231-8E46-9EA9-2210599D057D}" type="datetimeFigureOut">
               <a:rPr lang="en-US" smtClean="0"/>
-              <a:t>3/13/10</a:t>
+              <a:pPr/>
+              <a:t>3/15/10</a:t>
             </a:fld>
             <a:endParaRPr lang="en-US"/>
           </a:p>
@@ -1953,6 +3373,7 @@
           <a:p>
             <a:fld id="{B258BA6B-FF80-FC49-B83B-E65015C8E3C3}" type="slidenum">
               <a:rPr lang="en-US" smtClean="0"/>
+              <a:pPr/>
               <a:t>‹#›</a:t>
             </a:fld>
             <a:endParaRPr lang="en-US"/>
@@ -2152,7 +3573,8 @@
           <a:p>
             <a:fld id="{AEDC4D7B-6231-8E46-9EA9-2210599D057D}" type="datetimeFigureOut">
               <a:rPr lang="en-US" smtClean="0"/>
-              <a:t>3/13/10</a:t>
+              <a:pPr/>
+              <a:t>3/15/10</a:t>
             </a:fld>
             <a:endParaRPr lang="en-US"/>
           </a:p>
@@ -2194,6 +3616,7 @@
           <a:p>
             <a:fld id="{B258BA6B-FF80-FC49-B83B-E65015C8E3C3}" type="slidenum">
               <a:rPr lang="en-US" smtClean="0"/>
+              <a:pPr/>
               <a:t>‹#›</a:t>
             </a:fld>
             <a:endParaRPr lang="en-US"/>
@@ -2435,7 +3858,8 @@
           <a:p>
             <a:fld id="{AEDC4D7B-6231-8E46-9EA9-2210599D057D}" type="datetimeFigureOut">
               <a:rPr lang="en-US" smtClean="0"/>
-              <a:t>3/13/10</a:t>
+              <a:pPr/>
+              <a:t>3/15/10</a:t>
             </a:fld>
             <a:endParaRPr lang="en-US"/>
           </a:p>
@@ -2477,6 +3901,7 @@
           <a:p>
             <a:fld id="{B258BA6B-FF80-FC49-B83B-E65015C8E3C3}" type="slidenum">
               <a:rPr lang="en-US" smtClean="0"/>
+              <a:pPr/>
               <a:t>‹#›</a:t>
             </a:fld>
             <a:endParaRPr lang="en-US"/>
@@ -2852,7 +4277,8 @@
           <a:p>
             <a:fld id="{AEDC4D7B-6231-8E46-9EA9-2210599D057D}" type="datetimeFigureOut">
               <a:rPr lang="en-US" smtClean="0"/>
-              <a:t>3/13/10</a:t>
+              <a:pPr/>
+              <a:t>3/15/10</a:t>
             </a:fld>
             <a:endParaRPr lang="en-US"/>
           </a:p>
@@ -2894,6 +4320,7 @@
           <a:p>
             <a:fld id="{B258BA6B-FF80-FC49-B83B-E65015C8E3C3}" type="slidenum">
               <a:rPr lang="en-US" smtClean="0"/>
+              <a:pPr/>
               <a:t>‹#›</a:t>
             </a:fld>
             <a:endParaRPr lang="en-US"/>
@@ -2965,7 +4392,8 @@
           <a:p>
             <a:fld id="{AEDC4D7B-6231-8E46-9EA9-2210599D057D}" type="datetimeFigureOut">
               <a:rPr lang="en-US" smtClean="0"/>
-              <a:t>3/13/10</a:t>
+              <a:pPr/>
+              <a:t>3/15/10</a:t>
             </a:fld>
             <a:endParaRPr lang="en-US"/>
           </a:p>
@@ -3007,6 +4435,7 @@
           <a:p>
             <a:fld id="{B258BA6B-FF80-FC49-B83B-E65015C8E3C3}" type="slidenum">
               <a:rPr lang="en-US" smtClean="0"/>
+              <a:pPr/>
               <a:t>‹#›</a:t>
             </a:fld>
             <a:endParaRPr lang="en-US"/>
@@ -3055,7 +4484,8 @@
           <a:p>
             <a:fld id="{AEDC4D7B-6231-8E46-9EA9-2210599D057D}" type="datetimeFigureOut">
               <a:rPr lang="en-US" smtClean="0"/>
-              <a:t>3/13/10</a:t>
+              <a:pPr/>
+              <a:t>3/15/10</a:t>
             </a:fld>
             <a:endParaRPr lang="en-US"/>
           </a:p>
@@ -3097,6 +4527,7 @@
           <a:p>
             <a:fld id="{B258BA6B-FF80-FC49-B83B-E65015C8E3C3}" type="slidenum">
               <a:rPr lang="en-US" smtClean="0"/>
+              <a:pPr/>
               <a:t>‹#›</a:t>
             </a:fld>
             <a:endParaRPr lang="en-US"/>
@@ -3327,7 +4758,8 @@
           <a:p>
             <a:fld id="{AEDC4D7B-6231-8E46-9EA9-2210599D057D}" type="datetimeFigureOut">
               <a:rPr lang="en-US" smtClean="0"/>
-              <a:t>3/13/10</a:t>
+              <a:pPr/>
+              <a:t>3/15/10</a:t>
             </a:fld>
             <a:endParaRPr lang="en-US"/>
           </a:p>
@@ -3369,6 +4801,7 @@
           <a:p>
             <a:fld id="{B258BA6B-FF80-FC49-B83B-E65015C8E3C3}" type="slidenum">
               <a:rPr lang="en-US" smtClean="0"/>
+              <a:pPr/>
               <a:t>‹#›</a:t>
             </a:fld>
             <a:endParaRPr lang="en-US"/>
@@ -3575,7 +5008,8 @@
           <a:p>
             <a:fld id="{AEDC4D7B-6231-8E46-9EA9-2210599D057D}" type="datetimeFigureOut">
               <a:rPr lang="en-US" smtClean="0"/>
-              <a:t>3/13/10</a:t>
+              <a:pPr/>
+              <a:t>3/15/10</a:t>
             </a:fld>
             <a:endParaRPr lang="en-US"/>
           </a:p>
@@ -3617,6 +5051,7 @@
           <a:p>
             <a:fld id="{B258BA6B-FF80-FC49-B83B-E65015C8E3C3}" type="slidenum">
               <a:rPr lang="en-US" smtClean="0"/>
+              <a:pPr/>
               <a:t>‹#›</a:t>
             </a:fld>
             <a:endParaRPr lang="en-US"/>
@@ -3783,7 +5218,8 @@
           <a:p>
             <a:fld id="{AEDC4D7B-6231-8E46-9EA9-2210599D057D}" type="datetimeFigureOut">
               <a:rPr lang="en-US" smtClean="0"/>
-              <a:t>3/13/10</a:t>
+              <a:pPr/>
+              <a:t>3/15/10</a:t>
             </a:fld>
             <a:endParaRPr lang="en-US"/>
           </a:p>
@@ -3861,6 +5297,7 @@
           <a:p>
             <a:fld id="{B258BA6B-FF80-FC49-B83B-E65015C8E3C3}" type="slidenum">
               <a:rPr lang="en-US" smtClean="0"/>
+              <a:pPr/>
               <a:t>‹#›</a:t>
             </a:fld>
             <a:endParaRPr lang="en-US"/>
@@ -5472,7 +6909,7 @@
               <a:defRPr/>
             </a:pPr>
             <a:r>
-              <a:rPr kumimoji="0" lang="en-US" sz="4400" b="0" i="0" u="none" strike="noStrike" kern="1200" cap="none" spc="0" normalizeH="0" baseline="0" noProof="0" smtClean="0">
+              <a:rPr kumimoji="0" lang="en-US" sz="4400" b="0" i="0" u="none" strike="noStrike" kern="1200" cap="none" spc="0" normalizeH="0" baseline="0" noProof="0" dirty="0" smtClean="0">
                 <a:ln>
                   <a:noFill/>
                 </a:ln>
@@ -5491,23 +6928,6 @@
               </a:rPr>
               <a:t>DIP</a:t>
             </a:r>
-            <a:endParaRPr kumimoji="0" lang="en-US" sz="4400" b="0" i="0" u="none" strike="noStrike" kern="1200" cap="none" spc="0" normalizeH="0" baseline="0" noProof="0" dirty="0" smtClean="0">
-              <a:ln>
-                <a:noFill/>
-              </a:ln>
-              <a:solidFill>
-                <a:schemeClr val="tx1">
-                  <a:lumMod val="50000"/>
-                  <a:lumOff val="50000"/>
-                </a:schemeClr>
-              </a:solidFill>
-              <a:effectLst/>
-              <a:uLnTx/>
-              <a:uFillTx/>
-              <a:latin typeface="+mj-lt"/>
-              <a:ea typeface="+mj-ea"/>
-              <a:cs typeface="+mj-cs"/>
-            </a:endParaRPr>
           </a:p>
         </p:txBody>
       </p:sp>
@@ -5969,6 +7389,795 @@
 </p:sld>
 </file>
 
+<file path=ppt/slides/slide15.xml><?xml version="1.0" encoding="utf-8"?>
+<p:sld xmlns:a="http://schemas.openxmlformats.org/drawingml/2006/main" xmlns:r="http://schemas.openxmlformats.org/officeDocument/2006/relationships" xmlns:mc="http://schemas.openxmlformats.org/markup-compatibility/2006" xmlns:mv="urn:schemas-microsoft-com:mac:vml" xmlns:p="http://schemas.openxmlformats.org/presentationml/2006/main" mc:Ignorable="mv" mc:PreserveAttributes="mv:*">
+  <p:cSld>
+    <p:spTree>
+      <p:nvGrpSpPr>
+        <p:cNvPr id="1" name=""/>
+        <p:cNvGrpSpPr/>
+        <p:nvPr/>
+      </p:nvGrpSpPr>
+      <p:grpSpPr>
+        <a:xfrm>
+          <a:off x="0" y="0"/>
+          <a:ext cx="0" cy="0"/>
+          <a:chOff x="0" y="0"/>
+          <a:chExt cx="0" cy="0"/>
+        </a:xfrm>
+      </p:grpSpPr>
+      <p:sp>
+        <p:nvSpPr>
+          <p:cNvPr id="2" name="Title 1"/>
+          <p:cNvSpPr>
+            <a:spLocks noGrp="1"/>
+          </p:cNvSpPr>
+          <p:nvPr>
+            <p:ph type="title"/>
+          </p:nvPr>
+        </p:nvSpPr>
+        <p:spPr/>
+        <p:txBody>
+          <a:bodyPr/>
+          <a:lstStyle/>
+          <a:p>
+            <a:endParaRPr lang="en-US"/>
+          </a:p>
+        </p:txBody>
+      </p:sp>
+      <p:sp>
+        <p:nvSpPr>
+          <p:cNvPr id="4" name="Left-Up Arrow 3"/>
+          <p:cNvSpPr/>
+          <p:nvPr/>
+        </p:nvSpPr>
+        <p:spPr>
+          <a:xfrm rot="3624887">
+            <a:off x="3817085" y="1976930"/>
+            <a:ext cx="2088622" cy="2258679"/>
+          </a:xfrm>
+          <a:prstGeom prst="leftUpArrow">
+            <a:avLst>
+              <a:gd name="adj1" fmla="val 6056"/>
+              <a:gd name="adj2" fmla="val 6844"/>
+              <a:gd name="adj3" fmla="val 25000"/>
+            </a:avLst>
+          </a:prstGeom>
+          <a:solidFill>
+            <a:schemeClr val="tx1"/>
+          </a:solidFill>
+          <a:ln>
+            <a:noFill/>
+          </a:ln>
+        </p:spPr>
+        <p:style>
+          <a:lnRef idx="1">
+            <a:schemeClr val="accent1"/>
+          </a:lnRef>
+          <a:fillRef idx="3">
+            <a:schemeClr val="accent1"/>
+          </a:fillRef>
+          <a:effectRef idx="2">
+            <a:schemeClr val="accent1"/>
+          </a:effectRef>
+          <a:fontRef idx="minor">
+            <a:schemeClr val="lt1"/>
+          </a:fontRef>
+        </p:style>
+      </p:sp>
+      <p:sp>
+        <p:nvSpPr>
+          <p:cNvPr id="5" name="Arc 4"/>
+          <p:cNvSpPr/>
+          <p:nvPr/>
+        </p:nvSpPr>
+        <p:spPr>
+          <a:xfrm rot="20489299">
+            <a:off x="4020686" y="3715886"/>
+            <a:ext cx="822960" cy="822960"/>
+          </a:xfrm>
+          <a:prstGeom prst="arc">
+            <a:avLst>
+              <a:gd name="adj1" fmla="val 15872078"/>
+              <a:gd name="adj2" fmla="val 0"/>
+            </a:avLst>
+          </a:prstGeom>
+          <a:ln>
+            <a:solidFill>
+              <a:schemeClr val="tx1"/>
+            </a:solidFill>
+          </a:ln>
+        </p:spPr>
+        <p:style>
+          <a:lnRef idx="2">
+            <a:schemeClr val="accent1"/>
+          </a:lnRef>
+          <a:fillRef idx="0">
+            <a:schemeClr val="accent1"/>
+          </a:fillRef>
+          <a:effectRef idx="1">
+            <a:schemeClr val="accent1"/>
+          </a:effectRef>
+          <a:fontRef idx="minor">
+            <a:schemeClr val="tx1"/>
+          </a:fontRef>
+        </p:style>
+        <p:txBody>
+          <a:bodyPr/>
+          <a:lstStyle/>
+          <a:p>
+            <a:endParaRPr lang="en-US" dirty="0"/>
+          </a:p>
+        </p:txBody>
+      </p:sp>
+      <p:sp>
+        <p:nvSpPr>
+          <p:cNvPr id="7" name="TextBox 6"/>
+          <p:cNvSpPr txBox="1"/>
+          <p:nvPr/>
+        </p:nvSpPr>
+        <p:spPr>
+          <a:xfrm>
+            <a:off x="4495800" y="3352800"/>
+            <a:ext cx="609600" cy="369332"/>
+          </a:xfrm>
+          <a:prstGeom prst="rect">
+            <a:avLst/>
+          </a:prstGeom>
+          <a:noFill/>
+        </p:spPr>
+        <p:txBody>
+          <a:bodyPr wrap="square" rtlCol="0">
+            <a:spAutoFit/>
+          </a:bodyPr>
+          <a:lstStyle/>
+          <a:p>
+            <a:r>
+              <a:rPr lang="en-US" dirty="0" smtClean="0"/>
+              <a:t>90˚</a:t>
+            </a:r>
+            <a:endParaRPr lang="en-US" dirty="0"/>
+          </a:p>
+        </p:txBody>
+      </p:sp>
+      <p:sp>
+        <p:nvSpPr>
+          <p:cNvPr id="8" name="TextBox 7"/>
+          <p:cNvSpPr txBox="1"/>
+          <p:nvPr/>
+        </p:nvSpPr>
+        <p:spPr>
+          <a:xfrm>
+            <a:off x="3276600" y="2286000"/>
+            <a:ext cx="533400" cy="369332"/>
+          </a:xfrm>
+          <a:prstGeom prst="rect">
+            <a:avLst/>
+          </a:prstGeom>
+          <a:noFill/>
+        </p:spPr>
+        <p:txBody>
+          <a:bodyPr wrap="square" rtlCol="0">
+            <a:spAutoFit/>
+          </a:bodyPr>
+          <a:lstStyle/>
+          <a:p>
+            <a:r>
+              <a:rPr lang="en-US" dirty="0" smtClean="0"/>
+              <a:t>X</a:t>
+            </a:r>
+            <a:endParaRPr lang="en-US" dirty="0"/>
+          </a:p>
+        </p:txBody>
+      </p:sp>
+      <p:sp>
+        <p:nvSpPr>
+          <p:cNvPr id="9" name="TextBox 8"/>
+          <p:cNvSpPr txBox="1"/>
+          <p:nvPr/>
+        </p:nvSpPr>
+        <p:spPr>
+          <a:xfrm>
+            <a:off x="6324600" y="2983468"/>
+            <a:ext cx="533400" cy="369332"/>
+          </a:xfrm>
+          <a:prstGeom prst="rect">
+            <a:avLst/>
+          </a:prstGeom>
+          <a:noFill/>
+        </p:spPr>
+        <p:txBody>
+          <a:bodyPr wrap="square" rtlCol="0">
+            <a:spAutoFit/>
+          </a:bodyPr>
+          <a:lstStyle/>
+          <a:p>
+            <a:r>
+              <a:rPr lang="en-US" dirty="0" smtClean="0"/>
+              <a:t>Y</a:t>
+            </a:r>
+            <a:endParaRPr lang="en-US" dirty="0"/>
+          </a:p>
+        </p:txBody>
+      </p:sp>
+      <p:sp>
+        <p:nvSpPr>
+          <p:cNvPr id="10" name="Title 1"/>
+          <p:cNvSpPr txBox="1">
+            <a:spLocks/>
+          </p:cNvSpPr>
+          <p:nvPr/>
+        </p:nvSpPr>
+        <p:spPr>
+          <a:xfrm>
+            <a:off x="7924800" y="5715000"/>
+            <a:ext cx="1219200" cy="1143000"/>
+          </a:xfrm>
+          <a:prstGeom prst="rect">
+            <a:avLst/>
+          </a:prstGeom>
+        </p:spPr>
+        <p:txBody>
+          <a:bodyPr vert="horz" lIns="91440" tIns="45720" rIns="91440" bIns="45720" rtlCol="0" anchor="b">
+            <a:normAutofit/>
+          </a:bodyPr>
+          <a:lstStyle/>
+          <a:p>
+            <a:pPr marL="0" marR="0" lvl="0" indent="0" algn="r" defTabSz="457200" rtl="0" eaLnBrk="1" fontAlgn="auto" latinLnBrk="0" hangingPunct="1">
+              <a:lnSpc>
+                <a:spcPct val="100000"/>
+              </a:lnSpc>
+              <a:spcBef>
+                <a:spcPct val="0"/>
+              </a:spcBef>
+              <a:spcAft>
+                <a:spcPts val="0"/>
+              </a:spcAft>
+              <a:buClrTx/>
+              <a:buSzTx/>
+              <a:buFontTx/>
+              <a:buNone/>
+              <a:tabLst/>
+              <a:defRPr/>
+            </a:pPr>
+            <a:r>
+              <a:rPr kumimoji="0" lang="en-US" sz="4400" b="0" i="0" u="none" strike="noStrike" kern="1200" cap="none" spc="0" normalizeH="0" baseline="0" noProof="0" dirty="0" smtClean="0">
+                <a:ln>
+                  <a:noFill/>
+                </a:ln>
+                <a:solidFill>
+                  <a:schemeClr val="tx1">
+                    <a:lumMod val="50000"/>
+                    <a:lumOff val="50000"/>
+                  </a:schemeClr>
+                </a:solidFill>
+                <a:effectLst/>
+                <a:uLnTx/>
+                <a:uFillTx/>
+                <a:latin typeface="+mj-lt"/>
+                <a:ea typeface="+mj-ea"/>
+                <a:cs typeface="+mj-cs"/>
+              </a:rPr>
+              <a:t>DIP</a:t>
+            </a:r>
+          </a:p>
+        </p:txBody>
+      </p:sp>
+    </p:spTree>
+  </p:cSld>
+  <p:clrMapOvr>
+    <a:masterClrMapping/>
+  </p:clrMapOvr>
+  <p:timing>
+    <p:tnLst>
+      <p:par>
+        <p:cTn id="1" dur="indefinite" restart="never" nodeType="tmRoot"/>
+      </p:par>
+    </p:tnLst>
+  </p:timing>
+</p:sld>
+</file>
+
+<file path=ppt/slides/slide16.xml><?xml version="1.0" encoding="utf-8"?>
+<p:sld xmlns:a="http://schemas.openxmlformats.org/drawingml/2006/main" xmlns:r="http://schemas.openxmlformats.org/officeDocument/2006/relationships" xmlns:mc="http://schemas.openxmlformats.org/markup-compatibility/2006" xmlns:mv="urn:schemas-microsoft-com:mac:vml" xmlns:p="http://schemas.openxmlformats.org/presentationml/2006/main" mc:Ignorable="mv" mc:PreserveAttributes="mv:*">
+  <p:cSld>
+    <p:spTree>
+      <p:nvGrpSpPr>
+        <p:cNvPr id="1" name=""/>
+        <p:cNvGrpSpPr/>
+        <p:nvPr/>
+      </p:nvGrpSpPr>
+      <p:grpSpPr>
+        <a:xfrm>
+          <a:off x="0" y="0"/>
+          <a:ext cx="0" cy="0"/>
+          <a:chOff x="0" y="0"/>
+          <a:chExt cx="0" cy="0"/>
+        </a:xfrm>
+      </p:grpSpPr>
+      <p:sp>
+        <p:nvSpPr>
+          <p:cNvPr id="2" name="Title 1"/>
+          <p:cNvSpPr>
+            <a:spLocks noGrp="1"/>
+          </p:cNvSpPr>
+          <p:nvPr>
+            <p:ph type="title"/>
+          </p:nvPr>
+        </p:nvSpPr>
+        <p:spPr>
+          <a:xfrm>
+            <a:off x="457200" y="2667000"/>
+            <a:ext cx="8229600" cy="1143000"/>
+          </a:xfrm>
+        </p:spPr>
+        <p:txBody>
+          <a:bodyPr/>
+          <a:lstStyle/>
+          <a:p>
+            <a:r>
+              <a:rPr lang="en-US" dirty="0" smtClean="0"/>
+              <a:t>service location</a:t>
+            </a:r>
+            <a:endParaRPr lang="en-US" dirty="0"/>
+          </a:p>
+        </p:txBody>
+      </p:sp>
+      <p:sp>
+        <p:nvSpPr>
+          <p:cNvPr id="3" name="Title 1"/>
+          <p:cNvSpPr txBox="1">
+            <a:spLocks/>
+          </p:cNvSpPr>
+          <p:nvPr/>
+        </p:nvSpPr>
+        <p:spPr>
+          <a:xfrm>
+            <a:off x="8153400" y="6096000"/>
+            <a:ext cx="990600" cy="762000"/>
+          </a:xfrm>
+          <a:prstGeom prst="rect">
+            <a:avLst/>
+          </a:prstGeom>
+        </p:spPr>
+        <p:txBody>
+          <a:bodyPr vert="horz" lIns="91440" tIns="45720" rIns="91440" bIns="45720" rtlCol="0" anchor="b">
+            <a:normAutofit/>
+          </a:bodyPr>
+          <a:lstStyle/>
+          <a:p>
+            <a:pPr marL="0" marR="0" lvl="0" indent="0" algn="r" defTabSz="457200" rtl="0" eaLnBrk="1" fontAlgn="auto" latinLnBrk="0" hangingPunct="1">
+              <a:lnSpc>
+                <a:spcPct val="100000"/>
+              </a:lnSpc>
+              <a:spcBef>
+                <a:spcPct val="0"/>
+              </a:spcBef>
+              <a:spcAft>
+                <a:spcPts val="0"/>
+              </a:spcAft>
+              <a:buClrTx/>
+              <a:buSzTx/>
+              <a:buFontTx/>
+              <a:buNone/>
+              <a:tabLst/>
+              <a:defRPr/>
+            </a:pPr>
+            <a:r>
+              <a:rPr kumimoji="0" lang="en-US" sz="4400" b="0" i="0" u="none" strike="noStrike" kern="1200" cap="none" spc="0" normalizeH="0" baseline="0" noProof="0" dirty="0" smtClean="0">
+                <a:ln>
+                  <a:noFill/>
+                </a:ln>
+                <a:solidFill>
+                  <a:schemeClr val="tx1">
+                    <a:lumMod val="50000"/>
+                    <a:lumOff val="50000"/>
+                  </a:schemeClr>
+                </a:solidFill>
+                <a:effectLst/>
+                <a:uLnTx/>
+                <a:uFillTx/>
+                <a:latin typeface="+mj-lt"/>
+                <a:ea typeface="+mj-ea"/>
+                <a:cs typeface="+mj-cs"/>
+              </a:rPr>
+              <a:t>DI</a:t>
+            </a:r>
+          </a:p>
+        </p:txBody>
+      </p:sp>
+    </p:spTree>
+  </p:cSld>
+  <p:clrMapOvr>
+    <a:masterClrMapping/>
+  </p:clrMapOvr>
+</p:sld>
+</file>
+
+<file path=ppt/slides/slide17.xml><?xml version="1.0" encoding="utf-8"?>
+<p:sld xmlns:a="http://schemas.openxmlformats.org/drawingml/2006/main" xmlns:r="http://schemas.openxmlformats.org/officeDocument/2006/relationships" xmlns:mc="http://schemas.openxmlformats.org/markup-compatibility/2006" xmlns:mv="urn:schemas-microsoft-com:mac:vml" xmlns:p="http://schemas.openxmlformats.org/presentationml/2006/main" mc:Ignorable="mv" mc:PreserveAttributes="mv:*">
+  <p:cSld>
+    <p:spTree>
+      <p:nvGrpSpPr>
+        <p:cNvPr id="1" name=""/>
+        <p:cNvGrpSpPr/>
+        <p:nvPr/>
+      </p:nvGrpSpPr>
+      <p:grpSpPr>
+        <a:xfrm>
+          <a:off x="0" y="0"/>
+          <a:ext cx="0" cy="0"/>
+          <a:chOff x="0" y="0"/>
+          <a:chExt cx="0" cy="0"/>
+        </a:xfrm>
+      </p:grpSpPr>
+      <p:sp>
+        <p:nvSpPr>
+          <p:cNvPr id="2" name="Title 1"/>
+          <p:cNvSpPr>
+            <a:spLocks noGrp="1"/>
+          </p:cNvSpPr>
+          <p:nvPr>
+            <p:ph type="title"/>
+          </p:nvPr>
+        </p:nvSpPr>
+        <p:spPr>
+          <a:xfrm>
+            <a:off x="457200" y="2667000"/>
+            <a:ext cx="8229600" cy="1143000"/>
+          </a:xfrm>
+        </p:spPr>
+        <p:txBody>
+          <a:bodyPr>
+            <a:normAutofit fontScale="90000"/>
+          </a:bodyPr>
+          <a:lstStyle/>
+          <a:p>
+            <a:r>
+              <a:rPr lang="en-US" dirty="0" smtClean="0"/>
+              <a:t>XXX</a:t>
+            </a:r>
+            <a:br>
+              <a:rPr lang="en-US" dirty="0" smtClean="0"/>
+            </a:br>
+            <a:r>
+              <a:rPr lang="en-US" dirty="0" smtClean="0"/>
+              <a:t>service locator source code</a:t>
+            </a:r>
+            <a:br>
+              <a:rPr lang="en-US" dirty="0" smtClean="0"/>
+            </a:br>
+            <a:r>
+              <a:rPr lang="en-US" dirty="0" smtClean="0"/>
+              <a:t>XXX</a:t>
+            </a:r>
+            <a:endParaRPr lang="en-US" dirty="0"/>
+          </a:p>
+        </p:txBody>
+      </p:sp>
+      <p:sp>
+        <p:nvSpPr>
+          <p:cNvPr id="3" name="Title 1"/>
+          <p:cNvSpPr txBox="1">
+            <a:spLocks/>
+          </p:cNvSpPr>
+          <p:nvPr/>
+        </p:nvSpPr>
+        <p:spPr>
+          <a:xfrm>
+            <a:off x="8153400" y="6096000"/>
+            <a:ext cx="990600" cy="762000"/>
+          </a:xfrm>
+          <a:prstGeom prst="rect">
+            <a:avLst/>
+          </a:prstGeom>
+        </p:spPr>
+        <p:txBody>
+          <a:bodyPr vert="horz" lIns="91440" tIns="45720" rIns="91440" bIns="45720" rtlCol="0" anchor="b">
+            <a:normAutofit/>
+          </a:bodyPr>
+          <a:lstStyle/>
+          <a:p>
+            <a:pPr marL="0" marR="0" lvl="0" indent="0" algn="r" defTabSz="457200" rtl="0" eaLnBrk="1" fontAlgn="auto" latinLnBrk="0" hangingPunct="1">
+              <a:lnSpc>
+                <a:spcPct val="100000"/>
+              </a:lnSpc>
+              <a:spcBef>
+                <a:spcPct val="0"/>
+              </a:spcBef>
+              <a:spcAft>
+                <a:spcPts val="0"/>
+              </a:spcAft>
+              <a:buClrTx/>
+              <a:buSzTx/>
+              <a:buFontTx/>
+              <a:buNone/>
+              <a:tabLst/>
+              <a:defRPr/>
+            </a:pPr>
+            <a:r>
+              <a:rPr kumimoji="0" lang="en-US" sz="4400" b="0" i="0" u="none" strike="noStrike" kern="1200" cap="none" spc="0" normalizeH="0" baseline="0" noProof="0" dirty="0" smtClean="0">
+                <a:ln>
+                  <a:noFill/>
+                </a:ln>
+                <a:solidFill>
+                  <a:schemeClr val="tx1">
+                    <a:lumMod val="50000"/>
+                    <a:lumOff val="50000"/>
+                  </a:schemeClr>
+                </a:solidFill>
+                <a:effectLst/>
+                <a:uLnTx/>
+                <a:uFillTx/>
+                <a:latin typeface="+mj-lt"/>
+                <a:ea typeface="+mj-ea"/>
+                <a:cs typeface="+mj-cs"/>
+              </a:rPr>
+              <a:t>DI</a:t>
+            </a:r>
+          </a:p>
+        </p:txBody>
+      </p:sp>
+    </p:spTree>
+  </p:cSld>
+  <p:clrMapOvr>
+    <a:masterClrMapping/>
+  </p:clrMapOvr>
+</p:sld>
+</file>
+
+<file path=ppt/slides/slide18.xml><?xml version="1.0" encoding="utf-8"?>
+<p:sld xmlns:a="http://schemas.openxmlformats.org/drawingml/2006/main" xmlns:r="http://schemas.openxmlformats.org/officeDocument/2006/relationships" xmlns:mc="http://schemas.openxmlformats.org/markup-compatibility/2006" xmlns:mv="urn:schemas-microsoft-com:mac:vml" xmlns:p="http://schemas.openxmlformats.org/presentationml/2006/main" mc:Ignorable="mv" mc:PreserveAttributes="mv:*">
+  <p:cSld>
+    <p:spTree>
+      <p:nvGrpSpPr>
+        <p:cNvPr id="1" name=""/>
+        <p:cNvGrpSpPr/>
+        <p:nvPr/>
+      </p:nvGrpSpPr>
+      <p:grpSpPr>
+        <a:xfrm>
+          <a:off x="0" y="0"/>
+          <a:ext cx="0" cy="0"/>
+          <a:chOff x="0" y="0"/>
+          <a:chExt cx="0" cy="0"/>
+        </a:xfrm>
+      </p:grpSpPr>
+      <p:sp>
+        <p:nvSpPr>
+          <p:cNvPr id="2" name="Title 1"/>
+          <p:cNvSpPr>
+            <a:spLocks noGrp="1"/>
+          </p:cNvSpPr>
+          <p:nvPr>
+            <p:ph type="title"/>
+          </p:nvPr>
+        </p:nvSpPr>
+        <p:spPr>
+          <a:xfrm>
+            <a:off x="457200" y="2667000"/>
+            <a:ext cx="8229600" cy="1143000"/>
+          </a:xfrm>
+        </p:spPr>
+        <p:txBody>
+          <a:bodyPr/>
+          <a:lstStyle/>
+          <a:p>
+            <a:r>
+              <a:rPr lang="en-US" dirty="0" smtClean="0"/>
+              <a:t>dependency injection</a:t>
+            </a:r>
+            <a:endParaRPr lang="en-US" dirty="0"/>
+          </a:p>
+        </p:txBody>
+      </p:sp>
+      <p:sp>
+        <p:nvSpPr>
+          <p:cNvPr id="3" name="Title 1"/>
+          <p:cNvSpPr txBox="1">
+            <a:spLocks/>
+          </p:cNvSpPr>
+          <p:nvPr/>
+        </p:nvSpPr>
+        <p:spPr>
+          <a:xfrm>
+            <a:off x="8153400" y="6096000"/>
+            <a:ext cx="990600" cy="762000"/>
+          </a:xfrm>
+          <a:prstGeom prst="rect">
+            <a:avLst/>
+          </a:prstGeom>
+        </p:spPr>
+        <p:txBody>
+          <a:bodyPr vert="horz" lIns="91440" tIns="45720" rIns="91440" bIns="45720" rtlCol="0" anchor="b">
+            <a:normAutofit/>
+          </a:bodyPr>
+          <a:lstStyle/>
+          <a:p>
+            <a:pPr marL="0" marR="0" lvl="0" indent="0" algn="r" defTabSz="457200" rtl="0" eaLnBrk="1" fontAlgn="auto" latinLnBrk="0" hangingPunct="1">
+              <a:lnSpc>
+                <a:spcPct val="100000"/>
+              </a:lnSpc>
+              <a:spcBef>
+                <a:spcPct val="0"/>
+              </a:spcBef>
+              <a:spcAft>
+                <a:spcPts val="0"/>
+              </a:spcAft>
+              <a:buClrTx/>
+              <a:buSzTx/>
+              <a:buFontTx/>
+              <a:buNone/>
+              <a:tabLst/>
+              <a:defRPr/>
+            </a:pPr>
+            <a:r>
+              <a:rPr kumimoji="0" lang="en-US" sz="4400" b="0" i="0" u="none" strike="noStrike" kern="1200" cap="none" spc="0" normalizeH="0" baseline="0" noProof="0" dirty="0" smtClean="0">
+                <a:ln>
+                  <a:noFill/>
+                </a:ln>
+                <a:solidFill>
+                  <a:schemeClr val="tx1">
+                    <a:lumMod val="50000"/>
+                    <a:lumOff val="50000"/>
+                  </a:schemeClr>
+                </a:solidFill>
+                <a:effectLst/>
+                <a:uLnTx/>
+                <a:uFillTx/>
+                <a:latin typeface="+mj-lt"/>
+                <a:ea typeface="+mj-ea"/>
+                <a:cs typeface="+mj-cs"/>
+              </a:rPr>
+              <a:t>DI</a:t>
+            </a:r>
+          </a:p>
+        </p:txBody>
+      </p:sp>
+    </p:spTree>
+  </p:cSld>
+  <p:clrMapOvr>
+    <a:masterClrMapping/>
+  </p:clrMapOvr>
+</p:sld>
+</file>
+
+<file path=ppt/slides/slide19.xml><?xml version="1.0" encoding="utf-8"?>
+<p:sld xmlns:a="http://schemas.openxmlformats.org/drawingml/2006/main" xmlns:r="http://schemas.openxmlformats.org/officeDocument/2006/relationships" xmlns:mc="http://schemas.openxmlformats.org/markup-compatibility/2006" xmlns:mv="urn:schemas-microsoft-com:mac:vml" xmlns:p="http://schemas.openxmlformats.org/presentationml/2006/main" mc:Ignorable="mv" mc:PreserveAttributes="mv:*">
+  <p:cSld>
+    <p:spTree>
+      <p:nvGrpSpPr>
+        <p:cNvPr id="1" name=""/>
+        <p:cNvGrpSpPr/>
+        <p:nvPr/>
+      </p:nvGrpSpPr>
+      <p:grpSpPr>
+        <a:xfrm>
+          <a:off x="0" y="0"/>
+          <a:ext cx="0" cy="0"/>
+          <a:chOff x="0" y="0"/>
+          <a:chExt cx="0" cy="0"/>
+        </a:xfrm>
+      </p:grpSpPr>
+      <p:sp>
+        <p:nvSpPr>
+          <p:cNvPr id="2" name="Title 1"/>
+          <p:cNvSpPr>
+            <a:spLocks noGrp="1"/>
+          </p:cNvSpPr>
+          <p:nvPr>
+            <p:ph type="title"/>
+          </p:nvPr>
+        </p:nvSpPr>
+        <p:spPr>
+          <a:xfrm>
+            <a:off x="457200" y="2667000"/>
+            <a:ext cx="8229600" cy="1143000"/>
+          </a:xfrm>
+        </p:spPr>
+        <p:txBody>
+          <a:bodyPr>
+            <a:normAutofit fontScale="90000"/>
+          </a:bodyPr>
+          <a:lstStyle/>
+          <a:p>
+            <a:r>
+              <a:rPr lang="en-US" dirty="0" smtClean="0"/>
+              <a:t>xxx</a:t>
+            </a:r>
+            <a:br>
+              <a:rPr lang="en-US" dirty="0" smtClean="0"/>
+            </a:br>
+            <a:r>
+              <a:rPr lang="en-US" dirty="0" err="1" smtClean="0"/>
+              <a:t>MovieLister</a:t>
+            </a:r>
+            <a:r>
+              <a:rPr lang="en-US" dirty="0" smtClean="0"/>
+              <a:t> example, no DI</a:t>
+            </a:r>
+            <a:br>
+              <a:rPr lang="en-US" dirty="0" smtClean="0"/>
+            </a:br>
+            <a:r>
+              <a:rPr lang="en-US" dirty="0" smtClean="0"/>
+              <a:t>XXX</a:t>
+            </a:r>
+            <a:endParaRPr lang="en-US" dirty="0"/>
+          </a:p>
+        </p:txBody>
+      </p:sp>
+      <p:sp>
+        <p:nvSpPr>
+          <p:cNvPr id="3" name="Title 1"/>
+          <p:cNvSpPr txBox="1">
+            <a:spLocks/>
+          </p:cNvSpPr>
+          <p:nvPr/>
+        </p:nvSpPr>
+        <p:spPr>
+          <a:xfrm>
+            <a:off x="8153400" y="6096000"/>
+            <a:ext cx="990600" cy="762000"/>
+          </a:xfrm>
+          <a:prstGeom prst="rect">
+            <a:avLst/>
+          </a:prstGeom>
+        </p:spPr>
+        <p:txBody>
+          <a:bodyPr vert="horz" lIns="91440" tIns="45720" rIns="91440" bIns="45720" rtlCol="0" anchor="b">
+            <a:normAutofit/>
+          </a:bodyPr>
+          <a:lstStyle/>
+          <a:p>
+            <a:pPr marL="0" marR="0" lvl="0" indent="0" algn="r" defTabSz="457200" rtl="0" eaLnBrk="1" fontAlgn="auto" latinLnBrk="0" hangingPunct="1">
+              <a:lnSpc>
+                <a:spcPct val="100000"/>
+              </a:lnSpc>
+              <a:spcBef>
+                <a:spcPct val="0"/>
+              </a:spcBef>
+              <a:spcAft>
+                <a:spcPts val="0"/>
+              </a:spcAft>
+              <a:buClrTx/>
+              <a:buSzTx/>
+              <a:buFontTx/>
+              <a:buNone/>
+              <a:tabLst/>
+              <a:defRPr/>
+            </a:pPr>
+            <a:r>
+              <a:rPr kumimoji="0" lang="en-US" sz="4400" b="0" i="0" u="none" strike="noStrike" kern="1200" cap="none" spc="0" normalizeH="0" baseline="0" noProof="0" dirty="0" smtClean="0">
+                <a:ln>
+                  <a:noFill/>
+                </a:ln>
+                <a:solidFill>
+                  <a:schemeClr val="tx1">
+                    <a:lumMod val="50000"/>
+                    <a:lumOff val="50000"/>
+                  </a:schemeClr>
+                </a:solidFill>
+                <a:effectLst/>
+                <a:uLnTx/>
+                <a:uFillTx/>
+                <a:latin typeface="+mj-lt"/>
+                <a:ea typeface="+mj-ea"/>
+                <a:cs typeface="+mj-cs"/>
+              </a:rPr>
+              <a:t>DI</a:t>
+            </a:r>
+          </a:p>
+        </p:txBody>
+      </p:sp>
+    </p:spTree>
+  </p:cSld>
+  <p:clrMapOvr>
+    <a:masterClrMapping/>
+  </p:clrMapOvr>
+</p:sld>
+</file>
+
 <file path=ppt/slides/slide2.xml><?xml version="1.0" encoding="utf-8"?>
 <p:sld xmlns:a="http://schemas.openxmlformats.org/drawingml/2006/main" xmlns:r="http://schemas.openxmlformats.org/officeDocument/2006/relationships" xmlns:mc="http://schemas.openxmlformats.org/markup-compatibility/2006" xmlns:mv="urn:schemas-microsoft-com:mac:vml" xmlns:p="http://schemas.openxmlformats.org/presentationml/2006/main" mc:Ignorable="mv" mc:PreserveAttributes="mv:*">
   <p:cSld>
@@ -6112,6 +8321,914 @@
   <p:clrMapOvr>
     <a:masterClrMapping/>
   </p:clrMapOvr>
+</p:sld>
+</file>
+
+<file path=ppt/slides/slide20.xml><?xml version="1.0" encoding="utf-8"?>
+<p:sld xmlns:a="http://schemas.openxmlformats.org/drawingml/2006/main" xmlns:r="http://schemas.openxmlformats.org/officeDocument/2006/relationships" xmlns:mc="http://schemas.openxmlformats.org/markup-compatibility/2006" xmlns:mv="urn:schemas-microsoft-com:mac:vml" xmlns:p="http://schemas.openxmlformats.org/presentationml/2006/main" mc:Ignorable="mv" mc:PreserveAttributes="mv:*">
+  <p:cSld>
+    <p:spTree>
+      <p:nvGrpSpPr>
+        <p:cNvPr id="1" name=""/>
+        <p:cNvGrpSpPr/>
+        <p:nvPr/>
+      </p:nvGrpSpPr>
+      <p:grpSpPr>
+        <a:xfrm>
+          <a:off x="0" y="0"/>
+          <a:ext cx="0" cy="0"/>
+          <a:chOff x="0" y="0"/>
+          <a:chExt cx="0" cy="0"/>
+        </a:xfrm>
+      </p:grpSpPr>
+      <p:sp>
+        <p:nvSpPr>
+          <p:cNvPr id="2" name="Title 1"/>
+          <p:cNvSpPr>
+            <a:spLocks noGrp="1"/>
+          </p:cNvSpPr>
+          <p:nvPr>
+            <p:ph type="title"/>
+          </p:nvPr>
+        </p:nvSpPr>
+        <p:spPr>
+          <a:xfrm>
+            <a:off x="457200" y="2667000"/>
+            <a:ext cx="8229600" cy="1143000"/>
+          </a:xfrm>
+        </p:spPr>
+        <p:txBody>
+          <a:bodyPr>
+            <a:normAutofit fontScale="90000"/>
+          </a:bodyPr>
+          <a:lstStyle/>
+          <a:p>
+            <a:r>
+              <a:rPr lang="en-US" dirty="0" smtClean="0"/>
+              <a:t>XXX</a:t>
+            </a:r>
+            <a:br>
+              <a:rPr lang="en-US" dirty="0" smtClean="0"/>
+            </a:br>
+            <a:r>
+              <a:rPr lang="en-US" dirty="0" err="1" smtClean="0"/>
+              <a:t>MovieLister</a:t>
+            </a:r>
+            <a:r>
+              <a:rPr lang="en-US" dirty="0" smtClean="0"/>
+              <a:t> example property injection</a:t>
+            </a:r>
+            <a:br>
+              <a:rPr lang="en-US" dirty="0" smtClean="0"/>
+            </a:br>
+            <a:r>
+              <a:rPr lang="en-US" dirty="0" smtClean="0"/>
+              <a:t>XXX</a:t>
+            </a:r>
+            <a:endParaRPr lang="en-US" dirty="0"/>
+          </a:p>
+        </p:txBody>
+      </p:sp>
+      <p:sp>
+        <p:nvSpPr>
+          <p:cNvPr id="3" name="Title 1"/>
+          <p:cNvSpPr txBox="1">
+            <a:spLocks/>
+          </p:cNvSpPr>
+          <p:nvPr/>
+        </p:nvSpPr>
+        <p:spPr>
+          <a:xfrm>
+            <a:off x="8153400" y="6096000"/>
+            <a:ext cx="990600" cy="762000"/>
+          </a:xfrm>
+          <a:prstGeom prst="rect">
+            <a:avLst/>
+          </a:prstGeom>
+        </p:spPr>
+        <p:txBody>
+          <a:bodyPr vert="horz" lIns="91440" tIns="45720" rIns="91440" bIns="45720" rtlCol="0" anchor="b">
+            <a:normAutofit/>
+          </a:bodyPr>
+          <a:lstStyle/>
+          <a:p>
+            <a:pPr marL="0" marR="0" lvl="0" indent="0" algn="r" defTabSz="457200" rtl="0" eaLnBrk="1" fontAlgn="auto" latinLnBrk="0" hangingPunct="1">
+              <a:lnSpc>
+                <a:spcPct val="100000"/>
+              </a:lnSpc>
+              <a:spcBef>
+                <a:spcPct val="0"/>
+              </a:spcBef>
+              <a:spcAft>
+                <a:spcPts val="0"/>
+              </a:spcAft>
+              <a:buClrTx/>
+              <a:buSzTx/>
+              <a:buFontTx/>
+              <a:buNone/>
+              <a:tabLst/>
+              <a:defRPr/>
+            </a:pPr>
+            <a:r>
+              <a:rPr kumimoji="0" lang="en-US" sz="4400" b="0" i="0" u="none" strike="noStrike" kern="1200" cap="none" spc="0" normalizeH="0" baseline="0" noProof="0" dirty="0" smtClean="0">
+                <a:ln>
+                  <a:noFill/>
+                </a:ln>
+                <a:solidFill>
+                  <a:schemeClr val="tx1">
+                    <a:lumMod val="50000"/>
+                    <a:lumOff val="50000"/>
+                  </a:schemeClr>
+                </a:solidFill>
+                <a:effectLst/>
+                <a:uLnTx/>
+                <a:uFillTx/>
+                <a:latin typeface="+mj-lt"/>
+                <a:ea typeface="+mj-ea"/>
+                <a:cs typeface="+mj-cs"/>
+              </a:rPr>
+              <a:t>DI</a:t>
+            </a:r>
+          </a:p>
+        </p:txBody>
+      </p:sp>
+    </p:spTree>
+  </p:cSld>
+  <p:clrMapOvr>
+    <a:masterClrMapping/>
+  </p:clrMapOvr>
+</p:sld>
+</file>
+
+<file path=ppt/slides/slide21.xml><?xml version="1.0" encoding="utf-8"?>
+<p:sld xmlns:a="http://schemas.openxmlformats.org/drawingml/2006/main" xmlns:r="http://schemas.openxmlformats.org/officeDocument/2006/relationships" xmlns:mc="http://schemas.openxmlformats.org/markup-compatibility/2006" xmlns:mv="urn:schemas-microsoft-com:mac:vml" xmlns:p="http://schemas.openxmlformats.org/presentationml/2006/main" mc:Ignorable="mv" mc:PreserveAttributes="mv:*">
+  <p:cSld>
+    <p:spTree>
+      <p:nvGrpSpPr>
+        <p:cNvPr id="1" name=""/>
+        <p:cNvGrpSpPr/>
+        <p:nvPr/>
+      </p:nvGrpSpPr>
+      <p:grpSpPr>
+        <a:xfrm>
+          <a:off x="0" y="0"/>
+          <a:ext cx="0" cy="0"/>
+          <a:chOff x="0" y="0"/>
+          <a:chExt cx="0" cy="0"/>
+        </a:xfrm>
+      </p:grpSpPr>
+      <p:sp>
+        <p:nvSpPr>
+          <p:cNvPr id="2" name="Title 1"/>
+          <p:cNvSpPr>
+            <a:spLocks noGrp="1"/>
+          </p:cNvSpPr>
+          <p:nvPr>
+            <p:ph type="title"/>
+          </p:nvPr>
+        </p:nvSpPr>
+        <p:spPr>
+          <a:xfrm>
+            <a:off x="457200" y="2667000"/>
+            <a:ext cx="8229600" cy="1143000"/>
+          </a:xfrm>
+        </p:spPr>
+        <p:txBody>
+          <a:bodyPr>
+            <a:normAutofit fontScale="90000"/>
+          </a:bodyPr>
+          <a:lstStyle/>
+          <a:p>
+            <a:r>
+              <a:rPr lang="en-US" dirty="0" smtClean="0"/>
+              <a:t>XXX</a:t>
+            </a:r>
+            <a:br>
+              <a:rPr lang="en-US" dirty="0" smtClean="0"/>
+            </a:br>
+            <a:r>
+              <a:rPr lang="en-US" dirty="0" err="1" smtClean="0"/>
+              <a:t>MovieLister</a:t>
+            </a:r>
+            <a:r>
+              <a:rPr lang="en-US" dirty="0" smtClean="0"/>
+              <a:t> example Constructor Injection</a:t>
+            </a:r>
+            <a:br>
+              <a:rPr lang="en-US" dirty="0" smtClean="0"/>
+            </a:br>
+            <a:r>
+              <a:rPr lang="en-US" dirty="0" smtClean="0"/>
+              <a:t>XXX</a:t>
+            </a:r>
+            <a:endParaRPr lang="en-US" dirty="0"/>
+          </a:p>
+        </p:txBody>
+      </p:sp>
+      <p:sp>
+        <p:nvSpPr>
+          <p:cNvPr id="3" name="Title 1"/>
+          <p:cNvSpPr txBox="1">
+            <a:spLocks/>
+          </p:cNvSpPr>
+          <p:nvPr/>
+        </p:nvSpPr>
+        <p:spPr>
+          <a:xfrm>
+            <a:off x="8153400" y="6096000"/>
+            <a:ext cx="990600" cy="762000"/>
+          </a:xfrm>
+          <a:prstGeom prst="rect">
+            <a:avLst/>
+          </a:prstGeom>
+        </p:spPr>
+        <p:txBody>
+          <a:bodyPr vert="horz" lIns="91440" tIns="45720" rIns="91440" bIns="45720" rtlCol="0" anchor="b">
+            <a:normAutofit/>
+          </a:bodyPr>
+          <a:lstStyle/>
+          <a:p>
+            <a:pPr marL="0" marR="0" lvl="0" indent="0" algn="r" defTabSz="457200" rtl="0" eaLnBrk="1" fontAlgn="auto" latinLnBrk="0" hangingPunct="1">
+              <a:lnSpc>
+                <a:spcPct val="100000"/>
+              </a:lnSpc>
+              <a:spcBef>
+                <a:spcPct val="0"/>
+              </a:spcBef>
+              <a:spcAft>
+                <a:spcPts val="0"/>
+              </a:spcAft>
+              <a:buClrTx/>
+              <a:buSzTx/>
+              <a:buFontTx/>
+              <a:buNone/>
+              <a:tabLst/>
+              <a:defRPr/>
+            </a:pPr>
+            <a:r>
+              <a:rPr kumimoji="0" lang="en-US" sz="4400" b="0" i="0" u="none" strike="noStrike" kern="1200" cap="none" spc="0" normalizeH="0" baseline="0" noProof="0" dirty="0" smtClean="0">
+                <a:ln>
+                  <a:noFill/>
+                </a:ln>
+                <a:solidFill>
+                  <a:schemeClr val="tx1">
+                    <a:lumMod val="50000"/>
+                    <a:lumOff val="50000"/>
+                  </a:schemeClr>
+                </a:solidFill>
+                <a:effectLst/>
+                <a:uLnTx/>
+                <a:uFillTx/>
+                <a:latin typeface="+mj-lt"/>
+                <a:ea typeface="+mj-ea"/>
+                <a:cs typeface="+mj-cs"/>
+              </a:rPr>
+              <a:t>DI</a:t>
+            </a:r>
+          </a:p>
+        </p:txBody>
+      </p:sp>
+    </p:spTree>
+  </p:cSld>
+  <p:clrMapOvr>
+    <a:masterClrMapping/>
+  </p:clrMapOvr>
+</p:sld>
+</file>
+
+<file path=ppt/slides/slide22.xml><?xml version="1.0" encoding="utf-8"?>
+<p:sld xmlns:a="http://schemas.openxmlformats.org/drawingml/2006/main" xmlns:r="http://schemas.openxmlformats.org/officeDocument/2006/relationships" xmlns:mc="http://schemas.openxmlformats.org/markup-compatibility/2006" xmlns:mv="urn:schemas-microsoft-com:mac:vml" xmlns:p="http://schemas.openxmlformats.org/presentationml/2006/main" mc:Ignorable="mv" mc:PreserveAttributes="mv:*">
+  <p:cSld>
+    <p:spTree>
+      <p:nvGrpSpPr>
+        <p:cNvPr id="1" name=""/>
+        <p:cNvGrpSpPr/>
+        <p:nvPr/>
+      </p:nvGrpSpPr>
+      <p:grpSpPr>
+        <a:xfrm>
+          <a:off x="0" y="0"/>
+          <a:ext cx="0" cy="0"/>
+          <a:chOff x="0" y="0"/>
+          <a:chExt cx="0" cy="0"/>
+        </a:xfrm>
+      </p:grpSpPr>
+      <p:sp>
+        <p:nvSpPr>
+          <p:cNvPr id="2" name="Title 1"/>
+          <p:cNvSpPr>
+            <a:spLocks noGrp="1"/>
+          </p:cNvSpPr>
+          <p:nvPr>
+            <p:ph type="title"/>
+          </p:nvPr>
+        </p:nvSpPr>
+        <p:spPr>
+          <a:xfrm>
+            <a:off x="457200" y="2667000"/>
+            <a:ext cx="8229600" cy="1143000"/>
+          </a:xfrm>
+        </p:spPr>
+        <p:txBody>
+          <a:bodyPr/>
+          <a:lstStyle/>
+          <a:p>
+            <a:r>
+              <a:rPr lang="en-US" dirty="0" smtClean="0"/>
+              <a:t>poor man’s DI</a:t>
+            </a:r>
+            <a:endParaRPr lang="en-US" dirty="0"/>
+          </a:p>
+        </p:txBody>
+      </p:sp>
+      <p:sp>
+        <p:nvSpPr>
+          <p:cNvPr id="4" name="Title 1"/>
+          <p:cNvSpPr txBox="1">
+            <a:spLocks/>
+          </p:cNvSpPr>
+          <p:nvPr/>
+        </p:nvSpPr>
+        <p:spPr>
+          <a:xfrm>
+            <a:off x="8153400" y="6096000"/>
+            <a:ext cx="990600" cy="762000"/>
+          </a:xfrm>
+          <a:prstGeom prst="rect">
+            <a:avLst/>
+          </a:prstGeom>
+        </p:spPr>
+        <p:txBody>
+          <a:bodyPr vert="horz" lIns="91440" tIns="45720" rIns="91440" bIns="45720" rtlCol="0" anchor="b">
+            <a:normAutofit/>
+          </a:bodyPr>
+          <a:lstStyle/>
+          <a:p>
+            <a:pPr marL="0" marR="0" lvl="0" indent="0" algn="r" defTabSz="457200" rtl="0" eaLnBrk="1" fontAlgn="auto" latinLnBrk="0" hangingPunct="1">
+              <a:lnSpc>
+                <a:spcPct val="100000"/>
+              </a:lnSpc>
+              <a:spcBef>
+                <a:spcPct val="0"/>
+              </a:spcBef>
+              <a:spcAft>
+                <a:spcPts val="0"/>
+              </a:spcAft>
+              <a:buClrTx/>
+              <a:buSzTx/>
+              <a:buFontTx/>
+              <a:buNone/>
+              <a:tabLst/>
+              <a:defRPr/>
+            </a:pPr>
+            <a:r>
+              <a:rPr kumimoji="0" lang="en-US" sz="4400" b="0" i="0" u="none" strike="noStrike" kern="1200" cap="none" spc="0" normalizeH="0" baseline="0" noProof="0" dirty="0" smtClean="0">
+                <a:ln>
+                  <a:noFill/>
+                </a:ln>
+                <a:solidFill>
+                  <a:schemeClr val="tx1">
+                    <a:lumMod val="50000"/>
+                    <a:lumOff val="50000"/>
+                  </a:schemeClr>
+                </a:solidFill>
+                <a:effectLst/>
+                <a:uLnTx/>
+                <a:uFillTx/>
+                <a:latin typeface="+mj-lt"/>
+                <a:ea typeface="+mj-ea"/>
+                <a:cs typeface="+mj-cs"/>
+              </a:rPr>
+              <a:t>DI</a:t>
+            </a:r>
+          </a:p>
+        </p:txBody>
+      </p:sp>
+    </p:spTree>
+  </p:cSld>
+  <p:clrMapOvr>
+    <a:masterClrMapping/>
+  </p:clrMapOvr>
+</p:sld>
+</file>
+
+<file path=ppt/slides/slide23.xml><?xml version="1.0" encoding="utf-8"?>
+<p:sld xmlns:a="http://schemas.openxmlformats.org/drawingml/2006/main" xmlns:r="http://schemas.openxmlformats.org/officeDocument/2006/relationships" xmlns:mc="http://schemas.openxmlformats.org/markup-compatibility/2006" xmlns:mv="urn:schemas-microsoft-com:mac:vml" xmlns:p="http://schemas.openxmlformats.org/presentationml/2006/main" mc:Ignorable="mv" mc:PreserveAttributes="mv:*">
+  <p:cSld>
+    <p:spTree>
+      <p:nvGrpSpPr>
+        <p:cNvPr id="1" name=""/>
+        <p:cNvGrpSpPr/>
+        <p:nvPr/>
+      </p:nvGrpSpPr>
+      <p:grpSpPr>
+        <a:xfrm>
+          <a:off x="0" y="0"/>
+          <a:ext cx="0" cy="0"/>
+          <a:chOff x="0" y="0"/>
+          <a:chExt cx="0" cy="0"/>
+        </a:xfrm>
+      </p:grpSpPr>
+      <p:sp>
+        <p:nvSpPr>
+          <p:cNvPr id="2" name="Title 1"/>
+          <p:cNvSpPr>
+            <a:spLocks noGrp="1"/>
+          </p:cNvSpPr>
+          <p:nvPr>
+            <p:ph type="title"/>
+          </p:nvPr>
+        </p:nvSpPr>
+        <p:spPr>
+          <a:xfrm>
+            <a:off x="457200" y="2667000"/>
+            <a:ext cx="8229600" cy="1143000"/>
+          </a:xfrm>
+        </p:spPr>
+        <p:txBody>
+          <a:bodyPr>
+            <a:normAutofit fontScale="90000"/>
+          </a:bodyPr>
+          <a:lstStyle/>
+          <a:p>
+            <a:r>
+              <a:rPr lang="en-US" dirty="0" smtClean="0"/>
+              <a:t>XXX</a:t>
+            </a:r>
+            <a:br>
+              <a:rPr lang="en-US" dirty="0" smtClean="0"/>
+            </a:br>
+            <a:r>
+              <a:rPr lang="en-US" dirty="0" err="1" smtClean="0"/>
+              <a:t>MovieLister</a:t>
+            </a:r>
+            <a:r>
+              <a:rPr lang="en-US" dirty="0" smtClean="0"/>
+              <a:t> PMDI</a:t>
+            </a:r>
+            <a:br>
+              <a:rPr lang="en-US" dirty="0" smtClean="0"/>
+            </a:br>
+            <a:r>
+              <a:rPr lang="en-US" dirty="0" smtClean="0"/>
+              <a:t>XXX</a:t>
+            </a:r>
+            <a:endParaRPr lang="en-US" dirty="0"/>
+          </a:p>
+        </p:txBody>
+      </p:sp>
+      <p:sp>
+        <p:nvSpPr>
+          <p:cNvPr id="3" name="Title 1"/>
+          <p:cNvSpPr txBox="1">
+            <a:spLocks/>
+          </p:cNvSpPr>
+          <p:nvPr/>
+        </p:nvSpPr>
+        <p:spPr>
+          <a:xfrm>
+            <a:off x="8153400" y="6096000"/>
+            <a:ext cx="990600" cy="762000"/>
+          </a:xfrm>
+          <a:prstGeom prst="rect">
+            <a:avLst/>
+          </a:prstGeom>
+        </p:spPr>
+        <p:txBody>
+          <a:bodyPr vert="horz" lIns="91440" tIns="45720" rIns="91440" bIns="45720" rtlCol="0" anchor="b">
+            <a:normAutofit/>
+          </a:bodyPr>
+          <a:lstStyle/>
+          <a:p>
+            <a:pPr marL="0" marR="0" lvl="0" indent="0" algn="r" defTabSz="457200" rtl="0" eaLnBrk="1" fontAlgn="auto" latinLnBrk="0" hangingPunct="1">
+              <a:lnSpc>
+                <a:spcPct val="100000"/>
+              </a:lnSpc>
+              <a:spcBef>
+                <a:spcPct val="0"/>
+              </a:spcBef>
+              <a:spcAft>
+                <a:spcPts val="0"/>
+              </a:spcAft>
+              <a:buClrTx/>
+              <a:buSzTx/>
+              <a:buFontTx/>
+              <a:buNone/>
+              <a:tabLst/>
+              <a:defRPr/>
+            </a:pPr>
+            <a:r>
+              <a:rPr kumimoji="0" lang="en-US" sz="4400" b="0" i="0" u="none" strike="noStrike" kern="1200" cap="none" spc="0" normalizeH="0" baseline="0" noProof="0" dirty="0" smtClean="0">
+                <a:ln>
+                  <a:noFill/>
+                </a:ln>
+                <a:solidFill>
+                  <a:schemeClr val="tx1">
+                    <a:lumMod val="50000"/>
+                    <a:lumOff val="50000"/>
+                  </a:schemeClr>
+                </a:solidFill>
+                <a:effectLst/>
+                <a:uLnTx/>
+                <a:uFillTx/>
+                <a:latin typeface="+mj-lt"/>
+                <a:ea typeface="+mj-ea"/>
+                <a:cs typeface="+mj-cs"/>
+              </a:rPr>
+              <a:t>DI</a:t>
+            </a:r>
+          </a:p>
+        </p:txBody>
+      </p:sp>
+    </p:spTree>
+  </p:cSld>
+  <p:clrMapOvr>
+    <a:masterClrMapping/>
+  </p:clrMapOvr>
+</p:sld>
+</file>
+
+<file path=ppt/slides/slide24.xml><?xml version="1.0" encoding="utf-8"?>
+<p:sld xmlns:a="http://schemas.openxmlformats.org/drawingml/2006/main" xmlns:r="http://schemas.openxmlformats.org/officeDocument/2006/relationships" xmlns:mc="http://schemas.openxmlformats.org/markup-compatibility/2006" xmlns:mv="urn:schemas-microsoft-com:mac:vml" xmlns:p="http://schemas.openxmlformats.org/presentationml/2006/main" mc:Ignorable="mv" mc:PreserveAttributes="mv:*">
+  <p:cSld>
+    <p:spTree>
+      <p:nvGrpSpPr>
+        <p:cNvPr id="1" name=""/>
+        <p:cNvGrpSpPr/>
+        <p:nvPr/>
+      </p:nvGrpSpPr>
+      <p:grpSpPr>
+        <a:xfrm>
+          <a:off x="0" y="0"/>
+          <a:ext cx="0" cy="0"/>
+          <a:chOff x="0" y="0"/>
+          <a:chExt cx="0" cy="0"/>
+        </a:xfrm>
+      </p:grpSpPr>
+      <p:sp>
+        <p:nvSpPr>
+          <p:cNvPr id="2" name="Title 1"/>
+          <p:cNvSpPr>
+            <a:spLocks noGrp="1"/>
+          </p:cNvSpPr>
+          <p:nvPr>
+            <p:ph type="title"/>
+          </p:nvPr>
+        </p:nvSpPr>
+        <p:spPr>
+          <a:xfrm>
+            <a:off x="457200" y="2667000"/>
+            <a:ext cx="8229600" cy="1143000"/>
+          </a:xfrm>
+        </p:spPr>
+        <p:txBody>
+          <a:bodyPr/>
+          <a:lstStyle/>
+          <a:p>
+            <a:r>
+              <a:rPr lang="en-US" dirty="0" smtClean="0"/>
+              <a:t>simplicity</a:t>
+            </a:r>
+            <a:endParaRPr lang="en-US" dirty="0"/>
+          </a:p>
+        </p:txBody>
+      </p:sp>
+      <p:sp>
+        <p:nvSpPr>
+          <p:cNvPr id="3" name="Title 1"/>
+          <p:cNvSpPr txBox="1">
+            <a:spLocks/>
+          </p:cNvSpPr>
+          <p:nvPr/>
+        </p:nvSpPr>
+        <p:spPr>
+          <a:xfrm>
+            <a:off x="7391400" y="6096000"/>
+            <a:ext cx="1752600" cy="762000"/>
+          </a:xfrm>
+          <a:prstGeom prst="rect">
+            <a:avLst/>
+          </a:prstGeom>
+        </p:spPr>
+        <p:txBody>
+          <a:bodyPr vert="horz" lIns="91440" tIns="45720" rIns="91440" bIns="45720" rtlCol="0" anchor="b">
+            <a:normAutofit/>
+          </a:bodyPr>
+          <a:lstStyle/>
+          <a:p>
+            <a:pPr marL="0" marR="0" lvl="0" indent="0" algn="r" defTabSz="457200" rtl="0" eaLnBrk="1" fontAlgn="auto" latinLnBrk="0" hangingPunct="1">
+              <a:lnSpc>
+                <a:spcPct val="100000"/>
+              </a:lnSpc>
+              <a:spcBef>
+                <a:spcPct val="0"/>
+              </a:spcBef>
+              <a:spcAft>
+                <a:spcPts val="0"/>
+              </a:spcAft>
+              <a:buClrTx/>
+              <a:buSzTx/>
+              <a:buFontTx/>
+              <a:buNone/>
+              <a:tabLst/>
+              <a:defRPr/>
+            </a:pPr>
+            <a:r>
+              <a:rPr kumimoji="0" lang="en-US" sz="4400" b="0" i="0" u="none" strike="noStrike" kern="1200" cap="none" spc="0" normalizeH="0" baseline="0" noProof="0" dirty="0" smtClean="0">
+                <a:ln>
+                  <a:noFill/>
+                </a:ln>
+                <a:solidFill>
+                  <a:schemeClr val="tx1">
+                    <a:lumMod val="50000"/>
+                    <a:lumOff val="50000"/>
+                  </a:schemeClr>
+                </a:solidFill>
+                <a:effectLst/>
+                <a:uLnTx/>
+                <a:uFillTx/>
+                <a:latin typeface="+mj-lt"/>
+                <a:ea typeface="+mj-ea"/>
+                <a:cs typeface="+mj-cs"/>
+              </a:rPr>
+              <a:t>WTF?</a:t>
+            </a:r>
+          </a:p>
+        </p:txBody>
+      </p:sp>
+    </p:spTree>
+  </p:cSld>
+  <p:clrMapOvr>
+    <a:masterClrMapping/>
+  </p:clrMapOvr>
+</p:sld>
+</file>
+
+<file path=ppt/slides/slide25.xml><?xml version="1.0" encoding="utf-8"?>
+<p:sld xmlns:a="http://schemas.openxmlformats.org/drawingml/2006/main" xmlns:r="http://schemas.openxmlformats.org/officeDocument/2006/relationships" xmlns:mc="http://schemas.openxmlformats.org/markup-compatibility/2006" xmlns:mv="urn:schemas-microsoft-com:mac:vml" xmlns:p="http://schemas.openxmlformats.org/presentationml/2006/main" mc:Ignorable="mv" mc:PreserveAttributes="mv:*">
+  <p:cSld>
+    <p:spTree>
+      <p:nvGrpSpPr>
+        <p:cNvPr id="1" name=""/>
+        <p:cNvGrpSpPr/>
+        <p:nvPr/>
+      </p:nvGrpSpPr>
+      <p:grpSpPr>
+        <a:xfrm>
+          <a:off x="0" y="0"/>
+          <a:ext cx="0" cy="0"/>
+          <a:chOff x="0" y="0"/>
+          <a:chExt cx="0" cy="0"/>
+        </a:xfrm>
+      </p:grpSpPr>
+      <p:sp>
+        <p:nvSpPr>
+          <p:cNvPr id="2" name="Title 1"/>
+          <p:cNvSpPr>
+            <a:spLocks noGrp="1"/>
+          </p:cNvSpPr>
+          <p:nvPr>
+            <p:ph type="title"/>
+          </p:nvPr>
+        </p:nvSpPr>
+        <p:spPr>
+          <a:xfrm>
+            <a:off x="457200" y="2667000"/>
+            <a:ext cx="8229600" cy="1143000"/>
+          </a:xfrm>
+        </p:spPr>
+        <p:txBody>
+          <a:bodyPr/>
+          <a:lstStyle/>
+          <a:p>
+            <a:r>
+              <a:rPr lang="en-US" dirty="0" smtClean="0"/>
+              <a:t>inversion of control</a:t>
+            </a:r>
+            <a:endParaRPr lang="en-US" dirty="0"/>
+          </a:p>
+        </p:txBody>
+      </p:sp>
+    </p:spTree>
+  </p:cSld>
+  <p:clrMapOvr>
+    <a:masterClrMapping/>
+  </p:clrMapOvr>
+</p:sld>
+</file>
+
+<file path=ppt/slides/slide26.xml><?xml version="1.0" encoding="utf-8"?>
+<p:sld xmlns:a="http://schemas.openxmlformats.org/drawingml/2006/main" xmlns:r="http://schemas.openxmlformats.org/officeDocument/2006/relationships" xmlns:mc="http://schemas.openxmlformats.org/markup-compatibility/2006" xmlns:mv="urn:schemas-microsoft-com:mac:vml" xmlns:p="http://schemas.openxmlformats.org/presentationml/2006/main" mc:Ignorable="mv" mc:PreserveAttributes="mv:*">
+  <p:cSld>
+    <p:spTree>
+      <p:nvGrpSpPr>
+        <p:cNvPr id="1" name=""/>
+        <p:cNvGrpSpPr/>
+        <p:nvPr/>
+      </p:nvGrpSpPr>
+      <p:grpSpPr>
+        <a:xfrm>
+          <a:off x="0" y="0"/>
+          <a:ext cx="0" cy="0"/>
+          <a:chOff x="0" y="0"/>
+          <a:chExt cx="0" cy="0"/>
+        </a:xfrm>
+      </p:grpSpPr>
+      <p:sp>
+        <p:nvSpPr>
+          <p:cNvPr id="2" name="Title 1"/>
+          <p:cNvSpPr>
+            <a:spLocks noGrp="1"/>
+          </p:cNvSpPr>
+          <p:nvPr>
+            <p:ph type="title"/>
+          </p:nvPr>
+        </p:nvSpPr>
+        <p:spPr>
+          <a:xfrm>
+            <a:off x="457200" y="2667000"/>
+            <a:ext cx="8229600" cy="1143000"/>
+          </a:xfrm>
+        </p:spPr>
+        <p:txBody>
+          <a:bodyPr/>
+          <a:lstStyle/>
+          <a:p>
+            <a:r>
+              <a:rPr lang="en-US" dirty="0" smtClean="0"/>
+              <a:t>declarative</a:t>
+            </a:r>
+            <a:endParaRPr lang="en-US" dirty="0"/>
+          </a:p>
+        </p:txBody>
+      </p:sp>
+    </p:spTree>
+  </p:cSld>
+  <p:clrMapOvr>
+    <a:masterClrMapping/>
+  </p:clrMapOvr>
+</p:sld>
+</file>
+
+<file path=ppt/slides/slide27.xml><?xml version="1.0" encoding="utf-8"?>
+<p:sld xmlns:a="http://schemas.openxmlformats.org/drawingml/2006/main" xmlns:r="http://schemas.openxmlformats.org/officeDocument/2006/relationships" xmlns:mc="http://schemas.openxmlformats.org/markup-compatibility/2006" xmlns:mv="urn:schemas-microsoft-com:mac:vml" xmlns:p="http://schemas.openxmlformats.org/presentationml/2006/main" mc:Ignorable="mv" mc:PreserveAttributes="mv:*">
+  <p:cSld>
+    <p:spTree>
+      <p:nvGrpSpPr>
+        <p:cNvPr id="1" name=""/>
+        <p:cNvGrpSpPr/>
+        <p:nvPr/>
+      </p:nvGrpSpPr>
+      <p:grpSpPr>
+        <a:xfrm>
+          <a:off x="0" y="0"/>
+          <a:ext cx="0" cy="0"/>
+          <a:chOff x="0" y="0"/>
+          <a:chExt cx="0" cy="0"/>
+        </a:xfrm>
+      </p:grpSpPr>
+      <p:sp>
+        <p:nvSpPr>
+          <p:cNvPr id="2" name="Title 1"/>
+          <p:cNvSpPr>
+            <a:spLocks noGrp="1"/>
+          </p:cNvSpPr>
+          <p:nvPr>
+            <p:ph type="title"/>
+          </p:nvPr>
+        </p:nvSpPr>
+        <p:spPr>
+          <a:xfrm>
+            <a:off x="457200" y="2667000"/>
+            <a:ext cx="8229600" cy="1143000"/>
+          </a:xfrm>
+        </p:spPr>
+        <p:txBody>
+          <a:bodyPr/>
+          <a:lstStyle/>
+          <a:p>
+            <a:r>
+              <a:rPr lang="en-US" dirty="0" smtClean="0"/>
+              <a:t>container</a:t>
+            </a:r>
+            <a:endParaRPr lang="en-US" dirty="0"/>
+          </a:p>
+        </p:txBody>
+      </p:sp>
+    </p:spTree>
+  </p:cSld>
+  <p:clrMapOvr>
+    <a:masterClrMapping/>
+  </p:clrMapOvr>
+</p:sld>
+</file>
+
+<file path=ppt/slides/slide28.xml><?xml version="1.0" encoding="utf-8"?>
+<p:sld xmlns:a="http://schemas.openxmlformats.org/drawingml/2006/main" xmlns:r="http://schemas.openxmlformats.org/officeDocument/2006/relationships" xmlns:mc="http://schemas.openxmlformats.org/markup-compatibility/2006" xmlns:mv="urn:schemas-microsoft-com:mac:vml" xmlns:p="http://schemas.openxmlformats.org/presentationml/2006/main" mc:Ignorable="mv" mc:PreserveAttributes="mv:*">
+  <p:cSld>
+    <p:spTree>
+      <p:nvGrpSpPr>
+        <p:cNvPr id="1" name=""/>
+        <p:cNvGrpSpPr/>
+        <p:nvPr/>
+      </p:nvGrpSpPr>
+      <p:grpSpPr>
+        <a:xfrm>
+          <a:off x="0" y="0"/>
+          <a:ext cx="0" cy="0"/>
+          <a:chOff x="0" y="0"/>
+          <a:chExt cx="0" cy="0"/>
+        </a:xfrm>
+      </p:grpSpPr>
+      <p:sp>
+        <p:nvSpPr>
+          <p:cNvPr id="2" name="Title 1"/>
+          <p:cNvSpPr>
+            <a:spLocks noGrp="1"/>
+          </p:cNvSpPr>
+          <p:nvPr>
+            <p:ph type="title"/>
+          </p:nvPr>
+        </p:nvSpPr>
+        <p:spPr>
+          <a:xfrm>
+            <a:off x="457200" y="2667000"/>
+            <a:ext cx="8229600" cy="1143000"/>
+          </a:xfrm>
+        </p:spPr>
+        <p:txBody>
+          <a:bodyPr/>
+          <a:lstStyle/>
+          <a:p>
+            <a:r>
+              <a:rPr lang="en-US" dirty="0" smtClean="0"/>
+              <a:t>simplicity</a:t>
+            </a:r>
+            <a:endParaRPr lang="en-US" dirty="0"/>
+          </a:p>
+        </p:txBody>
+      </p:sp>
+    </p:spTree>
+  </p:cSld>
+  <p:clrMapOvr>
+    <a:masterClrMapping/>
+  </p:clrMapOvr>
+</p:sld>
+</file>
+
+<file path=ppt/slides/slide29.xml><?xml version="1.0" encoding="utf-8"?>
+<p:sld xmlns:a="http://schemas.openxmlformats.org/drawingml/2006/main" xmlns:r="http://schemas.openxmlformats.org/officeDocument/2006/relationships" xmlns:mc="http://schemas.openxmlformats.org/markup-compatibility/2006" xmlns:mv="urn:schemas-microsoft-com:mac:vml" xmlns:p="http://schemas.openxmlformats.org/presentationml/2006/main" mc:Ignorable="mv" mc:PreserveAttributes="mv:*">
+  <p:cSld>
+    <p:spTree>
+      <p:nvGrpSpPr>
+        <p:cNvPr id="1" name=""/>
+        <p:cNvGrpSpPr/>
+        <p:nvPr/>
+      </p:nvGrpSpPr>
+      <p:grpSpPr>
+        <a:xfrm>
+          <a:off x="0" y="0"/>
+          <a:ext cx="0" cy="0"/>
+          <a:chOff x="0" y="0"/>
+          <a:chExt cx="0" cy="0"/>
+        </a:xfrm>
+      </p:grpSpPr>
+      <p:pic>
+        <p:nvPicPr>
+          <p:cNvPr id="4" name="whatever.cs.png" descr="/Users/fullerjc/Documents/presentations/dependencies/whatever.cs.png"/>
+          <p:cNvPicPr>
+            <a:picLocks noChangeAspect="1"/>
+          </p:cNvPicPr>
+          <p:nvPr/>
+        </p:nvPicPr>
+        <p:blipFill>
+          <a:blip r:embed="rId2" r:link="rId3"/>
+          <a:stretch>
+            <a:fillRect/>
+          </a:stretch>
+        </p:blipFill>
+        <p:spPr>
+          <a:xfrm>
+            <a:off x="2905615" y="2473877"/>
+            <a:ext cx="3332769" cy="1910246"/>
+          </a:xfrm>
+          <a:prstGeom prst="rect">
+            <a:avLst/>
+          </a:prstGeom>
+        </p:spPr>
+      </p:pic>
+    </p:spTree>
+  </p:cSld>
+  <p:clrMapOvr>
+    <a:masterClrMapping/>
+  </p:clrMapOvr>
+  <p:timing>
+    <p:tnLst>
+      <p:par>
+        <p:cTn id="1" dur="indefinite" restart="never" nodeType="tmRoot"/>
+      </p:par>
+    </p:tnLst>
+  </p:timing>
 </p:sld>
 </file>
 

</xml_diff>

<commit_message>
added slides up through conventions
</commit_message>
<xml_diff>
--- a/dependencies/dependencies.pptx
+++ b/dependencies/dependencies.pptx
@@ -5,7 +5,7 @@
     <p:sldMasterId id="2147483648" r:id="rId1"/>
   </p:sldMasterIdLst>
   <p:notesMasterIdLst>
-    <p:notesMasterId r:id="rId31"/>
+    <p:notesMasterId r:id="rId35"/>
   </p:notesMasterIdLst>
   <p:sldIdLst>
     <p:sldId id="256" r:id="rId2"/>
@@ -36,7 +36,11 @@
     <p:sldId id="282" r:id="rId27"/>
     <p:sldId id="283" r:id="rId28"/>
     <p:sldId id="284" r:id="rId29"/>
-    <p:sldId id="270" r:id="rId30"/>
+    <p:sldId id="285" r:id="rId30"/>
+    <p:sldId id="286" r:id="rId31"/>
+    <p:sldId id="287" r:id="rId32"/>
+    <p:sldId id="288" r:id="rId33"/>
+    <p:sldId id="290" r:id="rId34"/>
   </p:sldIdLst>
   <p:sldSz cx="9144000" cy="6858000" type="screen4x3"/>
   <p:notesSz cx="6858000" cy="9144000"/>
@@ -1866,6 +1870,20 @@
           </a:bodyPr>
           <a:lstStyle/>
           <a:p>
+            <a:r>
+              <a:rPr lang="en-US" dirty="0" smtClean="0"/>
+              <a:t>The container is simply</a:t>
+            </a:r>
+            <a:r>
+              <a:rPr lang="en-US" baseline="0" dirty="0" smtClean="0"/>
+              <a:t> that.  In its most basic form it’s basically a mapping between interfaces and concrete implementations.</a:t>
+            </a:r>
+          </a:p>
+          <a:p>
+            <a:r>
+              <a:rPr lang="en-US" baseline="0" dirty="0" smtClean="0"/>
+              <a:t>We’ll see soon though, that it’s much more than that.</a:t>
+            </a:r>
             <a:endParaRPr lang="en-US" dirty="0"/>
           </a:p>
         </p:txBody>
@@ -1889,6 +1907,553 @@
               <a:rPr lang="en-US" smtClean="0"/>
               <a:pPr/>
               <a:t>27</a:t>
+            </a:fld>
+            <a:endParaRPr lang="en-US"/>
+          </a:p>
+        </p:txBody>
+      </p:sp>
+    </p:spTree>
+  </p:cSld>
+  <p:clrMapOvr>
+    <a:masterClrMapping/>
+  </p:clrMapOvr>
+</p:notes>
+</file>
+
+<file path=ppt/notesSlides/notesSlide21.xml><?xml version="1.0" encoding="utf-8"?>
+<p:notes xmlns:a="http://schemas.openxmlformats.org/drawingml/2006/main" xmlns:r="http://schemas.openxmlformats.org/officeDocument/2006/relationships" xmlns:mc="http://schemas.openxmlformats.org/markup-compatibility/2006" xmlns:mv="urn:schemas-microsoft-com:mac:vml" xmlns:p="http://schemas.openxmlformats.org/presentationml/2006/main" mc:Ignorable="mv" mc:PreserveAttributes="mv:*">
+  <p:cSld>
+    <p:spTree>
+      <p:nvGrpSpPr>
+        <p:cNvPr id="1" name=""/>
+        <p:cNvGrpSpPr/>
+        <p:nvPr/>
+      </p:nvGrpSpPr>
+      <p:grpSpPr>
+        <a:xfrm>
+          <a:off x="0" y="0"/>
+          <a:ext cx="0" cy="0"/>
+          <a:chOff x="0" y="0"/>
+          <a:chExt cx="0" cy="0"/>
+        </a:xfrm>
+      </p:grpSpPr>
+      <p:sp>
+        <p:nvSpPr>
+          <p:cNvPr id="2" name="Slide Image Placeholder 1"/>
+          <p:cNvSpPr>
+            <a:spLocks noGrp="1" noRot="1" noChangeAspect="1"/>
+          </p:cNvSpPr>
+          <p:nvPr>
+            <p:ph type="sldImg"/>
+          </p:nvPr>
+        </p:nvSpPr>
+        <p:spPr/>
+      </p:sp>
+      <p:sp>
+        <p:nvSpPr>
+          <p:cNvPr id="3" name="Notes Placeholder 2"/>
+          <p:cNvSpPr>
+            <a:spLocks noGrp="1"/>
+          </p:cNvSpPr>
+          <p:nvPr>
+            <p:ph type="body" idx="1"/>
+          </p:nvPr>
+        </p:nvSpPr>
+        <p:spPr/>
+        <p:txBody>
+          <a:bodyPr>
+            <a:normAutofit/>
+          </a:bodyPr>
+          <a:lstStyle/>
+          <a:p>
+            <a:r>
+              <a:rPr lang="en-US" dirty="0" smtClean="0"/>
+              <a:t>what if I told you that you didn’t have to worry about your dependencies much at all?  simply declare your dependencies in your constructors, and you get them for free,</a:t>
+            </a:r>
+            <a:r>
+              <a:rPr lang="en-US" baseline="0" dirty="0" smtClean="0"/>
+              <a:t> whenever you need them.  Sound like magic?  not really.</a:t>
+            </a:r>
+          </a:p>
+          <a:p>
+            <a:r>
+              <a:rPr lang="en-US" baseline="0" dirty="0" smtClean="0"/>
+              <a:t>There is some well defined Reflection Kung-Fu going on, but nothing you or I couldn’t do given time.  However, I don’t want to spend my time or my employer’s time working on this infrastructure stuff.  So we’ll just use an existing container.</a:t>
+            </a:r>
+            <a:endParaRPr lang="en-US" dirty="0"/>
+          </a:p>
+        </p:txBody>
+      </p:sp>
+      <p:sp>
+        <p:nvSpPr>
+          <p:cNvPr id="4" name="Slide Number Placeholder 3"/>
+          <p:cNvSpPr>
+            <a:spLocks noGrp="1"/>
+          </p:cNvSpPr>
+          <p:nvPr>
+            <p:ph type="sldNum" sz="quarter" idx="10"/>
+          </p:nvPr>
+        </p:nvSpPr>
+        <p:spPr/>
+        <p:txBody>
+          <a:bodyPr/>
+          <a:lstStyle/>
+          <a:p>
+            <a:fld id="{F5395209-E063-144C-8968-CAA31F3D1B83}" type="slidenum">
+              <a:rPr lang="en-US" smtClean="0"/>
+              <a:pPr/>
+              <a:t>28</a:t>
+            </a:fld>
+            <a:endParaRPr lang="en-US"/>
+          </a:p>
+        </p:txBody>
+      </p:sp>
+    </p:spTree>
+  </p:cSld>
+  <p:clrMapOvr>
+    <a:masterClrMapping/>
+  </p:clrMapOvr>
+</p:notes>
+</file>
+
+<file path=ppt/notesSlides/notesSlide22.xml><?xml version="1.0" encoding="utf-8"?>
+<p:notes xmlns:a="http://schemas.openxmlformats.org/drawingml/2006/main" xmlns:r="http://schemas.openxmlformats.org/officeDocument/2006/relationships" xmlns:mc="http://schemas.openxmlformats.org/markup-compatibility/2006" xmlns:mv="urn:schemas-microsoft-com:mac:vml" xmlns:p="http://schemas.openxmlformats.org/presentationml/2006/main" mc:Ignorable="mv" mc:PreserveAttributes="mv:*">
+  <p:cSld>
+    <p:spTree>
+      <p:nvGrpSpPr>
+        <p:cNvPr id="1" name=""/>
+        <p:cNvGrpSpPr/>
+        <p:nvPr/>
+      </p:nvGrpSpPr>
+      <p:grpSpPr>
+        <a:xfrm>
+          <a:off x="0" y="0"/>
+          <a:ext cx="0" cy="0"/>
+          <a:chOff x="0" y="0"/>
+          <a:chExt cx="0" cy="0"/>
+        </a:xfrm>
+      </p:grpSpPr>
+      <p:sp>
+        <p:nvSpPr>
+          <p:cNvPr id="2" name="Slide Image Placeholder 1"/>
+          <p:cNvSpPr>
+            <a:spLocks noGrp="1" noRot="1" noChangeAspect="1"/>
+          </p:cNvSpPr>
+          <p:nvPr>
+            <p:ph type="sldImg"/>
+          </p:nvPr>
+        </p:nvSpPr>
+        <p:spPr/>
+      </p:sp>
+      <p:sp>
+        <p:nvSpPr>
+          <p:cNvPr id="3" name="Notes Placeholder 2"/>
+          <p:cNvSpPr>
+            <a:spLocks noGrp="1"/>
+          </p:cNvSpPr>
+          <p:nvPr>
+            <p:ph type="body" idx="1"/>
+          </p:nvPr>
+        </p:nvSpPr>
+        <p:spPr/>
+        <p:txBody>
+          <a:bodyPr>
+            <a:normAutofit/>
+          </a:bodyPr>
+          <a:lstStyle/>
+          <a:p>
+            <a:r>
+              <a:rPr lang="en-US" dirty="0" smtClean="0"/>
+              <a:t>Back to the manual DI example.</a:t>
+            </a:r>
+          </a:p>
+          <a:p>
+            <a:r>
+              <a:rPr lang="en-US" dirty="0" smtClean="0"/>
+              <a:t>So here, we can see the dependency is manually injected.</a:t>
+            </a:r>
+            <a:endParaRPr lang="en-US" dirty="0"/>
+          </a:p>
+        </p:txBody>
+      </p:sp>
+      <p:sp>
+        <p:nvSpPr>
+          <p:cNvPr id="4" name="Slide Number Placeholder 3"/>
+          <p:cNvSpPr>
+            <a:spLocks noGrp="1"/>
+          </p:cNvSpPr>
+          <p:nvPr>
+            <p:ph type="sldNum" sz="quarter" idx="10"/>
+          </p:nvPr>
+        </p:nvSpPr>
+        <p:spPr/>
+        <p:txBody>
+          <a:bodyPr/>
+          <a:lstStyle/>
+          <a:p>
+            <a:fld id="{F5395209-E063-144C-8968-CAA31F3D1B83}" type="slidenum">
+              <a:rPr lang="en-US" smtClean="0"/>
+              <a:pPr/>
+              <a:t>29</a:t>
+            </a:fld>
+            <a:endParaRPr lang="en-US"/>
+          </a:p>
+        </p:txBody>
+      </p:sp>
+    </p:spTree>
+  </p:cSld>
+  <p:clrMapOvr>
+    <a:masterClrMapping/>
+  </p:clrMapOvr>
+</p:notes>
+</file>
+
+<file path=ppt/notesSlides/notesSlide23.xml><?xml version="1.0" encoding="utf-8"?>
+<p:notes xmlns:a="http://schemas.openxmlformats.org/drawingml/2006/main" xmlns:r="http://schemas.openxmlformats.org/officeDocument/2006/relationships" xmlns:mc="http://schemas.openxmlformats.org/markup-compatibility/2006" xmlns:mv="urn:schemas-microsoft-com:mac:vml" xmlns:p="http://schemas.openxmlformats.org/presentationml/2006/main" mc:Ignorable="mv" mc:PreserveAttributes="mv:*">
+  <p:cSld>
+    <p:spTree>
+      <p:nvGrpSpPr>
+        <p:cNvPr id="1" name=""/>
+        <p:cNvGrpSpPr/>
+        <p:nvPr/>
+      </p:nvGrpSpPr>
+      <p:grpSpPr>
+        <a:xfrm>
+          <a:off x="0" y="0"/>
+          <a:ext cx="0" cy="0"/>
+          <a:chOff x="0" y="0"/>
+          <a:chExt cx="0" cy="0"/>
+        </a:xfrm>
+      </p:grpSpPr>
+      <p:sp>
+        <p:nvSpPr>
+          <p:cNvPr id="2" name="Slide Image Placeholder 1"/>
+          <p:cNvSpPr>
+            <a:spLocks noGrp="1" noRot="1" noChangeAspect="1"/>
+          </p:cNvSpPr>
+          <p:nvPr>
+            <p:ph type="sldImg"/>
+          </p:nvPr>
+        </p:nvSpPr>
+        <p:spPr/>
+      </p:sp>
+      <p:sp>
+        <p:nvSpPr>
+          <p:cNvPr id="3" name="Notes Placeholder 2"/>
+          <p:cNvSpPr>
+            <a:spLocks noGrp="1"/>
+          </p:cNvSpPr>
+          <p:nvPr>
+            <p:ph type="body" idx="1"/>
+          </p:nvPr>
+        </p:nvSpPr>
+        <p:spPr/>
+        <p:txBody>
+          <a:bodyPr>
+            <a:normAutofit/>
+          </a:bodyPr>
+          <a:lstStyle/>
+          <a:p>
+            <a:r>
+              <a:rPr lang="en-US" dirty="0" smtClean="0"/>
+              <a:t>Here’s an example using a container.</a:t>
+            </a:r>
+          </a:p>
+          <a:p>
+            <a:r>
+              <a:rPr lang="en-US" dirty="0" smtClean="0"/>
+              <a:t>Sort</a:t>
+            </a:r>
+            <a:r>
+              <a:rPr lang="en-US" baseline="0" dirty="0" smtClean="0"/>
+              <a:t> of looks like </a:t>
+            </a:r>
+            <a:r>
+              <a:rPr lang="en-US" baseline="0" dirty="0" err="1" smtClean="0"/>
+              <a:t>ServiceLocation</a:t>
+            </a:r>
+            <a:r>
+              <a:rPr lang="en-US" baseline="0" dirty="0" smtClean="0"/>
+              <a:t>?</a:t>
+            </a:r>
+          </a:p>
+          <a:p>
+            <a:r>
+              <a:rPr lang="en-US" baseline="0" dirty="0" smtClean="0"/>
+              <a:t>It sort of is, but with the power of a general purpose container behind it.</a:t>
+            </a:r>
+          </a:p>
+          <a:p>
+            <a:r>
+              <a:rPr lang="en-US" baseline="0" dirty="0" smtClean="0"/>
+              <a:t>At this point, it’s really little more than a glorified Service Locator… and I think, though maybe not, this is what most people see, and then either stop using a container, or never take it further.</a:t>
+            </a:r>
+            <a:endParaRPr lang="en-US" dirty="0" smtClean="0"/>
+          </a:p>
+        </p:txBody>
+      </p:sp>
+      <p:sp>
+        <p:nvSpPr>
+          <p:cNvPr id="4" name="Slide Number Placeholder 3"/>
+          <p:cNvSpPr>
+            <a:spLocks noGrp="1"/>
+          </p:cNvSpPr>
+          <p:nvPr>
+            <p:ph type="sldNum" sz="quarter" idx="10"/>
+          </p:nvPr>
+        </p:nvSpPr>
+        <p:spPr/>
+        <p:txBody>
+          <a:bodyPr/>
+          <a:lstStyle/>
+          <a:p>
+            <a:fld id="{F5395209-E063-144C-8968-CAA31F3D1B83}" type="slidenum">
+              <a:rPr lang="en-US" smtClean="0"/>
+              <a:pPr/>
+              <a:t>30</a:t>
+            </a:fld>
+            <a:endParaRPr lang="en-US"/>
+          </a:p>
+        </p:txBody>
+      </p:sp>
+    </p:spTree>
+  </p:cSld>
+  <p:clrMapOvr>
+    <a:masterClrMapping/>
+  </p:clrMapOvr>
+</p:notes>
+</file>
+
+<file path=ppt/notesSlides/notesSlide24.xml><?xml version="1.0" encoding="utf-8"?>
+<p:notes xmlns:a="http://schemas.openxmlformats.org/drawingml/2006/main" xmlns:r="http://schemas.openxmlformats.org/officeDocument/2006/relationships" xmlns:mc="http://schemas.openxmlformats.org/markup-compatibility/2006" xmlns:mv="urn:schemas-microsoft-com:mac:vml" xmlns:p="http://schemas.openxmlformats.org/presentationml/2006/main" mc:Ignorable="mv" mc:PreserveAttributes="mv:*">
+  <p:cSld>
+    <p:spTree>
+      <p:nvGrpSpPr>
+        <p:cNvPr id="1" name=""/>
+        <p:cNvGrpSpPr/>
+        <p:nvPr/>
+      </p:nvGrpSpPr>
+      <p:grpSpPr>
+        <a:xfrm>
+          <a:off x="0" y="0"/>
+          <a:ext cx="0" cy="0"/>
+          <a:chOff x="0" y="0"/>
+          <a:chExt cx="0" cy="0"/>
+        </a:xfrm>
+      </p:grpSpPr>
+      <p:sp>
+        <p:nvSpPr>
+          <p:cNvPr id="2" name="Slide Image Placeholder 1"/>
+          <p:cNvSpPr>
+            <a:spLocks noGrp="1" noRot="1" noChangeAspect="1"/>
+          </p:cNvSpPr>
+          <p:nvPr>
+            <p:ph type="sldImg"/>
+          </p:nvPr>
+        </p:nvSpPr>
+        <p:spPr/>
+      </p:sp>
+      <p:sp>
+        <p:nvSpPr>
+          <p:cNvPr id="3" name="Notes Placeholder 2"/>
+          <p:cNvSpPr>
+            <a:spLocks noGrp="1"/>
+          </p:cNvSpPr>
+          <p:nvPr>
+            <p:ph type="body" idx="1"/>
+          </p:nvPr>
+        </p:nvSpPr>
+        <p:spPr/>
+        <p:txBody>
+          <a:bodyPr>
+            <a:normAutofit/>
+          </a:bodyPr>
+          <a:lstStyle/>
+          <a:p>
+            <a:r>
+              <a:rPr lang="en-US" dirty="0" smtClean="0"/>
+              <a:t>The next major</a:t>
+            </a:r>
+            <a:r>
+              <a:rPr lang="en-US" baseline="0" dirty="0" smtClean="0"/>
+              <a:t> leap to take with the container is </a:t>
+            </a:r>
+            <a:r>
+              <a:rPr lang="en-US" baseline="0" dirty="0" err="1" smtClean="0"/>
+              <a:t>autowiring</a:t>
+            </a:r>
+            <a:r>
+              <a:rPr lang="en-US" baseline="0" dirty="0" smtClean="0"/>
+              <a:t>.</a:t>
+            </a:r>
+          </a:p>
+          <a:p>
+            <a:r>
+              <a:rPr lang="en-US" baseline="0" dirty="0" smtClean="0"/>
+              <a:t>This may sound a little magic-</a:t>
+            </a:r>
+            <a:r>
+              <a:rPr lang="en-US" baseline="0" dirty="0" err="1" smtClean="0"/>
+              <a:t>y</a:t>
+            </a:r>
+            <a:r>
+              <a:rPr lang="en-US" baseline="0" dirty="0" smtClean="0"/>
+              <a:t>, or “over my head”, but its not really… pretty simple, lets see</a:t>
+            </a:r>
+          </a:p>
+          <a:p>
+            <a:r>
+              <a:rPr lang="en-US" baseline="0" dirty="0" smtClean="0"/>
+              <a:t>CODE</a:t>
+            </a:r>
+          </a:p>
+          <a:p>
+            <a:r>
+              <a:rPr lang="en-US" baseline="0" dirty="0" smtClean="0"/>
+              <a:t>You can start to see now how this code has:</a:t>
+            </a:r>
+          </a:p>
+          <a:p>
+            <a:r>
+              <a:rPr lang="en-US" baseline="0" dirty="0" smtClean="0"/>
+              <a:t>Very low coupling</a:t>
+            </a:r>
+          </a:p>
+          <a:p>
+            <a:r>
+              <a:rPr lang="en-US" baseline="0" dirty="0" smtClean="0"/>
+              <a:t>Reusable (if that’s your thing)</a:t>
+            </a:r>
+          </a:p>
+          <a:p>
+            <a:r>
+              <a:rPr lang="en-US" baseline="0" dirty="0" smtClean="0"/>
+              <a:t>Verifiable</a:t>
+            </a:r>
+          </a:p>
+          <a:p>
+            <a:r>
+              <a:rPr lang="en-US" baseline="0" dirty="0" smtClean="0"/>
+              <a:t>Orthogonal</a:t>
+            </a:r>
+          </a:p>
+        </p:txBody>
+      </p:sp>
+      <p:sp>
+        <p:nvSpPr>
+          <p:cNvPr id="4" name="Slide Number Placeholder 3"/>
+          <p:cNvSpPr>
+            <a:spLocks noGrp="1"/>
+          </p:cNvSpPr>
+          <p:nvPr>
+            <p:ph type="sldNum" sz="quarter" idx="10"/>
+          </p:nvPr>
+        </p:nvSpPr>
+        <p:spPr/>
+        <p:txBody>
+          <a:bodyPr/>
+          <a:lstStyle/>
+          <a:p>
+            <a:fld id="{F5395209-E063-144C-8968-CAA31F3D1B83}" type="slidenum">
+              <a:rPr lang="en-US" smtClean="0"/>
+              <a:pPr/>
+              <a:t>31</a:t>
+            </a:fld>
+            <a:endParaRPr lang="en-US"/>
+          </a:p>
+        </p:txBody>
+      </p:sp>
+    </p:spTree>
+  </p:cSld>
+  <p:clrMapOvr>
+    <a:masterClrMapping/>
+  </p:clrMapOvr>
+</p:notes>
+</file>
+
+<file path=ppt/notesSlides/notesSlide25.xml><?xml version="1.0" encoding="utf-8"?>
+<p:notes xmlns:a="http://schemas.openxmlformats.org/drawingml/2006/main" xmlns:r="http://schemas.openxmlformats.org/officeDocument/2006/relationships" xmlns:mc="http://schemas.openxmlformats.org/markup-compatibility/2006" xmlns:mv="urn:schemas-microsoft-com:mac:vml" xmlns:p="http://schemas.openxmlformats.org/presentationml/2006/main" mc:Ignorable="mv" mc:PreserveAttributes="mv:*">
+  <p:cSld>
+    <p:spTree>
+      <p:nvGrpSpPr>
+        <p:cNvPr id="1" name=""/>
+        <p:cNvGrpSpPr/>
+        <p:nvPr/>
+      </p:nvGrpSpPr>
+      <p:grpSpPr>
+        <a:xfrm>
+          <a:off x="0" y="0"/>
+          <a:ext cx="0" cy="0"/>
+          <a:chOff x="0" y="0"/>
+          <a:chExt cx="0" cy="0"/>
+        </a:xfrm>
+      </p:grpSpPr>
+      <p:sp>
+        <p:nvSpPr>
+          <p:cNvPr id="2" name="Slide Image Placeholder 1"/>
+          <p:cNvSpPr>
+            <a:spLocks noGrp="1" noRot="1" noChangeAspect="1"/>
+          </p:cNvSpPr>
+          <p:nvPr>
+            <p:ph type="sldImg"/>
+          </p:nvPr>
+        </p:nvSpPr>
+        <p:spPr/>
+      </p:sp>
+      <p:sp>
+        <p:nvSpPr>
+          <p:cNvPr id="3" name="Notes Placeholder 2"/>
+          <p:cNvSpPr>
+            <a:spLocks noGrp="1"/>
+          </p:cNvSpPr>
+          <p:nvPr>
+            <p:ph type="body" idx="1"/>
+          </p:nvPr>
+        </p:nvSpPr>
+        <p:spPr/>
+        <p:txBody>
+          <a:bodyPr>
+            <a:normAutofit/>
+          </a:bodyPr>
+          <a:lstStyle/>
+          <a:p>
+            <a:r>
+              <a:rPr lang="en-US" dirty="0" smtClean="0"/>
+              <a:t>Java</a:t>
+            </a:r>
+            <a:r>
+              <a:rPr lang="en-US" baseline="0" dirty="0" smtClean="0"/>
+              <a:t> guys and containers almost always prefer property setter injection.</a:t>
+            </a:r>
+          </a:p>
+          <a:p>
+            <a:r>
+              <a:rPr lang="en-US" baseline="0" dirty="0" smtClean="0"/>
+              <a:t>.NET guys and containers almost always prefer constructor injection.</a:t>
+            </a:r>
+            <a:endParaRPr lang="en-US" dirty="0"/>
+          </a:p>
+        </p:txBody>
+      </p:sp>
+      <p:sp>
+        <p:nvSpPr>
+          <p:cNvPr id="4" name="Slide Number Placeholder 3"/>
+          <p:cNvSpPr>
+            <a:spLocks noGrp="1"/>
+          </p:cNvSpPr>
+          <p:nvPr>
+            <p:ph type="sldNum" sz="quarter" idx="10"/>
+          </p:nvPr>
+        </p:nvSpPr>
+        <p:spPr/>
+        <p:txBody>
+          <a:bodyPr/>
+          <a:lstStyle/>
+          <a:p>
+            <a:fld id="{F5395209-E063-144C-8968-CAA31F3D1B83}" type="slidenum">
+              <a:rPr lang="en-US" smtClean="0"/>
+              <a:pPr/>
+              <a:t>32</a:t>
             </a:fld>
             <a:endParaRPr lang="en-US"/>
           </a:p>
@@ -9162,7 +9727,11 @@
           <a:p>
             <a:r>
               <a:rPr lang="en-US" dirty="0" smtClean="0"/>
-              <a:t>simplicity</a:t>
+              <a:t>free </a:t>
+            </a:r>
+            <a:r>
+              <a:rPr lang="en-US" dirty="0" smtClean="0"/>
+              <a:t>your mind</a:t>
             </a:r>
             <a:endParaRPr lang="en-US" dirty="0"/>
           </a:p>
@@ -9193,46 +9762,311 @@
           <a:chExt cx="0" cy="0"/>
         </a:xfrm>
       </p:grpSpPr>
-      <p:pic>
-        <p:nvPicPr>
-          <p:cNvPr id="4" name="whatever.cs.png" descr="/Users/fullerjc/Documents/presentations/dependencies/whatever.cs.png"/>
-          <p:cNvPicPr>
-            <a:picLocks noChangeAspect="1"/>
-          </p:cNvPicPr>
-          <p:nvPr/>
-        </p:nvPicPr>
-        <p:blipFill>
-          <a:blip r:embed="rId2" r:link="rId3"/>
-          <a:stretch>
-            <a:fillRect/>
-          </a:stretch>
-        </p:blipFill>
+      <p:sp>
+        <p:nvSpPr>
+          <p:cNvPr id="2" name="Title 1"/>
+          <p:cNvSpPr>
+            <a:spLocks noGrp="1"/>
+          </p:cNvSpPr>
+          <p:nvPr>
+            <p:ph type="title"/>
+          </p:nvPr>
+        </p:nvSpPr>
         <p:spPr>
           <a:xfrm>
-            <a:off x="2905615" y="2473877"/>
-            <a:ext cx="3332769" cy="1910246"/>
+            <a:off x="457200" y="2667000"/>
+            <a:ext cx="8229600" cy="1143000"/>
           </a:xfrm>
-          <a:prstGeom prst="rect">
-            <a:avLst/>
-          </a:prstGeom>
         </p:spPr>
-      </p:pic>
+        <p:txBody>
+          <a:bodyPr>
+            <a:normAutofit fontScale="90000"/>
+          </a:bodyPr>
+          <a:lstStyle/>
+          <a:p>
+            <a:r>
+              <a:rPr lang="en-US" dirty="0" smtClean="0"/>
+              <a:t>XXX</a:t>
+            </a:r>
+            <a:br>
+              <a:rPr lang="en-US" dirty="0" smtClean="0"/>
+            </a:br>
+            <a:r>
+              <a:rPr lang="en-US" dirty="0" smtClean="0"/>
+              <a:t>manual DI example</a:t>
+            </a:r>
+            <a:br>
+              <a:rPr lang="en-US" dirty="0" smtClean="0"/>
+            </a:br>
+            <a:r>
+              <a:rPr lang="en-US" dirty="0" smtClean="0"/>
+              <a:t>XXX</a:t>
+            </a:r>
+            <a:endParaRPr lang="en-US" dirty="0"/>
+          </a:p>
+        </p:txBody>
+      </p:sp>
     </p:spTree>
   </p:cSld>
   <p:clrMapOvr>
     <a:masterClrMapping/>
   </p:clrMapOvr>
-  <p:timing>
-    <p:tnLst>
-      <p:par>
-        <p:cTn id="1" dur="indefinite" restart="never" nodeType="tmRoot"/>
-      </p:par>
-    </p:tnLst>
-  </p:timing>
 </p:sld>
 </file>
 
 <file path=ppt/slides/slide3.xml><?xml version="1.0" encoding="utf-8"?>
+<p:sld xmlns:a="http://schemas.openxmlformats.org/drawingml/2006/main" xmlns:r="http://schemas.openxmlformats.org/officeDocument/2006/relationships" xmlns:mc="http://schemas.openxmlformats.org/markup-compatibility/2006" xmlns:mv="urn:schemas-microsoft-com:mac:vml" xmlns:p="http://schemas.openxmlformats.org/presentationml/2006/main" mc:Ignorable="mv" mc:PreserveAttributes="mv:*">
+  <p:cSld>
+    <p:spTree>
+      <p:nvGrpSpPr>
+        <p:cNvPr id="1" name=""/>
+        <p:cNvGrpSpPr/>
+        <p:nvPr/>
+      </p:nvGrpSpPr>
+      <p:grpSpPr>
+        <a:xfrm>
+          <a:off x="0" y="0"/>
+          <a:ext cx="0" cy="0"/>
+          <a:chOff x="0" y="0"/>
+          <a:chExt cx="0" cy="0"/>
+        </a:xfrm>
+      </p:grpSpPr>
+      <p:sp>
+        <p:nvSpPr>
+          <p:cNvPr id="2" name="Title 1"/>
+          <p:cNvSpPr>
+            <a:spLocks noGrp="1"/>
+          </p:cNvSpPr>
+          <p:nvPr>
+            <p:ph type="title"/>
+          </p:nvPr>
+        </p:nvSpPr>
+        <p:spPr>
+          <a:xfrm>
+            <a:off x="457200" y="2667000"/>
+            <a:ext cx="8229600" cy="1143000"/>
+          </a:xfrm>
+        </p:spPr>
+        <p:txBody>
+          <a:bodyPr/>
+          <a:lstStyle/>
+          <a:p>
+            <a:r>
+              <a:rPr lang="en-US" dirty="0" smtClean="0"/>
+              <a:t>simplicity</a:t>
+            </a:r>
+            <a:endParaRPr lang="en-US" dirty="0"/>
+          </a:p>
+        </p:txBody>
+      </p:sp>
+    </p:spTree>
+  </p:cSld>
+  <p:clrMapOvr>
+    <a:masterClrMapping/>
+  </p:clrMapOvr>
+</p:sld>
+</file>
+
+<file path=ppt/slides/slide30.xml><?xml version="1.0" encoding="utf-8"?>
+<p:sld xmlns:a="http://schemas.openxmlformats.org/drawingml/2006/main" xmlns:r="http://schemas.openxmlformats.org/officeDocument/2006/relationships" xmlns:mc="http://schemas.openxmlformats.org/markup-compatibility/2006" xmlns:mv="urn:schemas-microsoft-com:mac:vml" xmlns:p="http://schemas.openxmlformats.org/presentationml/2006/main" mc:Ignorable="mv" mc:PreserveAttributes="mv:*">
+  <p:cSld>
+    <p:spTree>
+      <p:nvGrpSpPr>
+        <p:cNvPr id="1" name=""/>
+        <p:cNvGrpSpPr/>
+        <p:nvPr/>
+      </p:nvGrpSpPr>
+      <p:grpSpPr>
+        <a:xfrm>
+          <a:off x="0" y="0"/>
+          <a:ext cx="0" cy="0"/>
+          <a:chOff x="0" y="0"/>
+          <a:chExt cx="0" cy="0"/>
+        </a:xfrm>
+      </p:grpSpPr>
+      <p:sp>
+        <p:nvSpPr>
+          <p:cNvPr id="2" name="Title 1"/>
+          <p:cNvSpPr>
+            <a:spLocks noGrp="1"/>
+          </p:cNvSpPr>
+          <p:nvPr>
+            <p:ph type="title"/>
+          </p:nvPr>
+        </p:nvSpPr>
+        <p:spPr>
+          <a:xfrm>
+            <a:off x="457200" y="2667000"/>
+            <a:ext cx="8229600" cy="1143000"/>
+          </a:xfrm>
+        </p:spPr>
+        <p:txBody>
+          <a:bodyPr>
+            <a:normAutofit fontScale="90000"/>
+          </a:bodyPr>
+          <a:lstStyle/>
+          <a:p>
+            <a:r>
+              <a:rPr lang="en-US" dirty="0" smtClean="0"/>
+              <a:t>XXX</a:t>
+            </a:r>
+            <a:br>
+              <a:rPr lang="en-US" dirty="0" smtClean="0"/>
+            </a:br>
+            <a:r>
+              <a:rPr lang="en-US" dirty="0" smtClean="0"/>
+              <a:t>IOC Example</a:t>
+            </a:r>
+            <a:br>
+              <a:rPr lang="en-US" dirty="0" smtClean="0"/>
+            </a:br>
+            <a:r>
+              <a:rPr lang="en-US" dirty="0" smtClean="0"/>
+              <a:t>XXX</a:t>
+            </a:r>
+            <a:endParaRPr lang="en-US" dirty="0"/>
+          </a:p>
+        </p:txBody>
+      </p:sp>
+    </p:spTree>
+  </p:cSld>
+  <p:clrMapOvr>
+    <a:masterClrMapping/>
+  </p:clrMapOvr>
+</p:sld>
+</file>
+
+<file path=ppt/slides/slide31.xml><?xml version="1.0" encoding="utf-8"?>
+<p:sld xmlns:a="http://schemas.openxmlformats.org/drawingml/2006/main" xmlns:r="http://schemas.openxmlformats.org/officeDocument/2006/relationships" xmlns:mc="http://schemas.openxmlformats.org/markup-compatibility/2006" xmlns:mv="urn:schemas-microsoft-com:mac:vml" xmlns:p="http://schemas.openxmlformats.org/presentationml/2006/main" mc:Ignorable="mv" mc:PreserveAttributes="mv:*">
+  <p:cSld>
+    <p:spTree>
+      <p:nvGrpSpPr>
+        <p:cNvPr id="1" name=""/>
+        <p:cNvGrpSpPr/>
+        <p:nvPr/>
+      </p:nvGrpSpPr>
+      <p:grpSpPr>
+        <a:xfrm>
+          <a:off x="0" y="0"/>
+          <a:ext cx="0" cy="0"/>
+          <a:chOff x="0" y="0"/>
+          <a:chExt cx="0" cy="0"/>
+        </a:xfrm>
+      </p:grpSpPr>
+      <p:sp>
+        <p:nvSpPr>
+          <p:cNvPr id="2" name="Title 1"/>
+          <p:cNvSpPr>
+            <a:spLocks noGrp="1"/>
+          </p:cNvSpPr>
+          <p:nvPr>
+            <p:ph type="title"/>
+          </p:nvPr>
+        </p:nvSpPr>
+        <p:spPr>
+          <a:xfrm>
+            <a:off x="457200" y="2667000"/>
+            <a:ext cx="8229600" cy="1143000"/>
+          </a:xfrm>
+        </p:spPr>
+        <p:txBody>
+          <a:bodyPr>
+            <a:normAutofit fontScale="90000"/>
+          </a:bodyPr>
+          <a:lstStyle/>
+          <a:p>
+            <a:r>
+              <a:rPr lang="en-US" dirty="0" smtClean="0"/>
+              <a:t>XXX</a:t>
+            </a:r>
+            <a:br>
+              <a:rPr lang="en-US" dirty="0" smtClean="0"/>
+            </a:br>
+            <a:r>
+              <a:rPr lang="en-US" dirty="0" smtClean="0"/>
+              <a:t>IOC Example </a:t>
+            </a:r>
+            <a:r>
+              <a:rPr lang="en-US" dirty="0" err="1" smtClean="0"/>
+              <a:t>w/Autowire</a:t>
+            </a:r>
+            <a:r>
+              <a:rPr lang="en-US" dirty="0" smtClean="0"/>
+              <a:t/>
+            </a:r>
+            <a:br>
+              <a:rPr lang="en-US" dirty="0" smtClean="0"/>
+            </a:br>
+            <a:r>
+              <a:rPr lang="en-US" dirty="0" smtClean="0"/>
+              <a:t>XXX</a:t>
+            </a:r>
+            <a:endParaRPr lang="en-US" dirty="0"/>
+          </a:p>
+        </p:txBody>
+      </p:sp>
+    </p:spTree>
+  </p:cSld>
+  <p:clrMapOvr>
+    <a:masterClrMapping/>
+  </p:clrMapOvr>
+</p:sld>
+</file>
+
+<file path=ppt/slides/slide32.xml><?xml version="1.0" encoding="utf-8"?>
+<p:sld xmlns:a="http://schemas.openxmlformats.org/drawingml/2006/main" xmlns:r="http://schemas.openxmlformats.org/officeDocument/2006/relationships" xmlns:mc="http://schemas.openxmlformats.org/markup-compatibility/2006" xmlns:mv="urn:schemas-microsoft-com:mac:vml" xmlns:p="http://schemas.openxmlformats.org/presentationml/2006/main" mc:Ignorable="mv" mc:PreserveAttributes="mv:*">
+  <p:cSld>
+    <p:spTree>
+      <p:nvGrpSpPr>
+        <p:cNvPr id="1" name=""/>
+        <p:cNvGrpSpPr/>
+        <p:nvPr/>
+      </p:nvGrpSpPr>
+      <p:grpSpPr>
+        <a:xfrm>
+          <a:off x="0" y="0"/>
+          <a:ext cx="0" cy="0"/>
+          <a:chOff x="0" y="0"/>
+          <a:chExt cx="0" cy="0"/>
+        </a:xfrm>
+      </p:grpSpPr>
+      <p:sp>
+        <p:nvSpPr>
+          <p:cNvPr id="2" name="Title 1"/>
+          <p:cNvSpPr>
+            <a:spLocks noGrp="1"/>
+          </p:cNvSpPr>
+          <p:nvPr>
+            <p:ph type="title"/>
+          </p:nvPr>
+        </p:nvSpPr>
+        <p:spPr>
+          <a:xfrm>
+            <a:off x="457200" y="2667000"/>
+            <a:ext cx="8229600" cy="1143000"/>
+          </a:xfrm>
+        </p:spPr>
+        <p:txBody>
+          <a:bodyPr/>
+          <a:lstStyle/>
+          <a:p>
+            <a:r>
+              <a:rPr lang="en-US" dirty="0" smtClean="0"/>
+              <a:t>conventions</a:t>
+            </a:r>
+            <a:endParaRPr lang="en-US" dirty="0"/>
+          </a:p>
+        </p:txBody>
+      </p:sp>
+    </p:spTree>
+  </p:cSld>
+  <p:clrMapOvr>
+    <a:masterClrMapping/>
+  </p:clrMapOvr>
+</p:sld>
+</file>
+
+<file path=ppt/slides/slide33.xml><?xml version="1.0" encoding="utf-8"?>
 <p:sld xmlns:a="http://schemas.openxmlformats.org/drawingml/2006/main" xmlns:r="http://schemas.openxmlformats.org/officeDocument/2006/relationships" xmlns:mc="http://schemas.openxmlformats.org/markup-compatibility/2006" xmlns:mv="urn:schemas-microsoft-com:mac:vml" xmlns:p="http://schemas.openxmlformats.org/presentationml/2006/main" mc:Ignorable="mv" mc:PreserveAttributes="mv:*">
   <p:cSld>
     <p:spTree>

</xml_diff>

<commit_message>
add some more code samples to the powerpoint
</commit_message>
<xml_diff>
--- a/dependencies/dependencies.pptx
+++ b/dependencies/dependencies.pptx
@@ -8378,50 +8378,6 @@
       </p:grpSpPr>
       <p:sp>
         <p:nvSpPr>
-          <p:cNvPr id="2" name="Title 1"/>
-          <p:cNvSpPr>
-            <a:spLocks noGrp="1"/>
-          </p:cNvSpPr>
-          <p:nvPr>
-            <p:ph type="title"/>
-          </p:nvPr>
-        </p:nvSpPr>
-        <p:spPr>
-          <a:xfrm>
-            <a:off x="457200" y="2667000"/>
-            <a:ext cx="8229600" cy="1143000"/>
-          </a:xfrm>
-        </p:spPr>
-        <p:txBody>
-          <a:bodyPr>
-            <a:normAutofit fontScale="90000"/>
-          </a:bodyPr>
-          <a:lstStyle/>
-          <a:p>
-            <a:r>
-              <a:rPr lang="en-US" dirty="0" smtClean="0"/>
-              <a:t>XXX</a:t>
-            </a:r>
-            <a:br>
-              <a:rPr lang="en-US" dirty="0" smtClean="0"/>
-            </a:br>
-            <a:r>
-              <a:rPr lang="en-US" dirty="0" smtClean="0"/>
-              <a:t>service locator source code</a:t>
-            </a:r>
-            <a:br>
-              <a:rPr lang="en-US" dirty="0" smtClean="0"/>
-            </a:br>
-            <a:r>
-              <a:rPr lang="en-US" dirty="0" smtClean="0"/>
-              <a:t>XXX</a:t>
-            </a:r>
-            <a:endParaRPr lang="en-US" dirty="0"/>
-          </a:p>
-        </p:txBody>
-      </p:sp>
-      <p:sp>
-        <p:nvSpPr>
           <p:cNvPr id="3" name="Title 1"/>
           <p:cNvSpPr txBox="1">
             <a:spLocks/>
@@ -8483,11 +8439,42 @@
           </a:p>
         </p:txBody>
       </p:sp>
+      <p:pic>
+        <p:nvPicPr>
+          <p:cNvPr id="6" name="ServiceLocator.cs.png" descr="/Users/fullerjc/Documents/presentations/dependencies/img/ServiceLocator.cs.png"/>
+          <p:cNvPicPr>
+            <a:picLocks noChangeAspect="1"/>
+          </p:cNvPicPr>
+          <p:nvPr/>
+        </p:nvPicPr>
+        <p:blipFill>
+          <a:blip r:embed="rId3" r:link="rId4"/>
+          <a:stretch>
+            <a:fillRect/>
+          </a:stretch>
+        </p:blipFill>
+        <p:spPr>
+          <a:xfrm>
+            <a:off x="1645666" y="1051354"/>
+            <a:ext cx="5852668" cy="4755292"/>
+          </a:xfrm>
+          <a:prstGeom prst="rect">
+            <a:avLst/>
+          </a:prstGeom>
+        </p:spPr>
+      </p:pic>
     </p:spTree>
   </p:cSld>
   <p:clrMapOvr>
     <a:masterClrMapping/>
   </p:clrMapOvr>
+  <p:timing>
+    <p:tnLst>
+      <p:par>
+        <p:cTn id="1" dur="indefinite" restart="never" nodeType="tmRoot"/>
+      </p:par>
+    </p:tnLst>
+  </p:timing>
 </p:sld>
 </file>
 
@@ -8604,6 +8591,13 @@
   <p:clrMapOvr>
     <a:masterClrMapping/>
   </p:clrMapOvr>
+  <p:timing>
+    <p:tnLst>
+      <p:par>
+        <p:cTn id="1" dur="indefinite" restart="never" nodeType="tmRoot"/>
+      </p:par>
+    </p:tnLst>
+  </p:timing>
 </p:sld>
 </file>
 
@@ -8626,54 +8620,6 @@
       </p:grpSpPr>
       <p:sp>
         <p:nvSpPr>
-          <p:cNvPr id="2" name="Title 1"/>
-          <p:cNvSpPr>
-            <a:spLocks noGrp="1"/>
-          </p:cNvSpPr>
-          <p:nvPr>
-            <p:ph type="title"/>
-          </p:nvPr>
-        </p:nvSpPr>
-        <p:spPr>
-          <a:xfrm>
-            <a:off x="457200" y="2667000"/>
-            <a:ext cx="8229600" cy="1143000"/>
-          </a:xfrm>
-        </p:spPr>
-        <p:txBody>
-          <a:bodyPr>
-            <a:normAutofit fontScale="90000"/>
-          </a:bodyPr>
-          <a:lstStyle/>
-          <a:p>
-            <a:r>
-              <a:rPr lang="en-US" dirty="0" smtClean="0"/>
-              <a:t>xxx</a:t>
-            </a:r>
-            <a:br>
-              <a:rPr lang="en-US" dirty="0" smtClean="0"/>
-            </a:br>
-            <a:r>
-              <a:rPr lang="en-US" dirty="0" err="1" smtClean="0"/>
-              <a:t>MovieLister</a:t>
-            </a:r>
-            <a:r>
-              <a:rPr lang="en-US" dirty="0" smtClean="0"/>
-              <a:t> example, no DI</a:t>
-            </a:r>
-            <a:br>
-              <a:rPr lang="en-US" dirty="0" smtClean="0"/>
-            </a:br>
-            <a:r>
-              <a:rPr lang="en-US" dirty="0" smtClean="0"/>
-              <a:t>XXX</a:t>
-            </a:r>
-            <a:endParaRPr lang="en-US" dirty="0"/>
-          </a:p>
-        </p:txBody>
-      </p:sp>
-      <p:sp>
-        <p:nvSpPr>
           <p:cNvPr id="3" name="Title 1"/>
           <p:cNvSpPr txBox="1">
             <a:spLocks/>
@@ -8735,6 +8681,30 @@
           </a:p>
         </p:txBody>
       </p:sp>
+      <p:pic>
+        <p:nvPicPr>
+          <p:cNvPr id="5" name="NoInjection.cs.png" descr="/Users/fullerjc/Documents/presentations/dependencies/img/NoInjection.cs.png"/>
+          <p:cNvPicPr>
+            <a:picLocks noChangeAspect="1"/>
+          </p:cNvPicPr>
+          <p:nvPr/>
+        </p:nvPicPr>
+        <p:blipFill>
+          <a:blip r:embed="rId2" r:link="rId3"/>
+          <a:stretch>
+            <a:fillRect/>
+          </a:stretch>
+        </p:blipFill>
+        <p:spPr>
+          <a:xfrm>
+            <a:off x="1645666" y="1051354"/>
+            <a:ext cx="5852668" cy="4755292"/>
+          </a:xfrm>
+          <a:prstGeom prst="rect">
+            <a:avLst/>
+          </a:prstGeom>
+        </p:spPr>
+      </p:pic>
     </p:spTree>
   </p:cSld>
   <p:clrMapOvr>
@@ -8908,54 +8878,6 @@
       </p:grpSpPr>
       <p:sp>
         <p:nvSpPr>
-          <p:cNvPr id="2" name="Title 1"/>
-          <p:cNvSpPr>
-            <a:spLocks noGrp="1"/>
-          </p:cNvSpPr>
-          <p:nvPr>
-            <p:ph type="title"/>
-          </p:nvPr>
-        </p:nvSpPr>
-        <p:spPr>
-          <a:xfrm>
-            <a:off x="457200" y="2667000"/>
-            <a:ext cx="8229600" cy="1143000"/>
-          </a:xfrm>
-        </p:spPr>
-        <p:txBody>
-          <a:bodyPr>
-            <a:normAutofit fontScale="90000"/>
-          </a:bodyPr>
-          <a:lstStyle/>
-          <a:p>
-            <a:r>
-              <a:rPr lang="en-US" dirty="0" smtClean="0"/>
-              <a:t>XXX</a:t>
-            </a:r>
-            <a:br>
-              <a:rPr lang="en-US" dirty="0" smtClean="0"/>
-            </a:br>
-            <a:r>
-              <a:rPr lang="en-US" dirty="0" err="1" smtClean="0"/>
-              <a:t>MovieLister</a:t>
-            </a:r>
-            <a:r>
-              <a:rPr lang="en-US" dirty="0" smtClean="0"/>
-              <a:t> example property injection</a:t>
-            </a:r>
-            <a:br>
-              <a:rPr lang="en-US" dirty="0" smtClean="0"/>
-            </a:br>
-            <a:r>
-              <a:rPr lang="en-US" dirty="0" smtClean="0"/>
-              <a:t>XXX</a:t>
-            </a:r>
-            <a:endParaRPr lang="en-US" dirty="0"/>
-          </a:p>
-        </p:txBody>
-      </p:sp>
-      <p:sp>
-        <p:nvSpPr>
           <p:cNvPr id="3" name="Title 1"/>
           <p:cNvSpPr txBox="1">
             <a:spLocks/>
@@ -9017,6 +8939,30 @@
           </a:p>
         </p:txBody>
       </p:sp>
+      <p:pic>
+        <p:nvPicPr>
+          <p:cNvPr id="5" name="PropertyInjection.cs.png" descr="/Users/fullerjc/Documents/presentations/dependencies/img/PropertyInjection.cs.png"/>
+          <p:cNvPicPr>
+            <a:picLocks noChangeAspect="1"/>
+          </p:cNvPicPr>
+          <p:nvPr/>
+        </p:nvPicPr>
+        <p:blipFill>
+          <a:blip r:embed="rId3" r:link="rId4"/>
+          <a:stretch>
+            <a:fillRect/>
+          </a:stretch>
+        </p:blipFill>
+        <p:spPr>
+          <a:xfrm>
+            <a:off x="1645666" y="340092"/>
+            <a:ext cx="5852668" cy="6177816"/>
+          </a:xfrm>
+          <a:prstGeom prst="rect">
+            <a:avLst/>
+          </a:prstGeom>
+        </p:spPr>
+      </p:pic>
     </p:spTree>
   </p:cSld>
   <p:clrMapOvr>
@@ -9044,54 +8990,6 @@
       </p:grpSpPr>
       <p:sp>
         <p:nvSpPr>
-          <p:cNvPr id="2" name="Title 1"/>
-          <p:cNvSpPr>
-            <a:spLocks noGrp="1"/>
-          </p:cNvSpPr>
-          <p:nvPr>
-            <p:ph type="title"/>
-          </p:nvPr>
-        </p:nvSpPr>
-        <p:spPr>
-          <a:xfrm>
-            <a:off x="457200" y="2667000"/>
-            <a:ext cx="8229600" cy="1143000"/>
-          </a:xfrm>
-        </p:spPr>
-        <p:txBody>
-          <a:bodyPr>
-            <a:normAutofit fontScale="90000"/>
-          </a:bodyPr>
-          <a:lstStyle/>
-          <a:p>
-            <a:r>
-              <a:rPr lang="en-US" dirty="0" smtClean="0"/>
-              <a:t>XXX</a:t>
-            </a:r>
-            <a:br>
-              <a:rPr lang="en-US" dirty="0" smtClean="0"/>
-            </a:br>
-            <a:r>
-              <a:rPr lang="en-US" dirty="0" err="1" smtClean="0"/>
-              <a:t>MovieLister</a:t>
-            </a:r>
-            <a:r>
-              <a:rPr lang="en-US" dirty="0" smtClean="0"/>
-              <a:t> example Constructor Injection</a:t>
-            </a:r>
-            <a:br>
-              <a:rPr lang="en-US" dirty="0" smtClean="0"/>
-            </a:br>
-            <a:r>
-              <a:rPr lang="en-US" dirty="0" smtClean="0"/>
-              <a:t>XXX</a:t>
-            </a:r>
-            <a:endParaRPr lang="en-US" dirty="0"/>
-          </a:p>
-        </p:txBody>
-      </p:sp>
-      <p:sp>
-        <p:nvSpPr>
           <p:cNvPr id="3" name="Title 1"/>
           <p:cNvSpPr txBox="1">
             <a:spLocks/>
@@ -9153,6 +9051,30 @@
           </a:p>
         </p:txBody>
       </p:sp>
+      <p:pic>
+        <p:nvPicPr>
+          <p:cNvPr id="5" name="ConstructorInjection.cs.png" descr="/Users/fullerjc/Documents/presentations/dependencies/img/ConstructorInjection.cs.png"/>
+          <p:cNvPicPr>
+            <a:picLocks noChangeAspect="1"/>
+          </p:cNvPicPr>
+          <p:nvPr/>
+        </p:nvPicPr>
+        <p:blipFill>
+          <a:blip r:embed="rId3" r:link="rId4"/>
+          <a:stretch>
+            <a:fillRect/>
+          </a:stretch>
+        </p:blipFill>
+        <p:spPr>
+          <a:xfrm>
+            <a:off x="1645666" y="1051354"/>
+            <a:ext cx="5852668" cy="4755292"/>
+          </a:xfrm>
+          <a:prstGeom prst="rect">
+            <a:avLst/>
+          </a:prstGeom>
+        </p:spPr>
+      </p:pic>
     </p:spTree>
   </p:cSld>
   <p:clrMapOvr>

</xml_diff>

<commit_message>
updated images after changing line height
</commit_message>
<xml_diff>
--- a/dependencies/dependencies.pptx
+++ b/dependencies/dependencies.pptx
@@ -225,7 +225,7 @@
             <a:fld id="{25FF3015-ADE1-B94E-A2C3-338B0764DC65}" type="datetimeFigureOut">
               <a:rPr lang="en-US" smtClean="0"/>
               <a:pPr/>
-              <a:t>3/15/10</a:t>
+              <a:t>3/16/10</a:t>
             </a:fld>
             <a:endParaRPr lang="en-US"/>
           </a:p>
@@ -3385,7 +3385,7 @@
             <a:fld id="{AEDC4D7B-6231-8E46-9EA9-2210599D057D}" type="datetimeFigureOut">
               <a:rPr lang="en-US" smtClean="0"/>
               <a:pPr/>
-              <a:t>3/15/10</a:t>
+              <a:t>3/16/10</a:t>
             </a:fld>
             <a:endParaRPr lang="en-US"/>
           </a:p>
@@ -3552,7 +3552,7 @@
             <a:fld id="{AEDC4D7B-6231-8E46-9EA9-2210599D057D}" type="datetimeFigureOut">
               <a:rPr lang="en-US" smtClean="0"/>
               <a:pPr/>
-              <a:t>3/15/10</a:t>
+              <a:t>3/16/10</a:t>
             </a:fld>
             <a:endParaRPr lang="en-US"/>
           </a:p>
@@ -3729,7 +3729,7 @@
             <a:fld id="{AEDC4D7B-6231-8E46-9EA9-2210599D057D}" type="datetimeFigureOut">
               <a:rPr lang="en-US" smtClean="0"/>
               <a:pPr/>
-              <a:t>3/15/10</a:t>
+              <a:t>3/16/10</a:t>
             </a:fld>
             <a:endParaRPr lang="en-US"/>
           </a:p>
@@ -3896,7 +3896,7 @@
             <a:fld id="{AEDC4D7B-6231-8E46-9EA9-2210599D057D}" type="datetimeFigureOut">
               <a:rPr lang="en-US" smtClean="0"/>
               <a:pPr/>
-              <a:t>3/15/10</a:t>
+              <a:t>3/16/10</a:t>
             </a:fld>
             <a:endParaRPr lang="en-US"/>
           </a:p>
@@ -4139,7 +4139,7 @@
             <a:fld id="{AEDC4D7B-6231-8E46-9EA9-2210599D057D}" type="datetimeFigureOut">
               <a:rPr lang="en-US" smtClean="0"/>
               <a:pPr/>
-              <a:t>3/15/10</a:t>
+              <a:t>3/16/10</a:t>
             </a:fld>
             <a:endParaRPr lang="en-US"/>
           </a:p>
@@ -4424,7 +4424,7 @@
             <a:fld id="{AEDC4D7B-6231-8E46-9EA9-2210599D057D}" type="datetimeFigureOut">
               <a:rPr lang="en-US" smtClean="0"/>
               <a:pPr/>
-              <a:t>3/15/10</a:t>
+              <a:t>3/16/10</a:t>
             </a:fld>
             <a:endParaRPr lang="en-US"/>
           </a:p>
@@ -4843,7 +4843,7 @@
             <a:fld id="{AEDC4D7B-6231-8E46-9EA9-2210599D057D}" type="datetimeFigureOut">
               <a:rPr lang="en-US" smtClean="0"/>
               <a:pPr/>
-              <a:t>3/15/10</a:t>
+              <a:t>3/16/10</a:t>
             </a:fld>
             <a:endParaRPr lang="en-US"/>
           </a:p>
@@ -4958,7 +4958,7 @@
             <a:fld id="{AEDC4D7B-6231-8E46-9EA9-2210599D057D}" type="datetimeFigureOut">
               <a:rPr lang="en-US" smtClean="0"/>
               <a:pPr/>
-              <a:t>3/15/10</a:t>
+              <a:t>3/16/10</a:t>
             </a:fld>
             <a:endParaRPr lang="en-US"/>
           </a:p>
@@ -5050,7 +5050,7 @@
             <a:fld id="{AEDC4D7B-6231-8E46-9EA9-2210599D057D}" type="datetimeFigureOut">
               <a:rPr lang="en-US" smtClean="0"/>
               <a:pPr/>
-              <a:t>3/15/10</a:t>
+              <a:t>3/16/10</a:t>
             </a:fld>
             <a:endParaRPr lang="en-US"/>
           </a:p>
@@ -5324,7 +5324,7 @@
             <a:fld id="{AEDC4D7B-6231-8E46-9EA9-2210599D057D}" type="datetimeFigureOut">
               <a:rPr lang="en-US" smtClean="0"/>
               <a:pPr/>
-              <a:t>3/15/10</a:t>
+              <a:t>3/16/10</a:t>
             </a:fld>
             <a:endParaRPr lang="en-US"/>
           </a:p>
@@ -5574,7 +5574,7 @@
             <a:fld id="{AEDC4D7B-6231-8E46-9EA9-2210599D057D}" type="datetimeFigureOut">
               <a:rPr lang="en-US" smtClean="0"/>
               <a:pPr/>
-              <a:t>3/15/10</a:t>
+              <a:t>3/16/10</a:t>
             </a:fld>
             <a:endParaRPr lang="en-US"/>
           </a:p>
@@ -5784,7 +5784,7 @@
             <a:fld id="{AEDC4D7B-6231-8E46-9EA9-2210599D057D}" type="datetimeFigureOut">
               <a:rPr lang="en-US" smtClean="0"/>
               <a:pPr/>
-              <a:t>3/15/10</a:t>
+              <a:t>3/16/10</a:t>
             </a:fld>
             <a:endParaRPr lang="en-US"/>
           </a:p>
@@ -8441,7 +8441,7 @@
       </p:sp>
       <p:pic>
         <p:nvPicPr>
-          <p:cNvPr id="6" name="ServiceLocator.cs.png" descr="/Users/fullerjc/Documents/presentations/dependencies/img/ServiceLocator.cs.png"/>
+          <p:cNvPr id="4" name="ServiceLocator.cs.png" descr="/Users/fullerjc/Documents/presentations/dependencies/img/ServiceLocator.cs.png"/>
           <p:cNvPicPr>
             <a:picLocks noChangeAspect="1"/>
           </p:cNvPicPr>
@@ -8455,8 +8455,8 @@
         </p:blipFill>
         <p:spPr>
           <a:xfrm>
-            <a:off x="1645666" y="1051354"/>
-            <a:ext cx="5852668" cy="4755292"/>
+            <a:off x="670221" y="1864224"/>
+            <a:ext cx="7803557" cy="3129551"/>
           </a:xfrm>
           <a:prstGeom prst="rect">
             <a:avLst/>
@@ -8683,7 +8683,7 @@
       </p:sp>
       <p:pic>
         <p:nvPicPr>
-          <p:cNvPr id="5" name="NoInjection.cs.png" descr="/Users/fullerjc/Documents/presentations/dependencies/img/NoInjection.cs.png"/>
+          <p:cNvPr id="4" name="NoInjection.cs.png" descr="/Users/fullerjc/Documents/presentations/dependencies/img/NoInjection.cs.png"/>
           <p:cNvPicPr>
             <a:picLocks noChangeAspect="1"/>
           </p:cNvPicPr>
@@ -8697,8 +8697,8 @@
         </p:blipFill>
         <p:spPr>
           <a:xfrm>
-            <a:off x="1645666" y="1051354"/>
-            <a:ext cx="5852668" cy="4755292"/>
+            <a:off x="670221" y="1864224"/>
+            <a:ext cx="7803557" cy="3129551"/>
           </a:xfrm>
           <a:prstGeom prst="rect">
             <a:avLst/>
@@ -8941,7 +8941,7 @@
       </p:sp>
       <p:pic>
         <p:nvPicPr>
-          <p:cNvPr id="5" name="PropertyInjection.cs.png" descr="/Users/fullerjc/Documents/presentations/dependencies/img/PropertyInjection.cs.png"/>
+          <p:cNvPr id="4" name="PropertyInjection.cs.png" descr="/Users/fullerjc/Documents/presentations/dependencies/img/PropertyInjection.cs.png"/>
           <p:cNvPicPr>
             <a:picLocks noChangeAspect="1"/>
           </p:cNvPicPr>
@@ -8955,8 +8955,8 @@
         </p:blipFill>
         <p:spPr>
           <a:xfrm>
-            <a:off x="1645666" y="340092"/>
-            <a:ext cx="5852668" cy="6177816"/>
+            <a:off x="670221" y="1406984"/>
+            <a:ext cx="7803557" cy="4044031"/>
           </a:xfrm>
           <a:prstGeom prst="rect">
             <a:avLst/>
@@ -9053,7 +9053,7 @@
       </p:sp>
       <p:pic>
         <p:nvPicPr>
-          <p:cNvPr id="5" name="ConstructorInjection.cs.png" descr="/Users/fullerjc/Documents/presentations/dependencies/img/ConstructorInjection.cs.png"/>
+          <p:cNvPr id="4" name="ConstructorInjection.cs.png" descr="/Users/fullerjc/Documents/presentations/dependencies/img/ConstructorInjection.cs.png"/>
           <p:cNvPicPr>
             <a:picLocks noChangeAspect="1"/>
           </p:cNvPicPr>
@@ -9067,8 +9067,8 @@
         </p:blipFill>
         <p:spPr>
           <a:xfrm>
-            <a:off x="1645666" y="1051354"/>
-            <a:ext cx="5852668" cy="4755292"/>
+            <a:off x="670221" y="1864224"/>
+            <a:ext cx="7803557" cy="3129551"/>
           </a:xfrm>
           <a:prstGeom prst="rect">
             <a:avLst/>
@@ -9649,11 +9649,7 @@
           <a:p>
             <a:r>
               <a:rPr lang="en-US" dirty="0" smtClean="0"/>
-              <a:t>free </a:t>
-            </a:r>
-            <a:r>
-              <a:rPr lang="en-US" dirty="0" smtClean="0"/>
-              <a:t>your mind</a:t>
+              <a:t>free your mind</a:t>
             </a:r>
             <a:endParaRPr lang="en-US" dirty="0"/>
           </a:p>

</xml_diff>

<commit_message>
finished last slides... added pdf output as well
</commit_message>
<xml_diff>
--- a/dependencies/dependencies.pptx
+++ b/dependencies/dependencies.pptx
@@ -5,7 +5,7 @@
     <p:sldMasterId id="2147483648" r:id="rId1"/>
   </p:sldMasterIdLst>
   <p:notesMasterIdLst>
-    <p:notesMasterId r:id="rId35"/>
+    <p:notesMasterId r:id="rId40"/>
   </p:notesMasterIdLst>
   <p:sldIdLst>
     <p:sldId id="256" r:id="rId2"/>
@@ -41,6 +41,11 @@
     <p:sldId id="287" r:id="rId32"/>
     <p:sldId id="288" r:id="rId33"/>
     <p:sldId id="290" r:id="rId34"/>
+    <p:sldId id="291" r:id="rId35"/>
+    <p:sldId id="292" r:id="rId36"/>
+    <p:sldId id="293" r:id="rId37"/>
+    <p:sldId id="295" r:id="rId38"/>
+    <p:sldId id="296" r:id="rId39"/>
   </p:sldIdLst>
   <p:sldSz cx="9144000" cy="6858000" type="screen4x3"/>
   <p:notesSz cx="6858000" cy="9144000"/>
@@ -990,7 +995,7 @@
           <a:p>
             <a:r>
               <a:rPr lang="en-US" dirty="0" smtClean="0"/>
-              <a:t>Java guys like to do it this way</a:t>
+              <a:t>no injection</a:t>
             </a:r>
             <a:endParaRPr lang="en-US" dirty="0"/>
           </a:p>
@@ -1014,7 +1019,7 @@
             <a:fld id="{F5395209-E063-144C-8968-CAA31F3D1B83}" type="slidenum">
               <a:rPr lang="en-US" smtClean="0"/>
               <a:pPr/>
-              <a:t>20</a:t>
+              <a:t>19</a:t>
             </a:fld>
             <a:endParaRPr lang="en-US"/>
           </a:p>
@@ -1076,17 +1081,13 @@
           <a:p>
             <a:r>
               <a:rPr lang="en-US" dirty="0" smtClean="0"/>
-              <a:t>.NET guys</a:t>
-            </a:r>
-            <a:r>
-              <a:rPr lang="en-US" baseline="0" dirty="0" smtClean="0"/>
-              <a:t> (myself included) like to do it this way.</a:t>
-            </a:r>
-          </a:p>
-          <a:p>
-            <a:r>
-              <a:rPr lang="en-US" baseline="0" dirty="0" smtClean="0"/>
-              <a:t>You can see now, how the dependencies are explicitly stated up front, when the class gets created.</a:t>
+              <a:t>property injection</a:t>
+            </a:r>
+          </a:p>
+          <a:p>
+            <a:r>
+              <a:rPr lang="en-US" dirty="0" smtClean="0"/>
+              <a:t>Java guys like to do it this way</a:t>
             </a:r>
             <a:endParaRPr lang="en-US" dirty="0"/>
           </a:p>
@@ -1110,7 +1111,7 @@
             <a:fld id="{F5395209-E063-144C-8968-CAA31F3D1B83}" type="slidenum">
               <a:rPr lang="en-US" smtClean="0"/>
               <a:pPr/>
-              <a:t>21</a:t>
+              <a:t>20</a:t>
             </a:fld>
             <a:endParaRPr lang="en-US"/>
           </a:p>
@@ -1172,24 +1173,25 @@
           <a:p>
             <a:r>
               <a:rPr lang="en-US" dirty="0" smtClean="0"/>
-              <a:t>Poor Man’s DI is:</a:t>
+              <a:t>constructor injection</a:t>
             </a:r>
           </a:p>
           <a:p>
             <a:r>
               <a:rPr lang="en-US" dirty="0" smtClean="0"/>
-              <a:t>Easy</a:t>
+              <a:t>.NET guys</a:t>
             </a:r>
             <a:r>
               <a:rPr lang="en-US" baseline="0" dirty="0" smtClean="0"/>
-              <a:t> to understand</a:t>
+              <a:t> (myself included) like to do it this way.</a:t>
             </a:r>
           </a:p>
           <a:p>
             <a:r>
               <a:rPr lang="en-US" baseline="0" dirty="0" smtClean="0"/>
-              <a:t>Low barrier to entry way to start doing DI.</a:t>
-            </a:r>
+              <a:t>You can see now, how the dependencies are explicitly stated up front, when the class gets created.</a:t>
+            </a:r>
+            <a:endParaRPr lang="en-US" dirty="0"/>
           </a:p>
         </p:txBody>
       </p:sp>
@@ -1211,7 +1213,7 @@
             <a:fld id="{F5395209-E063-144C-8968-CAA31F3D1B83}" type="slidenum">
               <a:rPr lang="en-US" smtClean="0"/>
               <a:pPr/>
-              <a:t>22</a:t>
+              <a:t>21</a:t>
             </a:fld>
             <a:endParaRPr lang="en-US"/>
           </a:p>
@@ -1271,45 +1273,26 @@
           </a:bodyPr>
           <a:lstStyle/>
           <a:p>
-            <a:pPr marL="0" marR="0" indent="0" algn="l" defTabSz="457200" rtl="0" eaLnBrk="1" fontAlgn="auto" latinLnBrk="0" hangingPunct="1">
-              <a:lnSpc>
-                <a:spcPct val="100000"/>
-              </a:lnSpc>
-              <a:spcBef>
-                <a:spcPts val="0"/>
-              </a:spcBef>
-              <a:spcAft>
-                <a:spcPts val="0"/>
-              </a:spcAft>
-              <a:buClrTx/>
-              <a:buSzTx/>
-              <a:buFontTx/>
-              <a:buNone/>
-              <a:tabLst/>
-              <a:defRPr/>
-            </a:pPr>
+            <a:r>
+              <a:rPr lang="en-US" dirty="0" smtClean="0"/>
+              <a:t>Poor Man’s DI is:</a:t>
+            </a:r>
+          </a:p>
+          <a:p>
+            <a:r>
+              <a:rPr lang="en-US" dirty="0" smtClean="0"/>
+              <a:t>Easy</a:t>
+            </a:r>
             <a:r>
               <a:rPr lang="en-US" baseline="0" dirty="0" smtClean="0"/>
-              <a:t>You can use one version during test (the DI version, so you can mock things) and use another version in production code.</a:t>
-            </a:r>
-            <a:endParaRPr lang="en-US" dirty="0" smtClean="0"/>
-          </a:p>
-          <a:p>
-            <a:r>
-              <a:rPr lang="en-US" dirty="0" smtClean="0"/>
-              <a:t>There may be legitimate</a:t>
-            </a:r>
+              <a:t> to understand</a:t>
+            </a:r>
+          </a:p>
+          <a:p>
             <a:r>
               <a:rPr lang="en-US" baseline="0" dirty="0" smtClean="0"/>
-              <a:t> reasons for doing this, but I can’t think of any…</a:t>
-            </a:r>
-          </a:p>
-          <a:p>
-            <a:r>
-              <a:rPr lang="en-US" baseline="0" dirty="0" smtClean="0"/>
-              <a:t>In the long run, you’ll be better off to have just went without it, and went with a framework/tool instead.</a:t>
-            </a:r>
-            <a:endParaRPr lang="en-US" dirty="0"/>
+              <a:t>Low barrier to entry way to start doing DI.</a:t>
+            </a:r>
           </a:p>
         </p:txBody>
       </p:sp>
@@ -1331,7 +1314,7 @@
             <a:fld id="{F5395209-E063-144C-8968-CAA31F3D1B83}" type="slidenum">
               <a:rPr lang="en-US" smtClean="0"/>
               <a:pPr/>
-              <a:t>23</a:t>
+              <a:t>22</a:t>
             </a:fld>
             <a:endParaRPr lang="en-US"/>
           </a:p>
@@ -1391,55 +1374,66 @@
           </a:bodyPr>
           <a:lstStyle/>
           <a:p>
+            <a:pPr marL="0" marR="0" indent="0" algn="l" defTabSz="457200" rtl="0" eaLnBrk="1" fontAlgn="auto" latinLnBrk="0" hangingPunct="1">
+              <a:lnSpc>
+                <a:spcPct val="100000"/>
+              </a:lnSpc>
+              <a:spcBef>
+                <a:spcPts val="0"/>
+              </a:spcBef>
+              <a:spcAft>
+                <a:spcPts val="0"/>
+              </a:spcAft>
+              <a:buClrTx/>
+              <a:buSzTx/>
+              <a:buFontTx/>
+              <a:buNone/>
+              <a:tabLst/>
+              <a:defRPr/>
+            </a:pPr>
+            <a:r>
+              <a:rPr lang="en-US" baseline="0" dirty="0" smtClean="0"/>
+              <a:t>PMDI</a:t>
+            </a:r>
+          </a:p>
+          <a:p>
+            <a:pPr marL="0" marR="0" indent="0" algn="l" defTabSz="457200" rtl="0" eaLnBrk="1" fontAlgn="auto" latinLnBrk="0" hangingPunct="1">
+              <a:lnSpc>
+                <a:spcPct val="100000"/>
+              </a:lnSpc>
+              <a:spcBef>
+                <a:spcPts val="0"/>
+              </a:spcBef>
+              <a:spcAft>
+                <a:spcPts val="0"/>
+              </a:spcAft>
+              <a:buClrTx/>
+              <a:buSzTx/>
+              <a:buFontTx/>
+              <a:buNone/>
+              <a:tabLst/>
+              <a:defRPr/>
+            </a:pPr>
+            <a:r>
+              <a:rPr lang="en-US" baseline="0" dirty="0" smtClean="0"/>
+              <a:t>You can use one version during test (the DI version, so you can mock things) and use another version in production code.</a:t>
+            </a:r>
+            <a:endParaRPr lang="en-US" dirty="0" smtClean="0"/>
+          </a:p>
+          <a:p>
             <a:r>
               <a:rPr lang="en-US" dirty="0" smtClean="0"/>
-              <a:t>so I originally stated this was</a:t>
+              <a:t>There may be legitimate</a:t>
             </a:r>
             <a:r>
               <a:rPr lang="en-US" baseline="0" dirty="0" smtClean="0"/>
-              <a:t> all in the name of simplicity…</a:t>
+              <a:t> reasons for doing this, but I can’t think of any…</a:t>
             </a:r>
           </a:p>
           <a:p>
             <a:r>
               <a:rPr lang="en-US" baseline="0" dirty="0" smtClean="0"/>
-              <a:t>does it feel like we’ve gotten simpler?</a:t>
-            </a:r>
-          </a:p>
-          <a:p>
-            <a:r>
-              <a:rPr lang="en-US" baseline="0" dirty="0" smtClean="0"/>
-              <a:t>doesn’t really to me.</a:t>
-            </a:r>
-          </a:p>
-          <a:p>
-            <a:r>
-              <a:rPr lang="en-US" baseline="0" dirty="0" smtClean="0"/>
-              <a:t>we’ve created some abstractions (which, arguably, make our system more difficult to understand)</a:t>
-            </a:r>
-          </a:p>
-          <a:p>
-            <a:r>
-              <a:rPr lang="en-US" baseline="0" dirty="0" smtClean="0"/>
-              <a:t>and we’re manually wiring some of these things together.</a:t>
-            </a:r>
-          </a:p>
-          <a:p>
-            <a:r>
-              <a:rPr lang="en-US" baseline="0" dirty="0" smtClean="0"/>
-              <a:t>How, if we don’t do PMDI or service location are our dependencies going to find each other?</a:t>
-            </a:r>
-          </a:p>
-          <a:p>
-            <a:r>
-              <a:rPr lang="en-US" baseline="0" dirty="0" smtClean="0"/>
-              <a:t>Seems like we’ve just relegated ourselves to instantiating our dependencies one level higher, and then passing them down.</a:t>
-            </a:r>
-          </a:p>
-          <a:p>
-            <a:r>
-              <a:rPr lang="en-US" baseline="0" dirty="0" smtClean="0"/>
-              <a:t>That does NOT sound like simplicity.  Sounds like the same set of problems, just worse.</a:t>
+              <a:t>In the long run, you’ll be better off to have just went without it, and went with a framework/tool instead.</a:t>
             </a:r>
             <a:endParaRPr lang="en-US" dirty="0"/>
           </a:p>
@@ -1463,7 +1457,7 @@
             <a:fld id="{F5395209-E063-144C-8968-CAA31F3D1B83}" type="slidenum">
               <a:rPr lang="en-US" smtClean="0"/>
               <a:pPr/>
-              <a:t>24</a:t>
+              <a:t>23</a:t>
             </a:fld>
             <a:endParaRPr lang="en-US"/>
           </a:p>
@@ -1525,53 +1519,53 @@
           <a:p>
             <a:r>
               <a:rPr lang="en-US" dirty="0" smtClean="0"/>
-              <a:t>Alright, here’s where this starts to get good.</a:t>
-            </a:r>
-          </a:p>
-          <a:p>
-            <a:r>
-              <a:rPr lang="en-US" dirty="0" smtClean="0"/>
-              <a:t>The idea behind the general</a:t>
+              <a:t>so I originally stated this was</a:t>
             </a:r>
             <a:r>
               <a:rPr lang="en-US" baseline="0" dirty="0" smtClean="0"/>
-              <a:t> term is to give control to someone else.  A framework, person, process, etc.</a:t>
+              <a:t> all in the name of simplicity…</a:t>
             </a:r>
           </a:p>
           <a:p>
             <a:r>
               <a:rPr lang="en-US" baseline="0" dirty="0" smtClean="0"/>
-              <a:t>Things like </a:t>
-            </a:r>
-            <a:r>
-              <a:rPr lang="en-US" baseline="0" dirty="0" err="1" smtClean="0"/>
-              <a:t>RoR</a:t>
-            </a:r>
+              <a:t>does it feel like we’ve gotten simpler?</a:t>
+            </a:r>
+          </a:p>
+          <a:p>
             <a:r>
               <a:rPr lang="en-US" baseline="0" dirty="0" smtClean="0"/>
-              <a:t>, WPF, </a:t>
-            </a:r>
-            <a:r>
-              <a:rPr lang="en-US" baseline="0" dirty="0" err="1" smtClean="0"/>
-              <a:t>Nunit</a:t>
-            </a:r>
+              <a:t>doesn’t really to me.</a:t>
+            </a:r>
+          </a:p>
+          <a:p>
             <a:r>
               <a:rPr lang="en-US" baseline="0" dirty="0" smtClean="0"/>
-              <a:t> are all instances of where you’ve given up control and let someone/something else do the work for you.</a:t>
+              <a:t>we’ve created some abstractions (which, arguably, make our system more difficult to understand)</a:t>
             </a:r>
           </a:p>
           <a:p>
             <a:r>
               <a:rPr lang="en-US" baseline="0" dirty="0" smtClean="0"/>
-              <a:t>An </a:t>
-            </a:r>
-            <a:r>
-              <a:rPr lang="en-US" baseline="0" dirty="0" err="1" smtClean="0"/>
-              <a:t>IoC</a:t>
-            </a:r>
+              <a:t>and we’re manually wiring some of these things together.</a:t>
+            </a:r>
+          </a:p>
+          <a:p>
             <a:r>
               <a:rPr lang="en-US" baseline="0" dirty="0" smtClean="0"/>
-              <a:t> container is one other instance of this.</a:t>
+              <a:t>How, if we don’t do PMDI or service location are our dependencies going to find each other?</a:t>
+            </a:r>
+          </a:p>
+          <a:p>
+            <a:r>
+              <a:rPr lang="en-US" baseline="0" dirty="0" smtClean="0"/>
+              <a:t>Seems like we’ve just relegated ourselves to instantiating our dependencies one level higher, and then passing them down.</a:t>
+            </a:r>
+          </a:p>
+          <a:p>
+            <a:r>
+              <a:rPr lang="en-US" baseline="0" dirty="0" smtClean="0"/>
+              <a:t>That does NOT sound like simplicity.  Sounds like the same set of problems, just worse.</a:t>
             </a:r>
             <a:endParaRPr lang="en-US" dirty="0"/>
           </a:p>
@@ -1595,7 +1589,7 @@
             <a:fld id="{F5395209-E063-144C-8968-CAA31F3D1B83}" type="slidenum">
               <a:rPr lang="en-US" smtClean="0"/>
               <a:pPr/>
-              <a:t>25</a:t>
+              <a:t>24</a:t>
             </a:fld>
             <a:endParaRPr lang="en-US"/>
           </a:p>
@@ -1657,47 +1651,53 @@
           <a:p>
             <a:r>
               <a:rPr lang="en-US" dirty="0" smtClean="0"/>
-              <a:t>What this allows</a:t>
+              <a:t>Alright, here’s where this starts to get good.</a:t>
+            </a:r>
+          </a:p>
+          <a:p>
+            <a:r>
+              <a:rPr lang="en-US" dirty="0" smtClean="0"/>
+              <a:t>The idea behind the general</a:t>
             </a:r>
             <a:r>
               <a:rPr lang="en-US" baseline="0" dirty="0" smtClean="0"/>
-              <a:t> us to do is be declarative… specify what, not how.</a:t>
+              <a:t> term is to give control to someone else.  A framework, person, process, etc.</a:t>
             </a:r>
           </a:p>
           <a:p>
             <a:r>
               <a:rPr lang="en-US" baseline="0" dirty="0" smtClean="0"/>
-              <a:t>WPF allows you to declare your UI and how it interacts with its data.</a:t>
-            </a:r>
-          </a:p>
-          <a:p>
+              <a:t>Things like </a:t>
+            </a:r>
             <a:r>
               <a:rPr lang="en-US" baseline="0" dirty="0" err="1" smtClean="0"/>
               <a:t>RoR</a:t>
             </a:r>
             <a:r>
               <a:rPr lang="en-US" baseline="0" dirty="0" smtClean="0"/>
-              <a:t> allows you to declaratively define your routes and URL structure.</a:t>
-            </a:r>
-          </a:p>
-          <a:p>
+              <a:t>, WPF, </a:t>
+            </a:r>
+            <a:r>
+              <a:rPr lang="en-US" baseline="0" dirty="0" err="1" smtClean="0"/>
+              <a:t>Nunit</a:t>
+            </a:r>
             <a:r>
               <a:rPr lang="en-US" baseline="0" dirty="0" smtClean="0"/>
-              <a:t>This correlates to the </a:t>
+              <a:t> are all instances of where you’ve given up control and let someone/something else do the work for you.</a:t>
+            </a:r>
+          </a:p>
+          <a:p>
+            <a:r>
+              <a:rPr lang="en-US" baseline="0" dirty="0" smtClean="0"/>
+              <a:t>An </a:t>
             </a:r>
             <a:r>
               <a:rPr lang="en-US" baseline="0" dirty="0" err="1" smtClean="0"/>
-              <a:t>hollywood</a:t>
+              <a:t>IoC</a:t>
             </a:r>
             <a:r>
               <a:rPr lang="en-US" baseline="0" dirty="0" smtClean="0"/>
-              <a:t> principle.  Don’t Call Us, We’ll Call you.</a:t>
-            </a:r>
-          </a:p>
-          <a:p>
-            <a:r>
-              <a:rPr lang="en-US" baseline="0" dirty="0" smtClean="0"/>
-              <a:t>You place hooks into the process, and when it’s time, your hooks will be called.</a:t>
+              <a:t> container is one other instance of this.</a:t>
             </a:r>
             <a:endParaRPr lang="en-US" dirty="0"/>
           </a:p>
@@ -1721,7 +1721,7 @@
             <a:fld id="{F5395209-E063-144C-8968-CAA31F3D1B83}" type="slidenum">
               <a:rPr lang="en-US" smtClean="0"/>
               <a:pPr/>
-              <a:t>26</a:t>
+              <a:t>25</a:t>
             </a:fld>
             <a:endParaRPr lang="en-US"/>
           </a:p>
@@ -1872,17 +1872,47 @@
           <a:p>
             <a:r>
               <a:rPr lang="en-US" dirty="0" smtClean="0"/>
-              <a:t>The container is simply</a:t>
+              <a:t>What this allows</a:t>
             </a:r>
             <a:r>
               <a:rPr lang="en-US" baseline="0" dirty="0" smtClean="0"/>
-              <a:t> that.  In its most basic form it’s basically a mapping between interfaces and concrete implementations.</a:t>
+              <a:t> us to do is be declarative… specify what, not how.</a:t>
             </a:r>
           </a:p>
           <a:p>
             <a:r>
               <a:rPr lang="en-US" baseline="0" dirty="0" smtClean="0"/>
-              <a:t>We’ll see soon though, that it’s much more than that.</a:t>
+              <a:t>WPF allows you to declare your UI and how it interacts with its data.</a:t>
+            </a:r>
+          </a:p>
+          <a:p>
+            <a:r>
+              <a:rPr lang="en-US" baseline="0" dirty="0" err="1" smtClean="0"/>
+              <a:t>RoR</a:t>
+            </a:r>
+            <a:r>
+              <a:rPr lang="en-US" baseline="0" dirty="0" smtClean="0"/>
+              <a:t> allows you to declaratively define your routes and URL structure.</a:t>
+            </a:r>
+          </a:p>
+          <a:p>
+            <a:r>
+              <a:rPr lang="en-US" baseline="0" dirty="0" smtClean="0"/>
+              <a:t>This correlates to the </a:t>
+            </a:r>
+            <a:r>
+              <a:rPr lang="en-US" baseline="0" dirty="0" err="1" smtClean="0"/>
+              <a:t>hollywood</a:t>
+            </a:r>
+            <a:r>
+              <a:rPr lang="en-US" baseline="0" dirty="0" smtClean="0"/>
+              <a:t> principle.  Don’t Call Us, We’ll Call you.</a:t>
+            </a:r>
+          </a:p>
+          <a:p>
+            <a:r>
+              <a:rPr lang="en-US" baseline="0" dirty="0" smtClean="0"/>
+              <a:t>You place hooks into the process, and when it’s time, your hooks will be called.</a:t>
             </a:r>
             <a:endParaRPr lang="en-US" dirty="0"/>
           </a:p>
@@ -1906,7 +1936,7 @@
             <a:fld id="{F5395209-E063-144C-8968-CAA31F3D1B83}" type="slidenum">
               <a:rPr lang="en-US" smtClean="0"/>
               <a:pPr/>
-              <a:t>27</a:t>
+              <a:t>26</a:t>
             </a:fld>
             <a:endParaRPr lang="en-US"/>
           </a:p>
@@ -1968,17 +1998,17 @@
           <a:p>
             <a:r>
               <a:rPr lang="en-US" dirty="0" smtClean="0"/>
-              <a:t>what if I told you that you didn’t have to worry about your dependencies much at all?  simply declare your dependencies in your constructors, and you get them for free,</a:t>
+              <a:t>The container is simply</a:t>
             </a:r>
             <a:r>
               <a:rPr lang="en-US" baseline="0" dirty="0" smtClean="0"/>
-              <a:t> whenever you need them.  Sound like magic?  not really.</a:t>
+              <a:t> that.  In its most basic form it’s basically a mapping between interfaces and concrete implementations.</a:t>
             </a:r>
           </a:p>
           <a:p>
             <a:r>
               <a:rPr lang="en-US" baseline="0" dirty="0" smtClean="0"/>
-              <a:t>There is some well defined Reflection Kung-Fu going on, but nothing you or I couldn’t do given time.  However, I don’t want to spend my time or my employer’s time working on this infrastructure stuff.  So we’ll just use an existing container.</a:t>
+              <a:t>We’ll see soon though, that it’s much more than that.</a:t>
             </a:r>
             <a:endParaRPr lang="en-US" dirty="0"/>
           </a:p>
@@ -2002,7 +2032,7 @@
             <a:fld id="{F5395209-E063-144C-8968-CAA31F3D1B83}" type="slidenum">
               <a:rPr lang="en-US" smtClean="0"/>
               <a:pPr/>
-              <a:t>28</a:t>
+              <a:t>27</a:t>
             </a:fld>
             <a:endParaRPr lang="en-US"/>
           </a:p>
@@ -2064,13 +2094,17 @@
           <a:p>
             <a:r>
               <a:rPr lang="en-US" dirty="0" smtClean="0"/>
-              <a:t>Back to the manual DI example.</a:t>
-            </a:r>
-          </a:p>
-          <a:p>
-            <a:r>
-              <a:rPr lang="en-US" dirty="0" smtClean="0"/>
-              <a:t>So here, we can see the dependency is manually injected.</a:t>
+              <a:t>what if I told you that you didn’t have to worry about your dependencies much at all?  simply declare your dependencies in your constructors, and you get them for free,</a:t>
+            </a:r>
+            <a:r>
+              <a:rPr lang="en-US" baseline="0" dirty="0" smtClean="0"/>
+              <a:t> whenever you need them.  Sound like magic?  not really.</a:t>
+            </a:r>
+          </a:p>
+          <a:p>
+            <a:r>
+              <a:rPr lang="en-US" baseline="0" dirty="0" smtClean="0"/>
+              <a:t>There is some well defined Reflection Kung-Fu going on, but nothing you or I couldn’t do given time.  However, I don’t want to spend my time or my employer’s time working on this infrastructure stuff.  So we’ll just use an existing container.</a:t>
             </a:r>
             <a:endParaRPr lang="en-US" dirty="0"/>
           </a:p>
@@ -2094,7 +2128,7 @@
             <a:fld id="{F5395209-E063-144C-8968-CAA31F3D1B83}" type="slidenum">
               <a:rPr lang="en-US" smtClean="0"/>
               <a:pPr/>
-              <a:t>29</a:t>
+              <a:t>28</a:t>
             </a:fld>
             <a:endParaRPr lang="en-US"/>
           </a:p>
@@ -2156,39 +2190,15 @@
           <a:p>
             <a:r>
               <a:rPr lang="en-US" dirty="0" smtClean="0"/>
-              <a:t>Here’s an example using a container.</a:t>
+              <a:t>Back to the manual DI example.</a:t>
             </a:r>
           </a:p>
           <a:p>
             <a:r>
               <a:rPr lang="en-US" dirty="0" smtClean="0"/>
-              <a:t>Sort</a:t>
-            </a:r>
-            <a:r>
-              <a:rPr lang="en-US" baseline="0" dirty="0" smtClean="0"/>
-              <a:t> of looks like </a:t>
-            </a:r>
-            <a:r>
-              <a:rPr lang="en-US" baseline="0" dirty="0" err="1" smtClean="0"/>
-              <a:t>ServiceLocation</a:t>
-            </a:r>
-            <a:r>
-              <a:rPr lang="en-US" baseline="0" dirty="0" smtClean="0"/>
-              <a:t>?</a:t>
-            </a:r>
-          </a:p>
-          <a:p>
-            <a:r>
-              <a:rPr lang="en-US" baseline="0" dirty="0" smtClean="0"/>
-              <a:t>It sort of is, but with the power of a general purpose container behind it.</a:t>
-            </a:r>
-          </a:p>
-          <a:p>
-            <a:r>
-              <a:rPr lang="en-US" baseline="0" dirty="0" smtClean="0"/>
-              <a:t>At this point, it’s really little more than a glorified Service Locator… and I think, though maybe not, this is what most people see, and then either stop using a container, or never take it further.</a:t>
-            </a:r>
-            <a:endParaRPr lang="en-US" dirty="0" smtClean="0"/>
+              <a:t>So here, we can see the dependency is manually injected.</a:t>
+            </a:r>
+            <a:endParaRPr lang="en-US" dirty="0"/>
           </a:p>
         </p:txBody>
       </p:sp>
@@ -2210,7 +2220,7 @@
             <a:fld id="{F5395209-E063-144C-8968-CAA31F3D1B83}" type="slidenum">
               <a:rPr lang="en-US" smtClean="0"/>
               <a:pPr/>
-              <a:t>30</a:t>
+              <a:t>29</a:t>
             </a:fld>
             <a:endParaRPr lang="en-US"/>
           </a:p>
@@ -2272,70 +2282,39 @@
           <a:p>
             <a:r>
               <a:rPr lang="en-US" dirty="0" smtClean="0"/>
-              <a:t>The next major</a:t>
+              <a:t>Here’s an example using a container.</a:t>
+            </a:r>
+          </a:p>
+          <a:p>
+            <a:r>
+              <a:rPr lang="en-US" dirty="0" smtClean="0"/>
+              <a:t>Sort</a:t>
             </a:r>
             <a:r>
               <a:rPr lang="en-US" baseline="0" dirty="0" smtClean="0"/>
-              <a:t> leap to take with the container is </a:t>
+              <a:t> of looks like </a:t>
             </a:r>
             <a:r>
               <a:rPr lang="en-US" baseline="0" dirty="0" err="1" smtClean="0"/>
-              <a:t>autowiring</a:t>
+              <a:t>ServiceLocation</a:t>
             </a:r>
             <a:r>
               <a:rPr lang="en-US" baseline="0" dirty="0" smtClean="0"/>
-              <a:t>.</a:t>
+              <a:t>?</a:t>
             </a:r>
           </a:p>
           <a:p>
             <a:r>
               <a:rPr lang="en-US" baseline="0" dirty="0" smtClean="0"/>
-              <a:t>This may sound a little magic-</a:t>
-            </a:r>
-            <a:r>
-              <a:rPr lang="en-US" baseline="0" dirty="0" err="1" smtClean="0"/>
-              <a:t>y</a:t>
-            </a:r>
+              <a:t>It sort of is, but with the power of a general purpose container behind it.</a:t>
+            </a:r>
+          </a:p>
+          <a:p>
             <a:r>
               <a:rPr lang="en-US" baseline="0" dirty="0" smtClean="0"/>
-              <a:t>, or “over my head”, but its not really… pretty simple, lets see</a:t>
-            </a:r>
-          </a:p>
-          <a:p>
-            <a:r>
-              <a:rPr lang="en-US" baseline="0" dirty="0" smtClean="0"/>
-              <a:t>CODE</a:t>
-            </a:r>
-          </a:p>
-          <a:p>
-            <a:r>
-              <a:rPr lang="en-US" baseline="0" dirty="0" smtClean="0"/>
-              <a:t>You can start to see now how this code has:</a:t>
-            </a:r>
-          </a:p>
-          <a:p>
-            <a:r>
-              <a:rPr lang="en-US" baseline="0" dirty="0" smtClean="0"/>
-              <a:t>Very low coupling</a:t>
-            </a:r>
-          </a:p>
-          <a:p>
-            <a:r>
-              <a:rPr lang="en-US" baseline="0" dirty="0" smtClean="0"/>
-              <a:t>Reusable (if that’s your thing)</a:t>
-            </a:r>
-          </a:p>
-          <a:p>
-            <a:r>
-              <a:rPr lang="en-US" baseline="0" dirty="0" smtClean="0"/>
-              <a:t>Verifiable</a:t>
-            </a:r>
-          </a:p>
-          <a:p>
-            <a:r>
-              <a:rPr lang="en-US" baseline="0" dirty="0" smtClean="0"/>
-              <a:t>Orthogonal</a:t>
-            </a:r>
+              <a:t>At this point, it’s really little more than a glorified Service Locator… and I think, though maybe not, this is what most people see, and then either stop using a container, or never take it further.</a:t>
+            </a:r>
+            <a:endParaRPr lang="en-US" dirty="0" smtClean="0"/>
           </a:p>
         </p:txBody>
       </p:sp>
@@ -2357,7 +2336,7 @@
             <a:fld id="{F5395209-E063-144C-8968-CAA31F3D1B83}" type="slidenum">
               <a:rPr lang="en-US" smtClean="0"/>
               <a:pPr/>
-              <a:t>31</a:t>
+              <a:t>30</a:t>
             </a:fld>
             <a:endParaRPr lang="en-US"/>
           </a:p>
@@ -2419,6 +2398,153 @@
           <a:p>
             <a:r>
               <a:rPr lang="en-US" dirty="0" smtClean="0"/>
+              <a:t>The next major</a:t>
+            </a:r>
+            <a:r>
+              <a:rPr lang="en-US" baseline="0" dirty="0" smtClean="0"/>
+              <a:t> leap to take with the container is </a:t>
+            </a:r>
+            <a:r>
+              <a:rPr lang="en-US" baseline="0" dirty="0" err="1" smtClean="0"/>
+              <a:t>autowiring</a:t>
+            </a:r>
+            <a:r>
+              <a:rPr lang="en-US" baseline="0" dirty="0" smtClean="0"/>
+              <a:t>.</a:t>
+            </a:r>
+          </a:p>
+          <a:p>
+            <a:r>
+              <a:rPr lang="en-US" baseline="0" dirty="0" smtClean="0"/>
+              <a:t>This may sound a little magic-</a:t>
+            </a:r>
+            <a:r>
+              <a:rPr lang="en-US" baseline="0" dirty="0" err="1" smtClean="0"/>
+              <a:t>y</a:t>
+            </a:r>
+            <a:r>
+              <a:rPr lang="en-US" baseline="0" dirty="0" smtClean="0"/>
+              <a:t>, or “over my head”, but its not really… pretty simple, lets see</a:t>
+            </a:r>
+          </a:p>
+          <a:p>
+            <a:r>
+              <a:rPr lang="en-US" baseline="0" dirty="0" smtClean="0"/>
+              <a:t>CODE</a:t>
+            </a:r>
+          </a:p>
+          <a:p>
+            <a:r>
+              <a:rPr lang="en-US" baseline="0" dirty="0" smtClean="0"/>
+              <a:t>You can start to see now how this code has:</a:t>
+            </a:r>
+          </a:p>
+          <a:p>
+            <a:r>
+              <a:rPr lang="en-US" baseline="0" dirty="0" smtClean="0"/>
+              <a:t>Very low coupling</a:t>
+            </a:r>
+          </a:p>
+          <a:p>
+            <a:r>
+              <a:rPr lang="en-US" baseline="0" dirty="0" smtClean="0"/>
+              <a:t>Reusable (if that’s your thing)</a:t>
+            </a:r>
+          </a:p>
+          <a:p>
+            <a:r>
+              <a:rPr lang="en-US" baseline="0" dirty="0" smtClean="0"/>
+              <a:t>Verifiable</a:t>
+            </a:r>
+          </a:p>
+          <a:p>
+            <a:r>
+              <a:rPr lang="en-US" baseline="0" dirty="0" smtClean="0"/>
+              <a:t>Orthogonal</a:t>
+            </a:r>
+          </a:p>
+        </p:txBody>
+      </p:sp>
+      <p:sp>
+        <p:nvSpPr>
+          <p:cNvPr id="4" name="Slide Number Placeholder 3"/>
+          <p:cNvSpPr>
+            <a:spLocks noGrp="1"/>
+          </p:cNvSpPr>
+          <p:nvPr>
+            <p:ph type="sldNum" sz="quarter" idx="10"/>
+          </p:nvPr>
+        </p:nvSpPr>
+        <p:spPr/>
+        <p:txBody>
+          <a:bodyPr/>
+          <a:lstStyle/>
+          <a:p>
+            <a:fld id="{F5395209-E063-144C-8968-CAA31F3D1B83}" type="slidenum">
+              <a:rPr lang="en-US" smtClean="0"/>
+              <a:pPr/>
+              <a:t>31</a:t>
+            </a:fld>
+            <a:endParaRPr lang="en-US"/>
+          </a:p>
+        </p:txBody>
+      </p:sp>
+    </p:spTree>
+  </p:cSld>
+  <p:clrMapOvr>
+    <a:masterClrMapping/>
+  </p:clrMapOvr>
+</p:notes>
+</file>
+
+<file path=ppt/notesSlides/notesSlide26.xml><?xml version="1.0" encoding="utf-8"?>
+<p:notes xmlns:a="http://schemas.openxmlformats.org/drawingml/2006/main" xmlns:r="http://schemas.openxmlformats.org/officeDocument/2006/relationships" xmlns:mc="http://schemas.openxmlformats.org/markup-compatibility/2006" xmlns:mv="urn:schemas-microsoft-com:mac:vml" xmlns:p="http://schemas.openxmlformats.org/presentationml/2006/main" mc:Ignorable="mv" mc:PreserveAttributes="mv:*">
+  <p:cSld>
+    <p:spTree>
+      <p:nvGrpSpPr>
+        <p:cNvPr id="1" name=""/>
+        <p:cNvGrpSpPr/>
+        <p:nvPr/>
+      </p:nvGrpSpPr>
+      <p:grpSpPr>
+        <a:xfrm>
+          <a:off x="0" y="0"/>
+          <a:ext cx="0" cy="0"/>
+          <a:chOff x="0" y="0"/>
+          <a:chExt cx="0" cy="0"/>
+        </a:xfrm>
+      </p:grpSpPr>
+      <p:sp>
+        <p:nvSpPr>
+          <p:cNvPr id="2" name="Slide Image Placeholder 1"/>
+          <p:cNvSpPr>
+            <a:spLocks noGrp="1" noRot="1" noChangeAspect="1"/>
+          </p:cNvSpPr>
+          <p:nvPr>
+            <p:ph type="sldImg"/>
+          </p:nvPr>
+        </p:nvSpPr>
+        <p:spPr/>
+      </p:sp>
+      <p:sp>
+        <p:nvSpPr>
+          <p:cNvPr id="3" name="Notes Placeholder 2"/>
+          <p:cNvSpPr>
+            <a:spLocks noGrp="1"/>
+          </p:cNvSpPr>
+          <p:nvPr>
+            <p:ph type="body" idx="1"/>
+          </p:nvPr>
+        </p:nvSpPr>
+        <p:spPr/>
+        <p:txBody>
+          <a:bodyPr>
+            <a:normAutofit/>
+          </a:bodyPr>
+          <a:lstStyle/>
+          <a:p>
+            <a:r>
+              <a:rPr lang="en-US" dirty="0" smtClean="0"/>
               <a:t>Java</a:t>
             </a:r>
             <a:r>
@@ -2429,9 +2555,41 @@
           <a:p>
             <a:r>
               <a:rPr lang="en-US" baseline="0" dirty="0" smtClean="0"/>
+              <a:t>The Java guys also LOVE to use XML and they love to use IOC… you’ll see tons of XML and IOC all over java projects.</a:t>
+            </a:r>
+          </a:p>
+          <a:p>
+            <a:r>
+              <a:rPr lang="en-US" baseline="0" dirty="0" smtClean="0"/>
+              <a:t>They’ve been doing this for a long time, so watch out if you start evangelizing this stuff to a java dude.</a:t>
+            </a:r>
+          </a:p>
+          <a:p>
+            <a:endParaRPr lang="en-US" baseline="0" dirty="0" smtClean="0"/>
+          </a:p>
+          <a:p>
+            <a:r>
+              <a:rPr lang="en-US" baseline="0" dirty="0" smtClean="0"/>
               <a:t>.NET guys and containers almost always prefer constructor injection.</a:t>
             </a:r>
-            <a:endParaRPr lang="en-US" dirty="0"/>
+          </a:p>
+          <a:p>
+            <a:r>
+              <a:rPr lang="en-US" baseline="0" dirty="0" smtClean="0"/>
+              <a:t>It also seems like the .NET guys like to configure their stuff in code with a fluent interface or internal DSL… and because we have REAL</a:t>
+            </a:r>
+          </a:p>
+          <a:p>
+            <a:r>
+              <a:rPr lang="en-US" baseline="0" dirty="0" smtClean="0"/>
+              <a:t>generics (unlike Java) we use generics to express type information.  And since we can configure things in code, we can do some more powerful</a:t>
+            </a:r>
+          </a:p>
+          <a:p>
+            <a:r>
+              <a:rPr lang="en-US" baseline="0" dirty="0" smtClean="0"/>
+              <a:t>registration type things by default since we don’t have to have special xml handlers to do something out of the ordinary.</a:t>
+            </a:r>
           </a:p>
         </p:txBody>
       </p:sp>
@@ -2454,6 +2612,364 @@
               <a:rPr lang="en-US" smtClean="0"/>
               <a:pPr/>
               <a:t>32</a:t>
+            </a:fld>
+            <a:endParaRPr lang="en-US"/>
+          </a:p>
+        </p:txBody>
+      </p:sp>
+    </p:spTree>
+  </p:cSld>
+  <p:clrMapOvr>
+    <a:masterClrMapping/>
+  </p:clrMapOvr>
+</p:notes>
+</file>
+
+<file path=ppt/notesSlides/notesSlide27.xml><?xml version="1.0" encoding="utf-8"?>
+<p:notes xmlns:a="http://schemas.openxmlformats.org/drawingml/2006/main" xmlns:r="http://schemas.openxmlformats.org/officeDocument/2006/relationships" xmlns:mc="http://schemas.openxmlformats.org/markup-compatibility/2006" xmlns:mv="urn:schemas-microsoft-com:mac:vml" xmlns:p="http://schemas.openxmlformats.org/presentationml/2006/main" mc:Ignorable="mv" mc:PreserveAttributes="mv:*">
+  <p:cSld>
+    <p:spTree>
+      <p:nvGrpSpPr>
+        <p:cNvPr id="1" name=""/>
+        <p:cNvGrpSpPr/>
+        <p:nvPr/>
+      </p:nvGrpSpPr>
+      <p:grpSpPr>
+        <a:xfrm>
+          <a:off x="0" y="0"/>
+          <a:ext cx="0" cy="0"/>
+          <a:chOff x="0" y="0"/>
+          <a:chExt cx="0" cy="0"/>
+        </a:xfrm>
+      </p:grpSpPr>
+      <p:sp>
+        <p:nvSpPr>
+          <p:cNvPr id="2" name="Slide Image Placeholder 1"/>
+          <p:cNvSpPr>
+            <a:spLocks noGrp="1" noRot="1" noChangeAspect="1"/>
+          </p:cNvSpPr>
+          <p:nvPr>
+            <p:ph type="sldImg"/>
+          </p:nvPr>
+        </p:nvSpPr>
+        <p:spPr/>
+      </p:sp>
+      <p:sp>
+        <p:nvSpPr>
+          <p:cNvPr id="3" name="Notes Placeholder 2"/>
+          <p:cNvSpPr>
+            <a:spLocks noGrp="1"/>
+          </p:cNvSpPr>
+          <p:nvPr>
+            <p:ph type="body" idx="1"/>
+          </p:nvPr>
+        </p:nvSpPr>
+        <p:spPr/>
+        <p:txBody>
+          <a:bodyPr>
+            <a:normAutofit/>
+          </a:bodyPr>
+          <a:lstStyle/>
+          <a:p>
+            <a:r>
+              <a:rPr lang="en-US" dirty="0" smtClean="0"/>
+              <a:t>another</a:t>
+            </a:r>
+            <a:r>
+              <a:rPr lang="en-US" baseline="0" dirty="0" smtClean="0"/>
+              <a:t> great feature provided by the container is lifecycle management.</a:t>
+            </a:r>
+          </a:p>
+          <a:p>
+            <a:r>
+              <a:rPr lang="en-US" baseline="0" dirty="0" smtClean="0"/>
+              <a:t>sometimes you might want a singleton, because it grabs a scarce resource handle (physical device), or because it’s expensive to create</a:t>
+            </a:r>
+          </a:p>
+          <a:p>
+            <a:r>
+              <a:rPr lang="en-US" baseline="0" dirty="0" smtClean="0"/>
+              <a:t>sometimes you want something to be created once per web request</a:t>
+            </a:r>
+          </a:p>
+          <a:p>
+            <a:r>
+              <a:rPr lang="en-US" baseline="0" dirty="0" smtClean="0"/>
+              <a:t>… new one every time (called transient, usually)</a:t>
+            </a:r>
+          </a:p>
+          <a:p>
+            <a:r>
+              <a:rPr lang="en-US" baseline="0" dirty="0" smtClean="0"/>
+              <a:t>… X?</a:t>
+            </a:r>
+          </a:p>
+          <a:p>
+            <a:r>
+              <a:rPr lang="en-US" baseline="0" dirty="0" smtClean="0"/>
+              <a:t>let’s look at an example</a:t>
+            </a:r>
+            <a:endParaRPr lang="en-US" dirty="0"/>
+          </a:p>
+        </p:txBody>
+      </p:sp>
+      <p:sp>
+        <p:nvSpPr>
+          <p:cNvPr id="4" name="Slide Number Placeholder 3"/>
+          <p:cNvSpPr>
+            <a:spLocks noGrp="1"/>
+          </p:cNvSpPr>
+          <p:nvPr>
+            <p:ph type="sldNum" sz="quarter" idx="10"/>
+          </p:nvPr>
+        </p:nvSpPr>
+        <p:spPr/>
+        <p:txBody>
+          <a:bodyPr/>
+          <a:lstStyle/>
+          <a:p>
+            <a:fld id="{F5395209-E063-144C-8968-CAA31F3D1B83}" type="slidenum">
+              <a:rPr lang="en-US" smtClean="0"/>
+              <a:pPr/>
+              <a:t>33</a:t>
+            </a:fld>
+            <a:endParaRPr lang="en-US"/>
+          </a:p>
+        </p:txBody>
+      </p:sp>
+    </p:spTree>
+  </p:cSld>
+  <p:clrMapOvr>
+    <a:masterClrMapping/>
+  </p:clrMapOvr>
+</p:notes>
+</file>
+
+<file path=ppt/notesSlides/notesSlide28.xml><?xml version="1.0" encoding="utf-8"?>
+<p:notes xmlns:a="http://schemas.openxmlformats.org/drawingml/2006/main" xmlns:r="http://schemas.openxmlformats.org/officeDocument/2006/relationships" xmlns:mc="http://schemas.openxmlformats.org/markup-compatibility/2006" xmlns:mv="urn:schemas-microsoft-com:mac:vml" xmlns:p="http://schemas.openxmlformats.org/presentationml/2006/main" mc:Ignorable="mv" mc:PreserveAttributes="mv:*">
+  <p:cSld>
+    <p:spTree>
+      <p:nvGrpSpPr>
+        <p:cNvPr id="1" name=""/>
+        <p:cNvGrpSpPr/>
+        <p:nvPr/>
+      </p:nvGrpSpPr>
+      <p:grpSpPr>
+        <a:xfrm>
+          <a:off x="0" y="0"/>
+          <a:ext cx="0" cy="0"/>
+          <a:chOff x="0" y="0"/>
+          <a:chExt cx="0" cy="0"/>
+        </a:xfrm>
+      </p:grpSpPr>
+      <p:sp>
+        <p:nvSpPr>
+          <p:cNvPr id="2" name="Slide Image Placeholder 1"/>
+          <p:cNvSpPr>
+            <a:spLocks noGrp="1" noRot="1" noChangeAspect="1"/>
+          </p:cNvSpPr>
+          <p:nvPr>
+            <p:ph type="sldImg"/>
+          </p:nvPr>
+        </p:nvSpPr>
+        <p:spPr/>
+      </p:sp>
+      <p:sp>
+        <p:nvSpPr>
+          <p:cNvPr id="3" name="Notes Placeholder 2"/>
+          <p:cNvSpPr>
+            <a:spLocks noGrp="1"/>
+          </p:cNvSpPr>
+          <p:nvPr>
+            <p:ph type="body" idx="1"/>
+          </p:nvPr>
+        </p:nvSpPr>
+        <p:spPr/>
+        <p:txBody>
+          <a:bodyPr>
+            <a:normAutofit/>
+          </a:bodyPr>
+          <a:lstStyle/>
+          <a:p>
+            <a:r>
+              <a:rPr lang="en-US" dirty="0" smtClean="0"/>
+              <a:t>so</a:t>
+            </a:r>
+            <a:r>
+              <a:rPr lang="en-US" baseline="0" dirty="0" smtClean="0"/>
+              <a:t> yeah, you could still new up a new one of these things, which the singleton implementation pattern precludes you from doing…</a:t>
+            </a:r>
+          </a:p>
+          <a:p>
+            <a:r>
+              <a:rPr lang="en-US" baseline="0" dirty="0" smtClean="0"/>
+              <a:t>this lets you to have the declarative nature and flexibility of the container, in case you want to change your mind about the whole singleton thing later.</a:t>
+            </a:r>
+          </a:p>
+          <a:p>
+            <a:r>
+              <a:rPr lang="en-US" baseline="0" dirty="0" smtClean="0"/>
+              <a:t>it essentially separates the concerns of the singleton lifecycle and the singleton implementation pattern.</a:t>
+            </a:r>
+            <a:endParaRPr lang="en-US" dirty="0"/>
+          </a:p>
+        </p:txBody>
+      </p:sp>
+      <p:sp>
+        <p:nvSpPr>
+          <p:cNvPr id="4" name="Slide Number Placeholder 3"/>
+          <p:cNvSpPr>
+            <a:spLocks noGrp="1"/>
+          </p:cNvSpPr>
+          <p:nvPr>
+            <p:ph type="sldNum" sz="quarter" idx="10"/>
+          </p:nvPr>
+        </p:nvSpPr>
+        <p:spPr/>
+        <p:txBody>
+          <a:bodyPr/>
+          <a:lstStyle/>
+          <a:p>
+            <a:fld id="{F5395209-E063-144C-8968-CAA31F3D1B83}" type="slidenum">
+              <a:rPr lang="en-US" smtClean="0"/>
+              <a:pPr/>
+              <a:t>34</a:t>
+            </a:fld>
+            <a:endParaRPr lang="en-US"/>
+          </a:p>
+        </p:txBody>
+      </p:sp>
+    </p:spTree>
+  </p:cSld>
+  <p:clrMapOvr>
+    <a:masterClrMapping/>
+  </p:clrMapOvr>
+</p:notes>
+</file>
+
+<file path=ppt/notesSlides/notesSlide29.xml><?xml version="1.0" encoding="utf-8"?>
+<p:notes xmlns:a="http://schemas.openxmlformats.org/drawingml/2006/main" xmlns:r="http://schemas.openxmlformats.org/officeDocument/2006/relationships" xmlns:mc="http://schemas.openxmlformats.org/markup-compatibility/2006" xmlns:mv="urn:schemas-microsoft-com:mac:vml" xmlns:p="http://schemas.openxmlformats.org/presentationml/2006/main" mc:Ignorable="mv" mc:PreserveAttributes="mv:*">
+  <p:cSld>
+    <p:spTree>
+      <p:nvGrpSpPr>
+        <p:cNvPr id="1" name=""/>
+        <p:cNvGrpSpPr/>
+        <p:nvPr/>
+      </p:nvGrpSpPr>
+      <p:grpSpPr>
+        <a:xfrm>
+          <a:off x="0" y="0"/>
+          <a:ext cx="0" cy="0"/>
+          <a:chOff x="0" y="0"/>
+          <a:chExt cx="0" cy="0"/>
+        </a:xfrm>
+      </p:grpSpPr>
+      <p:sp>
+        <p:nvSpPr>
+          <p:cNvPr id="2" name="Slide Image Placeholder 1"/>
+          <p:cNvSpPr>
+            <a:spLocks noGrp="1" noRot="1" noChangeAspect="1"/>
+          </p:cNvSpPr>
+          <p:nvPr>
+            <p:ph type="sldImg"/>
+          </p:nvPr>
+        </p:nvSpPr>
+        <p:spPr/>
+      </p:sp>
+      <p:sp>
+        <p:nvSpPr>
+          <p:cNvPr id="3" name="Notes Placeholder 2"/>
+          <p:cNvSpPr>
+            <a:spLocks noGrp="1"/>
+          </p:cNvSpPr>
+          <p:nvPr>
+            <p:ph type="body" idx="1"/>
+          </p:nvPr>
+        </p:nvSpPr>
+        <p:spPr/>
+        <p:txBody>
+          <a:bodyPr>
+            <a:normAutofit/>
+          </a:bodyPr>
+          <a:lstStyle/>
+          <a:p>
+            <a:r>
+              <a:rPr lang="en-US" dirty="0" smtClean="0"/>
+              <a:t>when</a:t>
+            </a:r>
+            <a:r>
+              <a:rPr lang="en-US" baseline="0" dirty="0" smtClean="0"/>
+              <a:t> do I use a container?  normally.</a:t>
+            </a:r>
+          </a:p>
+          <a:p>
+            <a:r>
+              <a:rPr lang="en-US" baseline="0" dirty="0" smtClean="0"/>
+              <a:t>it might feel overkill at first for simple applications, but it’s not really, once you get used to it, it’s really natural and is difficult to go back to not using one.</a:t>
+            </a:r>
+          </a:p>
+          <a:p>
+            <a:r>
+              <a:rPr lang="en-US" baseline="0" dirty="0" smtClean="0"/>
+              <a:t>that being said, there isn’t really a hard and fast rule, you’ve </a:t>
+            </a:r>
+            <a:r>
+              <a:rPr lang="en-US" baseline="0" dirty="0" err="1" smtClean="0"/>
+              <a:t>gotta</a:t>
+            </a:r>
+            <a:r>
+              <a:rPr lang="en-US" baseline="0" dirty="0" smtClean="0"/>
+              <a:t> make the decision within the context of your project/solution/problem.</a:t>
+            </a:r>
+          </a:p>
+          <a:p>
+            <a:r>
+              <a:rPr lang="en-US" baseline="0" dirty="0" smtClean="0"/>
+              <a:t>There is no replacement for critical thought, you’ve </a:t>
+            </a:r>
+            <a:r>
+              <a:rPr lang="en-US" baseline="0" dirty="0" err="1" smtClean="0"/>
+              <a:t>gotta</a:t>
+            </a:r>
+            <a:r>
+              <a:rPr lang="en-US" baseline="0" dirty="0" smtClean="0"/>
+              <a:t> think it through.</a:t>
+            </a:r>
+          </a:p>
+          <a:p>
+            <a:r>
+              <a:rPr lang="en-US" baseline="0" dirty="0" smtClean="0"/>
+              <a:t>Usually a container will make things more simple, especially if your app is more than just a few lines long.</a:t>
+            </a:r>
+          </a:p>
+          <a:p>
+            <a:r>
+              <a:rPr lang="en-US" baseline="0" dirty="0" smtClean="0"/>
+              <a:t>Just remember to focus on simplicity and maintainability.</a:t>
+            </a:r>
+            <a:endParaRPr lang="en-US" dirty="0"/>
+          </a:p>
+        </p:txBody>
+      </p:sp>
+      <p:sp>
+        <p:nvSpPr>
+          <p:cNvPr id="4" name="Slide Number Placeholder 3"/>
+          <p:cNvSpPr>
+            <a:spLocks noGrp="1"/>
+          </p:cNvSpPr>
+          <p:nvPr>
+            <p:ph type="sldNum" sz="quarter" idx="10"/>
+          </p:nvPr>
+        </p:nvSpPr>
+        <p:spPr/>
+        <p:txBody>
+          <a:bodyPr/>
+          <a:lstStyle/>
+          <a:p>
+            <a:fld id="{F5395209-E063-144C-8968-CAA31F3D1B83}" type="slidenum">
+              <a:rPr lang="en-US" smtClean="0"/>
+              <a:pPr/>
+              <a:t>37</a:t>
             </a:fld>
             <a:endParaRPr lang="en-US"/>
           </a:p>
@@ -2539,6 +3055,146 @@
               <a:rPr lang="en-US" smtClean="0"/>
               <a:pPr/>
               <a:t>9</a:t>
+            </a:fld>
+            <a:endParaRPr lang="en-US"/>
+          </a:p>
+        </p:txBody>
+      </p:sp>
+    </p:spTree>
+  </p:cSld>
+  <p:clrMapOvr>
+    <a:masterClrMapping/>
+  </p:clrMapOvr>
+</p:notes>
+</file>
+
+<file path=ppt/notesSlides/notesSlide30.xml><?xml version="1.0" encoding="utf-8"?>
+<p:notes xmlns:a="http://schemas.openxmlformats.org/drawingml/2006/main" xmlns:r="http://schemas.openxmlformats.org/officeDocument/2006/relationships" xmlns:mc="http://schemas.openxmlformats.org/markup-compatibility/2006" xmlns:mv="urn:schemas-microsoft-com:mac:vml" xmlns:p="http://schemas.openxmlformats.org/presentationml/2006/main" mc:Ignorable="mv" mc:PreserveAttributes="mv:*">
+  <p:cSld>
+    <p:spTree>
+      <p:nvGrpSpPr>
+        <p:cNvPr id="1" name=""/>
+        <p:cNvGrpSpPr/>
+        <p:nvPr/>
+      </p:nvGrpSpPr>
+      <p:grpSpPr>
+        <a:xfrm>
+          <a:off x="0" y="0"/>
+          <a:ext cx="0" cy="0"/>
+          <a:chOff x="0" y="0"/>
+          <a:chExt cx="0" cy="0"/>
+        </a:xfrm>
+      </p:grpSpPr>
+      <p:sp>
+        <p:nvSpPr>
+          <p:cNvPr id="2" name="Slide Image Placeholder 1"/>
+          <p:cNvSpPr>
+            <a:spLocks noGrp="1" noRot="1" noChangeAspect="1"/>
+          </p:cNvSpPr>
+          <p:nvPr>
+            <p:ph type="sldImg"/>
+          </p:nvPr>
+        </p:nvSpPr>
+        <p:spPr/>
+      </p:sp>
+      <p:sp>
+        <p:nvSpPr>
+          <p:cNvPr id="3" name="Notes Placeholder 2"/>
+          <p:cNvSpPr>
+            <a:spLocks noGrp="1"/>
+          </p:cNvSpPr>
+          <p:nvPr>
+            <p:ph type="body" idx="1"/>
+          </p:nvPr>
+        </p:nvSpPr>
+        <p:spPr/>
+        <p:txBody>
+          <a:bodyPr>
+            <a:normAutofit/>
+          </a:bodyPr>
+          <a:lstStyle/>
+          <a:p>
+            <a:r>
+              <a:rPr lang="en-US" dirty="0" smtClean="0"/>
+              <a:t>when</a:t>
+            </a:r>
+            <a:r>
+              <a:rPr lang="en-US" baseline="0" dirty="0" smtClean="0"/>
+              <a:t> do I use a container?  normally.</a:t>
+            </a:r>
+          </a:p>
+          <a:p>
+            <a:r>
+              <a:rPr lang="en-US" baseline="0" dirty="0" smtClean="0"/>
+              <a:t>it might feel overkill at first for simple applications, but it’s not really, once you get used to it, it’s really natural and is difficult to go back to not using one.</a:t>
+            </a:r>
+          </a:p>
+          <a:p>
+            <a:r>
+              <a:rPr lang="en-US" baseline="0" dirty="0" smtClean="0"/>
+              <a:t>that being said, there isn’t really a hard and fast rule, you’ve </a:t>
+            </a:r>
+            <a:r>
+              <a:rPr lang="en-US" baseline="0" dirty="0" err="1" smtClean="0"/>
+              <a:t>gotta</a:t>
+            </a:r>
+            <a:r>
+              <a:rPr lang="en-US" baseline="0" dirty="0" smtClean="0"/>
+              <a:t> make the decision within the context of your project/solution/problem.</a:t>
+            </a:r>
+          </a:p>
+          <a:p>
+            <a:r>
+              <a:rPr lang="en-US" baseline="0" dirty="0" smtClean="0"/>
+              <a:t>There is no replacement for critical thought, you’ve </a:t>
+            </a:r>
+            <a:r>
+              <a:rPr lang="en-US" baseline="0" dirty="0" err="1" smtClean="0"/>
+              <a:t>gotta</a:t>
+            </a:r>
+            <a:r>
+              <a:rPr lang="en-US" baseline="0" dirty="0" smtClean="0"/>
+              <a:t> think it through.</a:t>
+            </a:r>
+          </a:p>
+          <a:p>
+            <a:r>
+              <a:rPr lang="en-US" baseline="0" dirty="0" smtClean="0"/>
+              <a:t>Usually a container will make things more simple, especially if your app is more than just a few lines long.</a:t>
+            </a:r>
+          </a:p>
+          <a:p>
+            <a:r>
+              <a:rPr lang="en-US" baseline="0" dirty="0" smtClean="0"/>
+              <a:t>Just remember to focus on simplicity </a:t>
+            </a:r>
+            <a:r>
+              <a:rPr lang="en-US" baseline="0" smtClean="0"/>
+              <a:t>and maintainability.</a:t>
+            </a:r>
+            <a:endParaRPr lang="en-US"/>
+          </a:p>
+        </p:txBody>
+      </p:sp>
+      <p:sp>
+        <p:nvSpPr>
+          <p:cNvPr id="4" name="Slide Number Placeholder 3"/>
+          <p:cNvSpPr>
+            <a:spLocks noGrp="1"/>
+          </p:cNvSpPr>
+          <p:nvPr>
+            <p:ph type="sldNum" sz="quarter" idx="10"/>
+          </p:nvPr>
+        </p:nvSpPr>
+        <p:spPr/>
+        <p:txBody>
+          <a:bodyPr/>
+          <a:lstStyle/>
+          <a:p>
+            <a:fld id="{F5395209-E063-144C-8968-CAA31F3D1B83}" type="slidenum">
+              <a:rPr lang="en-US" smtClean="0"/>
+              <a:pPr/>
+              <a:t>38</a:t>
             </a:fld>
             <a:endParaRPr lang="en-US"/>
           </a:p>
@@ -8356,6 +9012,13 @@
   <p:clrMapOvr>
     <a:masterClrMapping/>
   </p:clrMapOvr>
+  <p:timing>
+    <p:tnLst>
+      <p:par>
+        <p:cTn id="1" dur="indefinite" restart="never" nodeType="tmRoot"/>
+      </p:par>
+    </p:tnLst>
+  </p:timing>
 </p:sld>
 </file>
 
@@ -8690,7 +9353,7 @@
           <p:nvPr/>
         </p:nvPicPr>
         <p:blipFill>
-          <a:blip r:embed="rId2" r:link="rId3"/>
+          <a:blip r:embed="rId3" r:link="rId4"/>
           <a:stretch>
             <a:fillRect/>
           </a:stretch>
@@ -8710,6 +9373,13 @@
   <p:clrMapOvr>
     <a:masterClrMapping/>
   </p:clrMapOvr>
+  <p:timing>
+    <p:tnLst>
+      <p:par>
+        <p:cTn id="1" dur="indefinite" restart="never" nodeType="tmRoot"/>
+      </p:par>
+    </p:tnLst>
+  </p:timing>
 </p:sld>
 </file>
 
@@ -8780,7 +9450,7 @@
             </a:pPr>
             <a:r>
               <a:rPr lang="en-US" dirty="0" smtClean="0"/>
-              <a:t>Am:</a:t>
+              <a:t>I Am:</a:t>
             </a:r>
           </a:p>
           <a:p>
@@ -8827,7 +9497,7 @@
             </a:pPr>
             <a:r>
               <a:rPr lang="en-US" dirty="0" smtClean="0"/>
-              <a:t>Am not:</a:t>
+              <a:t>I Am Not:</a:t>
             </a:r>
           </a:p>
           <a:p>
@@ -8856,6 +9526,13 @@
   <p:clrMapOvr>
     <a:masterClrMapping/>
   </p:clrMapOvr>
+  <p:timing>
+    <p:tnLst>
+      <p:par>
+        <p:cTn id="1" dur="indefinite" restart="never" nodeType="tmRoot"/>
+      </p:par>
+    </p:tnLst>
+  </p:timing>
 </p:sld>
 </file>
 
@@ -8968,6 +9645,13 @@
   <p:clrMapOvr>
     <a:masterClrMapping/>
   </p:clrMapOvr>
+  <p:timing>
+    <p:tnLst>
+      <p:par>
+        <p:cTn id="1" dur="indefinite" restart="never" nodeType="tmRoot"/>
+      </p:par>
+    </p:tnLst>
+  </p:timing>
 </p:sld>
 </file>
 
@@ -9080,6 +9764,13 @@
   <p:clrMapOvr>
     <a:masterClrMapping/>
   </p:clrMapOvr>
+  <p:timing>
+    <p:tnLst>
+      <p:par>
+        <p:cTn id="1" dur="indefinite" restart="never" nodeType="tmRoot"/>
+      </p:par>
+    </p:tnLst>
+  </p:timing>
 </p:sld>
 </file>
 
@@ -9218,54 +9909,6 @@
       </p:grpSpPr>
       <p:sp>
         <p:nvSpPr>
-          <p:cNvPr id="2" name="Title 1"/>
-          <p:cNvSpPr>
-            <a:spLocks noGrp="1"/>
-          </p:cNvSpPr>
-          <p:nvPr>
-            <p:ph type="title"/>
-          </p:nvPr>
-        </p:nvSpPr>
-        <p:spPr>
-          <a:xfrm>
-            <a:off x="457200" y="2667000"/>
-            <a:ext cx="8229600" cy="1143000"/>
-          </a:xfrm>
-        </p:spPr>
-        <p:txBody>
-          <a:bodyPr>
-            <a:normAutofit fontScale="90000"/>
-          </a:bodyPr>
-          <a:lstStyle/>
-          <a:p>
-            <a:r>
-              <a:rPr lang="en-US" dirty="0" smtClean="0"/>
-              <a:t>XXX</a:t>
-            </a:r>
-            <a:br>
-              <a:rPr lang="en-US" dirty="0" smtClean="0"/>
-            </a:br>
-            <a:r>
-              <a:rPr lang="en-US" dirty="0" err="1" smtClean="0"/>
-              <a:t>MovieLister</a:t>
-            </a:r>
-            <a:r>
-              <a:rPr lang="en-US" dirty="0" smtClean="0"/>
-              <a:t> PMDI</a:t>
-            </a:r>
-            <a:br>
-              <a:rPr lang="en-US" dirty="0" smtClean="0"/>
-            </a:br>
-            <a:r>
-              <a:rPr lang="en-US" dirty="0" smtClean="0"/>
-              <a:t>XXX</a:t>
-            </a:r>
-            <a:endParaRPr lang="en-US" dirty="0"/>
-          </a:p>
-        </p:txBody>
-      </p:sp>
-      <p:sp>
-        <p:nvSpPr>
           <p:cNvPr id="3" name="Title 1"/>
           <p:cNvSpPr txBox="1">
             <a:spLocks/>
@@ -9327,6 +9970,30 @@
           </a:p>
         </p:txBody>
       </p:sp>
+      <p:pic>
+        <p:nvPicPr>
+          <p:cNvPr id="5" name="PoorManDI.cs.png" descr="/Users/fullerjc/Documents/presentations/dependencies/img/PoorManDI.cs.png"/>
+          <p:cNvPicPr>
+            <a:picLocks noChangeAspect="1"/>
+          </p:cNvPicPr>
+          <p:nvPr/>
+        </p:nvPicPr>
+        <p:blipFill>
+          <a:blip r:embed="rId3" r:link="rId4"/>
+          <a:stretch>
+            <a:fillRect/>
+          </a:stretch>
+        </p:blipFill>
+        <p:spPr>
+          <a:xfrm>
+            <a:off x="670221" y="1406984"/>
+            <a:ext cx="7803557" cy="4044031"/>
+          </a:xfrm>
+          <a:prstGeom prst="rect">
+            <a:avLst/>
+          </a:prstGeom>
+        </p:spPr>
+      </p:pic>
     </p:spTree>
   </p:cSld>
   <p:clrMapOvr>
@@ -9496,6 +10163,86 @@
           </a:p>
         </p:txBody>
       </p:sp>
+      <p:sp>
+        <p:nvSpPr>
+          <p:cNvPr id="3" name="Title 1"/>
+          <p:cNvSpPr txBox="1">
+            <a:spLocks/>
+          </p:cNvSpPr>
+          <p:nvPr/>
+        </p:nvSpPr>
+        <p:spPr>
+          <a:xfrm>
+            <a:off x="8153400" y="6096000"/>
+            <a:ext cx="990600" cy="762000"/>
+          </a:xfrm>
+          <a:prstGeom prst="rect">
+            <a:avLst/>
+          </a:prstGeom>
+        </p:spPr>
+        <p:txBody>
+          <a:bodyPr vert="horz" lIns="91440" tIns="45720" rIns="91440" bIns="45720" rtlCol="0" anchor="b">
+            <a:normAutofit/>
+          </a:bodyPr>
+          <a:lstStyle/>
+          <a:p>
+            <a:pPr marL="0" marR="0" lvl="0" indent="0" algn="r" defTabSz="457200" rtl="0" eaLnBrk="1" fontAlgn="auto" latinLnBrk="0" hangingPunct="1">
+              <a:lnSpc>
+                <a:spcPct val="100000"/>
+              </a:lnSpc>
+              <a:spcBef>
+                <a:spcPct val="0"/>
+              </a:spcBef>
+              <a:spcAft>
+                <a:spcPts val="0"/>
+              </a:spcAft>
+              <a:buClrTx/>
+              <a:buSzTx/>
+              <a:buFontTx/>
+              <a:buNone/>
+              <a:tabLst/>
+              <a:defRPr/>
+            </a:pPr>
+            <a:r>
+              <a:rPr kumimoji="0" lang="en-US" sz="4400" b="0" i="0" u="none" strike="noStrike" kern="1200" cap="none" spc="0" normalizeH="0" baseline="0" noProof="0" dirty="0" err="1" smtClean="0">
+                <a:ln>
+                  <a:noFill/>
+                </a:ln>
+                <a:solidFill>
+                  <a:schemeClr val="tx1">
+                    <a:lumMod val="50000"/>
+                    <a:lumOff val="50000"/>
+                  </a:schemeClr>
+                </a:solidFill>
+                <a:effectLst/>
+                <a:uLnTx/>
+                <a:uFillTx/>
+                <a:latin typeface="+mj-lt"/>
+                <a:ea typeface="+mj-ea"/>
+                <a:cs typeface="+mj-cs"/>
+              </a:rPr>
+              <a:t>IoC</a:t>
+            </a:r>
+            <a:endParaRPr kumimoji="0" lang="en-US" sz="4400" b="0" i="0" u="none" strike="noStrike" kern="1200" cap="none" spc="0" normalizeH="0" baseline="0" noProof="0" dirty="0" smtClean="0">
+              <a:ln>
+                <a:noFill/>
+              </a:ln>
+              <a:solidFill>
+                <a:schemeClr val="tx1">
+                  <a:lumMod val="50000"/>
+                  <a:lumOff val="50000"/>
+                </a:schemeClr>
+              </a:solidFill>
+              <a:effectLst/>
+              <a:uLnTx/>
+              <a:uFillTx/>
+              <a:latin typeface="+mj-lt"/>
+              <a:ea typeface="+mj-ea"/>
+              <a:cs typeface="+mj-cs"/>
+            </a:endParaRPr>
+          </a:p>
+        </p:txBody>
+      </p:sp>
     </p:spTree>
   </p:cSld>
   <p:clrMapOvr>
@@ -9549,6 +10296,86 @@
           </a:p>
         </p:txBody>
       </p:sp>
+      <p:sp>
+        <p:nvSpPr>
+          <p:cNvPr id="3" name="Title 1"/>
+          <p:cNvSpPr txBox="1">
+            <a:spLocks/>
+          </p:cNvSpPr>
+          <p:nvPr/>
+        </p:nvSpPr>
+        <p:spPr>
+          <a:xfrm>
+            <a:off x="8153400" y="6096000"/>
+            <a:ext cx="990600" cy="762000"/>
+          </a:xfrm>
+          <a:prstGeom prst="rect">
+            <a:avLst/>
+          </a:prstGeom>
+        </p:spPr>
+        <p:txBody>
+          <a:bodyPr vert="horz" lIns="91440" tIns="45720" rIns="91440" bIns="45720" rtlCol="0" anchor="b">
+            <a:normAutofit/>
+          </a:bodyPr>
+          <a:lstStyle/>
+          <a:p>
+            <a:pPr marL="0" marR="0" lvl="0" indent="0" algn="r" defTabSz="457200" rtl="0" eaLnBrk="1" fontAlgn="auto" latinLnBrk="0" hangingPunct="1">
+              <a:lnSpc>
+                <a:spcPct val="100000"/>
+              </a:lnSpc>
+              <a:spcBef>
+                <a:spcPct val="0"/>
+              </a:spcBef>
+              <a:spcAft>
+                <a:spcPts val="0"/>
+              </a:spcAft>
+              <a:buClrTx/>
+              <a:buSzTx/>
+              <a:buFontTx/>
+              <a:buNone/>
+              <a:tabLst/>
+              <a:defRPr/>
+            </a:pPr>
+            <a:r>
+              <a:rPr kumimoji="0" lang="en-US" sz="4400" b="0" i="0" u="none" strike="noStrike" kern="1200" cap="none" spc="0" normalizeH="0" baseline="0" noProof="0" dirty="0" err="1" smtClean="0">
+                <a:ln>
+                  <a:noFill/>
+                </a:ln>
+                <a:solidFill>
+                  <a:schemeClr val="tx1">
+                    <a:lumMod val="50000"/>
+                    <a:lumOff val="50000"/>
+                  </a:schemeClr>
+                </a:solidFill>
+                <a:effectLst/>
+                <a:uLnTx/>
+                <a:uFillTx/>
+                <a:latin typeface="+mj-lt"/>
+                <a:ea typeface="+mj-ea"/>
+                <a:cs typeface="+mj-cs"/>
+              </a:rPr>
+              <a:t>IoC</a:t>
+            </a:r>
+            <a:endParaRPr kumimoji="0" lang="en-US" sz="4400" b="0" i="0" u="none" strike="noStrike" kern="1200" cap="none" spc="0" normalizeH="0" baseline="0" noProof="0" dirty="0" smtClean="0">
+              <a:ln>
+                <a:noFill/>
+              </a:ln>
+              <a:solidFill>
+                <a:schemeClr val="tx1">
+                  <a:lumMod val="50000"/>
+                  <a:lumOff val="50000"/>
+                </a:schemeClr>
+              </a:solidFill>
+              <a:effectLst/>
+              <a:uLnTx/>
+              <a:uFillTx/>
+              <a:latin typeface="+mj-lt"/>
+              <a:ea typeface="+mj-ea"/>
+              <a:cs typeface="+mj-cs"/>
+            </a:endParaRPr>
+          </a:p>
+        </p:txBody>
+      </p:sp>
     </p:spTree>
   </p:cSld>
   <p:clrMapOvr>
@@ -9602,6 +10429,86 @@
           </a:p>
         </p:txBody>
       </p:sp>
+      <p:sp>
+        <p:nvSpPr>
+          <p:cNvPr id="3" name="Title 1"/>
+          <p:cNvSpPr txBox="1">
+            <a:spLocks/>
+          </p:cNvSpPr>
+          <p:nvPr/>
+        </p:nvSpPr>
+        <p:spPr>
+          <a:xfrm>
+            <a:off x="8153400" y="6096000"/>
+            <a:ext cx="990600" cy="762000"/>
+          </a:xfrm>
+          <a:prstGeom prst="rect">
+            <a:avLst/>
+          </a:prstGeom>
+        </p:spPr>
+        <p:txBody>
+          <a:bodyPr vert="horz" lIns="91440" tIns="45720" rIns="91440" bIns="45720" rtlCol="0" anchor="b">
+            <a:normAutofit/>
+          </a:bodyPr>
+          <a:lstStyle/>
+          <a:p>
+            <a:pPr marL="0" marR="0" lvl="0" indent="0" algn="r" defTabSz="457200" rtl="0" eaLnBrk="1" fontAlgn="auto" latinLnBrk="0" hangingPunct="1">
+              <a:lnSpc>
+                <a:spcPct val="100000"/>
+              </a:lnSpc>
+              <a:spcBef>
+                <a:spcPct val="0"/>
+              </a:spcBef>
+              <a:spcAft>
+                <a:spcPts val="0"/>
+              </a:spcAft>
+              <a:buClrTx/>
+              <a:buSzTx/>
+              <a:buFontTx/>
+              <a:buNone/>
+              <a:tabLst/>
+              <a:defRPr/>
+            </a:pPr>
+            <a:r>
+              <a:rPr kumimoji="0" lang="en-US" sz="4400" b="0" i="0" u="none" strike="noStrike" kern="1200" cap="none" spc="0" normalizeH="0" baseline="0" noProof="0" dirty="0" err="1" smtClean="0">
+                <a:ln>
+                  <a:noFill/>
+                </a:ln>
+                <a:solidFill>
+                  <a:schemeClr val="tx1">
+                    <a:lumMod val="50000"/>
+                    <a:lumOff val="50000"/>
+                  </a:schemeClr>
+                </a:solidFill>
+                <a:effectLst/>
+                <a:uLnTx/>
+                <a:uFillTx/>
+                <a:latin typeface="+mj-lt"/>
+                <a:ea typeface="+mj-ea"/>
+                <a:cs typeface="+mj-cs"/>
+              </a:rPr>
+              <a:t>IoC</a:t>
+            </a:r>
+            <a:endParaRPr kumimoji="0" lang="en-US" sz="4400" b="0" i="0" u="none" strike="noStrike" kern="1200" cap="none" spc="0" normalizeH="0" baseline="0" noProof="0" dirty="0" smtClean="0">
+              <a:ln>
+                <a:noFill/>
+              </a:ln>
+              <a:solidFill>
+                <a:schemeClr val="tx1">
+                  <a:lumMod val="50000"/>
+                  <a:lumOff val="50000"/>
+                </a:schemeClr>
+              </a:solidFill>
+              <a:effectLst/>
+              <a:uLnTx/>
+              <a:uFillTx/>
+              <a:latin typeface="+mj-lt"/>
+              <a:ea typeface="+mj-ea"/>
+              <a:cs typeface="+mj-cs"/>
+            </a:endParaRPr>
+          </a:p>
+        </p:txBody>
+      </p:sp>
     </p:spTree>
   </p:cSld>
   <p:clrMapOvr>
@@ -9655,6 +10562,86 @@
           </a:p>
         </p:txBody>
       </p:sp>
+      <p:sp>
+        <p:nvSpPr>
+          <p:cNvPr id="3" name="Title 1"/>
+          <p:cNvSpPr txBox="1">
+            <a:spLocks/>
+          </p:cNvSpPr>
+          <p:nvPr/>
+        </p:nvSpPr>
+        <p:spPr>
+          <a:xfrm>
+            <a:off x="8153400" y="6096000"/>
+            <a:ext cx="990600" cy="762000"/>
+          </a:xfrm>
+          <a:prstGeom prst="rect">
+            <a:avLst/>
+          </a:prstGeom>
+        </p:spPr>
+        <p:txBody>
+          <a:bodyPr vert="horz" lIns="91440" tIns="45720" rIns="91440" bIns="45720" rtlCol="0" anchor="b">
+            <a:normAutofit/>
+          </a:bodyPr>
+          <a:lstStyle/>
+          <a:p>
+            <a:pPr marL="0" marR="0" lvl="0" indent="0" algn="r" defTabSz="457200" rtl="0" eaLnBrk="1" fontAlgn="auto" latinLnBrk="0" hangingPunct="1">
+              <a:lnSpc>
+                <a:spcPct val="100000"/>
+              </a:lnSpc>
+              <a:spcBef>
+                <a:spcPct val="0"/>
+              </a:spcBef>
+              <a:spcAft>
+                <a:spcPts val="0"/>
+              </a:spcAft>
+              <a:buClrTx/>
+              <a:buSzTx/>
+              <a:buFontTx/>
+              <a:buNone/>
+              <a:tabLst/>
+              <a:defRPr/>
+            </a:pPr>
+            <a:r>
+              <a:rPr kumimoji="0" lang="en-US" sz="4400" b="0" i="0" u="none" strike="noStrike" kern="1200" cap="none" spc="0" normalizeH="0" baseline="0" noProof="0" dirty="0" err="1" smtClean="0">
+                <a:ln>
+                  <a:noFill/>
+                </a:ln>
+                <a:solidFill>
+                  <a:schemeClr val="tx1">
+                    <a:lumMod val="50000"/>
+                    <a:lumOff val="50000"/>
+                  </a:schemeClr>
+                </a:solidFill>
+                <a:effectLst/>
+                <a:uLnTx/>
+                <a:uFillTx/>
+                <a:latin typeface="+mj-lt"/>
+                <a:ea typeface="+mj-ea"/>
+                <a:cs typeface="+mj-cs"/>
+              </a:rPr>
+              <a:t>IoC</a:t>
+            </a:r>
+            <a:endParaRPr kumimoji="0" lang="en-US" sz="4400" b="0" i="0" u="none" strike="noStrike" kern="1200" cap="none" spc="0" normalizeH="0" baseline="0" noProof="0" dirty="0" smtClean="0">
+              <a:ln>
+                <a:noFill/>
+              </a:ln>
+              <a:solidFill>
+                <a:schemeClr val="tx1">
+                  <a:lumMod val="50000"/>
+                  <a:lumOff val="50000"/>
+                </a:schemeClr>
+              </a:solidFill>
+              <a:effectLst/>
+              <a:uLnTx/>
+              <a:uFillTx/>
+              <a:latin typeface="+mj-lt"/>
+              <a:ea typeface="+mj-ea"/>
+              <a:cs typeface="+mj-cs"/>
+            </a:endParaRPr>
+          </a:p>
+        </p:txBody>
+      </p:sp>
     </p:spTree>
   </p:cSld>
   <p:clrMapOvr>
@@ -9680,47 +10667,107 @@
           <a:chExt cx="0" cy="0"/>
         </a:xfrm>
       </p:grpSpPr>
-      <p:sp>
-        <p:nvSpPr>
-          <p:cNvPr id="2" name="Title 1"/>
-          <p:cNvSpPr>
-            <a:spLocks noGrp="1"/>
-          </p:cNvSpPr>
-          <p:nvPr>
-            <p:ph type="title"/>
-          </p:nvPr>
-        </p:nvSpPr>
+      <p:pic>
+        <p:nvPicPr>
+          <p:cNvPr id="6" name="ManualInjection.cs.png" descr="/Users/fullerjc/Documents/presentations/dependencies/img/ManualInjection.cs.png"/>
+          <p:cNvPicPr>
+            <a:picLocks noChangeAspect="1"/>
+          </p:cNvPicPr>
+          <p:nvPr/>
+        </p:nvPicPr>
+        <p:blipFill>
+          <a:blip r:embed="rId3" r:link="rId4"/>
+          <a:stretch>
+            <a:fillRect/>
+          </a:stretch>
+        </p:blipFill>
         <p:spPr>
           <a:xfrm>
-            <a:off x="457200" y="2667000"/>
-            <a:ext cx="8229600" cy="1143000"/>
+            <a:off x="853117" y="2412912"/>
+            <a:ext cx="7437765" cy="2032176"/>
           </a:xfrm>
+          <a:prstGeom prst="rect">
+            <a:avLst/>
+          </a:prstGeom>
         </p:spPr>
-        <p:txBody>
-          <a:bodyPr>
-            <a:normAutofit fontScale="90000"/>
+      </p:pic>
+      <p:sp>
+        <p:nvSpPr>
+          <p:cNvPr id="3" name="Title 1"/>
+          <p:cNvSpPr txBox="1">
+            <a:spLocks/>
+          </p:cNvSpPr>
+          <p:nvPr/>
+        </p:nvSpPr>
+        <p:spPr>
+          <a:xfrm>
+            <a:off x="8153400" y="6096000"/>
+            <a:ext cx="990600" cy="762000"/>
+          </a:xfrm>
+          <a:prstGeom prst="rect">
+            <a:avLst/>
+          </a:prstGeom>
+        </p:spPr>
+        <p:txBody>
+          <a:bodyPr vert="horz" lIns="91440" tIns="45720" rIns="91440" bIns="45720" rtlCol="0" anchor="b">
+            <a:normAutofit/>
           </a:bodyPr>
           <a:lstStyle/>
           <a:p>
-            <a:r>
-              <a:rPr lang="en-US" dirty="0" smtClean="0"/>
-              <a:t>XXX</a:t>
-            </a:r>
-            <a:br>
-              <a:rPr lang="en-US" dirty="0" smtClean="0"/>
-            </a:br>
-            <a:r>
-              <a:rPr lang="en-US" dirty="0" smtClean="0"/>
-              <a:t>manual DI example</a:t>
-            </a:r>
-            <a:br>
-              <a:rPr lang="en-US" dirty="0" smtClean="0"/>
-            </a:br>
-            <a:r>
-              <a:rPr lang="en-US" dirty="0" smtClean="0"/>
-              <a:t>XXX</a:t>
-            </a:r>
-            <a:endParaRPr lang="en-US" dirty="0"/>
+            <a:pPr marL="0" marR="0" lvl="0" indent="0" algn="r" defTabSz="457200" rtl="0" eaLnBrk="1" fontAlgn="auto" latinLnBrk="0" hangingPunct="1">
+              <a:lnSpc>
+                <a:spcPct val="100000"/>
+              </a:lnSpc>
+              <a:spcBef>
+                <a:spcPct val="0"/>
+              </a:spcBef>
+              <a:spcAft>
+                <a:spcPts val="0"/>
+              </a:spcAft>
+              <a:buClrTx/>
+              <a:buSzTx/>
+              <a:buFontTx/>
+              <a:buNone/>
+              <a:tabLst/>
+              <a:defRPr/>
+            </a:pPr>
+            <a:r>
+              <a:rPr kumimoji="0" lang="en-US" sz="4400" b="0" i="0" u="none" strike="noStrike" kern="1200" cap="none" spc="0" normalizeH="0" baseline="0" noProof="0" dirty="0" err="1" smtClean="0">
+                <a:ln>
+                  <a:noFill/>
+                </a:ln>
+                <a:solidFill>
+                  <a:schemeClr val="tx1">
+                    <a:lumMod val="50000"/>
+                    <a:lumOff val="50000"/>
+                  </a:schemeClr>
+                </a:solidFill>
+                <a:effectLst/>
+                <a:uLnTx/>
+                <a:uFillTx/>
+                <a:latin typeface="+mj-lt"/>
+                <a:ea typeface="+mj-ea"/>
+                <a:cs typeface="+mj-cs"/>
+              </a:rPr>
+              <a:t>IoC</a:t>
+            </a:r>
+            <a:endParaRPr kumimoji="0" lang="en-US" sz="4400" b="0" i="0" u="none" strike="noStrike" kern="1200" cap="none" spc="0" normalizeH="0" baseline="0" noProof="0" dirty="0" smtClean="0">
+              <a:ln>
+                <a:noFill/>
+              </a:ln>
+              <a:solidFill>
+                <a:schemeClr val="tx1">
+                  <a:lumMod val="50000"/>
+                  <a:lumOff val="50000"/>
+                </a:schemeClr>
+              </a:solidFill>
+              <a:effectLst/>
+              <a:uLnTx/>
+              <a:uFillTx/>
+              <a:latin typeface="+mj-lt"/>
+              <a:ea typeface="+mj-ea"/>
+              <a:cs typeface="+mj-cs"/>
+            </a:endParaRPr>
           </a:p>
         </p:txBody>
       </p:sp>
@@ -9782,6 +10829,13 @@
   <p:clrMapOvr>
     <a:masterClrMapping/>
   </p:clrMapOvr>
+  <p:timing>
+    <p:tnLst>
+      <p:par>
+        <p:cTn id="1" dur="indefinite" restart="never" nodeType="tmRoot"/>
+      </p:par>
+    </p:tnLst>
+  </p:timing>
 </p:sld>
 </file>
 
@@ -9802,47 +10856,107 @@
           <a:chExt cx="0" cy="0"/>
         </a:xfrm>
       </p:grpSpPr>
-      <p:sp>
-        <p:nvSpPr>
-          <p:cNvPr id="2" name="Title 1"/>
-          <p:cNvSpPr>
-            <a:spLocks noGrp="1"/>
-          </p:cNvSpPr>
-          <p:nvPr>
-            <p:ph type="title"/>
-          </p:nvPr>
-        </p:nvSpPr>
+      <p:pic>
+        <p:nvPicPr>
+          <p:cNvPr id="3" name="Container.cs.png" descr="/Users/fullerjc/Documents/presentations/dependencies/img/Container.cs.png"/>
+          <p:cNvPicPr>
+            <a:picLocks noChangeAspect="1"/>
+          </p:cNvPicPr>
+          <p:nvPr/>
+        </p:nvPicPr>
+        <p:blipFill>
+          <a:blip r:embed="rId3" r:link="rId4"/>
+          <a:stretch>
+            <a:fillRect/>
+          </a:stretch>
+        </p:blipFill>
         <p:spPr>
           <a:xfrm>
-            <a:off x="457200" y="2667000"/>
-            <a:ext cx="8229600" cy="1143000"/>
+            <a:off x="381000" y="2064925"/>
+            <a:ext cx="9144000" cy="2728149"/>
           </a:xfrm>
+          <a:prstGeom prst="rect">
+            <a:avLst/>
+          </a:prstGeom>
         </p:spPr>
-        <p:txBody>
-          <a:bodyPr>
-            <a:normAutofit fontScale="90000"/>
+      </p:pic>
+      <p:sp>
+        <p:nvSpPr>
+          <p:cNvPr id="4" name="Title 1"/>
+          <p:cNvSpPr txBox="1">
+            <a:spLocks/>
+          </p:cNvSpPr>
+          <p:nvPr/>
+        </p:nvSpPr>
+        <p:spPr>
+          <a:xfrm>
+            <a:off x="8153400" y="6096000"/>
+            <a:ext cx="990600" cy="762000"/>
+          </a:xfrm>
+          <a:prstGeom prst="rect">
+            <a:avLst/>
+          </a:prstGeom>
+        </p:spPr>
+        <p:txBody>
+          <a:bodyPr vert="horz" lIns="91440" tIns="45720" rIns="91440" bIns="45720" rtlCol="0" anchor="b">
+            <a:normAutofit/>
           </a:bodyPr>
           <a:lstStyle/>
           <a:p>
-            <a:r>
-              <a:rPr lang="en-US" dirty="0" smtClean="0"/>
-              <a:t>XXX</a:t>
-            </a:r>
-            <a:br>
-              <a:rPr lang="en-US" dirty="0" smtClean="0"/>
-            </a:br>
-            <a:r>
-              <a:rPr lang="en-US" dirty="0" smtClean="0"/>
-              <a:t>IOC Example</a:t>
-            </a:r>
-            <a:br>
-              <a:rPr lang="en-US" dirty="0" smtClean="0"/>
-            </a:br>
-            <a:r>
-              <a:rPr lang="en-US" dirty="0" smtClean="0"/>
-              <a:t>XXX</a:t>
-            </a:r>
-            <a:endParaRPr lang="en-US" dirty="0"/>
+            <a:pPr marL="0" marR="0" lvl="0" indent="0" algn="r" defTabSz="457200" rtl="0" eaLnBrk="1" fontAlgn="auto" latinLnBrk="0" hangingPunct="1">
+              <a:lnSpc>
+                <a:spcPct val="100000"/>
+              </a:lnSpc>
+              <a:spcBef>
+                <a:spcPct val="0"/>
+              </a:spcBef>
+              <a:spcAft>
+                <a:spcPts val="0"/>
+              </a:spcAft>
+              <a:buClrTx/>
+              <a:buSzTx/>
+              <a:buFontTx/>
+              <a:buNone/>
+              <a:tabLst/>
+              <a:defRPr/>
+            </a:pPr>
+            <a:r>
+              <a:rPr kumimoji="0" lang="en-US" sz="4400" b="0" i="0" u="none" strike="noStrike" kern="1200" cap="none" spc="0" normalizeH="0" baseline="0" noProof="0" dirty="0" err="1" smtClean="0">
+                <a:ln>
+                  <a:noFill/>
+                </a:ln>
+                <a:solidFill>
+                  <a:schemeClr val="tx1">
+                    <a:lumMod val="50000"/>
+                    <a:lumOff val="50000"/>
+                  </a:schemeClr>
+                </a:solidFill>
+                <a:effectLst/>
+                <a:uLnTx/>
+                <a:uFillTx/>
+                <a:latin typeface="+mj-lt"/>
+                <a:ea typeface="+mj-ea"/>
+                <a:cs typeface="+mj-cs"/>
+              </a:rPr>
+              <a:t>IoC</a:t>
+            </a:r>
+            <a:endParaRPr kumimoji="0" lang="en-US" sz="4400" b="0" i="0" u="none" strike="noStrike" kern="1200" cap="none" spc="0" normalizeH="0" baseline="0" noProof="0" dirty="0" smtClean="0">
+              <a:ln>
+                <a:noFill/>
+              </a:ln>
+              <a:solidFill>
+                <a:schemeClr val="tx1">
+                  <a:lumMod val="50000"/>
+                  <a:lumOff val="50000"/>
+                </a:schemeClr>
+              </a:solidFill>
+              <a:effectLst/>
+              <a:uLnTx/>
+              <a:uFillTx/>
+              <a:latin typeface="+mj-lt"/>
+              <a:ea typeface="+mj-ea"/>
+              <a:cs typeface="+mj-cs"/>
+            </a:endParaRPr>
           </a:p>
         </p:txBody>
       </p:sp>
@@ -9851,6 +10965,13 @@
   <p:clrMapOvr>
     <a:masterClrMapping/>
   </p:clrMapOvr>
+  <p:timing>
+    <p:tnLst>
+      <p:par>
+        <p:cTn id="1" dur="indefinite" restart="never" nodeType="tmRoot"/>
+      </p:par>
+    </p:tnLst>
+  </p:timing>
 </p:sld>
 </file>
 
@@ -9873,61 +10994,120 @@
       </p:grpSpPr>
       <p:sp>
         <p:nvSpPr>
-          <p:cNvPr id="2" name="Title 1"/>
-          <p:cNvSpPr>
-            <a:spLocks noGrp="1"/>
-          </p:cNvSpPr>
-          <p:nvPr>
-            <p:ph type="title"/>
-          </p:nvPr>
+          <p:cNvPr id="4" name="Title 1"/>
+          <p:cNvSpPr txBox="1">
+            <a:spLocks/>
+          </p:cNvSpPr>
+          <p:nvPr/>
         </p:nvSpPr>
         <p:spPr>
           <a:xfrm>
-            <a:off x="457200" y="2667000"/>
-            <a:ext cx="8229600" cy="1143000"/>
+            <a:off x="8153400" y="6096000"/>
+            <a:ext cx="990600" cy="762000"/>
           </a:xfrm>
+          <a:prstGeom prst="rect">
+            <a:avLst/>
+          </a:prstGeom>
         </p:spPr>
         <p:txBody>
-          <a:bodyPr>
-            <a:normAutofit fontScale="90000"/>
+          <a:bodyPr vert="horz" lIns="91440" tIns="45720" rIns="91440" bIns="45720" rtlCol="0" anchor="b">
+            <a:normAutofit/>
           </a:bodyPr>
           <a:lstStyle/>
           <a:p>
-            <a:r>
-              <a:rPr lang="en-US" dirty="0" smtClean="0"/>
-              <a:t>XXX</a:t>
-            </a:r>
-            <a:br>
-              <a:rPr lang="en-US" dirty="0" smtClean="0"/>
-            </a:br>
-            <a:r>
-              <a:rPr lang="en-US" dirty="0" smtClean="0"/>
-              <a:t>IOC Example </a:t>
-            </a:r>
-            <a:r>
-              <a:rPr lang="en-US" dirty="0" err="1" smtClean="0"/>
-              <a:t>w/Autowire</a:t>
-            </a:r>
-            <a:r>
-              <a:rPr lang="en-US" dirty="0" smtClean="0"/>
-              <a:t/>
-            </a:r>
-            <a:br>
-              <a:rPr lang="en-US" dirty="0" smtClean="0"/>
-            </a:br>
-            <a:r>
-              <a:rPr lang="en-US" dirty="0" smtClean="0"/>
-              <a:t>XXX</a:t>
-            </a:r>
-            <a:endParaRPr lang="en-US" dirty="0"/>
-          </a:p>
-        </p:txBody>
-      </p:sp>
+            <a:pPr marL="0" marR="0" lvl="0" indent="0" algn="r" defTabSz="457200" rtl="0" eaLnBrk="1" fontAlgn="auto" latinLnBrk="0" hangingPunct="1">
+              <a:lnSpc>
+                <a:spcPct val="100000"/>
+              </a:lnSpc>
+              <a:spcBef>
+                <a:spcPct val="0"/>
+              </a:spcBef>
+              <a:spcAft>
+                <a:spcPts val="0"/>
+              </a:spcAft>
+              <a:buClrTx/>
+              <a:buSzTx/>
+              <a:buFontTx/>
+              <a:buNone/>
+              <a:tabLst/>
+              <a:defRPr/>
+            </a:pPr>
+            <a:r>
+              <a:rPr kumimoji="0" lang="en-US" sz="4400" b="0" i="0" u="none" strike="noStrike" kern="1200" cap="none" spc="0" normalizeH="0" baseline="0" noProof="0" dirty="0" err="1" smtClean="0">
+                <a:ln>
+                  <a:noFill/>
+                </a:ln>
+                <a:solidFill>
+                  <a:schemeClr val="tx1">
+                    <a:lumMod val="50000"/>
+                    <a:lumOff val="50000"/>
+                  </a:schemeClr>
+                </a:solidFill>
+                <a:effectLst/>
+                <a:uLnTx/>
+                <a:uFillTx/>
+                <a:latin typeface="+mj-lt"/>
+                <a:ea typeface="+mj-ea"/>
+                <a:cs typeface="+mj-cs"/>
+              </a:rPr>
+              <a:t>IoC</a:t>
+            </a:r>
+            <a:endParaRPr kumimoji="0" lang="en-US" sz="4400" b="0" i="0" u="none" strike="noStrike" kern="1200" cap="none" spc="0" normalizeH="0" baseline="0" noProof="0" dirty="0" smtClean="0">
+              <a:ln>
+                <a:noFill/>
+              </a:ln>
+              <a:solidFill>
+                <a:schemeClr val="tx1">
+                  <a:lumMod val="50000"/>
+                  <a:lumOff val="50000"/>
+                </a:schemeClr>
+              </a:solidFill>
+              <a:effectLst/>
+              <a:uLnTx/>
+              <a:uFillTx/>
+              <a:latin typeface="+mj-lt"/>
+              <a:ea typeface="+mj-ea"/>
+              <a:cs typeface="+mj-cs"/>
+            </a:endParaRPr>
+          </a:p>
+        </p:txBody>
+      </p:sp>
+      <p:pic>
+        <p:nvPicPr>
+          <p:cNvPr id="5" name="ContainerAutowire.cs.png" descr="/Users/fullerjc/Documents/presentations/dependencies/img/ContainerAutowire.cs.png"/>
+          <p:cNvPicPr>
+            <a:picLocks noChangeAspect="1"/>
+          </p:cNvPicPr>
+          <p:nvPr/>
+        </p:nvPicPr>
+        <p:blipFill>
+          <a:blip r:embed="rId3" r:link="rId4"/>
+          <a:stretch>
+            <a:fillRect/>
+          </a:stretch>
+        </p:blipFill>
+        <p:spPr>
+          <a:xfrm>
+            <a:off x="670221" y="1772776"/>
+            <a:ext cx="7803557" cy="3312447"/>
+          </a:xfrm>
+          <a:prstGeom prst="rect">
+            <a:avLst/>
+          </a:prstGeom>
+        </p:spPr>
+      </p:pic>
     </p:spTree>
   </p:cSld>
   <p:clrMapOvr>
     <a:masterClrMapping/>
   </p:clrMapOvr>
+  <p:timing>
+    <p:tnLst>
+      <p:par>
+        <p:cTn id="1" dur="indefinite" restart="never" nodeType="tmRoot"/>
+      </p:par>
+    </p:tnLst>
+  </p:timing>
 </p:sld>
 </file>
 
@@ -9976,11 +11156,487 @@
           </a:p>
         </p:txBody>
       </p:sp>
+      <p:sp>
+        <p:nvSpPr>
+          <p:cNvPr id="4" name="Title 1"/>
+          <p:cNvSpPr txBox="1">
+            <a:spLocks/>
+          </p:cNvSpPr>
+          <p:nvPr/>
+        </p:nvSpPr>
+        <p:spPr>
+          <a:xfrm>
+            <a:off x="609600" y="3733800"/>
+            <a:ext cx="4191000" cy="1143000"/>
+          </a:xfrm>
+          <a:prstGeom prst="rect">
+            <a:avLst/>
+          </a:prstGeom>
+        </p:spPr>
+        <p:txBody>
+          <a:bodyPr vert="horz" lIns="91440" tIns="45720" rIns="91440" bIns="45720" rtlCol="0" anchor="ctr">
+            <a:normAutofit/>
+          </a:bodyPr>
+          <a:lstStyle/>
+          <a:p>
+            <a:pPr marL="0" marR="0" lvl="0" indent="0" algn="ctr" defTabSz="457200" rtl="0" eaLnBrk="1" fontAlgn="auto" latinLnBrk="0" hangingPunct="1">
+              <a:lnSpc>
+                <a:spcPct val="100000"/>
+              </a:lnSpc>
+              <a:spcBef>
+                <a:spcPct val="0"/>
+              </a:spcBef>
+              <a:spcAft>
+                <a:spcPts val="0"/>
+              </a:spcAft>
+              <a:buClrTx/>
+              <a:buSzTx/>
+              <a:buFontTx/>
+              <a:buNone/>
+              <a:tabLst/>
+              <a:defRPr/>
+            </a:pPr>
+            <a:r>
+              <a:rPr kumimoji="0" lang="en-US" sz="4400" b="0" i="0" u="none" strike="noStrike" kern="1200" cap="none" spc="0" normalizeH="0" baseline="0" noProof="0" dirty="0" smtClean="0">
+                <a:ln>
+                  <a:noFill/>
+                </a:ln>
+                <a:solidFill>
+                  <a:schemeClr val="accent3">
+                    <a:lumMod val="50000"/>
+                  </a:schemeClr>
+                </a:solidFill>
+                <a:effectLst/>
+                <a:uLnTx/>
+                <a:uFillTx/>
+                <a:latin typeface="+mj-lt"/>
+                <a:ea typeface="+mj-ea"/>
+                <a:cs typeface="+mj-cs"/>
+              </a:rPr>
+              <a:t>Java</a:t>
+            </a:r>
+            <a:endParaRPr kumimoji="0" lang="en-US" sz="4400" b="0" i="0" u="none" strike="noStrike" kern="1200" cap="none" spc="0" normalizeH="0" baseline="0" noProof="0" dirty="0">
+              <a:ln>
+                <a:noFill/>
+              </a:ln>
+              <a:solidFill>
+                <a:schemeClr val="accent3">
+                  <a:lumMod val="50000"/>
+                </a:schemeClr>
+              </a:solidFill>
+              <a:effectLst/>
+              <a:uLnTx/>
+              <a:uFillTx/>
+              <a:latin typeface="+mj-lt"/>
+              <a:ea typeface="+mj-ea"/>
+              <a:cs typeface="+mj-cs"/>
+            </a:endParaRPr>
+          </a:p>
+        </p:txBody>
+      </p:sp>
+      <p:sp>
+        <p:nvSpPr>
+          <p:cNvPr id="5" name="Title 1"/>
+          <p:cNvSpPr txBox="1">
+            <a:spLocks/>
+          </p:cNvSpPr>
+          <p:nvPr/>
+        </p:nvSpPr>
+        <p:spPr>
+          <a:xfrm>
+            <a:off x="4419600" y="3733800"/>
+            <a:ext cx="4191000" cy="1143000"/>
+          </a:xfrm>
+          <a:prstGeom prst="rect">
+            <a:avLst/>
+          </a:prstGeom>
+        </p:spPr>
+        <p:txBody>
+          <a:bodyPr vert="horz" lIns="91440" tIns="45720" rIns="91440" bIns="45720" rtlCol="0" anchor="ctr">
+            <a:normAutofit/>
+          </a:bodyPr>
+          <a:lstStyle/>
+          <a:p>
+            <a:pPr marL="0" marR="0" lvl="0" indent="0" algn="ctr" defTabSz="457200" rtl="0" eaLnBrk="1" fontAlgn="auto" latinLnBrk="0" hangingPunct="1">
+              <a:lnSpc>
+                <a:spcPct val="100000"/>
+              </a:lnSpc>
+              <a:spcBef>
+                <a:spcPct val="0"/>
+              </a:spcBef>
+              <a:spcAft>
+                <a:spcPts val="0"/>
+              </a:spcAft>
+              <a:buClrTx/>
+              <a:buSzTx/>
+              <a:buFontTx/>
+              <a:buNone/>
+              <a:tabLst/>
+              <a:defRPr/>
+            </a:pPr>
+            <a:r>
+              <a:rPr kumimoji="0" lang="en-US" sz="4400" b="0" i="0" u="none" strike="noStrike" kern="1200" cap="none" spc="0" normalizeH="0" baseline="0" noProof="0" dirty="0" smtClean="0">
+                <a:ln>
+                  <a:noFill/>
+                </a:ln>
+                <a:solidFill>
+                  <a:schemeClr val="tx2"/>
+                </a:solidFill>
+                <a:effectLst/>
+                <a:uLnTx/>
+                <a:uFillTx/>
+                <a:latin typeface="+mj-lt"/>
+                <a:ea typeface="+mj-ea"/>
+                <a:cs typeface="+mj-cs"/>
+              </a:rPr>
+              <a:t>.NET</a:t>
+            </a:r>
+            <a:endParaRPr kumimoji="0" lang="en-US" sz="4400" b="0" i="0" u="none" strike="noStrike" kern="1200" cap="none" spc="0" normalizeH="0" baseline="0" noProof="0" dirty="0">
+              <a:ln>
+                <a:noFill/>
+              </a:ln>
+              <a:solidFill>
+                <a:schemeClr val="tx2"/>
+              </a:solidFill>
+              <a:effectLst/>
+              <a:uLnTx/>
+              <a:uFillTx/>
+              <a:latin typeface="+mj-lt"/>
+              <a:ea typeface="+mj-ea"/>
+              <a:cs typeface="+mj-cs"/>
+            </a:endParaRPr>
+          </a:p>
+        </p:txBody>
+      </p:sp>
+      <p:sp>
+        <p:nvSpPr>
+          <p:cNvPr id="6" name="Title 1"/>
+          <p:cNvSpPr txBox="1">
+            <a:spLocks/>
+          </p:cNvSpPr>
+          <p:nvPr/>
+        </p:nvSpPr>
+        <p:spPr>
+          <a:xfrm>
+            <a:off x="2590800" y="4572000"/>
+            <a:ext cx="4191000" cy="1143000"/>
+          </a:xfrm>
+          <a:prstGeom prst="rect">
+            <a:avLst/>
+          </a:prstGeom>
+        </p:spPr>
+        <p:txBody>
+          <a:bodyPr vert="horz" lIns="91440" tIns="45720" rIns="91440" bIns="45720" rtlCol="0" anchor="ctr">
+            <a:normAutofit/>
+          </a:bodyPr>
+          <a:lstStyle/>
+          <a:p>
+            <a:pPr marL="0" marR="0" lvl="0" indent="0" algn="ctr" defTabSz="457200" rtl="0" eaLnBrk="1" fontAlgn="auto" latinLnBrk="0" hangingPunct="1">
+              <a:lnSpc>
+                <a:spcPct val="100000"/>
+              </a:lnSpc>
+              <a:spcBef>
+                <a:spcPct val="0"/>
+              </a:spcBef>
+              <a:spcAft>
+                <a:spcPts val="0"/>
+              </a:spcAft>
+              <a:buClrTx/>
+              <a:buSzTx/>
+              <a:buFontTx/>
+              <a:buNone/>
+              <a:tabLst/>
+              <a:defRPr/>
+            </a:pPr>
+            <a:r>
+              <a:rPr kumimoji="0" lang="en-US" sz="4400" b="0" i="0" u="none" strike="noStrike" kern="1200" cap="none" spc="0" normalizeH="0" baseline="0" noProof="0" dirty="0" smtClean="0">
+                <a:ln>
+                  <a:noFill/>
+                </a:ln>
+                <a:solidFill>
+                  <a:srgbClr val="800000"/>
+                </a:solidFill>
+                <a:effectLst/>
+                <a:uLnTx/>
+                <a:uFillTx/>
+                <a:latin typeface="+mj-lt"/>
+                <a:ea typeface="+mj-ea"/>
+                <a:cs typeface="+mj-cs"/>
+              </a:rPr>
+              <a:t>Dynamic</a:t>
+            </a:r>
+            <a:endParaRPr kumimoji="0" lang="en-US" sz="4400" b="0" i="0" u="none" strike="noStrike" kern="1200" cap="none" spc="0" normalizeH="0" baseline="0" noProof="0" dirty="0">
+              <a:ln>
+                <a:noFill/>
+              </a:ln>
+              <a:solidFill>
+                <a:srgbClr val="800000"/>
+              </a:solidFill>
+              <a:effectLst/>
+              <a:uLnTx/>
+              <a:uFillTx/>
+              <a:latin typeface="+mj-lt"/>
+              <a:ea typeface="+mj-ea"/>
+              <a:cs typeface="+mj-cs"/>
+            </a:endParaRPr>
+          </a:p>
+        </p:txBody>
+      </p:sp>
+      <p:sp>
+        <p:nvSpPr>
+          <p:cNvPr id="9" name="Title 1"/>
+          <p:cNvSpPr txBox="1">
+            <a:spLocks/>
+          </p:cNvSpPr>
+          <p:nvPr/>
+        </p:nvSpPr>
+        <p:spPr>
+          <a:xfrm>
+            <a:off x="8153400" y="6096000"/>
+            <a:ext cx="990600" cy="762000"/>
+          </a:xfrm>
+          <a:prstGeom prst="rect">
+            <a:avLst/>
+          </a:prstGeom>
+        </p:spPr>
+        <p:txBody>
+          <a:bodyPr vert="horz" lIns="91440" tIns="45720" rIns="91440" bIns="45720" rtlCol="0" anchor="b">
+            <a:normAutofit/>
+          </a:bodyPr>
+          <a:lstStyle/>
+          <a:p>
+            <a:pPr marL="0" marR="0" lvl="0" indent="0" algn="r" defTabSz="457200" rtl="0" eaLnBrk="1" fontAlgn="auto" latinLnBrk="0" hangingPunct="1">
+              <a:lnSpc>
+                <a:spcPct val="100000"/>
+              </a:lnSpc>
+              <a:spcBef>
+                <a:spcPct val="0"/>
+              </a:spcBef>
+              <a:spcAft>
+                <a:spcPts val="0"/>
+              </a:spcAft>
+              <a:buClrTx/>
+              <a:buSzTx/>
+              <a:buFontTx/>
+              <a:buNone/>
+              <a:tabLst/>
+              <a:defRPr/>
+            </a:pPr>
+            <a:r>
+              <a:rPr kumimoji="0" lang="en-US" sz="4400" b="0" i="0" u="none" strike="noStrike" kern="1200" cap="none" spc="0" normalizeH="0" baseline="0" noProof="0" dirty="0" err="1" smtClean="0">
+                <a:ln>
+                  <a:noFill/>
+                </a:ln>
+                <a:solidFill>
+                  <a:schemeClr val="tx1">
+                    <a:lumMod val="50000"/>
+                    <a:lumOff val="50000"/>
+                  </a:schemeClr>
+                </a:solidFill>
+                <a:effectLst/>
+                <a:uLnTx/>
+                <a:uFillTx/>
+                <a:latin typeface="+mj-lt"/>
+                <a:ea typeface="+mj-ea"/>
+                <a:cs typeface="+mj-cs"/>
+              </a:rPr>
+              <a:t>IoC</a:t>
+            </a:r>
+            <a:endParaRPr kumimoji="0" lang="en-US" sz="4400" b="0" i="0" u="none" strike="noStrike" kern="1200" cap="none" spc="0" normalizeH="0" baseline="0" noProof="0" dirty="0" smtClean="0">
+              <a:ln>
+                <a:noFill/>
+              </a:ln>
+              <a:solidFill>
+                <a:schemeClr val="tx1">
+                  <a:lumMod val="50000"/>
+                  <a:lumOff val="50000"/>
+                </a:schemeClr>
+              </a:solidFill>
+              <a:effectLst/>
+              <a:uLnTx/>
+              <a:uFillTx/>
+              <a:latin typeface="+mj-lt"/>
+              <a:ea typeface="+mj-ea"/>
+              <a:cs typeface="+mj-cs"/>
+            </a:endParaRPr>
+          </a:p>
+        </p:txBody>
+      </p:sp>
     </p:spTree>
   </p:cSld>
   <p:clrMapOvr>
     <a:masterClrMapping/>
   </p:clrMapOvr>
+  <p:timing>
+    <p:tnLst>
+      <p:par>
+        <p:cTn id="1" dur="indefinite" restart="never" nodeType="tmRoot">
+          <p:childTnLst>
+            <p:seq concurrent="1" nextAc="seek">
+              <p:cTn id="2" dur="indefinite" nodeType="mainSeq">
+                <p:childTnLst>
+                  <p:par>
+                    <p:cTn id="3" fill="hold">
+                      <p:stCondLst>
+                        <p:cond delay="indefinite"/>
+                      </p:stCondLst>
+                      <p:childTnLst>
+                        <p:par>
+                          <p:cTn id="4" fill="hold">
+                            <p:stCondLst>
+                              <p:cond delay="0"/>
+                            </p:stCondLst>
+                            <p:childTnLst>
+                              <p:par>
+                                <p:cTn id="5" presetID="1" presetClass="entr" presetSubtype="0" fill="hold" grpId="0" nodeType="clickEffect">
+                                  <p:stCondLst>
+                                    <p:cond delay="0"/>
+                                  </p:stCondLst>
+                                  <p:childTnLst>
+                                    <p:set>
+                                      <p:cBhvr>
+                                        <p:cTn id="6" dur="1" fill="hold">
+                                          <p:stCondLst>
+                                            <p:cond delay="0"/>
+                                          </p:stCondLst>
+                                        </p:cTn>
+                                        <p:tgtEl>
+                                          <p:spTgt spid="4"/>
+                                        </p:tgtEl>
+                                        <p:attrNameLst>
+                                          <p:attrName>style.visibility</p:attrName>
+                                        </p:attrNameLst>
+                                      </p:cBhvr>
+                                      <p:to>
+                                        <p:strVal val="visible"/>
+                                      </p:to>
+                                    </p:set>
+                                  </p:childTnLst>
+                                </p:cTn>
+                              </p:par>
+                            </p:childTnLst>
+                          </p:cTn>
+                        </p:par>
+                      </p:childTnLst>
+                    </p:cTn>
+                  </p:par>
+                  <p:par>
+                    <p:cTn id="7" fill="hold">
+                      <p:stCondLst>
+                        <p:cond delay="indefinite"/>
+                      </p:stCondLst>
+                      <p:childTnLst>
+                        <p:par>
+                          <p:cTn id="8" fill="hold">
+                            <p:stCondLst>
+                              <p:cond delay="0"/>
+                            </p:stCondLst>
+                            <p:childTnLst>
+                              <p:par>
+                                <p:cTn id="9" presetID="1" presetClass="entr" presetSubtype="0" fill="hold" grpId="0" nodeType="clickEffect">
+                                  <p:stCondLst>
+                                    <p:cond delay="0"/>
+                                  </p:stCondLst>
+                                  <p:childTnLst>
+                                    <p:set>
+                                      <p:cBhvr>
+                                        <p:cTn id="10" dur="1" fill="hold">
+                                          <p:stCondLst>
+                                            <p:cond delay="0"/>
+                                          </p:stCondLst>
+                                        </p:cTn>
+                                        <p:tgtEl>
+                                          <p:spTgt spid="5"/>
+                                        </p:tgtEl>
+                                        <p:attrNameLst>
+                                          <p:attrName>style.visibility</p:attrName>
+                                        </p:attrNameLst>
+                                      </p:cBhvr>
+                                      <p:to>
+                                        <p:strVal val="visible"/>
+                                      </p:to>
+                                    </p:set>
+                                  </p:childTnLst>
+                                </p:cTn>
+                              </p:par>
+                            </p:childTnLst>
+                          </p:cTn>
+                        </p:par>
+                      </p:childTnLst>
+                    </p:cTn>
+                  </p:par>
+                  <p:par>
+                    <p:cTn id="11" fill="hold">
+                      <p:stCondLst>
+                        <p:cond delay="indefinite"/>
+                      </p:stCondLst>
+                      <p:childTnLst>
+                        <p:par>
+                          <p:cTn id="12" fill="hold">
+                            <p:stCondLst>
+                              <p:cond delay="0"/>
+                            </p:stCondLst>
+                            <p:childTnLst>
+                              <p:par>
+                                <p:cTn id="13" presetID="1" presetClass="entr" presetSubtype="0" fill="hold" grpId="0" nodeType="clickEffect">
+                                  <p:stCondLst>
+                                    <p:cond delay="0"/>
+                                  </p:stCondLst>
+                                  <p:childTnLst>
+                                    <p:set>
+                                      <p:cBhvr>
+                                        <p:cTn id="14" dur="1" fill="hold">
+                                          <p:stCondLst>
+                                            <p:cond delay="0"/>
+                                          </p:stCondLst>
+                                        </p:cTn>
+                                        <p:tgtEl>
+                                          <p:spTgt spid="6"/>
+                                        </p:tgtEl>
+                                        <p:attrNameLst>
+                                          <p:attrName>style.visibility</p:attrName>
+                                        </p:attrNameLst>
+                                      </p:cBhvr>
+                                      <p:to>
+                                        <p:strVal val="visible"/>
+                                      </p:to>
+                                    </p:set>
+                                  </p:childTnLst>
+                                </p:cTn>
+                              </p:par>
+                            </p:childTnLst>
+                          </p:cTn>
+                        </p:par>
+                      </p:childTnLst>
+                    </p:cTn>
+                  </p:par>
+                </p:childTnLst>
+              </p:cTn>
+              <p:prevCondLst>
+                <p:cond evt="onPrev" delay="0">
+                  <p:tgtEl>
+                    <p:sldTgt/>
+                  </p:tgtEl>
+                </p:cond>
+              </p:prevCondLst>
+              <p:nextCondLst>
+                <p:cond evt="onNext" delay="0">
+                  <p:tgtEl>
+                    <p:sldTgt/>
+                  </p:tgtEl>
+                </p:cond>
+              </p:nextCondLst>
+            </p:seq>
+          </p:childTnLst>
+        </p:cTn>
+      </p:par>
+    </p:tnLst>
+    <p:bldLst>
+      <p:bldP spid="4" grpId="0"/>
+      <p:bldP spid="5" grpId="0"/>
+      <p:bldP spid="6" grpId="0"/>
+    </p:bldLst>
+  </p:timing>
 </p:sld>
 </file>
 
@@ -10023,9 +11679,89 @@
           <a:p>
             <a:r>
               <a:rPr lang="en-US" dirty="0" smtClean="0"/>
-              <a:t>simplicity</a:t>
+              <a:t>lifecycle management</a:t>
             </a:r>
             <a:endParaRPr lang="en-US" dirty="0"/>
+          </a:p>
+        </p:txBody>
+      </p:sp>
+      <p:sp>
+        <p:nvSpPr>
+          <p:cNvPr id="3" name="Title 1"/>
+          <p:cNvSpPr txBox="1">
+            <a:spLocks/>
+          </p:cNvSpPr>
+          <p:nvPr/>
+        </p:nvSpPr>
+        <p:spPr>
+          <a:xfrm>
+            <a:off x="8153400" y="6096000"/>
+            <a:ext cx="990600" cy="762000"/>
+          </a:xfrm>
+          <a:prstGeom prst="rect">
+            <a:avLst/>
+          </a:prstGeom>
+        </p:spPr>
+        <p:txBody>
+          <a:bodyPr vert="horz" lIns="91440" tIns="45720" rIns="91440" bIns="45720" rtlCol="0" anchor="b">
+            <a:normAutofit/>
+          </a:bodyPr>
+          <a:lstStyle/>
+          <a:p>
+            <a:pPr marL="0" marR="0" lvl="0" indent="0" algn="r" defTabSz="457200" rtl="0" eaLnBrk="1" fontAlgn="auto" latinLnBrk="0" hangingPunct="1">
+              <a:lnSpc>
+                <a:spcPct val="100000"/>
+              </a:lnSpc>
+              <a:spcBef>
+                <a:spcPct val="0"/>
+              </a:spcBef>
+              <a:spcAft>
+                <a:spcPts val="0"/>
+              </a:spcAft>
+              <a:buClrTx/>
+              <a:buSzTx/>
+              <a:buFontTx/>
+              <a:buNone/>
+              <a:tabLst/>
+              <a:defRPr/>
+            </a:pPr>
+            <a:r>
+              <a:rPr kumimoji="0" lang="en-US" sz="4400" b="0" i="0" u="none" strike="noStrike" kern="1200" cap="none" spc="0" normalizeH="0" baseline="0" noProof="0" dirty="0" err="1" smtClean="0">
+                <a:ln>
+                  <a:noFill/>
+                </a:ln>
+                <a:solidFill>
+                  <a:schemeClr val="tx1">
+                    <a:lumMod val="50000"/>
+                    <a:lumOff val="50000"/>
+                  </a:schemeClr>
+                </a:solidFill>
+                <a:effectLst/>
+                <a:uLnTx/>
+                <a:uFillTx/>
+                <a:latin typeface="+mj-lt"/>
+                <a:ea typeface="+mj-ea"/>
+                <a:cs typeface="+mj-cs"/>
+              </a:rPr>
+              <a:t>IoC</a:t>
+            </a:r>
+            <a:endParaRPr kumimoji="0" lang="en-US" sz="4400" b="0" i="0" u="none" strike="noStrike" kern="1200" cap="none" spc="0" normalizeH="0" baseline="0" noProof="0" dirty="0" smtClean="0">
+              <a:ln>
+                <a:noFill/>
+              </a:ln>
+              <a:solidFill>
+                <a:schemeClr val="tx1">
+                  <a:lumMod val="50000"/>
+                  <a:lumOff val="50000"/>
+                </a:schemeClr>
+              </a:solidFill>
+              <a:effectLst/>
+              <a:uLnTx/>
+              <a:uFillTx/>
+              <a:latin typeface="+mj-lt"/>
+              <a:ea typeface="+mj-ea"/>
+              <a:cs typeface="+mj-cs"/>
+            </a:endParaRPr>
           </a:p>
         </p:txBody>
       </p:sp>
@@ -10034,6 +11770,801 @@
   <p:clrMapOvr>
     <a:masterClrMapping/>
   </p:clrMapOvr>
+  <p:timing>
+    <p:tnLst>
+      <p:par>
+        <p:cTn id="1" dur="indefinite" restart="never" nodeType="tmRoot"/>
+      </p:par>
+    </p:tnLst>
+  </p:timing>
+</p:sld>
+</file>
+
+<file path=ppt/slides/slide34.xml><?xml version="1.0" encoding="utf-8"?>
+<p:sld xmlns:a="http://schemas.openxmlformats.org/drawingml/2006/main" xmlns:r="http://schemas.openxmlformats.org/officeDocument/2006/relationships" xmlns:mc="http://schemas.openxmlformats.org/markup-compatibility/2006" xmlns:mv="urn:schemas-microsoft-com:mac:vml" xmlns:p="http://schemas.openxmlformats.org/presentationml/2006/main" mc:Ignorable="mv" mc:PreserveAttributes="mv:*">
+  <p:cSld>
+    <p:spTree>
+      <p:nvGrpSpPr>
+        <p:cNvPr id="1" name=""/>
+        <p:cNvGrpSpPr/>
+        <p:nvPr/>
+      </p:nvGrpSpPr>
+      <p:grpSpPr>
+        <a:xfrm>
+          <a:off x="0" y="0"/>
+          <a:ext cx="0" cy="0"/>
+          <a:chOff x="0" y="0"/>
+          <a:chExt cx="0" cy="0"/>
+        </a:xfrm>
+      </p:grpSpPr>
+      <p:pic>
+        <p:nvPicPr>
+          <p:cNvPr id="4" name="Picture 3" descr="Singleton.cs.png"/>
+          <p:cNvPicPr>
+            <a:picLocks noChangeAspect="1"/>
+          </p:cNvPicPr>
+          <p:nvPr/>
+        </p:nvPicPr>
+        <p:blipFill>
+          <a:blip r:embed="rId3"/>
+          <a:stretch>
+            <a:fillRect/>
+          </a:stretch>
+        </p:blipFill>
+        <p:spPr>
+          <a:xfrm>
+            <a:off x="304430" y="1681328"/>
+            <a:ext cx="8535140" cy="3495343"/>
+          </a:xfrm>
+          <a:prstGeom prst="rect">
+            <a:avLst/>
+          </a:prstGeom>
+        </p:spPr>
+      </p:pic>
+      <p:sp>
+        <p:nvSpPr>
+          <p:cNvPr id="5" name="Title 1"/>
+          <p:cNvSpPr txBox="1">
+            <a:spLocks/>
+          </p:cNvSpPr>
+          <p:nvPr/>
+        </p:nvSpPr>
+        <p:spPr>
+          <a:xfrm>
+            <a:off x="8153400" y="6096000"/>
+            <a:ext cx="990600" cy="762000"/>
+          </a:xfrm>
+          <a:prstGeom prst="rect">
+            <a:avLst/>
+          </a:prstGeom>
+        </p:spPr>
+        <p:txBody>
+          <a:bodyPr vert="horz" lIns="91440" tIns="45720" rIns="91440" bIns="45720" rtlCol="0" anchor="b">
+            <a:normAutofit/>
+          </a:bodyPr>
+          <a:lstStyle/>
+          <a:p>
+            <a:pPr marL="0" marR="0" lvl="0" indent="0" algn="r" defTabSz="457200" rtl="0" eaLnBrk="1" fontAlgn="auto" latinLnBrk="0" hangingPunct="1">
+              <a:lnSpc>
+                <a:spcPct val="100000"/>
+              </a:lnSpc>
+              <a:spcBef>
+                <a:spcPct val="0"/>
+              </a:spcBef>
+              <a:spcAft>
+                <a:spcPts val="0"/>
+              </a:spcAft>
+              <a:buClrTx/>
+              <a:buSzTx/>
+              <a:buFontTx/>
+              <a:buNone/>
+              <a:tabLst/>
+              <a:defRPr/>
+            </a:pPr>
+            <a:r>
+              <a:rPr kumimoji="0" lang="en-US" sz="4400" b="0" i="0" u="none" strike="noStrike" kern="1200" cap="none" spc="0" normalizeH="0" baseline="0" noProof="0" dirty="0" err="1" smtClean="0">
+                <a:ln>
+                  <a:noFill/>
+                </a:ln>
+                <a:solidFill>
+                  <a:schemeClr val="tx1">
+                    <a:lumMod val="50000"/>
+                    <a:lumOff val="50000"/>
+                  </a:schemeClr>
+                </a:solidFill>
+                <a:effectLst/>
+                <a:uLnTx/>
+                <a:uFillTx/>
+                <a:latin typeface="+mj-lt"/>
+                <a:ea typeface="+mj-ea"/>
+                <a:cs typeface="+mj-cs"/>
+              </a:rPr>
+              <a:t>IoC</a:t>
+            </a:r>
+            <a:endParaRPr kumimoji="0" lang="en-US" sz="4400" b="0" i="0" u="none" strike="noStrike" kern="1200" cap="none" spc="0" normalizeH="0" baseline="0" noProof="0" dirty="0" smtClean="0">
+              <a:ln>
+                <a:noFill/>
+              </a:ln>
+              <a:solidFill>
+                <a:schemeClr val="tx1">
+                  <a:lumMod val="50000"/>
+                  <a:lumOff val="50000"/>
+                </a:schemeClr>
+              </a:solidFill>
+              <a:effectLst/>
+              <a:uLnTx/>
+              <a:uFillTx/>
+              <a:latin typeface="+mj-lt"/>
+              <a:ea typeface="+mj-ea"/>
+              <a:cs typeface="+mj-cs"/>
+            </a:endParaRPr>
+          </a:p>
+        </p:txBody>
+      </p:sp>
+    </p:spTree>
+  </p:cSld>
+  <p:clrMapOvr>
+    <a:masterClrMapping/>
+  </p:clrMapOvr>
+  <p:timing>
+    <p:tnLst>
+      <p:par>
+        <p:cTn id="1" dur="indefinite" restart="never" nodeType="tmRoot"/>
+      </p:par>
+    </p:tnLst>
+  </p:timing>
+</p:sld>
+</file>
+
+<file path=ppt/slides/slide35.xml><?xml version="1.0" encoding="utf-8"?>
+<p:sld xmlns:a="http://schemas.openxmlformats.org/drawingml/2006/main" xmlns:r="http://schemas.openxmlformats.org/officeDocument/2006/relationships" xmlns:mc="http://schemas.openxmlformats.org/markup-compatibility/2006" xmlns:mv="urn:schemas-microsoft-com:mac:vml" xmlns:p="http://schemas.openxmlformats.org/presentationml/2006/main" mc:Ignorable="mv" mc:PreserveAttributes="mv:*">
+  <p:cSld>
+    <p:spTree>
+      <p:nvGrpSpPr>
+        <p:cNvPr id="1" name=""/>
+        <p:cNvGrpSpPr/>
+        <p:nvPr/>
+      </p:nvGrpSpPr>
+      <p:grpSpPr>
+        <a:xfrm>
+          <a:off x="0" y="0"/>
+          <a:ext cx="0" cy="0"/>
+          <a:chOff x="0" y="0"/>
+          <a:chExt cx="0" cy="0"/>
+        </a:xfrm>
+      </p:grpSpPr>
+      <p:sp>
+        <p:nvSpPr>
+          <p:cNvPr id="2" name="Title 1"/>
+          <p:cNvSpPr>
+            <a:spLocks noGrp="1"/>
+          </p:cNvSpPr>
+          <p:nvPr>
+            <p:ph type="title"/>
+          </p:nvPr>
+        </p:nvSpPr>
+        <p:spPr>
+          <a:xfrm>
+            <a:off x="457200" y="2667000"/>
+            <a:ext cx="8229600" cy="1143000"/>
+          </a:xfrm>
+        </p:spPr>
+        <p:txBody>
+          <a:bodyPr/>
+          <a:lstStyle/>
+          <a:p>
+            <a:r>
+              <a:rPr lang="en-US" dirty="0" err="1" smtClean="0"/>
+              <a:t>aop</a:t>
+            </a:r>
+            <a:r>
+              <a:rPr lang="en-US" dirty="0" smtClean="0"/>
+              <a:t>/interception</a:t>
+            </a:r>
+            <a:endParaRPr lang="en-US" dirty="0"/>
+          </a:p>
+        </p:txBody>
+      </p:sp>
+      <p:sp>
+        <p:nvSpPr>
+          <p:cNvPr id="3" name="Title 1"/>
+          <p:cNvSpPr txBox="1">
+            <a:spLocks/>
+          </p:cNvSpPr>
+          <p:nvPr/>
+        </p:nvSpPr>
+        <p:spPr>
+          <a:xfrm>
+            <a:off x="8153400" y="6096000"/>
+            <a:ext cx="990600" cy="762000"/>
+          </a:xfrm>
+          <a:prstGeom prst="rect">
+            <a:avLst/>
+          </a:prstGeom>
+        </p:spPr>
+        <p:txBody>
+          <a:bodyPr vert="horz" lIns="91440" tIns="45720" rIns="91440" bIns="45720" rtlCol="0" anchor="b">
+            <a:normAutofit/>
+          </a:bodyPr>
+          <a:lstStyle/>
+          <a:p>
+            <a:pPr marL="0" marR="0" lvl="0" indent="0" algn="r" defTabSz="457200" rtl="0" eaLnBrk="1" fontAlgn="auto" latinLnBrk="0" hangingPunct="1">
+              <a:lnSpc>
+                <a:spcPct val="100000"/>
+              </a:lnSpc>
+              <a:spcBef>
+                <a:spcPct val="0"/>
+              </a:spcBef>
+              <a:spcAft>
+                <a:spcPts val="0"/>
+              </a:spcAft>
+              <a:buClrTx/>
+              <a:buSzTx/>
+              <a:buFontTx/>
+              <a:buNone/>
+              <a:tabLst/>
+              <a:defRPr/>
+            </a:pPr>
+            <a:r>
+              <a:rPr kumimoji="0" lang="en-US" sz="4400" b="0" i="0" u="none" strike="noStrike" kern="1200" cap="none" spc="0" normalizeH="0" baseline="0" noProof="0" dirty="0" err="1" smtClean="0">
+                <a:ln>
+                  <a:noFill/>
+                </a:ln>
+                <a:solidFill>
+                  <a:schemeClr val="tx1">
+                    <a:lumMod val="50000"/>
+                    <a:lumOff val="50000"/>
+                  </a:schemeClr>
+                </a:solidFill>
+                <a:effectLst/>
+                <a:uLnTx/>
+                <a:uFillTx/>
+                <a:latin typeface="+mj-lt"/>
+                <a:ea typeface="+mj-ea"/>
+                <a:cs typeface="+mj-cs"/>
+              </a:rPr>
+              <a:t>IoC</a:t>
+            </a:r>
+            <a:endParaRPr kumimoji="0" lang="en-US" sz="4400" b="0" i="0" u="none" strike="noStrike" kern="1200" cap="none" spc="0" normalizeH="0" baseline="0" noProof="0" dirty="0" smtClean="0">
+              <a:ln>
+                <a:noFill/>
+              </a:ln>
+              <a:solidFill>
+                <a:schemeClr val="tx1">
+                  <a:lumMod val="50000"/>
+                  <a:lumOff val="50000"/>
+                </a:schemeClr>
+              </a:solidFill>
+              <a:effectLst/>
+              <a:uLnTx/>
+              <a:uFillTx/>
+              <a:latin typeface="+mj-lt"/>
+              <a:ea typeface="+mj-ea"/>
+              <a:cs typeface="+mj-cs"/>
+            </a:endParaRPr>
+          </a:p>
+        </p:txBody>
+      </p:sp>
+    </p:spTree>
+  </p:cSld>
+  <p:clrMapOvr>
+    <a:masterClrMapping/>
+  </p:clrMapOvr>
+  <p:timing>
+    <p:tnLst>
+      <p:par>
+        <p:cTn id="1" dur="indefinite" restart="never" nodeType="tmRoot"/>
+      </p:par>
+    </p:tnLst>
+  </p:timing>
+</p:sld>
+</file>
+
+<file path=ppt/slides/slide36.xml><?xml version="1.0" encoding="utf-8"?>
+<p:sld xmlns:a="http://schemas.openxmlformats.org/drawingml/2006/main" xmlns:r="http://schemas.openxmlformats.org/officeDocument/2006/relationships" xmlns:mc="http://schemas.openxmlformats.org/markup-compatibility/2006" xmlns:mv="urn:schemas-microsoft-com:mac:vml" xmlns:p="http://schemas.openxmlformats.org/presentationml/2006/main" mc:Ignorable="mv" mc:PreserveAttributes="mv:*">
+  <p:cSld>
+    <p:spTree>
+      <p:nvGrpSpPr>
+        <p:cNvPr id="1" name=""/>
+        <p:cNvGrpSpPr/>
+        <p:nvPr/>
+      </p:nvGrpSpPr>
+      <p:grpSpPr>
+        <a:xfrm>
+          <a:off x="0" y="0"/>
+          <a:ext cx="0" cy="0"/>
+          <a:chOff x="0" y="0"/>
+          <a:chExt cx="0" cy="0"/>
+        </a:xfrm>
+      </p:grpSpPr>
+      <p:pic>
+        <p:nvPicPr>
+          <p:cNvPr id="5" name="Intercept.cs.png" descr="/Users/fullerjc/Documents/presentations/dependencies/img/Intercept.cs.png"/>
+          <p:cNvPicPr>
+            <a:picLocks noChangeAspect="1"/>
+          </p:cNvPicPr>
+          <p:nvPr/>
+        </p:nvPicPr>
+        <p:blipFill>
+          <a:blip r:embed="rId2" r:link="rId3"/>
+          <a:stretch>
+            <a:fillRect/>
+          </a:stretch>
+        </p:blipFill>
+        <p:spPr>
+          <a:xfrm>
+            <a:off x="304430" y="1498432"/>
+            <a:ext cx="8535140" cy="3861135"/>
+          </a:xfrm>
+          <a:prstGeom prst="rect">
+            <a:avLst/>
+          </a:prstGeom>
+        </p:spPr>
+      </p:pic>
+      <p:sp>
+        <p:nvSpPr>
+          <p:cNvPr id="6" name="Title 1"/>
+          <p:cNvSpPr txBox="1">
+            <a:spLocks/>
+          </p:cNvSpPr>
+          <p:nvPr/>
+        </p:nvSpPr>
+        <p:spPr>
+          <a:xfrm>
+            <a:off x="8153400" y="6096000"/>
+            <a:ext cx="990600" cy="762000"/>
+          </a:xfrm>
+          <a:prstGeom prst="rect">
+            <a:avLst/>
+          </a:prstGeom>
+        </p:spPr>
+        <p:txBody>
+          <a:bodyPr vert="horz" lIns="91440" tIns="45720" rIns="91440" bIns="45720" rtlCol="0" anchor="b">
+            <a:normAutofit/>
+          </a:bodyPr>
+          <a:lstStyle/>
+          <a:p>
+            <a:pPr marL="0" marR="0" lvl="0" indent="0" algn="r" defTabSz="457200" rtl="0" eaLnBrk="1" fontAlgn="auto" latinLnBrk="0" hangingPunct="1">
+              <a:lnSpc>
+                <a:spcPct val="100000"/>
+              </a:lnSpc>
+              <a:spcBef>
+                <a:spcPct val="0"/>
+              </a:spcBef>
+              <a:spcAft>
+                <a:spcPts val="0"/>
+              </a:spcAft>
+              <a:buClrTx/>
+              <a:buSzTx/>
+              <a:buFontTx/>
+              <a:buNone/>
+              <a:tabLst/>
+              <a:defRPr/>
+            </a:pPr>
+            <a:r>
+              <a:rPr kumimoji="0" lang="en-US" sz="4400" b="0" i="0" u="none" strike="noStrike" kern="1200" cap="none" spc="0" normalizeH="0" baseline="0" noProof="0" dirty="0" err="1" smtClean="0">
+                <a:ln>
+                  <a:noFill/>
+                </a:ln>
+                <a:solidFill>
+                  <a:schemeClr val="tx1">
+                    <a:lumMod val="50000"/>
+                    <a:lumOff val="50000"/>
+                  </a:schemeClr>
+                </a:solidFill>
+                <a:effectLst/>
+                <a:uLnTx/>
+                <a:uFillTx/>
+                <a:latin typeface="+mj-lt"/>
+                <a:ea typeface="+mj-ea"/>
+                <a:cs typeface="+mj-cs"/>
+              </a:rPr>
+              <a:t>IoC</a:t>
+            </a:r>
+            <a:endParaRPr kumimoji="0" lang="en-US" sz="4400" b="0" i="0" u="none" strike="noStrike" kern="1200" cap="none" spc="0" normalizeH="0" baseline="0" noProof="0" dirty="0" smtClean="0">
+              <a:ln>
+                <a:noFill/>
+              </a:ln>
+              <a:solidFill>
+                <a:schemeClr val="tx1">
+                  <a:lumMod val="50000"/>
+                  <a:lumOff val="50000"/>
+                </a:schemeClr>
+              </a:solidFill>
+              <a:effectLst/>
+              <a:uLnTx/>
+              <a:uFillTx/>
+              <a:latin typeface="+mj-lt"/>
+              <a:ea typeface="+mj-ea"/>
+              <a:cs typeface="+mj-cs"/>
+            </a:endParaRPr>
+          </a:p>
+        </p:txBody>
+      </p:sp>
+    </p:spTree>
+  </p:cSld>
+  <p:clrMapOvr>
+    <a:masterClrMapping/>
+  </p:clrMapOvr>
+  <p:timing>
+    <p:tnLst>
+      <p:par>
+        <p:cTn id="1" dur="indefinite" restart="never" nodeType="tmRoot"/>
+      </p:par>
+    </p:tnLst>
+  </p:timing>
+</p:sld>
+</file>
+
+<file path=ppt/slides/slide37.xml><?xml version="1.0" encoding="utf-8"?>
+<p:sld xmlns:a="http://schemas.openxmlformats.org/drawingml/2006/main" xmlns:r="http://schemas.openxmlformats.org/officeDocument/2006/relationships" xmlns:mc="http://schemas.openxmlformats.org/markup-compatibility/2006" xmlns:mv="urn:schemas-microsoft-com:mac:vml" xmlns:p="http://schemas.openxmlformats.org/presentationml/2006/main" mc:Ignorable="mv" mc:PreserveAttributes="mv:*">
+  <p:cSld>
+    <p:spTree>
+      <p:nvGrpSpPr>
+        <p:cNvPr id="1" name=""/>
+        <p:cNvGrpSpPr/>
+        <p:nvPr/>
+      </p:nvGrpSpPr>
+      <p:grpSpPr>
+        <a:xfrm>
+          <a:off x="0" y="0"/>
+          <a:ext cx="0" cy="0"/>
+          <a:chOff x="0" y="0"/>
+          <a:chExt cx="0" cy="0"/>
+        </a:xfrm>
+      </p:grpSpPr>
+      <p:sp>
+        <p:nvSpPr>
+          <p:cNvPr id="2" name="Title 1"/>
+          <p:cNvSpPr>
+            <a:spLocks noGrp="1"/>
+          </p:cNvSpPr>
+          <p:nvPr>
+            <p:ph type="title"/>
+          </p:nvPr>
+        </p:nvSpPr>
+        <p:spPr>
+          <a:xfrm>
+            <a:off x="457200" y="2667000"/>
+            <a:ext cx="8229600" cy="1143000"/>
+          </a:xfrm>
+        </p:spPr>
+        <p:txBody>
+          <a:bodyPr/>
+          <a:lstStyle/>
+          <a:p>
+            <a:r>
+              <a:rPr lang="en-US" dirty="0" smtClean="0"/>
+              <a:t>simplicity</a:t>
+            </a:r>
+            <a:endParaRPr lang="en-US" dirty="0"/>
+          </a:p>
+        </p:txBody>
+      </p:sp>
+    </p:spTree>
+  </p:cSld>
+  <p:clrMapOvr>
+    <a:masterClrMapping/>
+  </p:clrMapOvr>
+  <p:timing>
+    <p:tnLst>
+      <p:par>
+        <p:cTn id="1" dur="indefinite" restart="never" nodeType="tmRoot"/>
+      </p:par>
+    </p:tnLst>
+  </p:timing>
+</p:sld>
+</file>
+
+<file path=ppt/slides/slide38.xml><?xml version="1.0" encoding="utf-8"?>
+<p:sld xmlns:a="http://schemas.openxmlformats.org/drawingml/2006/main" xmlns:r="http://schemas.openxmlformats.org/officeDocument/2006/relationships" xmlns:mc="http://schemas.openxmlformats.org/markup-compatibility/2006" xmlns:mv="urn:schemas-microsoft-com:mac:vml" xmlns:p="http://schemas.openxmlformats.org/presentationml/2006/main" mc:Ignorable="mv" mc:PreserveAttributes="mv:*">
+  <p:cSld>
+    <p:spTree>
+      <p:nvGrpSpPr>
+        <p:cNvPr id="1" name=""/>
+        <p:cNvGrpSpPr/>
+        <p:nvPr/>
+      </p:nvGrpSpPr>
+      <p:grpSpPr>
+        <a:xfrm>
+          <a:off x="0" y="0"/>
+          <a:ext cx="0" cy="0"/>
+          <a:chOff x="0" y="0"/>
+          <a:chExt cx="0" cy="0"/>
+        </a:xfrm>
+      </p:grpSpPr>
+      <p:sp>
+        <p:nvSpPr>
+          <p:cNvPr id="2" name="Title 1"/>
+          <p:cNvSpPr>
+            <a:spLocks noGrp="1"/>
+          </p:cNvSpPr>
+          <p:nvPr>
+            <p:ph type="title"/>
+          </p:nvPr>
+        </p:nvSpPr>
+        <p:spPr>
+          <a:xfrm>
+            <a:off x="457200" y="2667000"/>
+            <a:ext cx="8229600" cy="1143000"/>
+          </a:xfrm>
+        </p:spPr>
+        <p:txBody>
+          <a:bodyPr>
+            <a:normAutofit/>
+          </a:bodyPr>
+          <a:lstStyle/>
+          <a:p>
+            <a:r>
+              <a:rPr lang="en-US" sz="6000" dirty="0" smtClean="0"/>
+              <a:t>?</a:t>
+            </a:r>
+            <a:endParaRPr lang="en-US" sz="6000" dirty="0"/>
+          </a:p>
+        </p:txBody>
+      </p:sp>
+      <p:sp>
+        <p:nvSpPr>
+          <p:cNvPr id="3" name="Title 1"/>
+          <p:cNvSpPr txBox="1">
+            <a:spLocks/>
+          </p:cNvSpPr>
+          <p:nvPr/>
+        </p:nvSpPr>
+        <p:spPr>
+          <a:xfrm>
+            <a:off x="0" y="5715000"/>
+            <a:ext cx="8229600" cy="1143000"/>
+          </a:xfrm>
+          <a:prstGeom prst="rect">
+            <a:avLst/>
+          </a:prstGeom>
+        </p:spPr>
+        <p:txBody>
+          <a:bodyPr vert="horz" lIns="91440" tIns="45720" rIns="91440" bIns="45720" rtlCol="0" anchor="ctr">
+            <a:normAutofit fontScale="62500" lnSpcReduction="20000"/>
+          </a:bodyPr>
+          <a:lstStyle/>
+          <a:p>
+            <a:pPr marL="0" marR="0" lvl="0" indent="0" defTabSz="457200" rtl="0" eaLnBrk="1" fontAlgn="auto" latinLnBrk="0" hangingPunct="1">
+              <a:lnSpc>
+                <a:spcPct val="100000"/>
+              </a:lnSpc>
+              <a:spcBef>
+                <a:spcPct val="0"/>
+              </a:spcBef>
+              <a:spcAft>
+                <a:spcPts val="0"/>
+              </a:spcAft>
+              <a:buClrTx/>
+              <a:buSzTx/>
+              <a:buFontTx/>
+              <a:buNone/>
+              <a:tabLst/>
+              <a:defRPr/>
+            </a:pPr>
+            <a:r>
+              <a:rPr kumimoji="0" lang="en-US" sz="4400" b="0" i="0" u="none" strike="noStrike" kern="1200" cap="none" spc="0" normalizeH="0" baseline="0" noProof="0" dirty="0" smtClean="0">
+                <a:ln>
+                  <a:noFill/>
+                </a:ln>
+                <a:solidFill>
+                  <a:schemeClr val="tx1"/>
+                </a:solidFill>
+                <a:effectLst/>
+                <a:uLnTx/>
+                <a:uFillTx/>
+                <a:latin typeface="+mj-lt"/>
+                <a:ea typeface="+mj-ea"/>
+                <a:cs typeface="+mj-cs"/>
+              </a:rPr>
+              <a:t>@</a:t>
+            </a:r>
+            <a:r>
+              <a:rPr kumimoji="0" lang="en-US" sz="4400" b="0" i="0" u="none" strike="noStrike" kern="1200" cap="none" spc="0" normalizeH="0" baseline="0" noProof="0" dirty="0" err="1" smtClean="0">
+                <a:ln>
+                  <a:noFill/>
+                </a:ln>
+                <a:solidFill>
+                  <a:schemeClr val="tx1"/>
+                </a:solidFill>
+                <a:effectLst/>
+                <a:uLnTx/>
+                <a:uFillTx/>
+                <a:latin typeface="+mj-lt"/>
+                <a:ea typeface="+mj-ea"/>
+                <a:cs typeface="+mj-cs"/>
+              </a:rPr>
+              <a:t>jon</a:t>
+            </a:r>
+            <a:r>
+              <a:rPr lang="en-US" sz="4400" dirty="0" smtClean="0">
+                <a:latin typeface="+mj-lt"/>
+                <a:ea typeface="+mj-ea"/>
+                <a:cs typeface="+mj-cs"/>
+              </a:rPr>
+              <a:t>_fuller</a:t>
+            </a:r>
+          </a:p>
+          <a:p>
+            <a:pPr marL="0" marR="0" lvl="0" indent="0" defTabSz="457200" rtl="0" eaLnBrk="1" fontAlgn="auto" latinLnBrk="0" hangingPunct="1">
+              <a:lnSpc>
+                <a:spcPct val="100000"/>
+              </a:lnSpc>
+              <a:spcBef>
+                <a:spcPct val="0"/>
+              </a:spcBef>
+              <a:spcAft>
+                <a:spcPts val="0"/>
+              </a:spcAft>
+              <a:buClrTx/>
+              <a:buSzTx/>
+              <a:buFontTx/>
+              <a:buNone/>
+              <a:tabLst/>
+              <a:defRPr/>
+            </a:pPr>
+            <a:r>
+              <a:rPr kumimoji="0" lang="en-US" sz="4400" b="0" i="0" u="none" strike="noStrike" kern="1200" cap="none" spc="0" normalizeH="0" baseline="0" noProof="0" dirty="0" err="1" smtClean="0">
+                <a:ln>
+                  <a:noFill/>
+                </a:ln>
+                <a:solidFill>
+                  <a:schemeClr val="tx1"/>
+                </a:solidFill>
+                <a:effectLst/>
+                <a:uLnTx/>
+                <a:uFillTx/>
+                <a:latin typeface="+mj-lt"/>
+                <a:ea typeface="+mj-ea"/>
+                <a:cs typeface="+mj-cs"/>
+              </a:rPr>
+              <a:t>fullerjc@gmail.com</a:t>
+            </a:r>
+            <a:endParaRPr kumimoji="0" lang="en-US" sz="4400" b="0" i="0" u="none" strike="noStrike" kern="1200" cap="none" spc="0" normalizeH="0" baseline="0" noProof="0" dirty="0" smtClean="0">
+              <a:ln>
+                <a:noFill/>
+              </a:ln>
+              <a:solidFill>
+                <a:schemeClr val="tx1"/>
+              </a:solidFill>
+              <a:effectLst/>
+              <a:uLnTx/>
+              <a:uFillTx/>
+              <a:latin typeface="+mj-lt"/>
+              <a:ea typeface="+mj-ea"/>
+              <a:cs typeface="+mj-cs"/>
+            </a:endParaRPr>
+          </a:p>
+          <a:p>
+            <a:pPr marL="0" marR="0" lvl="0" indent="0" defTabSz="457200" rtl="0" eaLnBrk="1" fontAlgn="auto" latinLnBrk="0" hangingPunct="1">
+              <a:lnSpc>
+                <a:spcPct val="100000"/>
+              </a:lnSpc>
+              <a:spcBef>
+                <a:spcPct val="0"/>
+              </a:spcBef>
+              <a:spcAft>
+                <a:spcPts val="0"/>
+              </a:spcAft>
+              <a:buClrTx/>
+              <a:buSzTx/>
+              <a:buFontTx/>
+              <a:buNone/>
+              <a:tabLst/>
+              <a:defRPr/>
+            </a:pPr>
+            <a:r>
+              <a:rPr lang="en-US" sz="4400" dirty="0" err="1" smtClean="0">
+                <a:latin typeface="+mj-lt"/>
+                <a:ea typeface="+mj-ea"/>
+                <a:cs typeface="+mj-cs"/>
+              </a:rPr>
+              <a:t>github.com/jonfuller</a:t>
+            </a:r>
+            <a:endParaRPr kumimoji="0" lang="en-US" sz="4400" b="0" i="0" u="none" strike="noStrike" kern="1200" cap="none" spc="0" normalizeH="0" baseline="0" noProof="0" dirty="0">
+              <a:ln>
+                <a:noFill/>
+              </a:ln>
+              <a:solidFill>
+                <a:schemeClr val="tx1"/>
+              </a:solidFill>
+              <a:effectLst/>
+              <a:uLnTx/>
+              <a:uFillTx/>
+              <a:latin typeface="+mj-lt"/>
+              <a:ea typeface="+mj-ea"/>
+              <a:cs typeface="+mj-cs"/>
+            </a:endParaRPr>
+          </a:p>
+        </p:txBody>
+      </p:sp>
+      <p:sp>
+        <p:nvSpPr>
+          <p:cNvPr id="5" name="TextBox 4"/>
+          <p:cNvSpPr txBox="1"/>
+          <p:nvPr/>
+        </p:nvSpPr>
+        <p:spPr>
+          <a:xfrm>
+            <a:off x="3581400" y="6019800"/>
+            <a:ext cx="1804889" cy="369332"/>
+          </a:xfrm>
+          <a:prstGeom prst="rect">
+            <a:avLst/>
+          </a:prstGeom>
+          <a:noFill/>
+        </p:spPr>
+        <p:txBody>
+          <a:bodyPr wrap="none" rtlCol="0">
+            <a:spAutoFit/>
+          </a:bodyPr>
+          <a:lstStyle/>
+          <a:p>
+            <a:r>
+              <a:rPr lang="en-US" dirty="0" smtClean="0"/>
+              <a:t>Feedback please!</a:t>
+            </a:r>
+            <a:endParaRPr lang="en-US" dirty="0"/>
+          </a:p>
+        </p:txBody>
+      </p:sp>
+      <p:sp>
+        <p:nvSpPr>
+          <p:cNvPr id="6" name="Right Brace 5"/>
+          <p:cNvSpPr/>
+          <p:nvPr/>
+        </p:nvSpPr>
+        <p:spPr>
+          <a:xfrm>
+            <a:off x="3276600" y="5715000"/>
+            <a:ext cx="228600" cy="1066800"/>
+          </a:xfrm>
+          <a:prstGeom prst="rightBrace">
+            <a:avLst/>
+          </a:prstGeom>
+          <a:noFill/>
+          <a:ln>
+            <a:solidFill>
+              <a:schemeClr val="tx1"/>
+            </a:solidFill>
+          </a:ln>
+        </p:spPr>
+        <p:style>
+          <a:lnRef idx="2">
+            <a:schemeClr val="accent1"/>
+          </a:lnRef>
+          <a:fillRef idx="0">
+            <a:schemeClr val="accent1"/>
+          </a:fillRef>
+          <a:effectRef idx="1">
+            <a:schemeClr val="accent1"/>
+          </a:effectRef>
+          <a:fontRef idx="minor">
+            <a:schemeClr val="tx1"/>
+          </a:fontRef>
+        </p:style>
+        <p:txBody>
+          <a:bodyPr rtlCol="0" anchor="ctr"/>
+          <a:lstStyle/>
+          <a:p>
+            <a:pPr algn="ctr"/>
+            <a:endParaRPr lang="en-US"/>
+          </a:p>
+        </p:txBody>
+      </p:sp>
+    </p:spTree>
+  </p:cSld>
+  <p:clrMapOvr>
+    <a:masterClrMapping/>
+  </p:clrMapOvr>
+  <p:timing>
+    <p:tnLst>
+      <p:par>
+        <p:cTn id="1" dur="indefinite" restart="never" nodeType="tmRoot"/>
+      </p:par>
+    </p:tnLst>
+  </p:timing>
 </p:sld>
 </file>
 

</xml_diff>

<commit_message>
add latest changes before presentation
</commit_message>
<xml_diff>
--- a/dependencies/dependencies.pptx
+++ b/dependencies/dependencies.pptx
@@ -545,7 +545,23 @@
           <a:p>
             <a:r>
               <a:rPr lang="en-US" dirty="0" smtClean="0"/>
-              <a:t>PLEASE interrupt me at any time during</a:t>
+              <a:t>you very well may ask questions I don’t know answers to… so if someone else has the answer, please chime in.</a:t>
+            </a:r>
+          </a:p>
+          <a:p>
+            <a:r>
+              <a:rPr lang="en-US" dirty="0" smtClean="0"/>
+              <a:t/>
+            </a:r>
+          </a:p>
+          <a:p>
+            <a:r>
+              <a:rPr lang="en-US" dirty="0" smtClean="0"/>
+              <a:t>PLEASE </a:t>
+            </a:r>
+            <a:r>
+              <a:rPr lang="en-US" dirty="0" smtClean="0"/>
+              <a:t>interrupt me at any time during</a:t>
             </a:r>
             <a:r>
               <a:rPr lang="en-US" baseline="0" dirty="0" smtClean="0"/>
@@ -634,34 +650,76 @@
           <a:lstStyle/>
           <a:p>
             <a:r>
+              <a:rPr lang="en-US" dirty="0" err="1" smtClean="0"/>
+              <a:t>Orthogonality</a:t>
+            </a:r>
+            <a:r>
               <a:rPr lang="en-US" dirty="0" smtClean="0"/>
-              <a:t>So we’ve broken</a:t>
+              <a:t>.</a:t>
+            </a:r>
+          </a:p>
+          <a:p>
+            <a:r>
+              <a:rPr lang="en-US" dirty="0" smtClean="0"/>
+              <a:t>With</a:t>
             </a:r>
             <a:r>
               <a:rPr lang="en-US" baseline="0" dirty="0" smtClean="0"/>
-              <a:t> our concrete dependencies (or at least we know how).</a:t>
-            </a:r>
-            <a:endParaRPr lang="en-US" dirty="0" smtClean="0"/>
+              <a:t> this inverted dependency in place we get the benefit of </a:t>
+            </a:r>
+            <a:r>
+              <a:rPr lang="en-US" baseline="0" dirty="0" err="1" smtClean="0"/>
+              <a:t>orthogonality</a:t>
+            </a:r>
+            <a:r>
+              <a:rPr lang="en-US" baseline="0" dirty="0" smtClean="0"/>
+              <a:t>.</a:t>
+            </a:r>
+          </a:p>
+          <a:p>
+            <a:r>
+              <a:rPr lang="en-US" baseline="0" dirty="0" smtClean="0"/>
+              <a:t>Now since we only depend on abstractions, rather than concretions we can change these to modules independently.</a:t>
+            </a:r>
+          </a:p>
+          <a:p>
+            <a:r>
+              <a:rPr lang="en-US" baseline="0" dirty="0" smtClean="0"/>
+              <a:t>Concerns of one module don’t project onto the concerns of the other.</a:t>
+            </a:r>
+          </a:p>
+          <a:p>
+            <a:pPr marL="0" marR="0" indent="0" algn="l" defTabSz="457200" rtl="0" eaLnBrk="1" fontAlgn="auto" latinLnBrk="0" hangingPunct="1">
+              <a:lnSpc>
+                <a:spcPct val="100000"/>
+              </a:lnSpc>
+              <a:spcBef>
+                <a:spcPts val="0"/>
+              </a:spcBef>
+              <a:spcAft>
+                <a:spcPts val="0"/>
+              </a:spcAft>
+              <a:buClrTx/>
+              <a:buSzTx/>
+              <a:buFontTx/>
+              <a:buNone/>
+              <a:tabLst/>
+              <a:defRPr/>
+            </a:pPr>
+            <a:r>
+              <a:rPr lang="en-US" baseline="0" dirty="0" smtClean="0"/>
+              <a:t>Changes to one won’t affect another.</a:t>
+            </a:r>
           </a:p>
           <a:p>
             <a:r>
               <a:rPr lang="en-US" dirty="0" smtClean="0"/>
-              <a:t>We</a:t>
+              <a:t>However,</a:t>
             </a:r>
             <a:r>
               <a:rPr lang="en-US" baseline="0" dirty="0" smtClean="0"/>
-              <a:t> need to somehow wire our implementations together.</a:t>
-            </a:r>
-          </a:p>
-          <a:p>
-            <a:endParaRPr lang="en-US" dirty="0" smtClean="0"/>
-          </a:p>
-          <a:p>
-            <a:r>
-              <a:rPr lang="en-US" dirty="0" smtClean="0"/>
-              <a:t>http://www.lostechies.com/cfs-filesystemfile.ashx/__key/CommunityServer.Blogs.Components.WeblogFiles/derickbailey/DependencyInversionPrinciple_5F00_0278F9E2.jpg</a:t>
-            </a:r>
-            <a:endParaRPr lang="en-US" dirty="0"/>
+              <a:t> if the semantics or interface changes, then, obviously, we’ll have some work to do.</a:t>
+            </a:r>
           </a:p>
         </p:txBody>
       </p:sp>
@@ -683,7 +741,7 @@
             <a:fld id="{F5395209-E063-144C-8968-CAA31F3D1B83}" type="slidenum">
               <a:rPr lang="en-US" smtClean="0"/>
               <a:pPr/>
-              <a:t>16</a:t>
+              <a:t>15</a:t>
             </a:fld>
             <a:endParaRPr lang="en-US"/>
           </a:p>
@@ -745,21 +803,31 @@
           <a:p>
             <a:r>
               <a:rPr lang="en-US" dirty="0" smtClean="0"/>
-              <a:t>I </a:t>
-            </a:r>
+              <a:t>So we’ve broken</a:t>
+            </a:r>
+            <a:r>
+              <a:rPr lang="en-US" baseline="0" dirty="0" smtClean="0"/>
+              <a:t> our concrete dependencies (or at least we know how).</a:t>
+            </a:r>
+            <a:endParaRPr lang="en-US" dirty="0" smtClean="0"/>
+          </a:p>
+          <a:p>
             <a:r>
               <a:rPr lang="en-US" dirty="0" smtClean="0"/>
-              <a:t>think the first natural</a:t>
+              <a:t>We</a:t>
             </a:r>
             <a:r>
               <a:rPr lang="en-US" baseline="0" dirty="0" smtClean="0"/>
-              <a:t> place to go is service location.</a:t>
-            </a:r>
-          </a:p>
-          <a:p>
-            <a:r>
-              <a:rPr lang="en-US" baseline="0" dirty="0" smtClean="0"/>
-              <a:t>You shove everything behind a global object/static gateway and pull our your dependencies.</a:t>
+              <a:t> need to somehow wire our implementations together.</a:t>
+            </a:r>
+          </a:p>
+          <a:p>
+            <a:endParaRPr lang="en-US" dirty="0" smtClean="0"/>
+          </a:p>
+          <a:p>
+            <a:r>
+              <a:rPr lang="en-US" dirty="0" smtClean="0"/>
+              <a:t>http://www.lostechies.com/cfs-filesystemfile.ashx/__key/CommunityServer.Blogs.Components.WeblogFiles/derickbailey/DependencyInversionPrinciple_5F00_0278F9E2.jpg</a:t>
             </a:r>
             <a:endParaRPr lang="en-US" dirty="0"/>
           </a:p>
@@ -783,7 +851,7 @@
             <a:fld id="{F5395209-E063-144C-8968-CAA31F3D1B83}" type="slidenum">
               <a:rPr lang="en-US" smtClean="0"/>
               <a:pPr/>
-              <a:t>17</a:t>
+              <a:t>16</a:t>
             </a:fld>
             <a:endParaRPr lang="en-US"/>
           </a:p>
@@ -845,69 +913,21 @@
           <a:p>
             <a:r>
               <a:rPr lang="en-US" dirty="0" smtClean="0"/>
-              <a:t>At this point, we’ve</a:t>
+              <a:t>I </a:t>
+            </a:r>
+            <a:r>
+              <a:rPr lang="en-US" dirty="0" smtClean="0"/>
+              <a:t>think the first natural</a:t>
             </a:r>
             <a:r>
               <a:rPr lang="en-US" baseline="0" dirty="0" smtClean="0"/>
-              <a:t> basically traded dependencies.  We got rid of </a:t>
-            </a:r>
-            <a:r>
-              <a:rPr lang="en-US" baseline="0" dirty="0" err="1" smtClean="0"/>
-              <a:t>ImdbMovieFinder</a:t>
-            </a:r>
+              <a:t> place to go is service location.</a:t>
+            </a:r>
+          </a:p>
+          <a:p>
             <a:r>
               <a:rPr lang="en-US" baseline="0" dirty="0" smtClean="0"/>
-              <a:t> dependency but picked up the </a:t>
-            </a:r>
-            <a:r>
-              <a:rPr lang="en-US" baseline="0" dirty="0" err="1" smtClean="0"/>
-              <a:t>ServiceLocator</a:t>
-            </a:r>
-            <a:r>
-              <a:rPr lang="en-US" baseline="0" dirty="0" smtClean="0"/>
-              <a:t> one.</a:t>
-            </a:r>
-          </a:p>
-          <a:p>
-            <a:r>
-              <a:rPr lang="en-US" baseline="0" dirty="0" smtClean="0"/>
-              <a:t>That being said, this is probably the lesser of two evils.  It’s slightly more flexible.</a:t>
-            </a:r>
-          </a:p>
-          <a:p>
-            <a:r>
-              <a:rPr lang="en-US" baseline="0" dirty="0" smtClean="0"/>
-              <a:t>We’ve still got a bit of a smell though… the dependencies aren’t explicit.</a:t>
-            </a:r>
-          </a:p>
-          <a:p>
-            <a:r>
-              <a:rPr lang="en-US" baseline="0" dirty="0" smtClean="0"/>
-              <a:t>You can’t tell what this class needs, unless you look inside of it, at the implementation. Imagine using a library, and having to look at the source code to figure out what you need to register in your service locator to make it work?</a:t>
-            </a:r>
-          </a:p>
-          <a:p>
-            <a:r>
-              <a:rPr lang="en-US" baseline="0" dirty="0" smtClean="0"/>
-              <a:t>The idea is to make your implicit dependencies explicit, by declaring them, somehow.</a:t>
-            </a:r>
-          </a:p>
-          <a:p>
-            <a:r>
-              <a:rPr lang="en-US" baseline="0" dirty="0" smtClean="0"/>
-              <a:t>Also, depending on the implementation of your service locator, it may be difficult to reconfigure at deployment or runtime which finder gets used.</a:t>
-            </a:r>
-          </a:p>
-          <a:p>
-            <a:r>
-              <a:rPr lang="en-US" baseline="0" dirty="0" smtClean="0"/>
-              <a:t>That being said, this works pretty well, is easy to understand and is better than hard-coding all your dependencies.</a:t>
-            </a:r>
-          </a:p>
-          <a:p>
-            <a:r>
-              <a:rPr lang="en-US" baseline="0" dirty="0" smtClean="0"/>
-              <a:t>Let’s see a better way…</a:t>
+              <a:t>You shove everything behind a global object/static gateway and pull our your dependencies.</a:t>
             </a:r>
             <a:endParaRPr lang="en-US" dirty="0"/>
           </a:p>
@@ -931,7 +951,7 @@
             <a:fld id="{F5395209-E063-144C-8968-CAA31F3D1B83}" type="slidenum">
               <a:rPr lang="en-US" smtClean="0"/>
               <a:pPr/>
-              <a:t>18</a:t>
+              <a:t>17</a:t>
             </a:fld>
             <a:endParaRPr lang="en-US"/>
           </a:p>
@@ -993,17 +1013,69 @@
           <a:p>
             <a:r>
               <a:rPr lang="en-US" dirty="0" smtClean="0"/>
-              <a:t>Dependency</a:t>
+              <a:t>At this point, we’ve</a:t>
             </a:r>
             <a:r>
               <a:rPr lang="en-US" baseline="0" dirty="0" smtClean="0"/>
-              <a:t> injection is the act of injecting your dependencies (whether they’ve been inverted or not) into the consuming class of the service or dependency.</a:t>
-            </a:r>
-          </a:p>
-          <a:p>
+              <a:t> basically traded dependencies.  We got rid of </a:t>
+            </a:r>
+            <a:r>
+              <a:rPr lang="en-US" baseline="0" dirty="0" err="1" smtClean="0"/>
+              <a:t>ImdbMovieFinder</a:t>
+            </a:r>
             <a:r>
               <a:rPr lang="en-US" baseline="0" dirty="0" smtClean="0"/>
-              <a:t>We saw a minute ago how the consumer was pulling dependencies in.  We’re going to flip that upside down, and pass them into the consumer.</a:t>
+              <a:t> dependency but picked up the </a:t>
+            </a:r>
+            <a:r>
+              <a:rPr lang="en-US" baseline="0" dirty="0" err="1" smtClean="0"/>
+              <a:t>ServiceLocator</a:t>
+            </a:r>
+            <a:r>
+              <a:rPr lang="en-US" baseline="0" dirty="0" smtClean="0"/>
+              <a:t> one.</a:t>
+            </a:r>
+          </a:p>
+          <a:p>
+            <a:r>
+              <a:rPr lang="en-US" baseline="0" dirty="0" smtClean="0"/>
+              <a:t>That being said, this is probably the lesser of two evils.  It’s slightly more flexible.</a:t>
+            </a:r>
+          </a:p>
+          <a:p>
+            <a:r>
+              <a:rPr lang="en-US" baseline="0" dirty="0" smtClean="0"/>
+              <a:t>We’ve still got a bit of a smell though… the dependencies aren’t explicit.</a:t>
+            </a:r>
+          </a:p>
+          <a:p>
+            <a:r>
+              <a:rPr lang="en-US" baseline="0" dirty="0" smtClean="0"/>
+              <a:t>You can’t tell what this class needs, unless you look inside of it, at the implementation. Imagine using a library, and having to look at the source code to figure out what you need to register in your service locator to make it work?</a:t>
+            </a:r>
+          </a:p>
+          <a:p>
+            <a:r>
+              <a:rPr lang="en-US" baseline="0" dirty="0" smtClean="0"/>
+              <a:t>The idea is to make your implicit dependencies explicit, by declaring them, somehow.</a:t>
+            </a:r>
+          </a:p>
+          <a:p>
+            <a:r>
+              <a:rPr lang="en-US" baseline="0" dirty="0" smtClean="0"/>
+              <a:t>Also, depending on the implementation of your service locator, it may be difficult to reconfigure at deployment or runtime which finder gets used.</a:t>
+            </a:r>
+          </a:p>
+          <a:p>
+            <a:r>
+              <a:rPr lang="en-US" baseline="0" dirty="0" smtClean="0"/>
+              <a:t>That being said, this works pretty well, is easy to understand and is better than hard-coding all your dependencies.</a:t>
+            </a:r>
+          </a:p>
+          <a:p>
+            <a:r>
+              <a:rPr lang="en-US" baseline="0" dirty="0" smtClean="0"/>
+              <a:t>Let’s see a better way…</a:t>
             </a:r>
             <a:endParaRPr lang="en-US" dirty="0"/>
           </a:p>
@@ -1027,7 +1099,7 @@
             <a:fld id="{F5395209-E063-144C-8968-CAA31F3D1B83}" type="slidenum">
               <a:rPr lang="en-US" smtClean="0"/>
               <a:pPr/>
-              <a:t>19</a:t>
+              <a:t>18</a:t>
             </a:fld>
             <a:endParaRPr lang="en-US"/>
           </a:p>
@@ -1089,7 +1161,17 @@
           <a:p>
             <a:r>
               <a:rPr lang="en-US" dirty="0" smtClean="0"/>
-              <a:t>no injection</a:t>
+              <a:t>Dependency</a:t>
+            </a:r>
+            <a:r>
+              <a:rPr lang="en-US" baseline="0" dirty="0" smtClean="0"/>
+              <a:t> injection is the act of injecting your dependencies (whether they’ve been inverted or not) into the consuming class of the service or dependency.</a:t>
+            </a:r>
+          </a:p>
+          <a:p>
+            <a:r>
+              <a:rPr lang="en-US" baseline="0" dirty="0" smtClean="0"/>
+              <a:t>We saw a minute ago how the consumer was pulling dependencies in.  We’re going to flip that upside down, and pass them into the consumer.</a:t>
             </a:r>
             <a:endParaRPr lang="en-US" dirty="0"/>
           </a:p>
@@ -1113,7 +1195,7 @@
             <a:fld id="{F5395209-E063-144C-8968-CAA31F3D1B83}" type="slidenum">
               <a:rPr lang="en-US" smtClean="0"/>
               <a:pPr/>
-              <a:t>20</a:t>
+              <a:t>19</a:t>
             </a:fld>
             <a:endParaRPr lang="en-US"/>
           </a:p>
@@ -1175,13 +1257,7 @@
           <a:p>
             <a:r>
               <a:rPr lang="en-US" dirty="0" smtClean="0"/>
-              <a:t>property injection</a:t>
-            </a:r>
-          </a:p>
-          <a:p>
-            <a:r>
-              <a:rPr lang="en-US" dirty="0" smtClean="0"/>
-              <a:t>Java guys like to do it this way</a:t>
+              <a:t>no injection</a:t>
             </a:r>
             <a:endParaRPr lang="en-US" dirty="0"/>
           </a:p>
@@ -1205,7 +1281,7 @@
             <a:fld id="{F5395209-E063-144C-8968-CAA31F3D1B83}" type="slidenum">
               <a:rPr lang="en-US" smtClean="0"/>
               <a:pPr/>
-              <a:t>21</a:t>
+              <a:t>20</a:t>
             </a:fld>
             <a:endParaRPr lang="en-US"/>
           </a:p>
@@ -1267,23 +1343,13 @@
           <a:p>
             <a:r>
               <a:rPr lang="en-US" dirty="0" smtClean="0"/>
-              <a:t>constructor injection</a:t>
+              <a:t>property injection</a:t>
             </a:r>
           </a:p>
           <a:p>
             <a:r>
               <a:rPr lang="en-US" dirty="0" smtClean="0"/>
-              <a:t>.NET guys</a:t>
-            </a:r>
-            <a:r>
-              <a:rPr lang="en-US" baseline="0" dirty="0" smtClean="0"/>
-              <a:t> (myself included) like to do it this way.</a:t>
-            </a:r>
-          </a:p>
-          <a:p>
-            <a:r>
-              <a:rPr lang="en-US" baseline="0" dirty="0" smtClean="0"/>
-              <a:t>You can see now, how the dependencies are explicitly stated up front, when the class gets created.</a:t>
+              <a:t>Java guys like to do it this way</a:t>
             </a:r>
             <a:endParaRPr lang="en-US" dirty="0"/>
           </a:p>
@@ -1307,7 +1373,7 @@
             <a:fld id="{F5395209-E063-144C-8968-CAA31F3D1B83}" type="slidenum">
               <a:rPr lang="en-US" smtClean="0"/>
               <a:pPr/>
-              <a:t>22</a:t>
+              <a:t>21</a:t>
             </a:fld>
             <a:endParaRPr lang="en-US"/>
           </a:p>
@@ -1369,24 +1435,25 @@
           <a:p>
             <a:r>
               <a:rPr lang="en-US" dirty="0" smtClean="0"/>
-              <a:t>Poor Man’s DI is:</a:t>
+              <a:t>constructor injection</a:t>
             </a:r>
           </a:p>
           <a:p>
             <a:r>
               <a:rPr lang="en-US" dirty="0" smtClean="0"/>
-              <a:t>Easy</a:t>
+              <a:t>.NET guys</a:t>
             </a:r>
             <a:r>
               <a:rPr lang="en-US" baseline="0" dirty="0" smtClean="0"/>
-              <a:t> to understand</a:t>
+              <a:t> (myself included) like to do it this way.</a:t>
             </a:r>
           </a:p>
           <a:p>
             <a:r>
               <a:rPr lang="en-US" baseline="0" dirty="0" smtClean="0"/>
-              <a:t>Low barrier to entry way to start doing DI.</a:t>
-            </a:r>
+              <a:t>You can see now, how the dependencies are explicitly stated up front, when the class gets created.</a:t>
+            </a:r>
+            <a:endParaRPr lang="en-US" dirty="0"/>
           </a:p>
         </p:txBody>
       </p:sp>
@@ -1408,7 +1475,7 @@
             <a:fld id="{F5395209-E063-144C-8968-CAA31F3D1B83}" type="slidenum">
               <a:rPr lang="en-US" smtClean="0"/>
               <a:pPr/>
-              <a:t>23</a:t>
+              <a:t>22</a:t>
             </a:fld>
             <a:endParaRPr lang="en-US"/>
           </a:p>
@@ -1468,68 +1535,26 @@
           </a:bodyPr>
           <a:lstStyle/>
           <a:p>
-            <a:pPr marL="0" marR="0" indent="0" algn="l" defTabSz="457200" rtl="0" eaLnBrk="1" fontAlgn="auto" latinLnBrk="0" hangingPunct="1">
-              <a:lnSpc>
-                <a:spcPct val="100000"/>
-              </a:lnSpc>
-              <a:spcBef>
-                <a:spcPts val="0"/>
-              </a:spcBef>
-              <a:spcAft>
-                <a:spcPts val="0"/>
-              </a:spcAft>
-              <a:buClrTx/>
-              <a:buSzTx/>
-              <a:buFontTx/>
-              <a:buNone/>
-              <a:tabLst/>
-              <a:defRPr/>
-            </a:pPr>
+            <a:r>
+              <a:rPr lang="en-US" dirty="0" smtClean="0"/>
+              <a:t>Poor Man’s DI is:</a:t>
+            </a:r>
+          </a:p>
+          <a:p>
+            <a:r>
+              <a:rPr lang="en-US" dirty="0" smtClean="0"/>
+              <a:t>Easy</a:t>
+            </a:r>
             <a:r>
               <a:rPr lang="en-US" baseline="0" dirty="0" smtClean="0"/>
-              <a:t>PMDI</a:t>
-            </a:r>
-          </a:p>
-          <a:p>
-            <a:pPr marL="0" marR="0" indent="0" algn="l" defTabSz="457200" rtl="0" eaLnBrk="1" fontAlgn="auto" latinLnBrk="0" hangingPunct="1">
-              <a:lnSpc>
-                <a:spcPct val="100000"/>
-              </a:lnSpc>
-              <a:spcBef>
-                <a:spcPts val="0"/>
-              </a:spcBef>
-              <a:spcAft>
-                <a:spcPts val="0"/>
-              </a:spcAft>
-              <a:buClrTx/>
-              <a:buSzTx/>
-              <a:buFontTx/>
-              <a:buNone/>
-              <a:tabLst/>
-              <a:defRPr/>
-            </a:pPr>
+              <a:t> to understand</a:t>
+            </a:r>
+          </a:p>
+          <a:p>
             <a:r>
               <a:rPr lang="en-US" baseline="0" dirty="0" smtClean="0"/>
-              <a:t>You can use one version during test (the DI version, so you can mock things) and use another version in production code.</a:t>
-            </a:r>
-            <a:endParaRPr lang="en-US" dirty="0" smtClean="0"/>
-          </a:p>
-          <a:p>
-            <a:r>
-              <a:rPr lang="en-US" dirty="0" smtClean="0"/>
-              <a:t>There may be legitimate</a:t>
-            </a:r>
-            <a:r>
-              <a:rPr lang="en-US" baseline="0" dirty="0" smtClean="0"/>
-              <a:t> reasons for doing this, but I can’t think of any…</a:t>
-            </a:r>
-          </a:p>
-          <a:p>
-            <a:r>
-              <a:rPr lang="en-US" baseline="0" dirty="0" smtClean="0"/>
-              <a:t>In the long run, you’ll be better off to have just went without it, and went with a framework/tool instead.</a:t>
-            </a:r>
-            <a:endParaRPr lang="en-US" dirty="0"/>
+              <a:t>Low barrier to entry way to start doing DI.</a:t>
+            </a:r>
           </a:p>
         </p:txBody>
       </p:sp>
@@ -1551,7 +1576,7 @@
             <a:fld id="{F5395209-E063-144C-8968-CAA31F3D1B83}" type="slidenum">
               <a:rPr lang="en-US" smtClean="0"/>
               <a:pPr/>
-              <a:t>24</a:t>
+              <a:t>23</a:t>
             </a:fld>
             <a:endParaRPr lang="en-US"/>
           </a:p>
@@ -1611,55 +1636,66 @@
           </a:bodyPr>
           <a:lstStyle/>
           <a:p>
+            <a:pPr marL="0" marR="0" indent="0" algn="l" defTabSz="457200" rtl="0" eaLnBrk="1" fontAlgn="auto" latinLnBrk="0" hangingPunct="1">
+              <a:lnSpc>
+                <a:spcPct val="100000"/>
+              </a:lnSpc>
+              <a:spcBef>
+                <a:spcPts val="0"/>
+              </a:spcBef>
+              <a:spcAft>
+                <a:spcPts val="0"/>
+              </a:spcAft>
+              <a:buClrTx/>
+              <a:buSzTx/>
+              <a:buFontTx/>
+              <a:buNone/>
+              <a:tabLst/>
+              <a:defRPr/>
+            </a:pPr>
+            <a:r>
+              <a:rPr lang="en-US" baseline="0" dirty="0" smtClean="0"/>
+              <a:t>PMDI</a:t>
+            </a:r>
+          </a:p>
+          <a:p>
+            <a:pPr marL="0" marR="0" indent="0" algn="l" defTabSz="457200" rtl="0" eaLnBrk="1" fontAlgn="auto" latinLnBrk="0" hangingPunct="1">
+              <a:lnSpc>
+                <a:spcPct val="100000"/>
+              </a:lnSpc>
+              <a:spcBef>
+                <a:spcPts val="0"/>
+              </a:spcBef>
+              <a:spcAft>
+                <a:spcPts val="0"/>
+              </a:spcAft>
+              <a:buClrTx/>
+              <a:buSzTx/>
+              <a:buFontTx/>
+              <a:buNone/>
+              <a:tabLst/>
+              <a:defRPr/>
+            </a:pPr>
+            <a:r>
+              <a:rPr lang="en-US" baseline="0" dirty="0" smtClean="0"/>
+              <a:t>You can use one version during test (the DI version, so you can mock things) and use another version in production code.</a:t>
+            </a:r>
+            <a:endParaRPr lang="en-US" dirty="0" smtClean="0"/>
+          </a:p>
+          <a:p>
             <a:r>
               <a:rPr lang="en-US" dirty="0" smtClean="0"/>
-              <a:t>so I originally stated this was</a:t>
+              <a:t>There may be legitimate</a:t>
             </a:r>
             <a:r>
               <a:rPr lang="en-US" baseline="0" dirty="0" smtClean="0"/>
-              <a:t> all in the name of simplicity…</a:t>
+              <a:t> reasons for doing this, but I can’t think of any…</a:t>
             </a:r>
           </a:p>
           <a:p>
             <a:r>
               <a:rPr lang="en-US" baseline="0" dirty="0" smtClean="0"/>
-              <a:t>does it feel like we’ve gotten simpler?</a:t>
-            </a:r>
-          </a:p>
-          <a:p>
-            <a:r>
-              <a:rPr lang="en-US" baseline="0" dirty="0" smtClean="0"/>
-              <a:t>doesn’t really to me.</a:t>
-            </a:r>
-          </a:p>
-          <a:p>
-            <a:r>
-              <a:rPr lang="en-US" baseline="0" dirty="0" smtClean="0"/>
-              <a:t>we’ve created some abstractions (which, arguably, make our system more difficult to understand)</a:t>
-            </a:r>
-          </a:p>
-          <a:p>
-            <a:r>
-              <a:rPr lang="en-US" baseline="0" dirty="0" smtClean="0"/>
-              <a:t>and we’re manually wiring some of these things together.</a:t>
-            </a:r>
-          </a:p>
-          <a:p>
-            <a:r>
-              <a:rPr lang="en-US" baseline="0" dirty="0" smtClean="0"/>
-              <a:t>How, if we don’t do PMDI or service location are our dependencies going to find each other?</a:t>
-            </a:r>
-          </a:p>
-          <a:p>
-            <a:r>
-              <a:rPr lang="en-US" baseline="0" dirty="0" smtClean="0"/>
-              <a:t>Seems like we’ve just relegated ourselves to instantiating our dependencies one level higher, and then passing them down.</a:t>
-            </a:r>
-          </a:p>
-          <a:p>
-            <a:r>
-              <a:rPr lang="en-US" baseline="0" dirty="0" smtClean="0"/>
-              <a:t>That does NOT sound like simplicity.  Sounds like the same set of problems, just worse.</a:t>
+              <a:t>In the long run, you’ll be better off to have just went without it, and went with a framework/tool instead.</a:t>
             </a:r>
             <a:endParaRPr lang="en-US" dirty="0"/>
           </a:p>
@@ -1683,7 +1719,7 @@
             <a:fld id="{F5395209-E063-144C-8968-CAA31F3D1B83}" type="slidenum">
               <a:rPr lang="en-US" smtClean="0"/>
               <a:pPr/>
-              <a:t>25</a:t>
+              <a:t>24</a:t>
             </a:fld>
             <a:endParaRPr lang="en-US"/>
           </a:p>
@@ -1745,12 +1781,28 @@
           <a:p>
             <a:r>
               <a:rPr lang="en-US" dirty="0" smtClean="0"/>
-              <a:t>I’m hoping,</a:t>
+              <a:t>our focus </a:t>
             </a:r>
             <a:r>
               <a:rPr lang="en-US" baseline="0" dirty="0" smtClean="0"/>
-              <a:t> for my sake, not for yours I wouldn’t want to wish you harm that these things are important to you, and that you want to help figure out how to achieve them in your system.</a:t>
-            </a:r>
+              <a:t>here is going to be about managing all the complexity that comes into your system because of dependencies.  it makes your systems tough to manage and inflexible.</a:t>
+            </a:r>
+          </a:p>
+          <a:p>
+            <a:r>
+              <a:rPr lang="en-US" baseline="0" dirty="0" smtClean="0"/>
+              <a:t>we’ll try to see how it can be much simpler than how you’re wiring everything together now.</a:t>
+            </a:r>
+          </a:p>
+          <a:p>
+            <a:endParaRPr lang="en-US" baseline="0" dirty="0" smtClean="0"/>
+          </a:p>
+          <a:p>
+            <a:r>
+              <a:rPr lang="en-US" baseline="0" dirty="0" smtClean="0"/>
+              <a:t>simplicity can mean a lot of things… </a:t>
+            </a:r>
+            <a:endParaRPr lang="en-US" dirty="0"/>
           </a:p>
         </p:txBody>
       </p:sp>
@@ -1772,7 +1824,7 @@
             <a:fld id="{F5395209-E063-144C-8968-CAA31F3D1B83}" type="slidenum">
               <a:rPr lang="en-US" smtClean="0"/>
               <a:pPr/>
-              <a:t>8</a:t>
+              <a:t>3</a:t>
             </a:fld>
             <a:endParaRPr lang="en-US"/>
           </a:p>
@@ -1834,53 +1886,53 @@
           <a:p>
             <a:r>
               <a:rPr lang="en-US" dirty="0" smtClean="0"/>
-              <a:t>Alright, here’s where this starts to get good.</a:t>
-            </a:r>
-          </a:p>
-          <a:p>
-            <a:r>
-              <a:rPr lang="en-US" dirty="0" smtClean="0"/>
-              <a:t>The idea behind the general</a:t>
+              <a:t>so I originally stated this was</a:t>
             </a:r>
             <a:r>
               <a:rPr lang="en-US" baseline="0" dirty="0" smtClean="0"/>
-              <a:t> term is to give control to someone else.  A framework, person, process, etc.</a:t>
+              <a:t> all in the name of simplicity…</a:t>
             </a:r>
           </a:p>
           <a:p>
             <a:r>
               <a:rPr lang="en-US" baseline="0" dirty="0" smtClean="0"/>
-              <a:t>Things like </a:t>
-            </a:r>
-            <a:r>
-              <a:rPr lang="en-US" baseline="0" dirty="0" err="1" smtClean="0"/>
-              <a:t>RoR</a:t>
-            </a:r>
+              <a:t>does it feel like we’ve gotten simpler?</a:t>
+            </a:r>
+          </a:p>
+          <a:p>
             <a:r>
               <a:rPr lang="en-US" baseline="0" dirty="0" smtClean="0"/>
-              <a:t>, WPF, </a:t>
-            </a:r>
-            <a:r>
-              <a:rPr lang="en-US" baseline="0" dirty="0" err="1" smtClean="0"/>
-              <a:t>Nunit</a:t>
-            </a:r>
+              <a:t>doesn’t really to me.</a:t>
+            </a:r>
+          </a:p>
+          <a:p>
             <a:r>
               <a:rPr lang="en-US" baseline="0" dirty="0" smtClean="0"/>
-              <a:t> are all instances of where you’ve given up control and let someone/something else do the work for you.</a:t>
+              <a:t>we’ve created some abstractions (which, arguably, make our system more difficult to understand)</a:t>
             </a:r>
           </a:p>
           <a:p>
             <a:r>
               <a:rPr lang="en-US" baseline="0" dirty="0" smtClean="0"/>
-              <a:t>An </a:t>
-            </a:r>
-            <a:r>
-              <a:rPr lang="en-US" baseline="0" dirty="0" err="1" smtClean="0"/>
-              <a:t>IoC</a:t>
-            </a:r>
+              <a:t>and we’re manually wiring some of these things together.</a:t>
+            </a:r>
+          </a:p>
+          <a:p>
             <a:r>
               <a:rPr lang="en-US" baseline="0" dirty="0" smtClean="0"/>
-              <a:t> container is one other instance of this.</a:t>
+              <a:t>How, if we don’t do PMDI or service location are our dependencies going to find each other?</a:t>
+            </a:r>
+          </a:p>
+          <a:p>
+            <a:r>
+              <a:rPr lang="en-US" baseline="0" dirty="0" smtClean="0"/>
+              <a:t>Seems like we’ve just relegated ourselves to instantiating our dependencies one level higher, and then passing them down.</a:t>
+            </a:r>
+          </a:p>
+          <a:p>
+            <a:r>
+              <a:rPr lang="en-US" baseline="0" dirty="0" smtClean="0"/>
+              <a:t>That does NOT sound like simplicity.  Sounds like the same set of problems, just worse.</a:t>
             </a:r>
             <a:endParaRPr lang="en-US" dirty="0"/>
           </a:p>
@@ -1904,7 +1956,7 @@
             <a:fld id="{F5395209-E063-144C-8968-CAA31F3D1B83}" type="slidenum">
               <a:rPr lang="en-US" smtClean="0"/>
               <a:pPr/>
-              <a:t>26</a:t>
+              <a:t>25</a:t>
             </a:fld>
             <a:endParaRPr lang="en-US"/>
           </a:p>
@@ -1966,47 +2018,53 @@
           <a:p>
             <a:r>
               <a:rPr lang="en-US" dirty="0" smtClean="0"/>
-              <a:t>What this allows</a:t>
+              <a:t>Alright, here’s where this starts to get good.</a:t>
+            </a:r>
+          </a:p>
+          <a:p>
+            <a:r>
+              <a:rPr lang="en-US" dirty="0" smtClean="0"/>
+              <a:t>The idea behind the general</a:t>
             </a:r>
             <a:r>
               <a:rPr lang="en-US" baseline="0" dirty="0" smtClean="0"/>
-              <a:t> us to do is be declarative… specify what, not how.</a:t>
+              <a:t> term is to give control to someone else.  A framework, person, process, etc.</a:t>
             </a:r>
           </a:p>
           <a:p>
             <a:r>
               <a:rPr lang="en-US" baseline="0" dirty="0" smtClean="0"/>
-              <a:t>WPF allows you to declare your UI and how it interacts with its data.</a:t>
-            </a:r>
-          </a:p>
-          <a:p>
+              <a:t>Things like </a:t>
+            </a:r>
             <a:r>
               <a:rPr lang="en-US" baseline="0" dirty="0" err="1" smtClean="0"/>
               <a:t>RoR</a:t>
             </a:r>
             <a:r>
               <a:rPr lang="en-US" baseline="0" dirty="0" smtClean="0"/>
-              <a:t> allows you to declaratively define your routes and URL structure.</a:t>
-            </a:r>
-          </a:p>
-          <a:p>
+              <a:t>, WPF, </a:t>
+            </a:r>
+            <a:r>
+              <a:rPr lang="en-US" baseline="0" dirty="0" err="1" smtClean="0"/>
+              <a:t>Nunit</a:t>
+            </a:r>
             <a:r>
               <a:rPr lang="en-US" baseline="0" dirty="0" smtClean="0"/>
-              <a:t>This correlates to the </a:t>
+              <a:t> are all instances of where you’ve given up control and let someone/something else do the work for you.</a:t>
+            </a:r>
+          </a:p>
+          <a:p>
+            <a:r>
+              <a:rPr lang="en-US" baseline="0" dirty="0" smtClean="0"/>
+              <a:t>An </a:t>
             </a:r>
             <a:r>
               <a:rPr lang="en-US" baseline="0" dirty="0" err="1" smtClean="0"/>
-              <a:t>hollywood</a:t>
+              <a:t>IoC</a:t>
             </a:r>
             <a:r>
               <a:rPr lang="en-US" baseline="0" dirty="0" smtClean="0"/>
-              <a:t> principle.  Don’t Call Us, We’ll Call you.</a:t>
-            </a:r>
-          </a:p>
-          <a:p>
-            <a:r>
-              <a:rPr lang="en-US" baseline="0" dirty="0" smtClean="0"/>
-              <a:t>You place hooks into the process, and when it’s time, your hooks will be called.</a:t>
+              <a:t> container is one other instance of this.</a:t>
             </a:r>
             <a:endParaRPr lang="en-US" dirty="0"/>
           </a:p>
@@ -2030,7 +2088,7 @@
             <a:fld id="{F5395209-E063-144C-8968-CAA31F3D1B83}" type="slidenum">
               <a:rPr lang="en-US" smtClean="0"/>
               <a:pPr/>
-              <a:t>27</a:t>
+              <a:t>26</a:t>
             </a:fld>
             <a:endParaRPr lang="en-US"/>
           </a:p>
@@ -2092,17 +2150,47 @@
           <a:p>
             <a:r>
               <a:rPr lang="en-US" dirty="0" smtClean="0"/>
-              <a:t>The container is simply</a:t>
+              <a:t>What this allows</a:t>
             </a:r>
             <a:r>
               <a:rPr lang="en-US" baseline="0" dirty="0" smtClean="0"/>
-              <a:t> that.  In its most basic form it’s basically a mapping between interfaces and concrete implementations.</a:t>
+              <a:t> us to do is be declarative… specify what, not how.</a:t>
             </a:r>
           </a:p>
           <a:p>
             <a:r>
               <a:rPr lang="en-US" baseline="0" dirty="0" smtClean="0"/>
-              <a:t>We’ll see soon though, that it’s much more than that.</a:t>
+              <a:t>WPF allows you to declare your UI and how it interacts with its data.</a:t>
+            </a:r>
+          </a:p>
+          <a:p>
+            <a:r>
+              <a:rPr lang="en-US" baseline="0" dirty="0" err="1" smtClean="0"/>
+              <a:t>RoR</a:t>
+            </a:r>
+            <a:r>
+              <a:rPr lang="en-US" baseline="0" dirty="0" smtClean="0"/>
+              <a:t> allows you to declaratively define your routes and URL structure.</a:t>
+            </a:r>
+          </a:p>
+          <a:p>
+            <a:r>
+              <a:rPr lang="en-US" baseline="0" dirty="0" smtClean="0"/>
+              <a:t>This correlates to the </a:t>
+            </a:r>
+            <a:r>
+              <a:rPr lang="en-US" baseline="0" dirty="0" err="1" smtClean="0"/>
+              <a:t>hollywood</a:t>
+            </a:r>
+            <a:r>
+              <a:rPr lang="en-US" baseline="0" dirty="0" smtClean="0"/>
+              <a:t> principle.  Don’t Call Us, We’ll Call you.</a:t>
+            </a:r>
+          </a:p>
+          <a:p>
+            <a:r>
+              <a:rPr lang="en-US" baseline="0" dirty="0" smtClean="0"/>
+              <a:t>You place hooks into the process, and when it’s time, your hooks will be called.</a:t>
             </a:r>
             <a:endParaRPr lang="en-US" dirty="0"/>
           </a:p>
@@ -2126,7 +2214,7 @@
             <a:fld id="{F5395209-E063-144C-8968-CAA31F3D1B83}" type="slidenum">
               <a:rPr lang="en-US" smtClean="0"/>
               <a:pPr/>
-              <a:t>28</a:t>
+              <a:t>27</a:t>
             </a:fld>
             <a:endParaRPr lang="en-US"/>
           </a:p>
@@ -2188,17 +2276,17 @@
           <a:p>
             <a:r>
               <a:rPr lang="en-US" dirty="0" smtClean="0"/>
-              <a:t>what if I told you that you didn’t have to worry about your dependencies much at all?  simply declare your dependencies in your constructors, and you get them for free,</a:t>
+              <a:t>The container is simply</a:t>
             </a:r>
             <a:r>
               <a:rPr lang="en-US" baseline="0" dirty="0" smtClean="0"/>
-              <a:t> whenever you need them.  Sound like magic?  not really.</a:t>
+              <a:t> that.  In its most basic form it’s basically a mapping between interfaces and concrete implementations.</a:t>
             </a:r>
           </a:p>
           <a:p>
             <a:r>
               <a:rPr lang="en-US" baseline="0" dirty="0" smtClean="0"/>
-              <a:t>There is some well defined Reflection Kung-Fu going on, but nothing you or I couldn’t do given time.  However, I don’t want to spend my time or my employer’s time working on this infrastructure stuff.  So we’ll just use an existing container.</a:t>
+              <a:t>We’ll see soon though, that it’s much more than that.</a:t>
             </a:r>
             <a:endParaRPr lang="en-US" dirty="0"/>
           </a:p>
@@ -2222,7 +2310,7 @@
             <a:fld id="{F5395209-E063-144C-8968-CAA31F3D1B83}" type="slidenum">
               <a:rPr lang="en-US" smtClean="0"/>
               <a:pPr/>
-              <a:t>29</a:t>
+              <a:t>28</a:t>
             </a:fld>
             <a:endParaRPr lang="en-US"/>
           </a:p>
@@ -2284,13 +2372,17 @@
           <a:p>
             <a:r>
               <a:rPr lang="en-US" dirty="0" smtClean="0"/>
-              <a:t>Back to the manual DI example.</a:t>
-            </a:r>
-          </a:p>
-          <a:p>
-            <a:r>
-              <a:rPr lang="en-US" dirty="0" smtClean="0"/>
-              <a:t>So here, we can see the dependency is manually injected.</a:t>
+              <a:t>what if I told you that you didn’t have to worry about your dependencies much at all?  simply declare your dependencies in your constructors, and you get them for free,</a:t>
+            </a:r>
+            <a:r>
+              <a:rPr lang="en-US" baseline="0" dirty="0" smtClean="0"/>
+              <a:t> whenever you need them.  Sound like magic?  not really.</a:t>
+            </a:r>
+          </a:p>
+          <a:p>
+            <a:r>
+              <a:rPr lang="en-US" baseline="0" dirty="0" smtClean="0"/>
+              <a:t>There is some well defined Reflection Kung-Fu going on, but nothing you or I couldn’t do given time.  However, I don’t want to spend my time or my employer’s time working on this infrastructure stuff.  So we’ll just use an existing container.</a:t>
             </a:r>
             <a:endParaRPr lang="en-US" dirty="0"/>
           </a:p>
@@ -2314,7 +2406,7 @@
             <a:fld id="{F5395209-E063-144C-8968-CAA31F3D1B83}" type="slidenum">
               <a:rPr lang="en-US" smtClean="0"/>
               <a:pPr/>
-              <a:t>30</a:t>
+              <a:t>29</a:t>
             </a:fld>
             <a:endParaRPr lang="en-US"/>
           </a:p>
@@ -2376,39 +2468,15 @@
           <a:p>
             <a:r>
               <a:rPr lang="en-US" dirty="0" smtClean="0"/>
-              <a:t>Here’s an example using a container.</a:t>
+              <a:t>Back to the manual DI example.</a:t>
             </a:r>
           </a:p>
           <a:p>
             <a:r>
               <a:rPr lang="en-US" dirty="0" smtClean="0"/>
-              <a:t>Sort</a:t>
-            </a:r>
-            <a:r>
-              <a:rPr lang="en-US" baseline="0" dirty="0" smtClean="0"/>
-              <a:t> of looks like </a:t>
-            </a:r>
-            <a:r>
-              <a:rPr lang="en-US" baseline="0" dirty="0" err="1" smtClean="0"/>
-              <a:t>ServiceLocation</a:t>
-            </a:r>
-            <a:r>
-              <a:rPr lang="en-US" baseline="0" dirty="0" smtClean="0"/>
-              <a:t>?</a:t>
-            </a:r>
-          </a:p>
-          <a:p>
-            <a:r>
-              <a:rPr lang="en-US" baseline="0" dirty="0" smtClean="0"/>
-              <a:t>It sort of is, but with the power of a general purpose container behind it.</a:t>
-            </a:r>
-          </a:p>
-          <a:p>
-            <a:r>
-              <a:rPr lang="en-US" baseline="0" dirty="0" smtClean="0"/>
-              <a:t>At this point, it’s really little more than a glorified Service Locator… and I think, though maybe not, this is what most people see, and then either stop using a container, or never take it further.</a:t>
-            </a:r>
-            <a:endParaRPr lang="en-US" dirty="0" smtClean="0"/>
+              <a:t>So here, we can see the dependency is manually injected.</a:t>
+            </a:r>
+            <a:endParaRPr lang="en-US" dirty="0"/>
           </a:p>
         </p:txBody>
       </p:sp>
@@ -2430,7 +2498,7 @@
             <a:fld id="{F5395209-E063-144C-8968-CAA31F3D1B83}" type="slidenum">
               <a:rPr lang="en-US" smtClean="0"/>
               <a:pPr/>
-              <a:t>31</a:t>
+              <a:t>30</a:t>
             </a:fld>
             <a:endParaRPr lang="en-US"/>
           </a:p>
@@ -2492,70 +2560,39 @@
           <a:p>
             <a:r>
               <a:rPr lang="en-US" dirty="0" smtClean="0"/>
-              <a:t>The next major</a:t>
+              <a:t>Here’s an example using a container.</a:t>
+            </a:r>
+          </a:p>
+          <a:p>
+            <a:r>
+              <a:rPr lang="en-US" dirty="0" smtClean="0"/>
+              <a:t>Sort</a:t>
             </a:r>
             <a:r>
               <a:rPr lang="en-US" baseline="0" dirty="0" smtClean="0"/>
-              <a:t> leap to take with the container is </a:t>
+              <a:t> of looks like </a:t>
             </a:r>
             <a:r>
               <a:rPr lang="en-US" baseline="0" dirty="0" err="1" smtClean="0"/>
-              <a:t>autowiring</a:t>
+              <a:t>ServiceLocation</a:t>
             </a:r>
             <a:r>
               <a:rPr lang="en-US" baseline="0" dirty="0" smtClean="0"/>
-              <a:t>.</a:t>
+              <a:t>?</a:t>
             </a:r>
           </a:p>
           <a:p>
             <a:r>
               <a:rPr lang="en-US" baseline="0" dirty="0" smtClean="0"/>
-              <a:t>This may sound a little magic-</a:t>
-            </a:r>
-            <a:r>
-              <a:rPr lang="en-US" baseline="0" dirty="0" err="1" smtClean="0"/>
-              <a:t>y</a:t>
-            </a:r>
+              <a:t>It sort of is, but with the power of a general purpose container behind it.</a:t>
+            </a:r>
+          </a:p>
+          <a:p>
             <a:r>
               <a:rPr lang="en-US" baseline="0" dirty="0" smtClean="0"/>
-              <a:t>, or “over my head”, but its not really… pretty simple, lets see</a:t>
-            </a:r>
-          </a:p>
-          <a:p>
-            <a:r>
-              <a:rPr lang="en-US" baseline="0" dirty="0" smtClean="0"/>
-              <a:t>CODE</a:t>
-            </a:r>
-          </a:p>
-          <a:p>
-            <a:r>
-              <a:rPr lang="en-US" baseline="0" dirty="0" smtClean="0"/>
-              <a:t>You can start to see now how this code has:</a:t>
-            </a:r>
-          </a:p>
-          <a:p>
-            <a:r>
-              <a:rPr lang="en-US" baseline="0" dirty="0" smtClean="0"/>
-              <a:t>Very low coupling</a:t>
-            </a:r>
-          </a:p>
-          <a:p>
-            <a:r>
-              <a:rPr lang="en-US" baseline="0" dirty="0" smtClean="0"/>
-              <a:t>Reusable (if that’s your thing)</a:t>
-            </a:r>
-          </a:p>
-          <a:p>
-            <a:r>
-              <a:rPr lang="en-US" baseline="0" dirty="0" smtClean="0"/>
-              <a:t>Verifiable</a:t>
-            </a:r>
-          </a:p>
-          <a:p>
-            <a:r>
-              <a:rPr lang="en-US" baseline="0" dirty="0" smtClean="0"/>
-              <a:t>Orthogonal</a:t>
-            </a:r>
+              <a:t>At this point, it’s really little more than a glorified Service Locator… and I think, though maybe not, this is what most people see, and then either stop using a container, or never take it further.</a:t>
+            </a:r>
+            <a:endParaRPr lang="en-US" dirty="0" smtClean="0"/>
           </a:p>
         </p:txBody>
       </p:sp>
@@ -2577,7 +2614,7 @@
             <a:fld id="{F5395209-E063-144C-8968-CAA31F3D1B83}" type="slidenum">
               <a:rPr lang="en-US" smtClean="0"/>
               <a:pPr/>
-              <a:t>32</a:t>
+              <a:t>31</a:t>
             </a:fld>
             <a:endParaRPr lang="en-US"/>
           </a:p>
@@ -2639,50 +2676,69 @@
           <a:p>
             <a:r>
               <a:rPr lang="en-US" dirty="0" smtClean="0"/>
-              <a:t>Java</a:t>
+              <a:t>The next major</a:t>
             </a:r>
             <a:r>
               <a:rPr lang="en-US" baseline="0" dirty="0" smtClean="0"/>
-              <a:t> guys and containers almost always prefer property setter injection.</a:t>
-            </a:r>
-          </a:p>
-          <a:p>
+              <a:t> leap to take with the container is </a:t>
+            </a:r>
+            <a:r>
+              <a:rPr lang="en-US" baseline="0" dirty="0" err="1" smtClean="0"/>
+              <a:t>autowiring</a:t>
+            </a:r>
             <a:r>
               <a:rPr lang="en-US" baseline="0" dirty="0" smtClean="0"/>
-              <a:t>The Java guys also LOVE to use XML and they love to use IOC… you’ll see tons of XML and IOC all over java projects.</a:t>
+              <a:t>.</a:t>
             </a:r>
           </a:p>
           <a:p>
             <a:r>
               <a:rPr lang="en-US" baseline="0" dirty="0" smtClean="0"/>
-              <a:t>They’ve been doing this for a long time, so watch out if you start evangelizing this stuff to a java dude.</a:t>
-            </a:r>
-          </a:p>
-          <a:p>
-            <a:endParaRPr lang="en-US" baseline="0" dirty="0" smtClean="0"/>
-          </a:p>
-          <a:p>
+              <a:t>This may sound a little magic-</a:t>
+            </a:r>
+            <a:r>
+              <a:rPr lang="en-US" baseline="0" dirty="0" err="1" smtClean="0"/>
+              <a:t>y</a:t>
+            </a:r>
             <a:r>
               <a:rPr lang="en-US" baseline="0" dirty="0" smtClean="0"/>
-              <a:t>.NET guys and containers almost always prefer constructor injection.</a:t>
+              <a:t>, or “over my head”, but its not really… pretty simple, lets see</a:t>
             </a:r>
           </a:p>
           <a:p>
             <a:r>
               <a:rPr lang="en-US" baseline="0" dirty="0" smtClean="0"/>
-              <a:t>It also seems like the .NET guys like to configure their stuff in code with a fluent interface or internal DSL… and because we have REAL</a:t>
+              <a:t>CODE</a:t>
             </a:r>
           </a:p>
           <a:p>
             <a:r>
               <a:rPr lang="en-US" baseline="0" dirty="0" smtClean="0"/>
-              <a:t>generics (unlike Java) we use generics to express type information.  And since we can configure things in code, we can do some more powerful</a:t>
+              <a:t>You can start to see now how this code has:</a:t>
             </a:r>
           </a:p>
           <a:p>
             <a:r>
               <a:rPr lang="en-US" baseline="0" dirty="0" smtClean="0"/>
-              <a:t>registration type things by default since we don’t have to have special xml handlers to do something out of the ordinary.</a:t>
+              <a:t>Very low coupling</a:t>
+            </a:r>
+          </a:p>
+          <a:p>
+            <a:r>
+              <a:rPr lang="en-US" baseline="0" dirty="0" smtClean="0"/>
+              <a:t>Reusable (if that’s your thing)</a:t>
+            </a:r>
+          </a:p>
+          <a:p>
+            <a:r>
+              <a:rPr lang="en-US" baseline="0" dirty="0" smtClean="0"/>
+              <a:t>Verifiable</a:t>
+            </a:r>
+          </a:p>
+          <a:p>
+            <a:r>
+              <a:rPr lang="en-US" baseline="0" dirty="0" smtClean="0"/>
+              <a:t>Orthogonal</a:t>
             </a:r>
           </a:p>
         </p:txBody>
@@ -2705,7 +2761,7 @@
             <a:fld id="{F5395209-E063-144C-8968-CAA31F3D1B83}" type="slidenum">
               <a:rPr lang="en-US" smtClean="0"/>
               <a:pPr/>
-              <a:t>33</a:t>
+              <a:t>32</a:t>
             </a:fld>
             <a:endParaRPr lang="en-US"/>
           </a:p>
@@ -2767,43 +2823,51 @@
           <a:p>
             <a:r>
               <a:rPr lang="en-US" dirty="0" smtClean="0"/>
-              <a:t>another</a:t>
+              <a:t>Java</a:t>
             </a:r>
             <a:r>
               <a:rPr lang="en-US" baseline="0" dirty="0" smtClean="0"/>
-              <a:t> great feature provided by the container is lifecycle management.</a:t>
+              <a:t> guys and containers almost always prefer property setter injection.</a:t>
             </a:r>
           </a:p>
           <a:p>
             <a:r>
               <a:rPr lang="en-US" baseline="0" dirty="0" smtClean="0"/>
-              <a:t>sometimes you might want a singleton, because it grabs a scarce resource handle (physical device), or because it’s expensive to create</a:t>
+              <a:t>The Java guys also LOVE to use XML and they love to use IOC… you’ll see tons of XML and IOC all over java projects.</a:t>
             </a:r>
           </a:p>
           <a:p>
             <a:r>
               <a:rPr lang="en-US" baseline="0" dirty="0" smtClean="0"/>
-              <a:t>sometimes you want something to be created once per web request</a:t>
-            </a:r>
+              <a:t>They’ve been doing this for a long time, so watch out if you start evangelizing this stuff to a java dude.</a:t>
+            </a:r>
+          </a:p>
+          <a:p>
+            <a:endParaRPr lang="en-US" baseline="0" dirty="0" smtClean="0"/>
           </a:p>
           <a:p>
             <a:r>
               <a:rPr lang="en-US" baseline="0" dirty="0" smtClean="0"/>
-              <a:t>… new one every time (called transient, usually)</a:t>
+              <a:t>.NET guys and containers almost always prefer constructor injection.</a:t>
             </a:r>
           </a:p>
           <a:p>
             <a:r>
               <a:rPr lang="en-US" baseline="0" dirty="0" smtClean="0"/>
-              <a:t>… X?</a:t>
+              <a:t>It also seems like the .NET guys like to configure their stuff in code with a fluent interface or internal DSL… and because we have REAL</a:t>
             </a:r>
           </a:p>
           <a:p>
             <a:r>
               <a:rPr lang="en-US" baseline="0" dirty="0" smtClean="0"/>
-              <a:t>let’s look at an example</a:t>
-            </a:r>
-            <a:endParaRPr lang="en-US" dirty="0"/>
+              <a:t>generics (unlike Java) we use generics to express type information.  And since we can configure things in code, we can do some more powerful</a:t>
+            </a:r>
+          </a:p>
+          <a:p>
+            <a:r>
+              <a:rPr lang="en-US" baseline="0" dirty="0" smtClean="0"/>
+              <a:t>registration type things by default since we don’t have to have special xml handlers to do something out of the ordinary.</a:t>
+            </a:r>
           </a:p>
         </p:txBody>
       </p:sp>
@@ -2825,7 +2889,7 @@
             <a:fld id="{F5395209-E063-144C-8968-CAA31F3D1B83}" type="slidenum">
               <a:rPr lang="en-US" smtClean="0"/>
               <a:pPr/>
-              <a:t>34</a:t>
+              <a:t>33</a:t>
             </a:fld>
             <a:endParaRPr lang="en-US"/>
           </a:p>
@@ -2886,30 +2950,42 @@
           <a:lstStyle/>
           <a:p>
             <a:r>
-              <a:rPr lang="en-US" smtClean="0"/>
-              <a:t>Singleton</a:t>
-            </a:r>
-          </a:p>
-          <a:p>
-            <a:r>
               <a:rPr lang="en-US" dirty="0" smtClean="0"/>
-              <a:t>so</a:t>
+              <a:t>another</a:t>
             </a:r>
             <a:r>
               <a:rPr lang="en-US" baseline="0" dirty="0" smtClean="0"/>
-              <a:t> yeah, you could still new up a new one of these things, which the singleton implementation pattern precludes you from doing…</a:t>
+              <a:t> great feature provided by the container is lifecycle management.</a:t>
             </a:r>
           </a:p>
           <a:p>
             <a:r>
               <a:rPr lang="en-US" baseline="0" dirty="0" smtClean="0"/>
-              <a:t>this lets you to have the declarative nature and flexibility of the container, in case you want to change your mind about the whole singleton thing later.</a:t>
+              <a:t>sometimes you might want a singleton, because it grabs a scarce resource handle (physical device), or because it’s expensive to create</a:t>
             </a:r>
           </a:p>
           <a:p>
             <a:r>
               <a:rPr lang="en-US" baseline="0" dirty="0" smtClean="0"/>
-              <a:t>it essentially separates the concerns of the singleton lifecycle and the singleton implementation pattern.</a:t>
+              <a:t>sometimes you want something to be created once per web request</a:t>
+            </a:r>
+          </a:p>
+          <a:p>
+            <a:r>
+              <a:rPr lang="en-US" baseline="0" dirty="0" smtClean="0"/>
+              <a:t>… new one every time (called transient, usually)</a:t>
+            </a:r>
+          </a:p>
+          <a:p>
+            <a:r>
+              <a:rPr lang="en-US" baseline="0" dirty="0" smtClean="0"/>
+              <a:t>… X?</a:t>
+            </a:r>
+          </a:p>
+          <a:p>
+            <a:r>
+              <a:rPr lang="en-US" baseline="0" dirty="0" smtClean="0"/>
+              <a:t>let’s look at an example</a:t>
             </a:r>
             <a:endParaRPr lang="en-US" dirty="0"/>
           </a:p>
@@ -2933,7 +3009,7 @@
             <a:fld id="{F5395209-E063-144C-8968-CAA31F3D1B83}" type="slidenum">
               <a:rPr lang="en-US" smtClean="0"/>
               <a:pPr/>
-              <a:t>35</a:t>
+              <a:t>34</a:t>
             </a:fld>
             <a:endParaRPr lang="en-US"/>
           </a:p>
@@ -2994,8 +3070,12 @@
           <a:lstStyle/>
           <a:p>
             <a:r>
+              <a:rPr lang="en-US" dirty="0" smtClean="0"/>
+              <a:t>I’m hoping,</a:t>
+            </a:r>
+            <a:r>
               <a:rPr lang="en-US" baseline="0" dirty="0" smtClean="0"/>
-              <a:t>We see these acronyms thrown all around when we’re talking about this topics, often interchangeably.  Throughout the rest of the talk, hopefully we’ll figure out what they mean, and that they are distinct.</a:t>
+              <a:t> for my sake, not for yours I wouldn’t want to wish you harm that these things are important to you, and that you want to help figure out how to achieve them in your system.</a:t>
             </a:r>
           </a:p>
         </p:txBody>
@@ -3018,7 +3098,7 @@
             <a:fld id="{F5395209-E063-144C-8968-CAA31F3D1B83}" type="slidenum">
               <a:rPr lang="en-US" smtClean="0"/>
               <a:pPr/>
-              <a:t>9</a:t>
+              <a:t>8</a:t>
             </a:fld>
             <a:endParaRPr lang="en-US"/>
           </a:p>
@@ -3079,58 +3159,30 @@
           <a:lstStyle/>
           <a:p>
             <a:r>
+              <a:rPr lang="en-US" smtClean="0"/>
+              <a:t>Singleton</a:t>
+            </a:r>
+          </a:p>
+          <a:p>
+            <a:r>
               <a:rPr lang="en-US" dirty="0" smtClean="0"/>
-              <a:t>when</a:t>
+              <a:t>so</a:t>
             </a:r>
             <a:r>
               <a:rPr lang="en-US" baseline="0" dirty="0" smtClean="0"/>
-              <a:t> do I use a container?  normally.</a:t>
+              <a:t> yeah, you could still new up a new one of these things, which the singleton implementation pattern precludes you from doing…</a:t>
             </a:r>
           </a:p>
           <a:p>
             <a:r>
               <a:rPr lang="en-US" baseline="0" dirty="0" smtClean="0"/>
-              <a:t>it might feel overkill at first for simple applications, but it’s not really, once you get used to it, it’s really natural and is difficult to go back to not using one.</a:t>
+              <a:t>this lets you to have the declarative nature and flexibility of the container, in case you want to change your mind about the whole singleton thing later.</a:t>
             </a:r>
           </a:p>
           <a:p>
             <a:r>
               <a:rPr lang="en-US" baseline="0" dirty="0" smtClean="0"/>
-              <a:t>that being said, there isn’t really a hard and fast rule, you’ve </a:t>
-            </a:r>
-            <a:r>
-              <a:rPr lang="en-US" baseline="0" dirty="0" err="1" smtClean="0"/>
-              <a:t>gotta</a:t>
-            </a:r>
-            <a:r>
-              <a:rPr lang="en-US" baseline="0" dirty="0" smtClean="0"/>
-              <a:t> make the decision within the context of your project/solution/problem.</a:t>
-            </a:r>
-          </a:p>
-          <a:p>
-            <a:r>
-              <a:rPr lang="en-US" baseline="0" dirty="0" smtClean="0"/>
-              <a:t>There is no replacement for critical thought, you’ve </a:t>
-            </a:r>
-            <a:r>
-              <a:rPr lang="en-US" baseline="0" dirty="0" err="1" smtClean="0"/>
-              <a:t>gotta</a:t>
-            </a:r>
-            <a:r>
-              <a:rPr lang="en-US" baseline="0" dirty="0" smtClean="0"/>
-              <a:t> think it through.</a:t>
-            </a:r>
-          </a:p>
-          <a:p>
-            <a:r>
-              <a:rPr lang="en-US" baseline="0" dirty="0" smtClean="0"/>
-              <a:t>Usually a container will make things more simple, especially if your app is more than just a few lines long.</a:t>
-            </a:r>
-          </a:p>
-          <a:p>
-            <a:r>
-              <a:rPr lang="en-US" baseline="0" dirty="0" smtClean="0"/>
-              <a:t>Just remember to focus on simplicity and maintainability.</a:t>
+              <a:t>it essentially separates the concerns of the singleton lifecycle and the singleton implementation pattern.</a:t>
             </a:r>
             <a:endParaRPr lang="en-US" dirty="0"/>
           </a:p>
@@ -3154,7 +3206,7 @@
             <a:fld id="{F5395209-E063-144C-8968-CAA31F3D1B83}" type="slidenum">
               <a:rPr lang="en-US" smtClean="0"/>
               <a:pPr/>
-              <a:t>38</a:t>
+              <a:t>35</a:t>
             </a:fld>
             <a:endParaRPr lang="en-US"/>
           </a:p>
@@ -3266,6 +3318,142 @@
           <a:p>
             <a:r>
               <a:rPr lang="en-US" baseline="0" dirty="0" smtClean="0"/>
+              <a:t>Just remember to focus on simplicity and maintainability.</a:t>
+            </a:r>
+            <a:endParaRPr lang="en-US" dirty="0"/>
+          </a:p>
+        </p:txBody>
+      </p:sp>
+      <p:sp>
+        <p:nvSpPr>
+          <p:cNvPr id="4" name="Slide Number Placeholder 3"/>
+          <p:cNvSpPr>
+            <a:spLocks noGrp="1"/>
+          </p:cNvSpPr>
+          <p:nvPr>
+            <p:ph type="sldNum" sz="quarter" idx="10"/>
+          </p:nvPr>
+        </p:nvSpPr>
+        <p:spPr/>
+        <p:txBody>
+          <a:bodyPr/>
+          <a:lstStyle/>
+          <a:p>
+            <a:fld id="{F5395209-E063-144C-8968-CAA31F3D1B83}" type="slidenum">
+              <a:rPr lang="en-US" smtClean="0"/>
+              <a:pPr/>
+              <a:t>38</a:t>
+            </a:fld>
+            <a:endParaRPr lang="en-US"/>
+          </a:p>
+        </p:txBody>
+      </p:sp>
+    </p:spTree>
+  </p:cSld>
+  <p:clrMapOvr>
+    <a:masterClrMapping/>
+  </p:clrMapOvr>
+</p:notes>
+</file>
+
+<file path=ppt/notesSlides/notesSlide32.xml><?xml version="1.0" encoding="utf-8"?>
+<p:notes xmlns:a="http://schemas.openxmlformats.org/drawingml/2006/main" xmlns:r="http://schemas.openxmlformats.org/officeDocument/2006/relationships" xmlns:mc="http://schemas.openxmlformats.org/markup-compatibility/2006" xmlns:mv="urn:schemas-microsoft-com:mac:vml" xmlns:p="http://schemas.openxmlformats.org/presentationml/2006/main" mc:Ignorable="mv" mc:PreserveAttributes="mv:*">
+  <p:cSld>
+    <p:spTree>
+      <p:nvGrpSpPr>
+        <p:cNvPr id="1" name=""/>
+        <p:cNvGrpSpPr/>
+        <p:nvPr/>
+      </p:nvGrpSpPr>
+      <p:grpSpPr>
+        <a:xfrm>
+          <a:off x="0" y="0"/>
+          <a:ext cx="0" cy="0"/>
+          <a:chOff x="0" y="0"/>
+          <a:chExt cx="0" cy="0"/>
+        </a:xfrm>
+      </p:grpSpPr>
+      <p:sp>
+        <p:nvSpPr>
+          <p:cNvPr id="2" name="Slide Image Placeholder 1"/>
+          <p:cNvSpPr>
+            <a:spLocks noGrp="1" noRot="1" noChangeAspect="1"/>
+          </p:cNvSpPr>
+          <p:nvPr>
+            <p:ph type="sldImg"/>
+          </p:nvPr>
+        </p:nvSpPr>
+        <p:spPr/>
+      </p:sp>
+      <p:sp>
+        <p:nvSpPr>
+          <p:cNvPr id="3" name="Notes Placeholder 2"/>
+          <p:cNvSpPr>
+            <a:spLocks noGrp="1"/>
+          </p:cNvSpPr>
+          <p:nvPr>
+            <p:ph type="body" idx="1"/>
+          </p:nvPr>
+        </p:nvSpPr>
+        <p:spPr/>
+        <p:txBody>
+          <a:bodyPr>
+            <a:normAutofit/>
+          </a:bodyPr>
+          <a:lstStyle/>
+          <a:p>
+            <a:r>
+              <a:rPr lang="en-US" dirty="0" smtClean="0"/>
+              <a:t>when</a:t>
+            </a:r>
+            <a:r>
+              <a:rPr lang="en-US" baseline="0" dirty="0" smtClean="0"/>
+              <a:t> do I use a container?  normally.</a:t>
+            </a:r>
+          </a:p>
+          <a:p>
+            <a:r>
+              <a:rPr lang="en-US" baseline="0" dirty="0" smtClean="0"/>
+              <a:t>it might feel overkill at first for simple applications, but it’s not really, once you get used to it, it’s really natural and is difficult to go back to not using one.</a:t>
+            </a:r>
+          </a:p>
+          <a:p>
+            <a:r>
+              <a:rPr lang="en-US" baseline="0" dirty="0" smtClean="0"/>
+              <a:t>that being said, there isn’t really a hard and fast rule, you’ve </a:t>
+            </a:r>
+            <a:r>
+              <a:rPr lang="en-US" baseline="0" dirty="0" err="1" smtClean="0"/>
+              <a:t>gotta</a:t>
+            </a:r>
+            <a:r>
+              <a:rPr lang="en-US" baseline="0" dirty="0" smtClean="0"/>
+              <a:t> make the decision within the context of your project/solution/problem.</a:t>
+            </a:r>
+          </a:p>
+          <a:p>
+            <a:r>
+              <a:rPr lang="en-US" baseline="0" dirty="0" smtClean="0"/>
+              <a:t>There is no replacement for critical thought, you’ve </a:t>
+            </a:r>
+            <a:r>
+              <a:rPr lang="en-US" baseline="0" dirty="0" err="1" smtClean="0"/>
+              <a:t>gotta</a:t>
+            </a:r>
+            <a:r>
+              <a:rPr lang="en-US" baseline="0" dirty="0" smtClean="0"/>
+              <a:t> think it through.</a:t>
+            </a:r>
+          </a:p>
+          <a:p>
+            <a:r>
+              <a:rPr lang="en-US" baseline="0" dirty="0" smtClean="0"/>
+              <a:t>Usually a container will make things more simple, especially if your app is more than just a few lines long.</a:t>
+            </a:r>
+          </a:p>
+          <a:p>
+            <a:r>
+              <a:rPr lang="en-US" baseline="0" dirty="0" smtClean="0"/>
               <a:t>Just remember to focus on simplicity </a:t>
             </a:r>
             <a:r>
@@ -3354,7 +3542,10 @@
           </a:bodyPr>
           <a:lstStyle/>
           <a:p>
-            <a:endParaRPr lang="en-US" baseline="0" dirty="0" smtClean="0"/>
+            <a:r>
+              <a:rPr lang="en-US" baseline="0" dirty="0" smtClean="0"/>
+              <a:t>We see these acronyms thrown all around when we’re talking about this topics, often interchangeably.  Throughout the rest of the talk, hopefully we’ll figure out what they mean, and that they are distinct.</a:t>
+            </a:r>
           </a:p>
         </p:txBody>
       </p:sp>
@@ -3376,7 +3567,7 @@
             <a:fld id="{F5395209-E063-144C-8968-CAA31F3D1B83}" type="slidenum">
               <a:rPr lang="en-US" smtClean="0"/>
               <a:pPr/>
-              <a:t>10</a:t>
+              <a:t>9</a:t>
             </a:fld>
             <a:endParaRPr lang="en-US"/>
           </a:p>
@@ -3436,18 +3627,7 @@
           </a:bodyPr>
           <a:lstStyle/>
           <a:p>
-            <a:r>
-              <a:rPr lang="en-US" baseline="0" dirty="0" smtClean="0"/>
-              <a:t>Uncle Bob wrote an excellent paper on the DIP.  It’s definitely worth a read, it’s up at </a:t>
-            </a:r>
-            <a:r>
-              <a:rPr lang="en-US" baseline="0" dirty="0" err="1" smtClean="0"/>
-              <a:t>objectmentor.com</a:t>
-            </a:r>
-            <a:r>
-              <a:rPr lang="en-US" baseline="0" dirty="0" smtClean="0"/>
-              <a:t>… or if you can’t find it, let me know and I’ll help you out.  What does invert dependencies really mean.  Anyone?</a:t>
-            </a:r>
+            <a:endParaRPr lang="en-US" baseline="0" dirty="0" smtClean="0"/>
           </a:p>
         </p:txBody>
       </p:sp>
@@ -3469,7 +3649,7 @@
             <a:fld id="{F5395209-E063-144C-8968-CAA31F3D1B83}" type="slidenum">
               <a:rPr lang="en-US" smtClean="0"/>
               <a:pPr/>
-              <a:t>11</a:t>
+              <a:t>10</a:t>
             </a:fld>
             <a:endParaRPr lang="en-US"/>
           </a:p>
@@ -3531,15 +3711,15 @@
           <a:p>
             <a:r>
               <a:rPr lang="en-US" baseline="0" dirty="0" smtClean="0"/>
-              <a:t>I’m not </a:t>
+              <a:t>Uncle Bob wrote an excellent paper on the DIP.  It’s definitely worth a read, it’s up at </a:t>
             </a:r>
             <a:r>
               <a:rPr lang="en-US" baseline="0" dirty="0" err="1" smtClean="0"/>
-              <a:t>gonna</a:t>
+              <a:t>objectmentor.com</a:t>
             </a:r>
             <a:r>
               <a:rPr lang="en-US" baseline="0" dirty="0" smtClean="0"/>
-              <a:t> use formal UML here, because I’m not that smart.  That being said, the shape and direction of the arrows don’t really have significance other than the direction I feel the “dependency” is flowing. However, if you take a look at Uncle Bob’s Paper, you can see real UML if you’re a fan of that.  I however, am not.  Discuss diagram.</a:t>
+              <a:t>… or if you can’t find it, let me know and I’ll help you out.  What does invert dependencies really mean.  Anyone?</a:t>
             </a:r>
           </a:p>
         </p:txBody>
@@ -3562,7 +3742,7 @@
             <a:fld id="{F5395209-E063-144C-8968-CAA31F3D1B83}" type="slidenum">
               <a:rPr lang="en-US" smtClean="0"/>
               <a:pPr/>
-              <a:t>12</a:t>
+              <a:t>11</a:t>
             </a:fld>
             <a:endParaRPr lang="en-US"/>
           </a:p>
@@ -3624,29 +3804,16 @@
           <a:p>
             <a:r>
               <a:rPr lang="en-US" baseline="0" dirty="0" smtClean="0"/>
-              <a:t>So this is great until you realize your security handler now depends on exchange working in order to work.</a:t>
-            </a:r>
-          </a:p>
-          <a:p>
+              <a:t>I’m not </a:t>
+            </a:r>
+            <a:r>
+              <a:rPr lang="en-US" baseline="0" dirty="0" err="1" smtClean="0"/>
+              <a:t>gonna</a:t>
+            </a:r>
             <a:r>
               <a:rPr lang="en-US" baseline="0" dirty="0" smtClean="0"/>
-              <a:t>How do you test this?</a:t>
-            </a:r>
-          </a:p>
-          <a:p>
-            <a:r>
-              <a:rPr lang="en-US" baseline="0" dirty="0" smtClean="0"/>
-              <a:t>What if the guy working on the AD service isn’t done yet?</a:t>
-            </a:r>
-          </a:p>
-          <a:p>
-            <a:r>
-              <a:rPr lang="en-US" baseline="0" dirty="0" smtClean="0"/>
-              <a:t>What if we ordered the Exchange server, but it isn’t here yet?</a:t>
-            </a:r>
-          </a:p>
-          <a:p>
-            <a:endParaRPr lang="en-US" baseline="0" dirty="0" smtClean="0"/>
+              <a:t> use formal UML here, because I’m not that smart.  That being said, the shape and direction of the arrows don’t really have significance other than the direction I feel the “dependency” is flowing. However, if you take a look at Uncle Bob’s Paper, you can see real UML if you’re a fan of that.  I however, am not.  Discuss diagram.</a:t>
+            </a:r>
           </a:p>
         </p:txBody>
       </p:sp>
@@ -3668,7 +3835,7 @@
             <a:fld id="{F5395209-E063-144C-8968-CAA31F3D1B83}" type="slidenum">
               <a:rPr lang="en-US" smtClean="0"/>
               <a:pPr/>
-              <a:t>13</a:t>
+              <a:t>12</a:t>
             </a:fld>
             <a:endParaRPr lang="en-US"/>
           </a:p>
@@ -3730,48 +3897,29 @@
           <a:p>
             <a:r>
               <a:rPr lang="en-US" baseline="0" dirty="0" smtClean="0"/>
-              <a:t>We introduced the </a:t>
-            </a:r>
-            <a:r>
-              <a:rPr lang="en-US" baseline="0" dirty="0" err="1" smtClean="0"/>
-              <a:t>ILoginService</a:t>
-            </a:r>
+              <a:t>So this is great until you realize your security handler now depends on exchange working in order to work.</a:t>
+            </a:r>
+          </a:p>
+          <a:p>
             <a:r>
               <a:rPr lang="en-US" baseline="0" dirty="0" smtClean="0"/>
-              <a:t> abstraction upon which both the security handler depends on (with a uses relationship) and the login service depends on (with an </a:t>
-            </a:r>
-            <a:r>
-              <a:rPr lang="en-US" baseline="0" dirty="0" err="1" smtClean="0"/>
-              <a:t>imlementation</a:t>
-            </a:r>
+              <a:t>How do you test this?</a:t>
+            </a:r>
+          </a:p>
+          <a:p>
             <a:r>
               <a:rPr lang="en-US" baseline="0" dirty="0" smtClean="0"/>
-              <a:t>/inheritance) relationship.</a:t>
+              <a:t>What if the guy working on the AD service isn’t done yet?</a:t>
             </a:r>
           </a:p>
           <a:p>
             <a:r>
               <a:rPr lang="en-US" baseline="0" dirty="0" smtClean="0"/>
-              <a:t>They each now only depend on the abstraction, and neither directly on one another.  The dependency has been inverted, and the concrete dependency has been broken.</a:t>
-            </a:r>
-          </a:p>
-          <a:p>
-            <a:r>
-              <a:rPr lang="en-US" baseline="0" dirty="0" smtClean="0"/>
-              <a:t>Now, if Dean, working on the </a:t>
-            </a:r>
-            <a:r>
-              <a:rPr lang="en-US" baseline="0" dirty="0" err="1" smtClean="0"/>
-              <a:t>LoginService</a:t>
-            </a:r>
-            <a:r>
-              <a:rPr lang="en-US" baseline="0" dirty="0" smtClean="0"/>
-              <a:t> is on vacation while I’m trying to write the Security Handler, I can still get completed, since I know longer care about his implementation, only about </a:t>
-            </a:r>
-            <a:r>
-              <a:rPr lang="en-US" baseline="0" smtClean="0"/>
-              <a:t>the interface.</a:t>
-            </a:r>
+              <a:t>What if we ordered the Exchange server, but it isn’t here yet?</a:t>
+            </a:r>
+          </a:p>
+          <a:p>
+            <a:endParaRPr lang="en-US" baseline="0" dirty="0" smtClean="0"/>
           </a:p>
         </p:txBody>
       </p:sp>
@@ -3793,7 +3941,7 @@
             <a:fld id="{F5395209-E063-144C-8968-CAA31F3D1B83}" type="slidenum">
               <a:rPr lang="en-US" smtClean="0"/>
               <a:pPr/>
-              <a:t>14</a:t>
+              <a:t>13</a:t>
             </a:fld>
             <a:endParaRPr lang="en-US"/>
           </a:p>
@@ -3854,75 +4002,48 @@
           <a:lstStyle/>
           <a:p>
             <a:r>
-              <a:rPr lang="en-US" dirty="0" err="1" smtClean="0"/>
-              <a:t>Orthogonality</a:t>
-            </a:r>
-            <a:r>
-              <a:rPr lang="en-US" dirty="0" smtClean="0"/>
-              <a:t>.</a:t>
-            </a:r>
-          </a:p>
-          <a:p>
-            <a:r>
-              <a:rPr lang="en-US" dirty="0" smtClean="0"/>
-              <a:t>With</a:t>
-            </a:r>
-            <a:r>
               <a:rPr lang="en-US" baseline="0" dirty="0" smtClean="0"/>
-              <a:t> this inverted dependency in place we get the benefit of </a:t>
+              <a:t>We introduced the </a:t>
             </a:r>
             <a:r>
               <a:rPr lang="en-US" baseline="0" dirty="0" err="1" smtClean="0"/>
-              <a:t>orthogonality</a:t>
+              <a:t>ILoginService</a:t>
             </a:r>
             <a:r>
               <a:rPr lang="en-US" baseline="0" dirty="0" smtClean="0"/>
-              <a:t>.</a:t>
-            </a:r>
-          </a:p>
-          <a:p>
+              <a:t> abstraction upon which both the security handler depends on (with a uses relationship) and the login service depends on (with an </a:t>
+            </a:r>
+            <a:r>
+              <a:rPr lang="en-US" baseline="0" dirty="0" err="1" smtClean="0"/>
+              <a:t>imlementation</a:t>
+            </a:r>
             <a:r>
               <a:rPr lang="en-US" baseline="0" dirty="0" smtClean="0"/>
-              <a:t>Now since we only depend on abstractions, rather than concretions we can change these to modules independently.</a:t>
+              <a:t>/inheritance) relationship.</a:t>
             </a:r>
           </a:p>
           <a:p>
             <a:r>
               <a:rPr lang="en-US" baseline="0" dirty="0" smtClean="0"/>
-              <a:t>Concerns of one module don’t project onto the concerns of the other.</a:t>
-            </a:r>
-          </a:p>
-          <a:p>
-            <a:pPr marL="0" marR="0" indent="0" algn="l" defTabSz="457200" rtl="0" eaLnBrk="1" fontAlgn="auto" latinLnBrk="0" hangingPunct="1">
-              <a:lnSpc>
-                <a:spcPct val="100000"/>
-              </a:lnSpc>
-              <a:spcBef>
-                <a:spcPts val="0"/>
-              </a:spcBef>
-              <a:spcAft>
-                <a:spcPts val="0"/>
-              </a:spcAft>
-              <a:buClrTx/>
-              <a:buSzTx/>
-              <a:buFontTx/>
-              <a:buNone/>
-              <a:tabLst/>
-              <a:defRPr/>
-            </a:pPr>
+              <a:t>They each now only depend on the abstraction, and neither directly on one another.  The dependency has been inverted, and the concrete dependency has been broken.</a:t>
+            </a:r>
+          </a:p>
+          <a:p>
             <a:r>
               <a:rPr lang="en-US" baseline="0" dirty="0" smtClean="0"/>
-              <a:t>Changes to one won’t affect another.</a:t>
-            </a:r>
-          </a:p>
-          <a:p>
-            <a:r>
-              <a:rPr lang="en-US" dirty="0" smtClean="0"/>
-              <a:t>However,</a:t>
+              <a:t>Now, if Dean, working on the </a:t>
+            </a:r>
+            <a:r>
+              <a:rPr lang="en-US" baseline="0" dirty="0" err="1" smtClean="0"/>
+              <a:t>LoginService</a:t>
             </a:r>
             <a:r>
               <a:rPr lang="en-US" baseline="0" dirty="0" smtClean="0"/>
-              <a:t> if the semantics or interface changes, then, obviously, we’ll have some work to do.</a:t>
+              <a:t> is on vacation while I’m trying to write the Security Handler, I can still get completed, since I know longer care about his implementation, only about </a:t>
+            </a:r>
+            <a:r>
+              <a:rPr lang="en-US" baseline="0" smtClean="0"/>
+              <a:t>the interface.</a:t>
             </a:r>
           </a:p>
         </p:txBody>
@@ -3945,7 +4066,7 @@
             <a:fld id="{F5395209-E063-144C-8968-CAA31F3D1B83}" type="slidenum">
               <a:rPr lang="en-US" smtClean="0"/>
               <a:pPr/>
-              <a:t>15</a:t>
+              <a:t>14</a:t>
             </a:fld>
             <a:endParaRPr lang="en-US"/>
           </a:p>
@@ -7137,6 +7258,86 @@
           </a:p>
         </p:txBody>
       </p:sp>
+      <p:sp>
+        <p:nvSpPr>
+          <p:cNvPr id="3" name="Title 1"/>
+          <p:cNvSpPr txBox="1">
+            <a:spLocks/>
+          </p:cNvSpPr>
+          <p:nvPr/>
+        </p:nvSpPr>
+        <p:spPr>
+          <a:xfrm>
+            <a:off x="7924800" y="5715000"/>
+            <a:ext cx="1219200" cy="1143000"/>
+          </a:xfrm>
+          <a:prstGeom prst="rect">
+            <a:avLst/>
+          </a:prstGeom>
+        </p:spPr>
+        <p:txBody>
+          <a:bodyPr vert="horz" lIns="91440" tIns="45720" rIns="91440" bIns="45720" rtlCol="0" anchor="b">
+            <a:normAutofit/>
+          </a:bodyPr>
+          <a:lstStyle/>
+          <a:p>
+            <a:pPr marL="0" marR="0" lvl="0" indent="0" algn="r" defTabSz="457200" rtl="0" eaLnBrk="1" fontAlgn="auto" latinLnBrk="0" hangingPunct="1">
+              <a:lnSpc>
+                <a:spcPct val="100000"/>
+              </a:lnSpc>
+              <a:spcBef>
+                <a:spcPct val="0"/>
+              </a:spcBef>
+              <a:spcAft>
+                <a:spcPts val="0"/>
+              </a:spcAft>
+              <a:buClrTx/>
+              <a:buSzTx/>
+              <a:buFontTx/>
+              <a:buNone/>
+              <a:tabLst/>
+              <a:defRPr/>
+            </a:pPr>
+            <a:r>
+              <a:rPr kumimoji="0" lang="en-US" sz="4400" b="0" i="0" u="none" strike="noStrike" kern="1200" cap="none" spc="0" normalizeH="0" baseline="0" noProof="0" smtClean="0">
+                <a:ln>
+                  <a:noFill/>
+                </a:ln>
+                <a:solidFill>
+                  <a:schemeClr val="tx1">
+                    <a:lumMod val="50000"/>
+                    <a:lumOff val="50000"/>
+                  </a:schemeClr>
+                </a:solidFill>
+                <a:effectLst/>
+                <a:uLnTx/>
+                <a:uFillTx/>
+                <a:latin typeface="+mj-lt"/>
+                <a:ea typeface="+mj-ea"/>
+                <a:cs typeface="+mj-cs"/>
+              </a:rPr>
+              <a:t>DIP</a:t>
+            </a:r>
+            <a:endParaRPr kumimoji="0" lang="en-US" sz="4400" b="0" i="0" u="none" strike="noStrike" kern="1200" cap="none" spc="0" normalizeH="0" baseline="0" noProof="0" dirty="0">
+              <a:ln>
+                <a:noFill/>
+              </a:ln>
+              <a:solidFill>
+                <a:schemeClr val="tx1">
+                  <a:lumMod val="50000"/>
+                  <a:lumOff val="50000"/>
+                </a:schemeClr>
+              </a:solidFill>
+              <a:effectLst/>
+              <a:uLnTx/>
+              <a:uFillTx/>
+              <a:latin typeface="+mj-lt"/>
+              <a:ea typeface="+mj-ea"/>
+              <a:cs typeface="+mj-cs"/>
+            </a:endParaRPr>
+          </a:p>
+        </p:txBody>
+      </p:sp>
     </p:spTree>
   </p:cSld>
   <p:clrMapOvr>
@@ -9023,88 +9224,6 @@
           <a:chExt cx="0" cy="0"/>
         </a:xfrm>
       </p:grpSpPr>
-      <p:sp>
-        <p:nvSpPr>
-          <p:cNvPr id="3" name="Title 1"/>
-          <p:cNvSpPr txBox="1">
-            <a:spLocks/>
-          </p:cNvSpPr>
-          <p:nvPr/>
-        </p:nvSpPr>
-        <p:spPr>
-          <a:xfrm>
-            <a:off x="8153400" y="6096000"/>
-            <a:ext cx="990600" cy="762000"/>
-          </a:xfrm>
-          <a:prstGeom prst="rect">
-            <a:avLst/>
-          </a:prstGeom>
-        </p:spPr>
-        <p:txBody>
-          <a:bodyPr vert="horz" lIns="91440" tIns="45720" rIns="91440" bIns="45720" rtlCol="0" anchor="b">
-            <a:normAutofit/>
-          </a:bodyPr>
-          <a:lstStyle/>
-          <a:p>
-            <a:pPr marL="0" marR="0" lvl="0" indent="0" algn="r" defTabSz="457200" rtl="0" eaLnBrk="1" fontAlgn="auto" latinLnBrk="0" hangingPunct="1">
-              <a:lnSpc>
-                <a:spcPct val="100000"/>
-              </a:lnSpc>
-              <a:spcBef>
-                <a:spcPct val="0"/>
-              </a:spcBef>
-              <a:spcAft>
-                <a:spcPts val="0"/>
-              </a:spcAft>
-              <a:buClrTx/>
-              <a:buSzTx/>
-              <a:buFontTx/>
-              <a:buNone/>
-              <a:tabLst/>
-              <a:defRPr/>
-            </a:pPr>
-            <a:r>
-              <a:rPr kumimoji="0" lang="en-US" sz="4400" b="0" i="0" u="none" strike="noStrike" kern="1200" cap="none" spc="0" normalizeH="0" baseline="0" noProof="0" dirty="0" smtClean="0">
-                <a:ln>
-                  <a:noFill/>
-                </a:ln>
-                <a:solidFill>
-                  <a:schemeClr val="tx1">
-                    <a:lumMod val="50000"/>
-                    <a:lumOff val="50000"/>
-                  </a:schemeClr>
-                </a:solidFill>
-                <a:effectLst/>
-                <a:uLnTx/>
-                <a:uFillTx/>
-                <a:latin typeface="+mj-lt"/>
-                <a:ea typeface="+mj-ea"/>
-                <a:cs typeface="+mj-cs"/>
-              </a:rPr>
-              <a:t>DI</a:t>
-            </a:r>
-          </a:p>
-        </p:txBody>
-      </p:sp>
-      <p:sp>
-        <p:nvSpPr>
-          <p:cNvPr id="4" name="Title 3"/>
-          <p:cNvSpPr>
-            <a:spLocks noGrp="1"/>
-          </p:cNvSpPr>
-          <p:nvPr>
-            <p:ph type="title"/>
-          </p:nvPr>
-        </p:nvSpPr>
-        <p:spPr/>
-        <p:txBody>
-          <a:bodyPr/>
-          <a:lstStyle/>
-          <a:p>
-            <a:endParaRPr lang="en-US"/>
-          </a:p>
-        </p:txBody>
-      </p:sp>
       <p:pic>
         <p:nvPicPr>
           <p:cNvPr id="5" name="Picture 4"/>
@@ -9129,6 +9248,88 @@
           </a:prstGeom>
         </p:spPr>
       </p:pic>
+      <p:sp>
+        <p:nvSpPr>
+          <p:cNvPr id="4" name="Title 3"/>
+          <p:cNvSpPr>
+            <a:spLocks noGrp="1"/>
+          </p:cNvSpPr>
+          <p:nvPr>
+            <p:ph type="title"/>
+          </p:nvPr>
+        </p:nvSpPr>
+        <p:spPr/>
+        <p:txBody>
+          <a:bodyPr/>
+          <a:lstStyle/>
+          <a:p>
+            <a:endParaRPr lang="en-US"/>
+          </a:p>
+        </p:txBody>
+      </p:sp>
+      <p:sp>
+        <p:nvSpPr>
+          <p:cNvPr id="6" name="Title 1"/>
+          <p:cNvSpPr txBox="1">
+            <a:spLocks/>
+          </p:cNvSpPr>
+          <p:nvPr/>
+        </p:nvSpPr>
+        <p:spPr>
+          <a:xfrm>
+            <a:off x="7924800" y="5715000"/>
+            <a:ext cx="1219200" cy="1143000"/>
+          </a:xfrm>
+          <a:prstGeom prst="rect">
+            <a:avLst/>
+          </a:prstGeom>
+        </p:spPr>
+        <p:txBody>
+          <a:bodyPr vert="horz" lIns="91440" tIns="45720" rIns="91440" bIns="45720" rtlCol="0" anchor="b">
+            <a:normAutofit/>
+          </a:bodyPr>
+          <a:lstStyle/>
+          <a:p>
+            <a:pPr marL="0" marR="0" lvl="0" indent="0" algn="r" defTabSz="457200" rtl="0" eaLnBrk="1" fontAlgn="auto" latinLnBrk="0" hangingPunct="1">
+              <a:lnSpc>
+                <a:spcPct val="100000"/>
+              </a:lnSpc>
+              <a:spcBef>
+                <a:spcPct val="0"/>
+              </a:spcBef>
+              <a:spcAft>
+                <a:spcPts val="0"/>
+              </a:spcAft>
+              <a:buClrTx/>
+              <a:buSzTx/>
+              <a:buFontTx/>
+              <a:buNone/>
+              <a:tabLst/>
+              <a:defRPr/>
+            </a:pPr>
+            <a:r>
+              <a:rPr kumimoji="0" lang="en-US" sz="4400" b="0" i="0" u="none" strike="noStrike" kern="1200" cap="none" spc="0" normalizeH="0" baseline="0" noProof="0" dirty="0" smtClean="0">
+                <a:ln>
+                  <a:noFill/>
+                </a:ln>
+                <a:solidFill>
+                  <a:schemeClr val="tx1">
+                    <a:lumMod val="50000"/>
+                    <a:lumOff val="50000"/>
+                  </a:schemeClr>
+                </a:solidFill>
+                <a:effectLst/>
+                <a:uLnTx/>
+                <a:uFillTx/>
+                <a:latin typeface="+mj-lt"/>
+                <a:ea typeface="+mj-ea"/>
+                <a:cs typeface="+mj-cs"/>
+              </a:rPr>
+              <a:t>DIP</a:t>
+            </a:r>
+          </a:p>
+        </p:txBody>
+      </p:sp>
     </p:spTree>
   </p:cSld>
   <p:clrMapOvr>
@@ -9178,12 +9379,29 @@
           </a:xfrm>
         </p:spPr>
         <p:txBody>
-          <a:bodyPr/>
+          <a:bodyPr>
+            <a:normAutofit fontScale="90000"/>
+          </a:bodyPr>
           <a:lstStyle/>
           <a:p>
             <a:r>
               <a:rPr lang="en-US" dirty="0" smtClean="0"/>
-              <a:t>service location</a:t>
+              <a:t>service </a:t>
+            </a:r>
+            <a:r>
+              <a:rPr lang="en-US" dirty="0" smtClean="0"/>
+              <a:t>location</a:t>
+            </a:r>
+            <a:br>
+              <a:rPr lang="en-US" dirty="0" smtClean="0"/>
+            </a:br>
+            <a:r>
+              <a:rPr lang="en-US" dirty="0" smtClean="0"/>
+              <a:t>&amp; </a:t>
+            </a:r>
+            <a:r>
+              <a:rPr lang="en-US" dirty="0" smtClean="0"/>
+              <a:t>factories</a:t>
             </a:r>
             <a:endParaRPr lang="en-US" dirty="0"/>
           </a:p>

</xml_diff>

<commit_message>
new title, thanks BJB
</commit_message>
<xml_diff>
--- a/dependencies/dependencies.pptx
+++ b/dependencies/dependencies.pptx
@@ -231,7 +231,7 @@
             <a:fld id="{25FF3015-ADE1-B94E-A2C3-338B0764DC65}" type="datetimeFigureOut">
               <a:rPr lang="en-US" smtClean="0"/>
               <a:pPr/>
-              <a:t>3/18/10</a:t>
+              <a:t>3/20/10</a:t>
             </a:fld>
             <a:endParaRPr lang="en-US"/>
           </a:p>
@@ -549,19 +549,12 @@
             </a:r>
           </a:p>
           <a:p>
+            <a:endParaRPr/>
+          </a:p>
+          <a:p>
             <a:r>
               <a:rPr lang="en-US" dirty="0" smtClean="0"/>
-              <a:t/>
-            </a:r>
-          </a:p>
-          <a:p>
-            <a:r>
-              <a:rPr lang="en-US" dirty="0" smtClean="0"/>
-              <a:t>PLEASE </a:t>
-            </a:r>
-            <a:r>
-              <a:rPr lang="en-US" dirty="0" smtClean="0"/>
-              <a:t>interrupt me at any time during</a:t>
+              <a:t>PLEASE interrupt me at any time during</a:t>
             </a:r>
             <a:r>
               <a:rPr lang="en-US" baseline="0" dirty="0" smtClean="0"/>
@@ -913,11 +906,7 @@
           <a:p>
             <a:r>
               <a:rPr lang="en-US" dirty="0" smtClean="0"/>
-              <a:t>I </a:t>
-            </a:r>
-            <a:r>
-              <a:rPr lang="en-US" dirty="0" smtClean="0"/>
-              <a:t>think the first natural</a:t>
+              <a:t>I think the first natural</a:t>
             </a:r>
             <a:r>
               <a:rPr lang="en-US" baseline="0" dirty="0" smtClean="0"/>
@@ -4262,7 +4251,7 @@
             <a:fld id="{AEDC4D7B-6231-8E46-9EA9-2210599D057D}" type="datetimeFigureOut">
               <a:rPr lang="en-US" smtClean="0"/>
               <a:pPr/>
-              <a:t>3/18/10</a:t>
+              <a:t>3/20/10</a:t>
             </a:fld>
             <a:endParaRPr lang="en-US"/>
           </a:p>
@@ -4429,7 +4418,7 @@
             <a:fld id="{AEDC4D7B-6231-8E46-9EA9-2210599D057D}" type="datetimeFigureOut">
               <a:rPr lang="en-US" smtClean="0"/>
               <a:pPr/>
-              <a:t>3/18/10</a:t>
+              <a:t>3/20/10</a:t>
             </a:fld>
             <a:endParaRPr lang="en-US"/>
           </a:p>
@@ -4606,7 +4595,7 @@
             <a:fld id="{AEDC4D7B-6231-8E46-9EA9-2210599D057D}" type="datetimeFigureOut">
               <a:rPr lang="en-US" smtClean="0"/>
               <a:pPr/>
-              <a:t>3/18/10</a:t>
+              <a:t>3/20/10</a:t>
             </a:fld>
             <a:endParaRPr lang="en-US"/>
           </a:p>
@@ -4773,7 +4762,7 @@
             <a:fld id="{AEDC4D7B-6231-8E46-9EA9-2210599D057D}" type="datetimeFigureOut">
               <a:rPr lang="en-US" smtClean="0"/>
               <a:pPr/>
-              <a:t>3/18/10</a:t>
+              <a:t>3/20/10</a:t>
             </a:fld>
             <a:endParaRPr lang="en-US"/>
           </a:p>
@@ -5016,7 +5005,7 @@
             <a:fld id="{AEDC4D7B-6231-8E46-9EA9-2210599D057D}" type="datetimeFigureOut">
               <a:rPr lang="en-US" smtClean="0"/>
               <a:pPr/>
-              <a:t>3/18/10</a:t>
+              <a:t>3/20/10</a:t>
             </a:fld>
             <a:endParaRPr lang="en-US"/>
           </a:p>
@@ -5301,7 +5290,7 @@
             <a:fld id="{AEDC4D7B-6231-8E46-9EA9-2210599D057D}" type="datetimeFigureOut">
               <a:rPr lang="en-US" smtClean="0"/>
               <a:pPr/>
-              <a:t>3/18/10</a:t>
+              <a:t>3/20/10</a:t>
             </a:fld>
             <a:endParaRPr lang="en-US"/>
           </a:p>
@@ -5720,7 +5709,7 @@
             <a:fld id="{AEDC4D7B-6231-8E46-9EA9-2210599D057D}" type="datetimeFigureOut">
               <a:rPr lang="en-US" smtClean="0"/>
               <a:pPr/>
-              <a:t>3/18/10</a:t>
+              <a:t>3/20/10</a:t>
             </a:fld>
             <a:endParaRPr lang="en-US"/>
           </a:p>
@@ -5835,7 +5824,7 @@
             <a:fld id="{AEDC4D7B-6231-8E46-9EA9-2210599D057D}" type="datetimeFigureOut">
               <a:rPr lang="en-US" smtClean="0"/>
               <a:pPr/>
-              <a:t>3/18/10</a:t>
+              <a:t>3/20/10</a:t>
             </a:fld>
             <a:endParaRPr lang="en-US"/>
           </a:p>
@@ -5927,7 +5916,7 @@
             <a:fld id="{AEDC4D7B-6231-8E46-9EA9-2210599D057D}" type="datetimeFigureOut">
               <a:rPr lang="en-US" smtClean="0"/>
               <a:pPr/>
-              <a:t>3/18/10</a:t>
+              <a:t>3/20/10</a:t>
             </a:fld>
             <a:endParaRPr lang="en-US"/>
           </a:p>
@@ -6201,7 +6190,7 @@
             <a:fld id="{AEDC4D7B-6231-8E46-9EA9-2210599D057D}" type="datetimeFigureOut">
               <a:rPr lang="en-US" smtClean="0"/>
               <a:pPr/>
-              <a:t>3/18/10</a:t>
+              <a:t>3/20/10</a:t>
             </a:fld>
             <a:endParaRPr lang="en-US"/>
           </a:p>
@@ -6451,7 +6440,7 @@
             <a:fld id="{AEDC4D7B-6231-8E46-9EA9-2210599D057D}" type="datetimeFigureOut">
               <a:rPr lang="en-US" smtClean="0"/>
               <a:pPr/>
-              <a:t>3/18/10</a:t>
+              <a:t>3/20/10</a:t>
             </a:fld>
             <a:endParaRPr lang="en-US"/>
           </a:p>
@@ -6661,7 +6650,7 @@
             <a:fld id="{AEDC4D7B-6231-8E46-9EA9-2210599D057D}" type="datetimeFigureOut">
               <a:rPr lang="en-US" smtClean="0"/>
               <a:pPr/>
-              <a:t>3/18/10</a:t>
+              <a:t>3/20/10</a:t>
             </a:fld>
             <a:endParaRPr lang="en-US"/>
           </a:p>
@@ -7044,18 +7033,93 @@
         </p:nvSpPr>
         <p:spPr/>
         <p:txBody>
-          <a:bodyPr/>
-          <a:lstStyle/>
-          <a:p>
-            <a:r>
-              <a:rPr lang="en-US" dirty="0"/>
-              <a:t>a</a:t>
-            </a:r>
+          <a:bodyPr>
+            <a:normAutofit/>
+          </a:bodyPr>
+          <a:lstStyle/>
+          <a:p>
             <a:r>
               <a:rPr lang="en-US" dirty="0" smtClean="0"/>
-              <a:t>chieving system simplicity</a:t>
-            </a:r>
+              <a:t>dealing with dependencies</a:t>
+            </a:r>
+            <a:br>
+              <a:rPr lang="en-US" dirty="0" smtClean="0"/>
+            </a:br>
             <a:endParaRPr lang="en-US" dirty="0"/>
+          </a:p>
+        </p:txBody>
+      </p:sp>
+      <p:sp>
+        <p:nvSpPr>
+          <p:cNvPr id="3" name="Title 1"/>
+          <p:cNvSpPr txBox="1">
+            <a:spLocks/>
+          </p:cNvSpPr>
+          <p:nvPr/>
+        </p:nvSpPr>
+        <p:spPr>
+          <a:xfrm>
+            <a:off x="685800" y="2438400"/>
+            <a:ext cx="7772400" cy="1470025"/>
+          </a:xfrm>
+          <a:prstGeom prst="rect">
+            <a:avLst/>
+          </a:prstGeom>
+        </p:spPr>
+        <p:txBody>
+          <a:bodyPr vert="horz" lIns="91440" tIns="45720" rIns="91440" bIns="45720" rtlCol="0" anchor="ctr">
+            <a:normAutofit/>
+          </a:bodyPr>
+          <a:lstStyle/>
+          <a:p>
+            <a:pPr marL="0" marR="0" lvl="0" indent="0" algn="ctr" defTabSz="457200" rtl="0" eaLnBrk="1" fontAlgn="auto" latinLnBrk="0" hangingPunct="1">
+              <a:lnSpc>
+                <a:spcPct val="100000"/>
+              </a:lnSpc>
+              <a:spcBef>
+                <a:spcPct val="0"/>
+              </a:spcBef>
+              <a:spcAft>
+                <a:spcPts val="0"/>
+              </a:spcAft>
+              <a:buClrTx/>
+              <a:buSzTx/>
+              <a:buFontTx/>
+              <a:buNone/>
+              <a:tabLst/>
+              <a:defRPr/>
+            </a:pPr>
+            <a:r>
+              <a:rPr kumimoji="0" lang="en-US" sz="3200" b="0" i="0" u="none" strike="noStrike" kern="1200" cap="none" spc="0" normalizeH="0" baseline="0" noProof="0" dirty="0" smtClean="0">
+                <a:ln>
+                  <a:noFill/>
+                </a:ln>
+                <a:solidFill>
+                  <a:schemeClr val="tx1"/>
+                </a:solidFill>
+                <a:effectLst/>
+                <a:uLnTx/>
+                <a:uFillTx/>
+                <a:latin typeface="+mj-lt"/>
+                <a:ea typeface="+mj-ea"/>
+                <a:cs typeface="+mj-cs"/>
+              </a:rPr>
+              <a:t>taking your architecture to rehab</a:t>
+            </a:r>
+            <a:endParaRPr kumimoji="0" lang="en-US" sz="3200" b="0" i="0" u="none" strike="noStrike" kern="1200" cap="none" spc="0" normalizeH="0" baseline="0" noProof="0" dirty="0">
+              <a:ln>
+                <a:noFill/>
+              </a:ln>
+              <a:solidFill>
+                <a:schemeClr val="tx1"/>
+              </a:solidFill>
+              <a:effectLst/>
+              <a:uLnTx/>
+              <a:uFillTx/>
+              <a:latin typeface="+mj-lt"/>
+              <a:ea typeface="+mj-ea"/>
+              <a:cs typeface="+mj-cs"/>
+            </a:endParaRPr>
           </a:p>
         </p:txBody>
       </p:sp>
@@ -9386,22 +9450,14 @@
           <a:p>
             <a:r>
               <a:rPr lang="en-US" dirty="0" smtClean="0"/>
-              <a:t>service </a:t>
-            </a:r>
-            <a:r>
-              <a:rPr lang="en-US" dirty="0" smtClean="0"/>
-              <a:t>location</a:t>
+              <a:t>service location</a:t>
             </a:r>
             <a:br>
               <a:rPr lang="en-US" dirty="0" smtClean="0"/>
             </a:br>
             <a:r>
               <a:rPr lang="en-US" dirty="0" smtClean="0"/>
-              <a:t>&amp; </a:t>
-            </a:r>
-            <a:r>
-              <a:rPr lang="en-US" dirty="0" smtClean="0"/>
-              <a:t>factories</a:t>
+              <a:t>&amp; factories</a:t>
             </a:r>
             <a:endParaRPr lang="en-US" dirty="0"/>
           </a:p>
@@ -10081,7 +10137,7 @@
       </p:sp>
       <p:pic>
         <p:nvPicPr>
-          <p:cNvPr id="4" name="PropertyInjection.cs.png" descr="/Users/fullerjc/Documents/presentations/dependencies/img/PropertyInjection.cs.png"/>
+          <p:cNvPr id="5" name="PropertyInjection.cs.png" descr="/Users/fullerjc/Documents/presentations/dependencies/img/PropertyInjection.cs.png"/>
           <p:cNvPicPr>
             <a:picLocks noChangeAspect="1"/>
           </p:cNvPicPr>
@@ -10095,8 +10151,8 @@
         </p:blipFill>
         <p:spPr>
           <a:xfrm>
-            <a:off x="670221" y="1406984"/>
-            <a:ext cx="7803557" cy="4044031"/>
+            <a:off x="670221" y="1589880"/>
+            <a:ext cx="7803557" cy="3678239"/>
           </a:xfrm>
           <a:prstGeom prst="rect">
             <a:avLst/>

</xml_diff>

<commit_message>
make image entire size of slide
</commit_message>
<xml_diff>
--- a/dependencies/dependencies.pptx
+++ b/dependencies/dependencies.pptx
@@ -9558,6 +9558,30 @@
           <a:chExt cx="0" cy="0"/>
         </a:xfrm>
       </p:grpSpPr>
+      <p:pic>
+        <p:nvPicPr>
+          <p:cNvPr id="5" name="ServiceLocator.cs.png" descr="/Users/fullerjc/Documents/presentations/dependencies/img/ServiceLocator.cs.png"/>
+          <p:cNvPicPr>
+            <a:picLocks noChangeAspect="1"/>
+          </p:cNvPicPr>
+          <p:nvPr/>
+        </p:nvPicPr>
+        <p:blipFill>
+          <a:blip r:embed="rId3" r:link="rId4"/>
+          <a:stretch>
+            <a:fillRect/>
+          </a:stretch>
+        </p:blipFill>
+        <p:spPr>
+          <a:xfrm>
+            <a:off x="0" y="0"/>
+            <a:ext cx="9143999" cy="6858000"/>
+          </a:xfrm>
+          <a:prstGeom prst="rect">
+            <a:avLst/>
+          </a:prstGeom>
+        </p:spPr>
+      </p:pic>
       <p:sp>
         <p:nvSpPr>
           <p:cNvPr id="3" name="Title 1"/>
@@ -9621,30 +9645,6 @@
           </a:p>
         </p:txBody>
       </p:sp>
-      <p:pic>
-        <p:nvPicPr>
-          <p:cNvPr id="4" name="ServiceLocator.cs.png" descr="/Users/fullerjc/Documents/presentations/dependencies/img/ServiceLocator.cs.png"/>
-          <p:cNvPicPr>
-            <a:picLocks noChangeAspect="1"/>
-          </p:cNvPicPr>
-          <p:nvPr/>
-        </p:nvPicPr>
-        <p:blipFill>
-          <a:blip r:embed="rId3" r:link="rId4"/>
-          <a:stretch>
-            <a:fillRect/>
-          </a:stretch>
-        </p:blipFill>
-        <p:spPr>
-          <a:xfrm>
-            <a:off x="670221" y="1864224"/>
-            <a:ext cx="7803557" cy="3129551"/>
-          </a:xfrm>
-          <a:prstGeom prst="rect">
-            <a:avLst/>
-          </a:prstGeom>
-        </p:spPr>
-      </p:pic>
     </p:spTree>
   </p:cSld>
   <p:clrMapOvr>
@@ -9953,6 +9953,30 @@
           <a:chExt cx="0" cy="0"/>
         </a:xfrm>
       </p:grpSpPr>
+      <p:pic>
+        <p:nvPicPr>
+          <p:cNvPr id="5" name="NoInjection.cs.png" descr="/Users/fullerjc/Documents/presentations/dependencies/img/NoInjection.cs.png"/>
+          <p:cNvPicPr>
+            <a:picLocks noChangeAspect="1"/>
+          </p:cNvPicPr>
+          <p:nvPr/>
+        </p:nvPicPr>
+        <p:blipFill>
+          <a:blip r:embed="rId3" r:link="rId4"/>
+          <a:stretch>
+            <a:fillRect/>
+          </a:stretch>
+        </p:blipFill>
+        <p:spPr>
+          <a:xfrm>
+            <a:off x="0" y="0"/>
+            <a:ext cx="9143999" cy="6858000"/>
+          </a:xfrm>
+          <a:prstGeom prst="rect">
+            <a:avLst/>
+          </a:prstGeom>
+        </p:spPr>
+      </p:pic>
       <p:sp>
         <p:nvSpPr>
           <p:cNvPr id="3" name="Title 1"/>
@@ -10016,30 +10040,6 @@
           </a:p>
         </p:txBody>
       </p:sp>
-      <p:pic>
-        <p:nvPicPr>
-          <p:cNvPr id="4" name="NoInjection.cs.png" descr="/Users/fullerjc/Documents/presentations/dependencies/img/NoInjection.cs.png"/>
-          <p:cNvPicPr>
-            <a:picLocks noChangeAspect="1"/>
-          </p:cNvPicPr>
-          <p:nvPr/>
-        </p:nvPicPr>
-        <p:blipFill>
-          <a:blip r:embed="rId3" r:link="rId4"/>
-          <a:stretch>
-            <a:fillRect/>
-          </a:stretch>
-        </p:blipFill>
-        <p:spPr>
-          <a:xfrm>
-            <a:off x="670221" y="1864224"/>
-            <a:ext cx="7803557" cy="3129551"/>
-          </a:xfrm>
-          <a:prstGeom prst="rect">
-            <a:avLst/>
-          </a:prstGeom>
-        </p:spPr>
-      </p:pic>
     </p:spTree>
   </p:cSld>
   <p:clrMapOvr>
@@ -10072,6 +10072,30 @@
           <a:chExt cx="0" cy="0"/>
         </a:xfrm>
       </p:grpSpPr>
+      <p:pic>
+        <p:nvPicPr>
+          <p:cNvPr id="6" name="PropertyInjection.cs.png" descr="/Users/fullerjc/Documents/presentations/dependencies/img/PropertyInjection.cs.png"/>
+          <p:cNvPicPr>
+            <a:picLocks noChangeAspect="1"/>
+          </p:cNvPicPr>
+          <p:nvPr/>
+        </p:nvPicPr>
+        <p:blipFill>
+          <a:blip r:embed="rId3" r:link="rId4"/>
+          <a:stretch>
+            <a:fillRect/>
+          </a:stretch>
+        </p:blipFill>
+        <p:spPr>
+          <a:xfrm>
+            <a:off x="0" y="0"/>
+            <a:ext cx="9143999" cy="6858000"/>
+          </a:xfrm>
+          <a:prstGeom prst="rect">
+            <a:avLst/>
+          </a:prstGeom>
+        </p:spPr>
+      </p:pic>
       <p:sp>
         <p:nvSpPr>
           <p:cNvPr id="3" name="Title 1"/>
@@ -10135,30 +10159,6 @@
           </a:p>
         </p:txBody>
       </p:sp>
-      <p:pic>
-        <p:nvPicPr>
-          <p:cNvPr id="5" name="PropertyInjection.cs.png" descr="/Users/fullerjc/Documents/presentations/dependencies/img/PropertyInjection.cs.png"/>
-          <p:cNvPicPr>
-            <a:picLocks noChangeAspect="1"/>
-          </p:cNvPicPr>
-          <p:nvPr/>
-        </p:nvPicPr>
-        <p:blipFill>
-          <a:blip r:embed="rId3" r:link="rId4"/>
-          <a:stretch>
-            <a:fillRect/>
-          </a:stretch>
-        </p:blipFill>
-        <p:spPr>
-          <a:xfrm>
-            <a:off x="670221" y="1589880"/>
-            <a:ext cx="7803557" cy="3678239"/>
-          </a:xfrm>
-          <a:prstGeom prst="rect">
-            <a:avLst/>
-          </a:prstGeom>
-        </p:spPr>
-      </p:pic>
     </p:spTree>
   </p:cSld>
   <p:clrMapOvr>
@@ -10191,6 +10191,30 @@
           <a:chExt cx="0" cy="0"/>
         </a:xfrm>
       </p:grpSpPr>
+      <p:pic>
+        <p:nvPicPr>
+          <p:cNvPr id="5" name="ConstructorInjection.cs.png" descr="/Users/fullerjc/Documents/presentations/dependencies/img/ConstructorInjection.cs.png"/>
+          <p:cNvPicPr>
+            <a:picLocks noChangeAspect="1"/>
+          </p:cNvPicPr>
+          <p:nvPr/>
+        </p:nvPicPr>
+        <p:blipFill>
+          <a:blip r:embed="rId3" r:link="rId4"/>
+          <a:stretch>
+            <a:fillRect/>
+          </a:stretch>
+        </p:blipFill>
+        <p:spPr>
+          <a:xfrm>
+            <a:off x="0" y="0"/>
+            <a:ext cx="9143999" cy="6858000"/>
+          </a:xfrm>
+          <a:prstGeom prst="rect">
+            <a:avLst/>
+          </a:prstGeom>
+        </p:spPr>
+      </p:pic>
       <p:sp>
         <p:nvSpPr>
           <p:cNvPr id="3" name="Title 1"/>
@@ -10254,30 +10278,6 @@
           </a:p>
         </p:txBody>
       </p:sp>
-      <p:pic>
-        <p:nvPicPr>
-          <p:cNvPr id="4" name="ConstructorInjection.cs.png" descr="/Users/fullerjc/Documents/presentations/dependencies/img/ConstructorInjection.cs.png"/>
-          <p:cNvPicPr>
-            <a:picLocks noChangeAspect="1"/>
-          </p:cNvPicPr>
-          <p:nvPr/>
-        </p:nvPicPr>
-        <p:blipFill>
-          <a:blip r:embed="rId3" r:link="rId4"/>
-          <a:stretch>
-            <a:fillRect/>
-          </a:stretch>
-        </p:blipFill>
-        <p:spPr>
-          <a:xfrm>
-            <a:off x="670221" y="1864224"/>
-            <a:ext cx="7803557" cy="3129551"/>
-          </a:xfrm>
-          <a:prstGeom prst="rect">
-            <a:avLst/>
-          </a:prstGeom>
-        </p:spPr>
-      </p:pic>
     </p:spTree>
   </p:cSld>
   <p:clrMapOvr>
@@ -10433,6 +10433,30 @@
           <a:chExt cx="0" cy="0"/>
         </a:xfrm>
       </p:grpSpPr>
+      <p:pic>
+        <p:nvPicPr>
+          <p:cNvPr id="4" name="PoorManDI.cs.png" descr="/Users/fullerjc/Documents/presentations/dependencies/img/PoorManDI.cs.png"/>
+          <p:cNvPicPr>
+            <a:picLocks noChangeAspect="1"/>
+          </p:cNvPicPr>
+          <p:nvPr/>
+        </p:nvPicPr>
+        <p:blipFill>
+          <a:blip r:embed="rId3" r:link="rId4"/>
+          <a:stretch>
+            <a:fillRect/>
+          </a:stretch>
+        </p:blipFill>
+        <p:spPr>
+          <a:xfrm>
+            <a:off x="0" y="0"/>
+            <a:ext cx="9143999" cy="6858000"/>
+          </a:xfrm>
+          <a:prstGeom prst="rect">
+            <a:avLst/>
+          </a:prstGeom>
+        </p:spPr>
+      </p:pic>
       <p:sp>
         <p:nvSpPr>
           <p:cNvPr id="3" name="Title 1"/>
@@ -10496,30 +10520,6 @@
           </a:p>
         </p:txBody>
       </p:sp>
-      <p:pic>
-        <p:nvPicPr>
-          <p:cNvPr id="5" name="PoorManDI.cs.png" descr="/Users/fullerjc/Documents/presentations/dependencies/img/PoorManDI.cs.png"/>
-          <p:cNvPicPr>
-            <a:picLocks noChangeAspect="1"/>
-          </p:cNvPicPr>
-          <p:nvPr/>
-        </p:nvPicPr>
-        <p:blipFill>
-          <a:blip r:embed="rId3" r:link="rId4"/>
-          <a:stretch>
-            <a:fillRect/>
-          </a:stretch>
-        </p:blipFill>
-        <p:spPr>
-          <a:xfrm>
-            <a:off x="670221" y="1406984"/>
-            <a:ext cx="7803557" cy="4044031"/>
-          </a:xfrm>
-          <a:prstGeom prst="rect">
-            <a:avLst/>
-          </a:prstGeom>
-        </p:spPr>
-      </p:pic>
     </p:spTree>
   </p:cSld>
   <p:clrMapOvr>
@@ -11297,7 +11297,7 @@
       </p:grpSpPr>
       <p:pic>
         <p:nvPicPr>
-          <p:cNvPr id="6" name="ManualInjection.cs.png" descr="/Users/fullerjc/Documents/presentations/dependencies/img/ManualInjection.cs.png"/>
+          <p:cNvPr id="4" name="ManualInjection.cs.png" descr="/Users/fullerjc/Documents/presentations/dependencies/img/ManualInjection.cs.png"/>
           <p:cNvPicPr>
             <a:picLocks noChangeAspect="1"/>
           </p:cNvPicPr>
@@ -11311,8 +11311,8 @@
         </p:blipFill>
         <p:spPr>
           <a:xfrm>
-            <a:off x="853117" y="2412912"/>
-            <a:ext cx="7437765" cy="2032176"/>
+            <a:off x="0" y="0"/>
+            <a:ext cx="9143999" cy="6858000"/>
           </a:xfrm>
           <a:prstGeom prst="rect">
             <a:avLst/>
@@ -11431,6 +11431,30 @@
           <a:chExt cx="0" cy="0"/>
         </a:xfrm>
       </p:grpSpPr>
+      <p:pic>
+        <p:nvPicPr>
+          <p:cNvPr id="6" name="Container.cs.png" descr="/Users/fullerjc/Documents/presentations/dependencies/img/Container.cs.png"/>
+          <p:cNvPicPr>
+            <a:picLocks noChangeAspect="1"/>
+          </p:cNvPicPr>
+          <p:nvPr/>
+        </p:nvPicPr>
+        <p:blipFill>
+          <a:blip r:embed="rId3" r:link="rId4"/>
+          <a:stretch>
+            <a:fillRect/>
+          </a:stretch>
+        </p:blipFill>
+        <p:spPr>
+          <a:xfrm>
+            <a:off x="0" y="0"/>
+            <a:ext cx="9143999" cy="6858000"/>
+          </a:xfrm>
+          <a:prstGeom prst="rect">
+            <a:avLst/>
+          </a:prstGeom>
+        </p:spPr>
+      </p:pic>
       <p:sp>
         <p:nvSpPr>
           <p:cNvPr id="4" name="Title 1"/>
@@ -11511,30 +11535,6 @@
           </a:p>
         </p:txBody>
       </p:sp>
-      <p:pic>
-        <p:nvPicPr>
-          <p:cNvPr id="5" name="Container.cs.png" descr="/Users/fullerjc/Documents/presentations/dependencies/img/Container.cs.png"/>
-          <p:cNvPicPr>
-            <a:picLocks noChangeAspect="1"/>
-          </p:cNvPicPr>
-          <p:nvPr/>
-        </p:nvPicPr>
-        <p:blipFill>
-          <a:blip r:embed="rId3" r:link="rId4"/>
-          <a:stretch>
-            <a:fillRect/>
-          </a:stretch>
-        </p:blipFill>
-        <p:spPr>
-          <a:xfrm>
-            <a:off x="304800" y="2064925"/>
-            <a:ext cx="9144000" cy="2728149"/>
-          </a:xfrm>
-          <a:prstGeom prst="rect">
-            <a:avLst/>
-          </a:prstGeom>
-        </p:spPr>
-      </p:pic>
     </p:spTree>
   </p:cSld>
   <p:clrMapOvr>
@@ -11567,6 +11567,30 @@
           <a:chExt cx="0" cy="0"/>
         </a:xfrm>
       </p:grpSpPr>
+      <p:pic>
+        <p:nvPicPr>
+          <p:cNvPr id="6" name="ContainerAutowire.cs.png" descr="/Users/fullerjc/Documents/presentations/dependencies/img/ContainerAutowire.cs.png"/>
+          <p:cNvPicPr>
+            <a:picLocks noChangeAspect="1"/>
+          </p:cNvPicPr>
+          <p:nvPr/>
+        </p:nvPicPr>
+        <p:blipFill>
+          <a:blip r:embed="rId3" r:link="rId4"/>
+          <a:stretch>
+            <a:fillRect/>
+          </a:stretch>
+        </p:blipFill>
+        <p:spPr>
+          <a:xfrm>
+            <a:off x="0" y="0"/>
+            <a:ext cx="9143999" cy="6858000"/>
+          </a:xfrm>
+          <a:prstGeom prst="rect">
+            <a:avLst/>
+          </a:prstGeom>
+        </p:spPr>
+      </p:pic>
       <p:sp>
         <p:nvSpPr>
           <p:cNvPr id="4" name="Title 1"/>
@@ -11647,30 +11671,6 @@
           </a:p>
         </p:txBody>
       </p:sp>
-      <p:pic>
-        <p:nvPicPr>
-          <p:cNvPr id="5" name="ContainerAutowire.cs.png" descr="/Users/fullerjc/Documents/presentations/dependencies/img/ContainerAutowire.cs.png"/>
-          <p:cNvPicPr>
-            <a:picLocks noChangeAspect="1"/>
-          </p:cNvPicPr>
-          <p:nvPr/>
-        </p:nvPicPr>
-        <p:blipFill>
-          <a:blip r:embed="rId3" r:link="rId4"/>
-          <a:stretch>
-            <a:fillRect/>
-          </a:stretch>
-        </p:blipFill>
-        <p:spPr>
-          <a:xfrm>
-            <a:off x="670221" y="1772776"/>
-            <a:ext cx="7803557" cy="3312447"/>
-          </a:xfrm>
-          <a:prstGeom prst="rect">
-            <a:avLst/>
-          </a:prstGeom>
-        </p:spPr>
-      </p:pic>
     </p:spTree>
   </p:cSld>
   <p:clrMapOvr>
@@ -12372,6 +12372,30 @@
           <a:chExt cx="0" cy="0"/>
         </a:xfrm>
       </p:grpSpPr>
+      <p:pic>
+        <p:nvPicPr>
+          <p:cNvPr id="4" name="Singleton.cs.png" descr="/Users/fullerjc/Documents/presentations/dependencies/img/Singleton.cs.png"/>
+          <p:cNvPicPr>
+            <a:picLocks noChangeAspect="1"/>
+          </p:cNvPicPr>
+          <p:nvPr/>
+        </p:nvPicPr>
+        <p:blipFill>
+          <a:blip r:embed="rId3" r:link="rId4"/>
+          <a:stretch>
+            <a:fillRect/>
+          </a:stretch>
+        </p:blipFill>
+        <p:spPr>
+          <a:xfrm>
+            <a:off x="0" y="0"/>
+            <a:ext cx="9143999" cy="6858000"/>
+          </a:xfrm>
+          <a:prstGeom prst="rect">
+            <a:avLst/>
+          </a:prstGeom>
+        </p:spPr>
+      </p:pic>
       <p:sp>
         <p:nvSpPr>
           <p:cNvPr id="5" name="Title 1"/>
@@ -12452,30 +12476,6 @@
           </a:p>
         </p:txBody>
       </p:sp>
-      <p:pic>
-        <p:nvPicPr>
-          <p:cNvPr id="6" name="Singleton.cs.png" descr="/Users/fullerjc/Documents/presentations/dependencies/img/Singleton.cs.png"/>
-          <p:cNvPicPr>
-            <a:picLocks noChangeAspect="1"/>
-          </p:cNvPicPr>
-          <p:nvPr/>
-        </p:nvPicPr>
-        <p:blipFill>
-          <a:blip r:embed="rId3" r:link="rId4"/>
-          <a:stretch>
-            <a:fillRect/>
-          </a:stretch>
-        </p:blipFill>
-        <p:spPr>
-          <a:xfrm>
-            <a:off x="304430" y="1772776"/>
-            <a:ext cx="8535140" cy="3312447"/>
-          </a:xfrm>
-          <a:prstGeom prst="rect">
-            <a:avLst/>
-          </a:prstGeom>
-        </p:spPr>
-      </p:pic>
     </p:spTree>
   </p:cSld>
   <p:clrMapOvr>
@@ -12654,7 +12654,7 @@
       </p:grpSpPr>
       <p:pic>
         <p:nvPicPr>
-          <p:cNvPr id="5" name="Intercept.cs.png" descr="/Users/fullerjc/Documents/presentations/dependencies/img/Intercept.cs.png"/>
+          <p:cNvPr id="4" name="Intercept.cs.png" descr="/Users/fullerjc/Documents/presentations/dependencies/img/Intercept.cs.png"/>
           <p:cNvPicPr>
             <a:picLocks noChangeAspect="1"/>
           </p:cNvPicPr>
@@ -12668,8 +12668,8 @@
         </p:blipFill>
         <p:spPr>
           <a:xfrm>
-            <a:off x="304430" y="1498432"/>
-            <a:ext cx="8535140" cy="3861135"/>
+            <a:off x="0" y="0"/>
+            <a:ext cx="9143999" cy="6858000"/>
           </a:xfrm>
           <a:prstGeom prst="rect">
             <a:avLst/>

</xml_diff>